<commit_message>
added placeholder for reconfigure and restart speaker notes
</commit_message>
<xml_diff>
--- a/02-Install.pptx
+++ b/02-Install.pptx
@@ -30,8 +30,8 @@
     <p:sldId id="273" r:id="rId22"/>
     <p:sldId id="274" r:id="rId23"/>
     <p:sldId id="266" r:id="rId24"/>
-    <p:sldId id="276" r:id="rId25"/>
-    <p:sldId id="275" r:id="rId26"/>
+    <p:sldId id="275" r:id="rId25"/>
+    <p:sldId id="276" r:id="rId26"/>
     <p:sldId id="267" r:id="rId27"/>
   </p:sldIdLst>
   <p:sldSz cx="16256000" cy="9144000"/>
@@ -294,7 +294,7 @@
               <a:pPr>
                 <a:defRPr/>
               </a:pPr>
-              <a:t>2015-12-01</a:t>
+              <a:t>2015-12-02</a:t>
             </a:fld>
             <a:endParaRPr lang="en-US" dirty="0"/>
           </a:p>
@@ -477,7 +477,7 @@
               <a:pPr>
                 <a:defRPr/>
               </a:pPr>
-              <a:t>2015-12-01</a:t>
+              <a:t>2015-12-02</a:t>
             </a:fld>
             <a:endParaRPr lang="en-US" dirty="0"/>
           </a:p>
@@ -1948,7 +1948,7 @@
             </a:pPr>
             <a:r>
               <a:rPr lang="en-US" dirty="0" smtClean="0"/>
-              <a:t>From the resulting web page, highlight and copy the URL for  the </a:t>
+              <a:t>From the resulting web page, highlight and copy the URL for the latest </a:t>
             </a:r>
             <a:r>
               <a:rPr lang="en-US" b="1" dirty="0" smtClean="0"/>
@@ -1964,15 +1964,23 @@
             </a:r>
             <a:r>
               <a:rPr lang="en-US" dirty="0" smtClean="0"/>
-              <a:t>click the Download button. We don't want to download </a:t>
+              <a:t>click the Download button. We don't want to download this directly to your laptop but instead we will </a:t>
             </a:r>
             <a:r>
               <a:rPr lang="en-US" smtClean="0"/>
-              <a:t>this directly to </a:t>
+              <a:t>download it</a:t>
+            </a:r>
+            <a:r>
+              <a:rPr lang="en-US" baseline="0" smtClean="0"/>
+              <a:t> </a:t>
+            </a:r>
+            <a:r>
+              <a:rPr lang="en-US" smtClean="0"/>
+              <a:t>directly </a:t>
             </a:r>
             <a:r>
               <a:rPr lang="en-US" dirty="0" smtClean="0"/>
-              <a:t>your laptop but instead we will download to directly to our node.</a:t>
+              <a:t>to our node.</a:t>
             </a:r>
           </a:p>
           <a:p>
@@ -2108,7 +2116,7 @@
         <p:spPr/>
         <p:txBody>
           <a:bodyPr>
-            <a:normAutofit fontScale="92500"/>
+            <a:normAutofit/>
           </a:bodyPr>
           <a:lstStyle/>
           <a:p>
@@ -2598,17 +2606,13 @@
         <p:spPr/>
         <p:txBody>
           <a:bodyPr>
-            <a:normAutofit fontScale="47500" lnSpcReduction="20000"/>
+            <a:normAutofit/>
           </a:bodyPr>
           <a:lstStyle/>
           <a:p>
             <a:r>
               <a:rPr lang="en-US" dirty="0" smtClean="0"/>
-              <a:t>This </a:t>
-            </a:r>
-            <a:r>
-              <a:rPr lang="en-US" dirty="0" smtClean="0"/>
-              <a:t>reconfiguration process could take 10 to 15 minutes to complete. </a:t>
+              <a:t>This reconfiguration process could take 10 to 15 minutes to complete. </a:t>
             </a:r>
           </a:p>
           <a:p>
@@ -2623,6 +2627,106 @@
               <a:rPr lang="en-US" dirty="0" smtClean="0"/>
               <a:t>: Do not use Ctrl c while this is running. </a:t>
             </a:r>
+          </a:p>
+          <a:p>
+            <a:endParaRPr lang="en-US" dirty="0" smtClean="0"/>
+          </a:p>
+          <a:p>
+            <a:endParaRPr lang="en-US" dirty="0" smtClean="0"/>
+          </a:p>
+          <a:p>
+            <a:r>
+              <a:rPr lang="en-US" dirty="0" smtClean="0"/>
+              <a:t>TBD- </a:t>
+            </a:r>
+            <a:r>
+              <a:rPr lang="en-US" dirty="0" err="1" smtClean="0"/>
+              <a:t>i</a:t>
+            </a:r>
+            <a:r>
+              <a:rPr lang="en-US" dirty="0" smtClean="0"/>
+              <a:t> believe so.  that's how </a:t>
+            </a:r>
+            <a:r>
+              <a:rPr lang="en-US" dirty="0" err="1" smtClean="0"/>
+              <a:t>i</a:t>
+            </a:r>
+            <a:r>
+              <a:rPr lang="en-US" dirty="0" smtClean="0"/>
+              <a:t> have it running,  </a:t>
+            </a:r>
+            <a:r>
+              <a:rPr lang="en-US" dirty="0" err="1" smtClean="0"/>
+              <a:t>i've</a:t>
+            </a:r>
+            <a:r>
+              <a:rPr lang="en-US" dirty="0" smtClean="0"/>
+              <a:t> also been running a reconfigure and restart after </a:t>
+            </a:r>
+            <a:r>
+              <a:rPr lang="en-US" dirty="0" err="1" smtClean="0"/>
+              <a:t>i</a:t>
+            </a:r>
+            <a:r>
+              <a:rPr lang="en-US" dirty="0" smtClean="0"/>
+              <a:t> upgrade the package</a:t>
+            </a:r>
+          </a:p>
+          <a:p>
+            <a:r>
+              <a:rPr lang="en-US" dirty="0" smtClean="0"/>
+              <a:t>​[9:04 AM] </a:t>
+            </a:r>
+          </a:p>
+          <a:p>
+            <a:r>
+              <a:rPr lang="en-US" dirty="0" err="1" smtClean="0"/>
+              <a:t>steve_delfante</a:t>
+            </a:r>
+            <a:r>
+              <a:rPr lang="en-US" dirty="0" smtClean="0"/>
+              <a:t> `sudo chef-compliance-</a:t>
+            </a:r>
+            <a:r>
+              <a:rPr lang="en-US" dirty="0" err="1" smtClean="0"/>
+              <a:t>ctl</a:t>
+            </a:r>
+            <a:r>
+              <a:rPr lang="en-US" dirty="0" smtClean="0"/>
+              <a:t> reconfigure` will reconfigure it but s=does that also restart it?</a:t>
+            </a:r>
+          </a:p>
+          <a:p>
+            <a:r>
+              <a:rPr lang="en-US" dirty="0" smtClean="0"/>
+              <a:t>new messages</a:t>
+            </a:r>
+          </a:p>
+          <a:p>
+            <a:r>
+              <a:rPr lang="en-US" dirty="0" smtClean="0"/>
+              <a:t>​[9:04 AM] </a:t>
+            </a:r>
+          </a:p>
+          <a:p>
+            <a:r>
+              <a:rPr lang="en-US" dirty="0" err="1" smtClean="0"/>
+              <a:t>kennon</a:t>
+            </a:r>
+            <a:r>
+              <a:rPr lang="en-US" dirty="0" smtClean="0"/>
+              <a:t> not always, you should also run `sudo chef-compliance-</a:t>
+            </a:r>
+            <a:r>
+              <a:rPr lang="en-US" dirty="0" err="1" smtClean="0"/>
+              <a:t>ctl</a:t>
+            </a:r>
+            <a:r>
+              <a:rPr lang="en-US" dirty="0" smtClean="0"/>
+              <a:t> restart</a:t>
+            </a:r>
+          </a:p>
+          <a:p>
             <a:endParaRPr lang="en-US" dirty="0" smtClean="0"/>
           </a:p>
           <a:p>
@@ -2782,18 +2886,22 @@
             </a:pPr>
             <a:r>
               <a:rPr lang="en-US" dirty="0" smtClean="0"/>
-              <a:t>Execute sudo chef-compliance-</a:t>
-            </a:r>
-            <a:r>
-              <a:rPr lang="en-US" dirty="0" err="1" smtClean="0"/>
+              <a:t>Execute </a:t>
+            </a:r>
+            <a:r>
+              <a:rPr lang="en-US" b="1" dirty="0" smtClean="0"/>
+              <a:t>sudo chef-compliance-</a:t>
+            </a:r>
+            <a:r>
+              <a:rPr lang="en-US" b="1" dirty="0" err="1" smtClean="0"/>
               <a:t>ctl</a:t>
             </a:r>
             <a:r>
-              <a:rPr lang="en-US" dirty="0" smtClean="0"/>
+              <a:rPr lang="en-US" b="1" dirty="0" smtClean="0"/>
               <a:t> user-create admin </a:t>
             </a:r>
             <a:r>
-              <a:rPr lang="en-US" dirty="0" err="1" smtClean="0"/>
+              <a:rPr lang="en-US" b="1" dirty="0" err="1" smtClean="0"/>
               <a:t>admin</a:t>
             </a:r>
             <a:r>
@@ -2841,15 +2949,15 @@
             </a:pPr>
             <a:r>
               <a:rPr lang="en-US" baseline="0" dirty="0" smtClean="0"/>
-              <a:t>This will create a </a:t>
-            </a:r>
-            <a:r>
-              <a:rPr lang="en-US" baseline="0" dirty="0" err="1" smtClean="0"/>
-              <a:t>a</a:t>
+              <a:t>This will create </a:t>
+            </a:r>
+            <a:r>
+              <a:rPr lang="en-US" baseline="0" smtClean="0"/>
+              <a:t>a user </a:t>
             </a:r>
             <a:r>
               <a:rPr lang="en-US" baseline="0" dirty="0" smtClean="0"/>
-              <a:t> user named admin with a password of admin.</a:t>
+              <a:t>named admin with a password of admin.</a:t>
             </a:r>
           </a:p>
           <a:p>
@@ -3553,14 +3661,14 @@
           </a:ln>
           <a:extLst>
             <a:ext uri="{909E8E84-426E-40dd-AFC4-6F175D3DCCD1}">
-              <a14:hiddenFill xmlns:a14="http://schemas.microsoft.com/office/drawing/2010/main" xmlns="">
+              <a14:hiddenFill xmlns="" xmlns:a14="http://schemas.microsoft.com/office/drawing/2010/main">
                 <a:solidFill>
                   <a:srgbClr val="FFFFFF"/>
                 </a:solidFill>
               </a14:hiddenFill>
             </a:ext>
             <a:ext uri="{91240B29-F687-4f45-9708-019B960494DF}">
-              <a14:hiddenLine xmlns:a14="http://schemas.microsoft.com/office/drawing/2010/main" xmlns="" w="9525">
+              <a14:hiddenLine xmlns="" xmlns:a14="http://schemas.microsoft.com/office/drawing/2010/main" w="9525">
                 <a:solidFill>
                   <a:srgbClr val="000000"/>
                 </a:solidFill>
@@ -3708,14 +3816,14 @@
           </a:ln>
           <a:extLst>
             <a:ext uri="{909E8E84-426E-40dd-AFC4-6F175D3DCCD1}">
-              <a14:hiddenFill xmlns:a14="http://schemas.microsoft.com/office/drawing/2010/main" xmlns="">
+              <a14:hiddenFill xmlns="" xmlns:a14="http://schemas.microsoft.com/office/drawing/2010/main">
                 <a:solidFill>
                   <a:srgbClr val="FFFFFF"/>
                 </a:solidFill>
               </a14:hiddenFill>
             </a:ext>
             <a:ext uri="{91240B29-F687-4f45-9708-019B960494DF}">
-              <a14:hiddenLine xmlns:a14="http://schemas.microsoft.com/office/drawing/2010/main" xmlns="" w="9525">
+              <a14:hiddenLine xmlns="" xmlns:a14="http://schemas.microsoft.com/office/drawing/2010/main" w="9525">
                 <a:solidFill>
                   <a:srgbClr val="000000"/>
                 </a:solidFill>
@@ -4206,14 +4314,14 @@
           </a:ln>
           <a:extLst>
             <a:ext uri="{909E8E84-426E-40dd-AFC4-6F175D3DCCD1}">
-              <a14:hiddenFill xmlns:a14="http://schemas.microsoft.com/office/drawing/2010/main" xmlns="">
+              <a14:hiddenFill xmlns="" xmlns:a14="http://schemas.microsoft.com/office/drawing/2010/main">
                 <a:solidFill>
                   <a:srgbClr val="FFFFFF"/>
                 </a:solidFill>
               </a14:hiddenFill>
             </a:ext>
             <a:ext uri="{91240B29-F687-4f45-9708-019B960494DF}">
-              <a14:hiddenLine xmlns:a14="http://schemas.microsoft.com/office/drawing/2010/main" xmlns="" w="9525">
+              <a14:hiddenLine xmlns="" xmlns:a14="http://schemas.microsoft.com/office/drawing/2010/main" w="9525">
                 <a:solidFill>
                   <a:srgbClr val="000000"/>
                 </a:solidFill>
@@ -5662,14 +5770,14 @@
           </a:ln>
           <a:extLst>
             <a:ext uri="{909E8E84-426E-40dd-AFC4-6F175D3DCCD1}">
-              <a14:hiddenFill xmlns:a14="http://schemas.microsoft.com/office/drawing/2010/main" xmlns="">
+              <a14:hiddenFill xmlns="" xmlns:a14="http://schemas.microsoft.com/office/drawing/2010/main">
                 <a:solidFill>
                   <a:srgbClr val="FFFFFF"/>
                 </a:solidFill>
               </a14:hiddenFill>
             </a:ext>
             <a:ext uri="{91240B29-F687-4f45-9708-019B960494DF}">
-              <a14:hiddenLine xmlns:a14="http://schemas.microsoft.com/office/drawing/2010/main" xmlns="" w="9525">
+              <a14:hiddenLine xmlns="" xmlns:a14="http://schemas.microsoft.com/office/drawing/2010/main" w="9525">
                 <a:solidFill>
                   <a:srgbClr val="000000"/>
                 </a:solidFill>
@@ -7023,14 +7131,14 @@
           </a:ln>
           <a:extLst>
             <a:ext uri="{909E8E84-426E-40dd-AFC4-6F175D3DCCD1}">
-              <a14:hiddenFill xmlns:a14="http://schemas.microsoft.com/office/drawing/2010/main" xmlns="">
+              <a14:hiddenFill xmlns="" xmlns:a14="http://schemas.microsoft.com/office/drawing/2010/main">
                 <a:solidFill>
                   <a:srgbClr val="FFFFFF"/>
                 </a:solidFill>
               </a14:hiddenFill>
             </a:ext>
             <a:ext uri="{91240B29-F687-4f45-9708-019B960494DF}">
-              <a14:hiddenLine xmlns:a14="http://schemas.microsoft.com/office/drawing/2010/main" xmlns="" w="9525">
+              <a14:hiddenLine xmlns="" xmlns:a14="http://schemas.microsoft.com/office/drawing/2010/main" w="9525">
                 <a:solidFill>
                   <a:srgbClr val="000000"/>
                 </a:solidFill>
@@ -7588,14 +7696,14 @@
           </a:ln>
           <a:extLst>
             <a:ext uri="{909E8E84-426E-40dd-AFC4-6F175D3DCCD1}">
-              <a14:hiddenFill xmlns:a14="http://schemas.microsoft.com/office/drawing/2010/main" xmlns="">
+              <a14:hiddenFill xmlns="" xmlns:a14="http://schemas.microsoft.com/office/drawing/2010/main">
                 <a:solidFill>
                   <a:srgbClr val="FFFFFF"/>
                 </a:solidFill>
               </a14:hiddenFill>
             </a:ext>
             <a:ext uri="{91240B29-F687-4f45-9708-019B960494DF}">
-              <a14:hiddenLine xmlns:a14="http://schemas.microsoft.com/office/drawing/2010/main" xmlns="" w="9525">
+              <a14:hiddenLine xmlns="" xmlns:a14="http://schemas.microsoft.com/office/drawing/2010/main" w="9525">
                 <a:solidFill>
                   <a:srgbClr val="000000"/>
                 </a:solidFill>
@@ -8162,14 +8270,14 @@
           </a:ln>
           <a:extLst>
             <a:ext uri="{909E8E84-426E-40dd-AFC4-6F175D3DCCD1}">
-              <a14:hiddenFill xmlns:a14="http://schemas.microsoft.com/office/drawing/2010/main" xmlns="">
+              <a14:hiddenFill xmlns="" xmlns:a14="http://schemas.microsoft.com/office/drawing/2010/main">
                 <a:solidFill>
                   <a:srgbClr val="FFFFFF"/>
                 </a:solidFill>
               </a14:hiddenFill>
             </a:ext>
             <a:ext uri="{91240B29-F687-4f45-9708-019B960494DF}">
-              <a14:hiddenLine xmlns:a14="http://schemas.microsoft.com/office/drawing/2010/main" xmlns="" w="9525">
+              <a14:hiddenLine xmlns="" xmlns:a14="http://schemas.microsoft.com/office/drawing/2010/main" w="9525">
                 <a:solidFill>
                   <a:srgbClr val="000000"/>
                 </a:solidFill>
@@ -9109,14 +9217,14 @@
           </a:ln>
           <a:extLst>
             <a:ext uri="{909E8E84-426E-40dd-AFC4-6F175D3DCCD1}">
-              <a14:hiddenFill xmlns:a14="http://schemas.microsoft.com/office/drawing/2010/main" xmlns="">
+              <a14:hiddenFill xmlns="" xmlns:a14="http://schemas.microsoft.com/office/drawing/2010/main">
                 <a:solidFill>
                   <a:srgbClr val="FFFFFF"/>
                 </a:solidFill>
               </a14:hiddenFill>
             </a:ext>
             <a:ext uri="{91240B29-F687-4f45-9708-019B960494DF}">
-              <a14:hiddenLine xmlns:a14="http://schemas.microsoft.com/office/drawing/2010/main" xmlns="" w="9525">
+              <a14:hiddenLine xmlns="" xmlns:a14="http://schemas.microsoft.com/office/drawing/2010/main" w="9525">
                 <a:solidFill>
                   <a:srgbClr val="000000"/>
                 </a:solidFill>
@@ -9196,7 +9304,7 @@
               <a:defRPr/>
             </a:pPr>
             <a:r>
-              <a:rPr lang="en-US" dirty="0">
+              <a:rPr lang="en-US" dirty="0" smtClean="0">
                 <a:solidFill>
                   <a:srgbClr val="7D868C"/>
                 </a:solidFill>
@@ -9204,7 +9312,18 @@
                 <a:ea typeface="+mn-ea"/>
                 <a:cs typeface="+mn-cs"/>
               </a:rPr>
-              <a:t>©2015 Chef Software Inc</a:t>
+              <a:t>©2016 </a:t>
+            </a:r>
+            <a:r>
+              <a:rPr lang="en-US" dirty="0">
+                <a:solidFill>
+                  <a:srgbClr val="7D868C"/>
+                </a:solidFill>
+                <a:latin typeface="+mn-lt"/>
+                <a:ea typeface="+mn-ea"/>
+                <a:cs typeface="+mn-cs"/>
+              </a:rPr>
+              <a:t>Chef Software Inc</a:t>
             </a:r>
             <a:r>
               <a:rPr lang="en-US" dirty="0">
@@ -9856,14 +9975,14 @@
           </a:ln>
           <a:extLst>
             <a:ext uri="{909E8E84-426E-40dd-AFC4-6F175D3DCCD1}">
-              <a14:hiddenFill xmlns:a14="http://schemas.microsoft.com/office/drawing/2010/main" xmlns="">
+              <a14:hiddenFill xmlns="" xmlns:a14="http://schemas.microsoft.com/office/drawing/2010/main">
                 <a:solidFill>
                   <a:srgbClr val="FFFFFF"/>
                 </a:solidFill>
               </a14:hiddenFill>
             </a:ext>
             <a:ext uri="{91240B29-F687-4f45-9708-019B960494DF}">
-              <a14:hiddenLine xmlns:a14="http://schemas.microsoft.com/office/drawing/2010/main" xmlns="" w="9525">
+              <a14:hiddenLine xmlns="" xmlns:a14="http://schemas.microsoft.com/office/drawing/2010/main" w="9525">
                 <a:solidFill>
                   <a:srgbClr val="000000"/>
                 </a:solidFill>
@@ -9943,7 +10062,7 @@
               <a:defRPr/>
             </a:pPr>
             <a:r>
-              <a:rPr lang="en-US" dirty="0">
+              <a:rPr lang="en-US" dirty="0" smtClean="0">
                 <a:solidFill>
                   <a:srgbClr val="7D868C"/>
                 </a:solidFill>
@@ -9951,7 +10070,18 @@
                 <a:ea typeface="+mn-ea"/>
                 <a:cs typeface="+mn-cs"/>
               </a:rPr>
-              <a:t>©2015 Chef Software Inc</a:t>
+              <a:t>©2016 </a:t>
+            </a:r>
+            <a:r>
+              <a:rPr lang="en-US" dirty="0">
+                <a:solidFill>
+                  <a:srgbClr val="7D868C"/>
+                </a:solidFill>
+                <a:latin typeface="+mn-lt"/>
+                <a:ea typeface="+mn-ea"/>
+                <a:cs typeface="+mn-cs"/>
+              </a:rPr>
+              <a:t>Chef Software Inc</a:t>
             </a:r>
             <a:r>
               <a:rPr lang="en-US" dirty="0">
@@ -10892,11 +11022,7 @@
           <a:p>
             <a:r>
               <a:rPr lang="en-US" dirty="0" smtClean="0"/>
-              <a:t>...</a:t>
-            </a:r>
-            <a:r>
-              <a:rPr lang="en-US" dirty="0" smtClean="0"/>
-              <a:t>    </a:t>
+              <a:t>...    </a:t>
             </a:r>
           </a:p>
           <a:p>
@@ -11161,11 +11287,7 @@
           <a:p>
             <a:r>
               <a:rPr lang="en-US" dirty="0" smtClean="0"/>
-              <a:t>GE: Creat</a:t>
-            </a:r>
-            <a:r>
-              <a:rPr lang="en-US" dirty="0" smtClean="0"/>
-              <a:t>e Administrator Credentials</a:t>
+              <a:t>GE: Create Administrator Credentials</a:t>
             </a:r>
             <a:endParaRPr lang="en-US" dirty="0"/>
           </a:p>
@@ -11898,22 +12020,6 @@
 <file path=ppt/slides/slide19.xml><?xml version="1.0" encoding="utf-8"?>
 <p:sld xmlns:a="http://schemas.openxmlformats.org/drawingml/2006/main" xmlns:r="http://schemas.openxmlformats.org/officeDocument/2006/relationships" xmlns:p="http://schemas.openxmlformats.org/presentationml/2006/main">
   <p:cSld>
-    <p:bg>
-      <p:bgPr>
-        <a:gradFill rotWithShape="0">
-          <a:gsLst>
-            <a:gs pos="0">
-              <a:srgbClr val="F0F0F0"/>
-            </a:gs>
-            <a:gs pos="100000">
-              <a:schemeClr val="bg2"/>
-            </a:gs>
-          </a:gsLst>
-          <a:lin ang="5400000" scaled="1"/>
-        </a:gradFill>
-        <a:effectLst/>
-      </p:bgPr>
-    </p:bg>
     <p:spTree>
       <p:nvGrpSpPr>
         <p:cNvPr id="1" name=""/>
@@ -11935,7 +12041,28 @@
             <a:spLocks noGrp="1"/>
           </p:cNvSpPr>
           <p:nvPr>
-            <p:ph type="title"/>
+            <p:ph type="ctrTitle"/>
+          </p:nvPr>
+        </p:nvSpPr>
+        <p:spPr/>
+        <p:txBody>
+          <a:bodyPr>
+            <a:normAutofit fontScale="90000"/>
+          </a:bodyPr>
+          <a:lstStyle/>
+          <a:p>
+            <a:endParaRPr lang="en-US"/>
+          </a:p>
+        </p:txBody>
+      </p:sp>
+      <p:sp>
+        <p:nvSpPr>
+          <p:cNvPr id="3" name="Subtitle 2"/>
+          <p:cNvSpPr>
+            <a:spLocks noGrp="1"/>
+          </p:cNvSpPr>
+          <p:nvPr>
+            <p:ph type="subTitle" idx="1"/>
           </p:nvPr>
         </p:nvSpPr>
         <p:spPr/>
@@ -11943,126 +12070,102 @@
           <a:bodyPr/>
           <a:lstStyle/>
           <a:p>
-            <a:r>
-              <a:rPr lang="en-US" dirty="0" smtClean="0"/>
-              <a:t>Review Questions</a:t>
-            </a:r>
-            <a:endParaRPr lang="en-US" dirty="0"/>
-          </a:p>
-        </p:txBody>
-      </p:sp>
-      <p:sp>
-        <p:nvSpPr>
-          <p:cNvPr id="3" name="Text Placeholder 2"/>
-          <p:cNvSpPr>
-            <a:spLocks noGrp="1"/>
-          </p:cNvSpPr>
-          <p:nvPr>
-            <p:ph type="body" sz="quarter" idx="12"/>
-          </p:nvPr>
-        </p:nvSpPr>
-        <p:spPr/>
-        <p:txBody>
-          <a:bodyPr/>
-          <a:lstStyle/>
-          <a:p>
-            <a:pPr marL="514350" indent="-514350">
-              <a:buFont typeface="+mj-lt"/>
-              <a:buAutoNum type="arabicPeriod"/>
-            </a:pPr>
-            <a:r>
-              <a:rPr lang="en-US" dirty="0" smtClean="0"/>
-              <a:t>What is ...?</a:t>
-            </a:r>
-            <a:br>
-              <a:rPr lang="en-US" dirty="0" smtClean="0"/>
-            </a:br>
-            <a:r>
-              <a:rPr lang="en-US" dirty="0" smtClean="0"/>
-              <a:t>______________________________</a:t>
-            </a:r>
-          </a:p>
-          <a:p>
-            <a:pPr marL="514350" indent="-514350">
-              <a:buFont typeface="+mj-lt"/>
-              <a:buAutoNum type="arabicPeriod"/>
-            </a:pPr>
-            <a:r>
-              <a:rPr lang="en-US" dirty="0" smtClean="0"/>
-              <a:t>Which is the correct answer?  </a:t>
-            </a:r>
-          </a:p>
-          <a:p>
-            <a:pPr marL="822325" lvl="1" indent="-514350">
-              <a:buFont typeface="+mj-lt"/>
-              <a:buAutoNum type="alphaLcPeriod"/>
-            </a:pPr>
-            <a:r>
-              <a:rPr lang="en-US" dirty="0" smtClean="0"/>
-              <a:t>answer</a:t>
-            </a:r>
-          </a:p>
-          <a:p>
-            <a:pPr marL="822325" lvl="1" indent="-514350">
-              <a:buFont typeface="+mj-lt"/>
-              <a:buAutoNum type="alphaLcPeriod"/>
-            </a:pPr>
-            <a:r>
-              <a:rPr lang="en-US" dirty="0" smtClean="0"/>
-              <a:t>answer</a:t>
-            </a:r>
-          </a:p>
-          <a:p>
-            <a:pPr marL="822325" lvl="1" indent="-514350">
-              <a:buFont typeface="+mj-lt"/>
-              <a:buAutoNum type="alphaLcPeriod"/>
-            </a:pPr>
-            <a:r>
-              <a:rPr lang="en-US" dirty="0" smtClean="0"/>
-              <a:t>answer</a:t>
-            </a:r>
-          </a:p>
-          <a:p>
-            <a:pPr marL="822325" lvl="1" indent="-514350">
-              <a:buFont typeface="+mj-lt"/>
-              <a:buAutoNum type="alphaLcPeriod"/>
-            </a:pPr>
-            <a:r>
-              <a:rPr lang="en-US" dirty="0" smtClean="0"/>
-              <a:t>answer</a:t>
-            </a:r>
-            <a:br>
-              <a:rPr lang="en-US" dirty="0" smtClean="0"/>
-            </a:br>
             <a:endParaRPr lang="en-US" dirty="0" smtClean="0"/>
           </a:p>
           <a:p>
-            <a:pPr marL="514350" indent="-514350">
-              <a:buFont typeface="+mj-lt"/>
-              <a:buAutoNum type="arabicPeriod"/>
-            </a:pPr>
-            <a:r>
-              <a:rPr lang="en-US" dirty="0" smtClean="0"/>
-              <a:t>Capable of carrying on a conversation</a:t>
-            </a:r>
-          </a:p>
-          <a:p>
-            <a:pPr marL="514350" indent="-514350">
-              <a:buFont typeface="+mj-lt"/>
-              <a:buAutoNum type="arabicPeriod"/>
-            </a:pPr>
-            <a:r>
-              <a:rPr lang="en-US" dirty="0" smtClean="0"/>
-              <a:t>Explain</a:t>
-            </a:r>
-            <a:endParaRPr lang="en-US" dirty="0"/>
+            <a:r>
+              <a:rPr lang="en-US" dirty="0" err="1"/>
+              <a:t>i</a:t>
+            </a:r>
+            <a:r>
+              <a:rPr lang="en-US" dirty="0"/>
+              <a:t> believe so.  that's how </a:t>
+            </a:r>
+            <a:r>
+              <a:rPr lang="en-US" dirty="0" err="1"/>
+              <a:t>i</a:t>
+            </a:r>
+            <a:r>
+              <a:rPr lang="en-US" dirty="0"/>
+              <a:t> have it running,  </a:t>
+            </a:r>
+            <a:r>
+              <a:rPr lang="en-US" dirty="0" err="1"/>
+              <a:t>i've</a:t>
+            </a:r>
+            <a:r>
+              <a:rPr lang="en-US" dirty="0"/>
+              <a:t> also been running a reconfigure and restart after </a:t>
+            </a:r>
+            <a:r>
+              <a:rPr lang="en-US" dirty="0" err="1"/>
+              <a:t>i</a:t>
+            </a:r>
+            <a:r>
+              <a:rPr lang="en-US" dirty="0"/>
+              <a:t> upgrade the package</a:t>
+            </a:r>
+          </a:p>
+          <a:p>
+            <a:r>
+              <a:rPr lang="en-US" dirty="0"/>
+              <a:t>​[9:04 AM] </a:t>
+            </a:r>
+          </a:p>
+          <a:p>
+            <a:r>
+              <a:rPr lang="en-US" dirty="0" err="1"/>
+              <a:t>steve_delfante</a:t>
+            </a:r>
+            <a:r>
+              <a:rPr lang="en-US" dirty="0"/>
+              <a:t> `sudo chef-compliance-</a:t>
+            </a:r>
+            <a:r>
+              <a:rPr lang="en-US" dirty="0" err="1"/>
+              <a:t>ctl</a:t>
+            </a:r>
+            <a:r>
+              <a:rPr lang="en-US" dirty="0"/>
+              <a:t> reconfigure` will reconfigure it but s=does that also restart it?</a:t>
+            </a:r>
+          </a:p>
+          <a:p>
+            <a:r>
+              <a:rPr lang="en-US" dirty="0"/>
+              <a:t>new messages</a:t>
+            </a:r>
+          </a:p>
+          <a:p>
+            <a:r>
+              <a:rPr lang="en-US" dirty="0"/>
+              <a:t>​[9:04 AM] </a:t>
+            </a:r>
+          </a:p>
+          <a:p>
+            <a:r>
+              <a:rPr lang="en-US" dirty="0" err="1"/>
+              <a:t>kennon</a:t>
+            </a:r>
+            <a:r>
+              <a:rPr lang="en-US" dirty="0"/>
+              <a:t> not always, you should also run `sudo chef-compliance-</a:t>
+            </a:r>
+            <a:r>
+              <a:rPr lang="en-US" dirty="0" err="1"/>
+              <a:t>ctl</a:t>
+            </a:r>
+            <a:r>
+              <a:rPr lang="en-US" dirty="0"/>
+              <a:t> restart</a:t>
+            </a:r>
           </a:p>
         </p:txBody>
       </p:sp>
     </p:spTree>
     <p:extLst>
       <p:ext uri="{BB962C8B-B14F-4D97-AF65-F5344CB8AC3E}">
-        <p14:creationId xmlns:p14="http://schemas.microsoft.com/office/powerpoint/2010/main" val="321457963"/>
+        <p14:creationId xmlns:p14="http://schemas.microsoft.com/office/powerpoint/2010/main" val="108599519"/>
       </p:ext>
     </p:extLst>
   </p:cSld>
@@ -12072,6 +12175,13 @@
   <p:transition spd="med">
     <p:fade/>
   </p:transition>
+  <p:timing>
+    <p:tnLst>
+      <p:par>
+        <p:cTn id="1" dur="indefinite" restart="never" nodeType="tmRoot"/>
+      </p:par>
+    </p:tnLst>
+  </p:timing>
 </p:sld>
 </file>
 
@@ -12173,6 +12283,16 @@
               <a:rPr lang="en-US" dirty="0" smtClean="0"/>
               <a:t>Perform initial configuration of the Compliance server.</a:t>
             </a:r>
+          </a:p>
+          <a:p>
+            <a:pPr marL="457200" indent="-457200">
+              <a:buFont typeface="Wingdings" charset="2"/>
+              <a:buChar char="Ø"/>
+            </a:pPr>
+            <a:r>
+              <a:rPr lang="en-US" dirty="0" smtClean="0"/>
+              <a:t>Set up Compliance key pairs.</a:t>
+            </a:r>
             <a:endParaRPr lang="en-US" dirty="0"/>
           </a:p>
         </p:txBody>
@@ -12203,6 +12323,22 @@
 <file path=ppt/slides/slide20.xml><?xml version="1.0" encoding="utf-8"?>
 <p:sld xmlns:a="http://schemas.openxmlformats.org/drawingml/2006/main" xmlns:r="http://schemas.openxmlformats.org/officeDocument/2006/relationships" xmlns:p="http://schemas.openxmlformats.org/presentationml/2006/main">
   <p:cSld>
+    <p:bg>
+      <p:bgPr>
+        <a:gradFill rotWithShape="0">
+          <a:gsLst>
+            <a:gs pos="0">
+              <a:srgbClr val="F0F0F0"/>
+            </a:gs>
+            <a:gs pos="100000">
+              <a:schemeClr val="bg2"/>
+            </a:gs>
+          </a:gsLst>
+          <a:lin ang="5400000" scaled="1"/>
+        </a:gradFill>
+        <a:effectLst/>
+      </p:bgPr>
+    </p:bg>
     <p:spTree>
       <p:nvGrpSpPr>
         <p:cNvPr id="1" name=""/>
@@ -12224,28 +12360,7 @@
             <a:spLocks noGrp="1"/>
           </p:cNvSpPr>
           <p:nvPr>
-            <p:ph type="ctrTitle"/>
-          </p:nvPr>
-        </p:nvSpPr>
-        <p:spPr/>
-        <p:txBody>
-          <a:bodyPr>
-            <a:normAutofit fontScale="90000"/>
-          </a:bodyPr>
-          <a:lstStyle/>
-          <a:p>
-            <a:endParaRPr lang="en-US"/>
-          </a:p>
-        </p:txBody>
-      </p:sp>
-      <p:sp>
-        <p:nvSpPr>
-          <p:cNvPr id="3" name="Subtitle 2"/>
-          <p:cNvSpPr>
-            <a:spLocks noGrp="1"/>
-          </p:cNvSpPr>
-          <p:nvPr>
-            <p:ph type="subTitle" idx="1"/>
+            <p:ph type="title"/>
           </p:nvPr>
         </p:nvSpPr>
         <p:spPr/>
@@ -12253,14 +12368,126 @@
           <a:bodyPr/>
           <a:lstStyle/>
           <a:p>
-            <a:endParaRPr lang="en-US"/>
+            <a:r>
+              <a:rPr lang="en-US" dirty="0" smtClean="0"/>
+              <a:t>Review Questions</a:t>
+            </a:r>
+            <a:endParaRPr lang="en-US" dirty="0"/>
+          </a:p>
+        </p:txBody>
+      </p:sp>
+      <p:sp>
+        <p:nvSpPr>
+          <p:cNvPr id="3" name="Text Placeholder 2"/>
+          <p:cNvSpPr>
+            <a:spLocks noGrp="1"/>
+          </p:cNvSpPr>
+          <p:nvPr>
+            <p:ph type="body" sz="quarter" idx="12"/>
+          </p:nvPr>
+        </p:nvSpPr>
+        <p:spPr/>
+        <p:txBody>
+          <a:bodyPr/>
+          <a:lstStyle/>
+          <a:p>
+            <a:pPr marL="514350" indent="-514350">
+              <a:buFont typeface="+mj-lt"/>
+              <a:buAutoNum type="arabicPeriod"/>
+            </a:pPr>
+            <a:r>
+              <a:rPr lang="en-US" dirty="0" smtClean="0"/>
+              <a:t>What is ...?</a:t>
+            </a:r>
+            <a:br>
+              <a:rPr lang="en-US" dirty="0" smtClean="0"/>
+            </a:br>
+            <a:r>
+              <a:rPr lang="en-US" dirty="0" smtClean="0"/>
+              <a:t>______________________________</a:t>
+            </a:r>
+          </a:p>
+          <a:p>
+            <a:pPr marL="514350" indent="-514350">
+              <a:buFont typeface="+mj-lt"/>
+              <a:buAutoNum type="arabicPeriod"/>
+            </a:pPr>
+            <a:r>
+              <a:rPr lang="en-US" dirty="0" smtClean="0"/>
+              <a:t>Which is the correct answer?  </a:t>
+            </a:r>
+          </a:p>
+          <a:p>
+            <a:pPr marL="822325" lvl="1" indent="-514350">
+              <a:buFont typeface="+mj-lt"/>
+              <a:buAutoNum type="alphaLcPeriod"/>
+            </a:pPr>
+            <a:r>
+              <a:rPr lang="en-US" dirty="0" smtClean="0"/>
+              <a:t>answer</a:t>
+            </a:r>
+          </a:p>
+          <a:p>
+            <a:pPr marL="822325" lvl="1" indent="-514350">
+              <a:buFont typeface="+mj-lt"/>
+              <a:buAutoNum type="alphaLcPeriod"/>
+            </a:pPr>
+            <a:r>
+              <a:rPr lang="en-US" dirty="0" smtClean="0"/>
+              <a:t>answer</a:t>
+            </a:r>
+          </a:p>
+          <a:p>
+            <a:pPr marL="822325" lvl="1" indent="-514350">
+              <a:buFont typeface="+mj-lt"/>
+              <a:buAutoNum type="alphaLcPeriod"/>
+            </a:pPr>
+            <a:r>
+              <a:rPr lang="en-US" dirty="0" smtClean="0"/>
+              <a:t>answer</a:t>
+            </a:r>
+          </a:p>
+          <a:p>
+            <a:pPr marL="822325" lvl="1" indent="-514350">
+              <a:buFont typeface="+mj-lt"/>
+              <a:buAutoNum type="alphaLcPeriod"/>
+            </a:pPr>
+            <a:r>
+              <a:rPr lang="en-US" dirty="0" smtClean="0"/>
+              <a:t>answer</a:t>
+            </a:r>
+            <a:br>
+              <a:rPr lang="en-US" dirty="0" smtClean="0"/>
+            </a:br>
+            <a:endParaRPr lang="en-US" dirty="0" smtClean="0"/>
+          </a:p>
+          <a:p>
+            <a:pPr marL="514350" indent="-514350">
+              <a:buFont typeface="+mj-lt"/>
+              <a:buAutoNum type="arabicPeriod"/>
+            </a:pPr>
+            <a:r>
+              <a:rPr lang="en-US" dirty="0" smtClean="0"/>
+              <a:t>Capable of carrying on a conversation</a:t>
+            </a:r>
+          </a:p>
+          <a:p>
+            <a:pPr marL="514350" indent="-514350">
+              <a:buFont typeface="+mj-lt"/>
+              <a:buAutoNum type="arabicPeriod"/>
+            </a:pPr>
+            <a:r>
+              <a:rPr lang="en-US" dirty="0" smtClean="0"/>
+              <a:t>Explain</a:t>
+            </a:r>
+            <a:endParaRPr lang="en-US" dirty="0"/>
           </a:p>
         </p:txBody>
       </p:sp>
     </p:spTree>
     <p:extLst>
       <p:ext uri="{BB962C8B-B14F-4D97-AF65-F5344CB8AC3E}">
-        <p14:creationId xmlns:p14="http://schemas.microsoft.com/office/powerpoint/2010/main" val="108599519"/>
+        <p14:creationId xmlns:p14="http://schemas.microsoft.com/office/powerpoint/2010/main" val="321457963"/>
       </p:ext>
     </p:extLst>
   </p:cSld>
@@ -12290,6 +12517,167 @@
           <a:chExt cx="0" cy="0"/>
         </a:xfrm>
       </p:grpSpPr>
+      <p:sp>
+        <p:nvSpPr>
+          <p:cNvPr id="2" name="Footer Placeholder 1"/>
+          <p:cNvSpPr txBox="1">
+            <a:spLocks/>
+          </p:cNvSpPr>
+          <p:nvPr/>
+        </p:nvSpPr>
+        <p:spPr>
+          <a:xfrm>
+            <a:off x="324400" y="8579607"/>
+            <a:ext cx="5681953" cy="507556"/>
+          </a:xfrm>
+          <a:prstGeom prst="rect">
+            <a:avLst/>
+          </a:prstGeom>
+        </p:spPr>
+        <p:txBody>
+          <a:bodyPr/>
+          <a:lstStyle>
+            <a:defPPr>
+              <a:defRPr lang="en-US"/>
+            </a:defPPr>
+            <a:lvl1pPr algn="l" defTabSz="1217613" rtl="0" fontAlgn="base">
+              <a:spcBef>
+                <a:spcPct val="0"/>
+              </a:spcBef>
+              <a:spcAft>
+                <a:spcPct val="0"/>
+              </a:spcAft>
+              <a:defRPr sz="2400" kern="1200">
+                <a:solidFill>
+                  <a:schemeClr val="tx1"/>
+                </a:solidFill>
+                <a:latin typeface="Arial" charset="0"/>
+                <a:ea typeface="ＭＳ Ｐゴシック" charset="0"/>
+                <a:cs typeface="ＭＳ Ｐゴシック" charset="0"/>
+              </a:defRPr>
+            </a:lvl1pPr>
+            <a:lvl2pPr marL="608013" indent="-150813" algn="l" defTabSz="1217613" rtl="0" fontAlgn="base">
+              <a:spcBef>
+                <a:spcPct val="0"/>
+              </a:spcBef>
+              <a:spcAft>
+                <a:spcPct val="0"/>
+              </a:spcAft>
+              <a:defRPr sz="2400" kern="1200">
+                <a:solidFill>
+                  <a:schemeClr val="tx1"/>
+                </a:solidFill>
+                <a:latin typeface="Arial" charset="0"/>
+                <a:ea typeface="ＭＳ Ｐゴシック" charset="0"/>
+                <a:cs typeface="ＭＳ Ｐゴシック" charset="0"/>
+              </a:defRPr>
+            </a:lvl2pPr>
+            <a:lvl3pPr marL="1217613" indent="-303213" algn="l" defTabSz="1217613" rtl="0" fontAlgn="base">
+              <a:spcBef>
+                <a:spcPct val="0"/>
+              </a:spcBef>
+              <a:spcAft>
+                <a:spcPct val="0"/>
+              </a:spcAft>
+              <a:defRPr sz="2400" kern="1200">
+                <a:solidFill>
+                  <a:schemeClr val="tx1"/>
+                </a:solidFill>
+                <a:latin typeface="Arial" charset="0"/>
+                <a:ea typeface="ＭＳ Ｐゴシック" charset="0"/>
+                <a:cs typeface="ＭＳ Ｐゴシック" charset="0"/>
+              </a:defRPr>
+            </a:lvl3pPr>
+            <a:lvl4pPr marL="1827213" indent="-455613" algn="l" defTabSz="1217613" rtl="0" fontAlgn="base">
+              <a:spcBef>
+                <a:spcPct val="0"/>
+              </a:spcBef>
+              <a:spcAft>
+                <a:spcPct val="0"/>
+              </a:spcAft>
+              <a:defRPr sz="2400" kern="1200">
+                <a:solidFill>
+                  <a:schemeClr val="tx1"/>
+                </a:solidFill>
+                <a:latin typeface="Arial" charset="0"/>
+                <a:ea typeface="ＭＳ Ｐゴシック" charset="0"/>
+                <a:cs typeface="ＭＳ Ｐゴシック" charset="0"/>
+              </a:defRPr>
+            </a:lvl4pPr>
+            <a:lvl5pPr marL="2436813" indent="-608013" algn="l" defTabSz="1217613" rtl="0" fontAlgn="base">
+              <a:spcBef>
+                <a:spcPct val="0"/>
+              </a:spcBef>
+              <a:spcAft>
+                <a:spcPct val="0"/>
+              </a:spcAft>
+              <a:defRPr sz="2400" kern="1200">
+                <a:solidFill>
+                  <a:schemeClr val="tx1"/>
+                </a:solidFill>
+                <a:latin typeface="Arial" charset="0"/>
+                <a:ea typeface="ＭＳ Ｐゴシック" charset="0"/>
+                <a:cs typeface="ＭＳ Ｐゴシック" charset="0"/>
+              </a:defRPr>
+            </a:lvl5pPr>
+            <a:lvl6pPr marL="2286000" algn="l" defTabSz="457200" rtl="0" eaLnBrk="1" latinLnBrk="0" hangingPunct="1">
+              <a:defRPr sz="2400" kern="1200">
+                <a:solidFill>
+                  <a:schemeClr val="tx1"/>
+                </a:solidFill>
+                <a:latin typeface="Arial" charset="0"/>
+                <a:ea typeface="ＭＳ Ｐゴシック" charset="0"/>
+                <a:cs typeface="ＭＳ Ｐゴシック" charset="0"/>
+              </a:defRPr>
+            </a:lvl6pPr>
+            <a:lvl7pPr marL="2743200" algn="l" defTabSz="457200" rtl="0" eaLnBrk="1" latinLnBrk="0" hangingPunct="1">
+              <a:defRPr sz="2400" kern="1200">
+                <a:solidFill>
+                  <a:schemeClr val="tx1"/>
+                </a:solidFill>
+                <a:latin typeface="Arial" charset="0"/>
+                <a:ea typeface="ＭＳ Ｐゴシック" charset="0"/>
+                <a:cs typeface="ＭＳ Ｐゴシック" charset="0"/>
+              </a:defRPr>
+            </a:lvl7pPr>
+            <a:lvl8pPr marL="3200400" algn="l" defTabSz="457200" rtl="0" eaLnBrk="1" latinLnBrk="0" hangingPunct="1">
+              <a:defRPr sz="2400" kern="1200">
+                <a:solidFill>
+                  <a:schemeClr val="tx1"/>
+                </a:solidFill>
+                <a:latin typeface="Arial" charset="0"/>
+                <a:ea typeface="ＭＳ Ｐゴシック" charset="0"/>
+                <a:cs typeface="ＭＳ Ｐゴシック" charset="0"/>
+              </a:defRPr>
+            </a:lvl8pPr>
+            <a:lvl9pPr marL="3657600" algn="l" defTabSz="457200" rtl="0" eaLnBrk="1" latinLnBrk="0" hangingPunct="1">
+              <a:defRPr sz="2400" kern="1200">
+                <a:solidFill>
+                  <a:schemeClr val="tx1"/>
+                </a:solidFill>
+                <a:latin typeface="Arial" charset="0"/>
+                <a:ea typeface="ＭＳ Ｐゴシック" charset="0"/>
+                <a:cs typeface="ＭＳ Ｐゴシック" charset="0"/>
+              </a:defRPr>
+            </a:lvl9pPr>
+          </a:lstStyle>
+          <a:p>
+            <a:r>
+              <a:rPr lang="en-US" dirty="0" smtClean="0">
+                <a:solidFill>
+                  <a:srgbClr val="7D868C"/>
+                </a:solidFill>
+              </a:rPr>
+              <a:t>©2016 Chef Software Inc</a:t>
+            </a:r>
+            <a:r>
+              <a:rPr lang="en-US" dirty="0" smtClean="0"/>
+              <a:t>.</a:t>
+            </a:r>
+            <a:endParaRPr lang="en-US" dirty="0"/>
+          </a:p>
+        </p:txBody>
+      </p:sp>
     </p:spTree>
     <p:extLst>
       <p:ext uri="{BB962C8B-B14F-4D97-AF65-F5344CB8AC3E}">
@@ -12493,7 +12881,6 @@
               <a:rPr lang="en-US" dirty="0"/>
               <a:t>Installation</a:t>
             </a:r>
-            <a:endParaRPr lang="en-US" dirty="0"/>
           </a:p>
         </p:txBody>
       </p:sp>
@@ -12516,7 +12903,6 @@
               <a:rPr lang="en-US" dirty="0"/>
               <a:t>Standalone Installation</a:t>
             </a:r>
-            <a:endParaRPr lang="en-US" dirty="0"/>
           </a:p>
         </p:txBody>
       </p:sp>
@@ -13042,6 +13428,13 @@
   <p:transition spd="med">
     <p:fade/>
   </p:transition>
+  <p:timing>
+    <p:tnLst>
+      <p:par>
+        <p:cTn id="1" dur="indefinite" restart="never" nodeType="tmRoot"/>
+      </p:par>
+    </p:tnLst>
+  </p:timing>
 </p:sld>
 </file>
 
@@ -13194,6 +13587,13 @@
   <p:transition spd="med">
     <p:fade/>
   </p:transition>
+  <p:timing>
+    <p:tnLst>
+      <p:par>
+        <p:cTn id="1" dur="indefinite" restart="never" nodeType="tmRoot"/>
+      </p:par>
+    </p:tnLst>
+  </p:timing>
 </p:sld>
 </file>
 
@@ -13263,7 +13663,7 @@
             </a:pPr>
             <a:r>
               <a:rPr lang="en-US" dirty="0" smtClean="0"/>
-              <a:t>From the resulting web page, highlight and copy the URL for  the </a:t>
+              <a:t>From the resulting web page, click the Red Had Linux link and then highlight and copy the URL for the </a:t>
             </a:r>
             <a:r>
               <a:rPr lang="en-US" b="1" dirty="0"/>
@@ -13345,6 +13745,13 @@
   <p:transition spd="med">
     <p:fade/>
   </p:transition>
+  <p:timing>
+    <p:tnLst>
+      <p:par>
+        <p:cTn id="1" dur="indefinite" restart="never" nodeType="tmRoot"/>
+      </p:par>
+    </p:tnLst>
+  </p:timing>
 </p:sld>
 </file>
 
@@ -13381,8 +13788,12 @@
           <a:lstStyle/>
           <a:p>
             <a:r>
+              <a:rPr lang="en-US" dirty="0" smtClean="0"/>
+              <a:t>--2016-11-13 </a:t>
+            </a:r>
+            <a:r>
               <a:rPr lang="en-US" dirty="0"/>
-              <a:t>--2015-11-13 19:54:02--  https://packagecloud.io/chef/stable/packages/el/6/chef-compliance-0.9.1-1.el6.x86_64.rpm/download</a:t>
+              <a:t>19:54:02--  https://packagecloud.io/chef/stable/packages/el/6/chef-compliance-0.9.1-1.el6.x86_64.rpm/download</a:t>
             </a:r>
           </a:p>
           <a:p>
@@ -13544,7 +13955,6 @@
               <a:rPr lang="en-US" dirty="0"/>
               <a:t>the Install package</a:t>
             </a:r>
-            <a:endParaRPr lang="en-US" dirty="0"/>
           </a:p>
         </p:txBody>
       </p:sp>
@@ -13561,6 +13971,13 @@
   <p:transition spd="med">
     <p:fade/>
   </p:transition>
+  <p:timing>
+    <p:tnLst>
+      <p:par>
+        <p:cTn id="1" dur="indefinite" restart="never" nodeType="tmRoot"/>
+      </p:par>
+    </p:tnLst>
+  </p:timing>
 </p:sld>
 </file>
 
@@ -14907,61 +15324,6 @@
 </file>
 
 <file path=customXml/item2.xml><?xml version="1.0" encoding="utf-8"?>
-<?mso-contentType ?>
-<FormTemplates xmlns="http://schemas.microsoft.com/sharepoint/v3/contenttype/forms">
-  <Display>DocumentLibraryForm</Display>
-  <Edit>DocumentLibraryForm</Edit>
-  <New>DocumentLibraryForm</New>
-</FormTemplates>
-</file>
-
-<file path=customXml/item3.xml><?xml version="1.0" encoding="utf-8"?>
-<?mso-contentType ?>
-<spe:Receivers xmlns:spe="http://schemas.microsoft.com/sharepoint/events">
-  <Receiver>
-    <Name>Document ID Generator</Name>
-    <Synchronization>Synchronous</Synchronization>
-    <Type>10001</Type>
-    <SequenceNumber>1000</SequenceNumber>
-    <Assembly>Microsoft.Office.DocumentManagement, Version=14.0.0.0, Culture=neutral, PublicKeyToken=71e9bce111e9429c</Assembly>
-    <Class>Microsoft.Office.DocumentManagement.Internal.DocIdHandler</Class>
-    <Data/>
-    <Filter/>
-  </Receiver>
-  <Receiver>
-    <Name>Document ID Generator</Name>
-    <Synchronization>Synchronous</Synchronization>
-    <Type>10002</Type>
-    <SequenceNumber>1001</SequenceNumber>
-    <Assembly>Microsoft.Office.DocumentManagement, Version=14.0.0.0, Culture=neutral, PublicKeyToken=71e9bce111e9429c</Assembly>
-    <Class>Microsoft.Office.DocumentManagement.Internal.DocIdHandler</Class>
-    <Data/>
-    <Filter/>
-  </Receiver>
-  <Receiver>
-    <Name>Document ID Generator</Name>
-    <Synchronization>Synchronous</Synchronization>
-    <Type>10004</Type>
-    <SequenceNumber>1002</SequenceNumber>
-    <Assembly>Microsoft.Office.DocumentManagement, Version=14.0.0.0, Culture=neutral, PublicKeyToken=71e9bce111e9429c</Assembly>
-    <Class>Microsoft.Office.DocumentManagement.Internal.DocIdHandler</Class>
-    <Data/>
-    <Filter/>
-  </Receiver>
-  <Receiver>
-    <Name>Document ID Generator</Name>
-    <Synchronization>Synchronous</Synchronization>
-    <Type>10006</Type>
-    <SequenceNumber>1003</SequenceNumber>
-    <Assembly>Microsoft.Office.DocumentManagement, Version=14.0.0.0, Culture=neutral, PublicKeyToken=71e9bce111e9429c</Assembly>
-    <Class>Microsoft.Office.DocumentManagement.Internal.DocIdHandler</Class>
-    <Data/>
-    <Filter/>
-  </Receiver>
-</spe:Receivers>
-</file>
-
-<file path=customXml/item4.xml><?xml version="1.0" encoding="utf-8"?>
 <ct:contentTypeSchema xmlns:ct="http://schemas.microsoft.com/office/2006/metadata/contentType" xmlns:ma="http://schemas.microsoft.com/office/2006/metadata/properties/metaAttributes" ct:_="" ma:_="" ma:contentTypeName="Document" ma:contentTypeID="0x0101000812F700BE7F874999720E88173FE491" ma:contentTypeVersion="0" ma:contentTypeDescription="Create a new document." ma:contentTypeScope="" ma:versionID="3f79f408e2ca720b7aba6e0e32464d0c">
   <xsd:schema xmlns:xsd="http://www.w3.org/2001/XMLSchema" xmlns:xs="http://www.w3.org/2001/XMLSchema" xmlns:p="http://schemas.microsoft.com/office/2006/metadata/properties" xmlns:ns2="7bb5d761-a2ea-4873-95f7-7a6658fb3ef0" targetNamespace="http://schemas.microsoft.com/office/2006/metadata/properties" ma:root="true" ma:fieldsID="1e062cd38ba31e406bfc4340fbc7f87a" ns2:_="">
     <xsd:import namespace="7bb5d761-a2ea-4873-95f7-7a6658fb3ef0"/>
@@ -15106,6 +15468,61 @@
 </ct:contentTypeSchema>
 </file>
 
+<file path=customXml/item3.xml><?xml version="1.0" encoding="utf-8"?>
+<?mso-contentType ?>
+<spe:Receivers xmlns:spe="http://schemas.microsoft.com/sharepoint/events">
+  <Receiver>
+    <Name>Document ID Generator</Name>
+    <Synchronization>Synchronous</Synchronization>
+    <Type>10001</Type>
+    <SequenceNumber>1000</SequenceNumber>
+    <Assembly>Microsoft.Office.DocumentManagement, Version=14.0.0.0, Culture=neutral, PublicKeyToken=71e9bce111e9429c</Assembly>
+    <Class>Microsoft.Office.DocumentManagement.Internal.DocIdHandler</Class>
+    <Data/>
+    <Filter/>
+  </Receiver>
+  <Receiver>
+    <Name>Document ID Generator</Name>
+    <Synchronization>Synchronous</Synchronization>
+    <Type>10002</Type>
+    <SequenceNumber>1001</SequenceNumber>
+    <Assembly>Microsoft.Office.DocumentManagement, Version=14.0.0.0, Culture=neutral, PublicKeyToken=71e9bce111e9429c</Assembly>
+    <Class>Microsoft.Office.DocumentManagement.Internal.DocIdHandler</Class>
+    <Data/>
+    <Filter/>
+  </Receiver>
+  <Receiver>
+    <Name>Document ID Generator</Name>
+    <Synchronization>Synchronous</Synchronization>
+    <Type>10004</Type>
+    <SequenceNumber>1002</SequenceNumber>
+    <Assembly>Microsoft.Office.DocumentManagement, Version=14.0.0.0, Culture=neutral, PublicKeyToken=71e9bce111e9429c</Assembly>
+    <Class>Microsoft.Office.DocumentManagement.Internal.DocIdHandler</Class>
+    <Data/>
+    <Filter/>
+  </Receiver>
+  <Receiver>
+    <Name>Document ID Generator</Name>
+    <Synchronization>Synchronous</Synchronization>
+    <Type>10006</Type>
+    <SequenceNumber>1003</SequenceNumber>
+    <Assembly>Microsoft.Office.DocumentManagement, Version=14.0.0.0, Culture=neutral, PublicKeyToken=71e9bce111e9429c</Assembly>
+    <Class>Microsoft.Office.DocumentManagement.Internal.DocIdHandler</Class>
+    <Data/>
+    <Filter/>
+  </Receiver>
+</spe:Receivers>
+</file>
+
+<file path=customXml/item4.xml><?xml version="1.0" encoding="utf-8"?>
+<?mso-contentType ?>
+<FormTemplates xmlns="http://schemas.microsoft.com/sharepoint/v3/contenttype/forms">
+  <Display>DocumentLibraryForm</Display>
+  <Edit>DocumentLibraryForm</Edit>
+  <New>DocumentLibraryForm</New>
+</FormTemplates>
+</file>
+
 <file path=customXml/itemProps1.xml><?xml version="1.0" encoding="utf-8"?>
 <ds:datastoreItem xmlns:ds="http://schemas.openxmlformats.org/officeDocument/2006/customXml" ds:itemID="{6921749B-AEB7-461B-845F-603CABD25259}">
   <ds:schemaRefs>
@@ -15123,22 +15540,6 @@
 </file>
 
 <file path=customXml/itemProps2.xml><?xml version="1.0" encoding="utf-8"?>
-<ds:datastoreItem xmlns:ds="http://schemas.openxmlformats.org/officeDocument/2006/customXml" ds:itemID="{5CDEB364-43EC-4510-9881-539C2A3FCE9E}">
-  <ds:schemaRefs>
-    <ds:schemaRef ds:uri="http://schemas.microsoft.com/sharepoint/v3/contenttype/forms"/>
-  </ds:schemaRefs>
-</ds:datastoreItem>
-</file>
-
-<file path=customXml/itemProps3.xml><?xml version="1.0" encoding="utf-8"?>
-<ds:datastoreItem xmlns:ds="http://schemas.openxmlformats.org/officeDocument/2006/customXml" ds:itemID="{B13EBC30-FE27-4C6A-B723-23FC2188F7DC}">
-  <ds:schemaRefs>
-    <ds:schemaRef ds:uri="http://schemas.microsoft.com/sharepoint/events"/>
-  </ds:schemaRefs>
-</ds:datastoreItem>
-</file>
-
-<file path=customXml/itemProps4.xml><?xml version="1.0" encoding="utf-8"?>
 <ds:datastoreItem xmlns:ds="http://schemas.openxmlformats.org/officeDocument/2006/customXml" ds:itemID="{164479E5-0B02-49AC-B79E-EC1D6164DDD3}">
   <ds:schemaRefs>
     <ds:schemaRef ds:uri="http://schemas.microsoft.com/office/2006/metadata/contentType"/>
@@ -15154,4 +15555,20 @@
     <ds:schemaRef ds:uri="http://schemas.microsoft.com/internal/obd"/>
   </ds:schemaRefs>
 </ds:datastoreItem>
+</file>
+
+<file path=customXml/itemProps3.xml><?xml version="1.0" encoding="utf-8"?>
+<ds:datastoreItem xmlns:ds="http://schemas.openxmlformats.org/officeDocument/2006/customXml" ds:itemID="{B13EBC30-FE27-4C6A-B723-23FC2188F7DC}">
+  <ds:schemaRefs>
+    <ds:schemaRef ds:uri="http://schemas.microsoft.com/sharepoint/events"/>
+  </ds:schemaRefs>
+</ds:datastoreItem>
+</file>
+
+<file path=customXml/itemProps4.xml><?xml version="1.0" encoding="utf-8"?>
+<ds:datastoreItem xmlns:ds="http://schemas.openxmlformats.org/officeDocument/2006/customXml" ds:itemID="{5CDEB364-43EC-4510-9881-539C2A3FCE9E}">
+  <ds:schemaRefs>
+    <ds:schemaRef ds:uri="http://schemas.microsoft.com/sharepoint/v3/contenttype/forms"/>
+  </ds:schemaRefs>
+</ds:datastoreItem>
 </file>
</xml_diff>

<commit_message>
added Compliance Upgrade slide to 02-install
</commit_message>
<xml_diff>
--- a/02-Install.pptx
+++ b/02-Install.pptx
@@ -289,7 +289,7 @@
               <a:pPr>
                 <a:defRPr/>
               </a:pPr>
-              <a:t>2015-12-03</a:t>
+              <a:t>2015-12-04</a:t>
             </a:fld>
             <a:endParaRPr lang="en-US" dirty="0"/>
           </a:p>
@@ -472,7 +472,7 @@
               <a:pPr>
                 <a:defRPr/>
               </a:pPr>
-              <a:t>2015-12-03</a:t>
+              <a:t>2015-12-04</a:t>
             </a:fld>
             <a:endParaRPr lang="en-US" dirty="0"/>
           </a:p>
@@ -2511,12 +2511,12 @@
               <a:defRPr/>
             </a:pPr>
             <a:r>
-              <a:rPr lang="en-US" b="1" baseline="0" dirty="0" smtClean="0"/>
-              <a:t>Important</a:t>
+              <a:rPr lang="en-US" baseline="0" smtClean="0"/>
+              <a:t>In </a:t>
             </a:r>
             <a:r>
               <a:rPr lang="en-US" baseline="0" dirty="0" smtClean="0"/>
-              <a:t>: In the workplace you should of course create a more secure password.</a:t>
+              <a:t>the workplace you should of course create a more secure password.</a:t>
             </a:r>
             <a:endParaRPr lang="en-US" dirty="0"/>
           </a:p>
@@ -3449,14 +3449,14 @@
           </a:ln>
           <a:extLst>
             <a:ext uri="{909E8E84-426E-40dd-AFC4-6F175D3DCCD1}">
-              <a14:hiddenFill xmlns:a14="http://schemas.microsoft.com/office/drawing/2010/main" xmlns="">
+              <a14:hiddenFill xmlns="" xmlns:a14="http://schemas.microsoft.com/office/drawing/2010/main">
                 <a:solidFill>
                   <a:srgbClr val="FFFFFF"/>
                 </a:solidFill>
               </a14:hiddenFill>
             </a:ext>
             <a:ext uri="{91240B29-F687-4f45-9708-019B960494DF}">
-              <a14:hiddenLine xmlns:a14="http://schemas.microsoft.com/office/drawing/2010/main" xmlns="" w="9525">
+              <a14:hiddenLine xmlns="" xmlns:a14="http://schemas.microsoft.com/office/drawing/2010/main" w="9525">
                 <a:solidFill>
                   <a:srgbClr val="000000"/>
                 </a:solidFill>
@@ -3604,14 +3604,14 @@
           </a:ln>
           <a:extLst>
             <a:ext uri="{909E8E84-426E-40dd-AFC4-6F175D3DCCD1}">
-              <a14:hiddenFill xmlns:a14="http://schemas.microsoft.com/office/drawing/2010/main" xmlns="">
+              <a14:hiddenFill xmlns="" xmlns:a14="http://schemas.microsoft.com/office/drawing/2010/main">
                 <a:solidFill>
                   <a:srgbClr val="FFFFFF"/>
                 </a:solidFill>
               </a14:hiddenFill>
             </a:ext>
             <a:ext uri="{91240B29-F687-4f45-9708-019B960494DF}">
-              <a14:hiddenLine xmlns:a14="http://schemas.microsoft.com/office/drawing/2010/main" xmlns="" w="9525">
+              <a14:hiddenLine xmlns="" xmlns:a14="http://schemas.microsoft.com/office/drawing/2010/main" w="9525">
                 <a:solidFill>
                   <a:srgbClr val="000000"/>
                 </a:solidFill>
@@ -4102,14 +4102,14 @@
           </a:ln>
           <a:extLst>
             <a:ext uri="{909E8E84-426E-40dd-AFC4-6F175D3DCCD1}">
-              <a14:hiddenFill xmlns:a14="http://schemas.microsoft.com/office/drawing/2010/main" xmlns="">
+              <a14:hiddenFill xmlns="" xmlns:a14="http://schemas.microsoft.com/office/drawing/2010/main">
                 <a:solidFill>
                   <a:srgbClr val="FFFFFF"/>
                 </a:solidFill>
               </a14:hiddenFill>
             </a:ext>
             <a:ext uri="{91240B29-F687-4f45-9708-019B960494DF}">
-              <a14:hiddenLine xmlns:a14="http://schemas.microsoft.com/office/drawing/2010/main" xmlns="" w="9525">
+              <a14:hiddenLine xmlns="" xmlns:a14="http://schemas.microsoft.com/office/drawing/2010/main" w="9525">
                 <a:solidFill>
                   <a:srgbClr val="000000"/>
                 </a:solidFill>
@@ -5845,14 +5845,14 @@
           </a:ln>
           <a:extLst>
             <a:ext uri="{909E8E84-426E-40dd-AFC4-6F175D3DCCD1}">
-              <a14:hiddenFill xmlns:a14="http://schemas.microsoft.com/office/drawing/2010/main" xmlns="">
+              <a14:hiddenFill xmlns="" xmlns:a14="http://schemas.microsoft.com/office/drawing/2010/main">
                 <a:solidFill>
                   <a:srgbClr val="FFFFFF"/>
                 </a:solidFill>
               </a14:hiddenFill>
             </a:ext>
             <a:ext uri="{91240B29-F687-4f45-9708-019B960494DF}">
-              <a14:hiddenLine xmlns:a14="http://schemas.microsoft.com/office/drawing/2010/main" xmlns="" w="9525">
+              <a14:hiddenLine xmlns="" xmlns:a14="http://schemas.microsoft.com/office/drawing/2010/main" w="9525">
                 <a:solidFill>
                   <a:srgbClr val="000000"/>
                 </a:solidFill>
@@ -7206,14 +7206,14 @@
           </a:ln>
           <a:extLst>
             <a:ext uri="{909E8E84-426E-40dd-AFC4-6F175D3DCCD1}">
-              <a14:hiddenFill xmlns:a14="http://schemas.microsoft.com/office/drawing/2010/main" xmlns="">
+              <a14:hiddenFill xmlns="" xmlns:a14="http://schemas.microsoft.com/office/drawing/2010/main">
                 <a:solidFill>
                   <a:srgbClr val="FFFFFF"/>
                 </a:solidFill>
               </a14:hiddenFill>
             </a:ext>
             <a:ext uri="{91240B29-F687-4f45-9708-019B960494DF}">
-              <a14:hiddenLine xmlns:a14="http://schemas.microsoft.com/office/drawing/2010/main" xmlns="" w="9525">
+              <a14:hiddenLine xmlns="" xmlns:a14="http://schemas.microsoft.com/office/drawing/2010/main" w="9525">
                 <a:solidFill>
                   <a:srgbClr val="000000"/>
                 </a:solidFill>
@@ -7771,14 +7771,14 @@
           </a:ln>
           <a:extLst>
             <a:ext uri="{909E8E84-426E-40dd-AFC4-6F175D3DCCD1}">
-              <a14:hiddenFill xmlns:a14="http://schemas.microsoft.com/office/drawing/2010/main" xmlns="">
+              <a14:hiddenFill xmlns="" xmlns:a14="http://schemas.microsoft.com/office/drawing/2010/main">
                 <a:solidFill>
                   <a:srgbClr val="FFFFFF"/>
                 </a:solidFill>
               </a14:hiddenFill>
             </a:ext>
             <a:ext uri="{91240B29-F687-4f45-9708-019B960494DF}">
-              <a14:hiddenLine xmlns:a14="http://schemas.microsoft.com/office/drawing/2010/main" xmlns="" w="9525">
+              <a14:hiddenLine xmlns="" xmlns:a14="http://schemas.microsoft.com/office/drawing/2010/main" w="9525">
                 <a:solidFill>
                   <a:srgbClr val="000000"/>
                 </a:solidFill>
@@ -8345,14 +8345,14 @@
           </a:ln>
           <a:extLst>
             <a:ext uri="{909E8E84-426E-40dd-AFC4-6F175D3DCCD1}">
-              <a14:hiddenFill xmlns:a14="http://schemas.microsoft.com/office/drawing/2010/main" xmlns="">
+              <a14:hiddenFill xmlns="" xmlns:a14="http://schemas.microsoft.com/office/drawing/2010/main">
                 <a:solidFill>
                   <a:srgbClr val="FFFFFF"/>
                 </a:solidFill>
               </a14:hiddenFill>
             </a:ext>
             <a:ext uri="{91240B29-F687-4f45-9708-019B960494DF}">
-              <a14:hiddenLine xmlns:a14="http://schemas.microsoft.com/office/drawing/2010/main" xmlns="" w="9525">
+              <a14:hiddenLine xmlns="" xmlns:a14="http://schemas.microsoft.com/office/drawing/2010/main" w="9525">
                 <a:solidFill>
                   <a:srgbClr val="000000"/>
                 </a:solidFill>
@@ -9292,14 +9292,14 @@
           </a:ln>
           <a:extLst>
             <a:ext uri="{909E8E84-426E-40dd-AFC4-6F175D3DCCD1}">
-              <a14:hiddenFill xmlns:a14="http://schemas.microsoft.com/office/drawing/2010/main" xmlns="">
+              <a14:hiddenFill xmlns="" xmlns:a14="http://schemas.microsoft.com/office/drawing/2010/main">
                 <a:solidFill>
                   <a:srgbClr val="FFFFFF"/>
                 </a:solidFill>
               </a14:hiddenFill>
             </a:ext>
             <a:ext uri="{91240B29-F687-4f45-9708-019B960494DF}">
-              <a14:hiddenLine xmlns:a14="http://schemas.microsoft.com/office/drawing/2010/main" xmlns="" w="9525">
+              <a14:hiddenLine xmlns="" xmlns:a14="http://schemas.microsoft.com/office/drawing/2010/main" w="9525">
                 <a:solidFill>
                   <a:srgbClr val="000000"/>
                 </a:solidFill>
@@ -10051,14 +10051,14 @@
           </a:ln>
           <a:extLst>
             <a:ext uri="{909E8E84-426E-40dd-AFC4-6F175D3DCCD1}">
-              <a14:hiddenFill xmlns:a14="http://schemas.microsoft.com/office/drawing/2010/main" xmlns="">
+              <a14:hiddenFill xmlns="" xmlns:a14="http://schemas.microsoft.com/office/drawing/2010/main">
                 <a:solidFill>
                   <a:srgbClr val="FFFFFF"/>
                 </a:solidFill>
               </a14:hiddenFill>
             </a:ext>
             <a:ext uri="{91240B29-F687-4f45-9708-019B960494DF}">
-              <a14:hiddenLine xmlns:a14="http://schemas.microsoft.com/office/drawing/2010/main" xmlns="" w="9525">
+              <a14:hiddenLine xmlns="" xmlns:a14="http://schemas.microsoft.com/office/drawing/2010/main" w="9525">
                 <a:solidFill>
                   <a:srgbClr val="000000"/>
                 </a:solidFill>
@@ -12099,11 +12099,7 @@
             </a:pPr>
             <a:r>
               <a:rPr lang="en-US" dirty="0" smtClean="0"/>
-              <a:t>Perform initial configuration of the Compliance server</a:t>
-            </a:r>
-            <a:r>
-              <a:rPr lang="en-US" dirty="0" smtClean="0"/>
-              <a:t>.</a:t>
+              <a:t>Perform initial configuration of the Compliance server.</a:t>
             </a:r>
           </a:p>
           <a:p>
@@ -12115,7 +12111,6 @@
               <a:rPr lang="en-US" dirty="0" smtClean="0"/>
               <a:t>Launch the Compliance Web UI.</a:t>
             </a:r>
-            <a:endParaRPr lang="en-US" dirty="0" smtClean="0"/>
           </a:p>
         </p:txBody>
       </p:sp>
@@ -12393,11 +12388,7 @@
             </a:r>
             <a:r>
               <a:rPr lang="en-US" dirty="0" smtClean="0"/>
-              <a:t>nd install the </a:t>
-            </a:r>
-            <a:r>
-              <a:rPr lang="en-US" dirty="0" smtClean="0"/>
-              <a:t>chef-compliance-</a:t>
+              <a:t>nd install the chef-compliance-</a:t>
             </a:r>
             <a:r>
               <a:rPr lang="en-US" i="1" dirty="0" smtClean="0"/>
@@ -12415,11 +12406,7 @@
             </a:pPr>
             <a:r>
               <a:rPr lang="en-US" dirty="0" smtClean="0"/>
-              <a:t>Use </a:t>
-            </a:r>
-            <a:r>
-              <a:rPr lang="en-US" dirty="0" smtClean="0"/>
-              <a:t>chef-compliance-</a:t>
+              <a:t>Use chef-compliance-</a:t>
             </a:r>
             <a:r>
               <a:rPr lang="en-US" dirty="0" err="1" smtClean="0"/>
@@ -14760,6 +14747,27 @@
 </file>
 
 <file path=customXml/item2.xml><?xml version="1.0" encoding="utf-8"?>
+<?mso-contentType ?>
+<FormTemplates xmlns="http://schemas.microsoft.com/sharepoint/v3/contenttype/forms">
+  <Display>DocumentLibraryForm</Display>
+  <Edit>DocumentLibraryForm</Edit>
+  <New>DocumentLibraryForm</New>
+</FormTemplates>
+</file>
+
+<file path=customXml/item3.xml><?xml version="1.0" encoding="utf-8"?>
+<p:properties xmlns:p="http://schemas.microsoft.com/office/2006/metadata/properties" xmlns:xsi="http://www.w3.org/2001/XMLSchema-instance" xmlns:pc="http://schemas.microsoft.com/office/infopath/2007/PartnerControls">
+  <documentManagement>
+    <_dlc_DocId xmlns="7bb5d761-a2ea-4873-95f7-7a6658fb3ef0">M4CWTKMW727E-592-73</_dlc_DocId>
+    <_dlc_DocIdUrl xmlns="7bb5d761-a2ea-4873-95f7-7a6658fb3ef0">
+      <Url>https://kms.vci.local/marketing/team/_layouts/DocIdRedir.aspx?ID=M4CWTKMW727E-592-73</Url>
+      <Description>M4CWTKMW727E-592-73</Description>
+    </_dlc_DocIdUrl>
+  </documentManagement>
+</p:properties>
+</file>
+
+<file path=customXml/item4.xml><?xml version="1.0" encoding="utf-8"?>
 <ct:contentTypeSchema xmlns:ct="http://schemas.microsoft.com/office/2006/metadata/contentType" xmlns:ma="http://schemas.microsoft.com/office/2006/metadata/properties/metaAttributes" ct:_="" ma:_="" ma:contentTypeName="Document" ma:contentTypeID="0x0101000812F700BE7F874999720E88173FE491" ma:contentTypeVersion="0" ma:contentTypeDescription="Create a new document." ma:contentTypeScope="" ma:versionID="3f79f408e2ca720b7aba6e0e32464d0c">
   <xsd:schema xmlns:xsd="http://www.w3.org/2001/XMLSchema" xmlns:xs="http://www.w3.org/2001/XMLSchema" xmlns:p="http://schemas.microsoft.com/office/2006/metadata/properties" xmlns:ns2="7bb5d761-a2ea-4873-95f7-7a6658fb3ef0" targetNamespace="http://schemas.microsoft.com/office/2006/metadata/properties" ma:root="true" ma:fieldsID="1e062cd38ba31e406bfc4340fbc7f87a" ns2:_="">
     <xsd:import namespace="7bb5d761-a2ea-4873-95f7-7a6658fb3ef0"/>
@@ -14904,27 +14912,6 @@
 </ct:contentTypeSchema>
 </file>
 
-<file path=customXml/item3.xml><?xml version="1.0" encoding="utf-8"?>
-<p:properties xmlns:p="http://schemas.microsoft.com/office/2006/metadata/properties" xmlns:xsi="http://www.w3.org/2001/XMLSchema-instance" xmlns:pc="http://schemas.microsoft.com/office/infopath/2007/PartnerControls">
-  <documentManagement>
-    <_dlc_DocId xmlns="7bb5d761-a2ea-4873-95f7-7a6658fb3ef0">M4CWTKMW727E-592-73</_dlc_DocId>
-    <_dlc_DocIdUrl xmlns="7bb5d761-a2ea-4873-95f7-7a6658fb3ef0">
-      <Url>https://kms.vci.local/marketing/team/_layouts/DocIdRedir.aspx?ID=M4CWTKMW727E-592-73</Url>
-      <Description>M4CWTKMW727E-592-73</Description>
-    </_dlc_DocIdUrl>
-  </documentManagement>
-</p:properties>
-</file>
-
-<file path=customXml/item4.xml><?xml version="1.0" encoding="utf-8"?>
-<?mso-contentType ?>
-<FormTemplates xmlns="http://schemas.microsoft.com/sharepoint/v3/contenttype/forms">
-  <Display>DocumentLibraryForm</Display>
-  <Edit>DocumentLibraryForm</Edit>
-  <New>DocumentLibraryForm</New>
-</FormTemplates>
-</file>
-
 <file path=customXml/itemProps1.xml><?xml version="1.0" encoding="utf-8"?>
 <ds:datastoreItem xmlns:ds="http://schemas.openxmlformats.org/officeDocument/2006/customXml" ds:itemID="{B13EBC30-FE27-4C6A-B723-23FC2188F7DC}">
   <ds:schemaRefs>
@@ -14934,19 +14921,9 @@
 </file>
 
 <file path=customXml/itemProps2.xml><?xml version="1.0" encoding="utf-8"?>
-<ds:datastoreItem xmlns:ds="http://schemas.openxmlformats.org/officeDocument/2006/customXml" ds:itemID="{164479E5-0B02-49AC-B79E-EC1D6164DDD3}">
+<ds:datastoreItem xmlns:ds="http://schemas.openxmlformats.org/officeDocument/2006/customXml" ds:itemID="{5CDEB364-43EC-4510-9881-539C2A3FCE9E}">
   <ds:schemaRefs>
-    <ds:schemaRef ds:uri="http://schemas.microsoft.com/office/2006/metadata/contentType"/>
-    <ds:schemaRef ds:uri="http://schemas.microsoft.com/office/2006/metadata/properties/metaAttributes"/>
-    <ds:schemaRef ds:uri="http://www.w3.org/2001/XMLSchema"/>
-    <ds:schemaRef ds:uri="http://schemas.microsoft.com/office/2006/metadata/properties"/>
-    <ds:schemaRef ds:uri="7bb5d761-a2ea-4873-95f7-7a6658fb3ef0"/>
-    <ds:schemaRef ds:uri="http://schemas.microsoft.com/office/2006/documentManagement/types"/>
-    <ds:schemaRef ds:uri="http://schemas.microsoft.com/office/infopath/2007/PartnerControls"/>
-    <ds:schemaRef ds:uri="http://schemas.openxmlformats.org/package/2006/metadata/core-properties"/>
-    <ds:schemaRef ds:uri="http://purl.org/dc/elements/1.1/"/>
-    <ds:schemaRef ds:uri="http://purl.org/dc/terms/"/>
-    <ds:schemaRef ds:uri="http://schemas.microsoft.com/internal/obd"/>
+    <ds:schemaRef ds:uri="http://schemas.microsoft.com/sharepoint/v3/contenttype/forms"/>
   </ds:schemaRefs>
 </ds:datastoreItem>
 </file>
@@ -14968,9 +14945,19 @@
 </file>
 
 <file path=customXml/itemProps4.xml><?xml version="1.0" encoding="utf-8"?>
-<ds:datastoreItem xmlns:ds="http://schemas.openxmlformats.org/officeDocument/2006/customXml" ds:itemID="{5CDEB364-43EC-4510-9881-539C2A3FCE9E}">
+<ds:datastoreItem xmlns:ds="http://schemas.openxmlformats.org/officeDocument/2006/customXml" ds:itemID="{164479E5-0B02-49AC-B79E-EC1D6164DDD3}">
   <ds:schemaRefs>
-    <ds:schemaRef ds:uri="http://schemas.microsoft.com/sharepoint/v3/contenttype/forms"/>
+    <ds:schemaRef ds:uri="http://schemas.microsoft.com/office/2006/metadata/contentType"/>
+    <ds:schemaRef ds:uri="http://schemas.microsoft.com/office/2006/metadata/properties/metaAttributes"/>
+    <ds:schemaRef ds:uri="http://www.w3.org/2001/XMLSchema"/>
+    <ds:schemaRef ds:uri="http://schemas.microsoft.com/office/2006/metadata/properties"/>
+    <ds:schemaRef ds:uri="7bb5d761-a2ea-4873-95f7-7a6658fb3ef0"/>
+    <ds:schemaRef ds:uri="http://schemas.microsoft.com/office/2006/documentManagement/types"/>
+    <ds:schemaRef ds:uri="http://schemas.microsoft.com/office/infopath/2007/PartnerControls"/>
+    <ds:schemaRef ds:uri="http://schemas.openxmlformats.org/package/2006/metadata/core-properties"/>
+    <ds:schemaRef ds:uri="http://purl.org/dc/elements/1.1/"/>
+    <ds:schemaRef ds:uri="http://purl.org/dc/terms/"/>
+    <ds:schemaRef ds:uri="http://schemas.microsoft.com/internal/obd"/>
   </ds:schemaRefs>
 </ds:datastoreItem>
 </file>
</xml_diff>

<commit_message>
changed temp passwd for Comp server
</commit_message>
<xml_diff>
--- a/02-Install.pptx
+++ b/02-Install.pptx
@@ -289,7 +289,7 @@
               <a:pPr>
                 <a:defRPr/>
               </a:pPr>
-              <a:t>2015-12-30</a:t>
+              <a:t>2016-01-14</a:t>
             </a:fld>
             <a:endParaRPr lang="en-US" dirty="0"/>
           </a:p>
@@ -472,7 +472,7 @@
               <a:pPr>
                 <a:defRPr/>
               </a:pPr>
-              <a:t>2015-12-30</a:t>
+              <a:t>2016-01-14</a:t>
             </a:fld>
             <a:endParaRPr lang="en-US" dirty="0"/>
           </a:p>
@@ -1077,55 +1077,6 @@
               <a:rPr lang="en-US" dirty="0" smtClean="0"/>
               <a:t>We have not set up SSL so the https strikethrough is fine for now. In the workplace you would want to use SSL for connections to your Compliance Web UI.</a:t>
             </a:r>
-          </a:p>
-          <a:p>
-            <a:endParaRPr lang="en-US" dirty="0" smtClean="0"/>
-          </a:p>
-          <a:p>
-            <a:endParaRPr lang="en-US" dirty="0" smtClean="0"/>
-          </a:p>
-          <a:p>
-            <a:pPr marL="0" marR="0" indent="0" algn="l" defTabSz="1217613" rtl="0" eaLnBrk="1" fontAlgn="base" latinLnBrk="0" hangingPunct="1">
-              <a:lnSpc>
-                <a:spcPct val="90000"/>
-              </a:lnSpc>
-              <a:spcBef>
-                <a:spcPct val="30000"/>
-              </a:spcBef>
-              <a:spcAft>
-                <a:spcPts val="450"/>
-              </a:spcAft>
-              <a:buClrTx/>
-              <a:buSzTx/>
-              <a:buFontTx/>
-              <a:buNone/>
-              <a:tabLst/>
-              <a:defRPr/>
-            </a:pPr>
-            <a:r>
-              <a:rPr lang="en-US" dirty="0" smtClean="0"/>
-              <a:t>https://docs.chef.io/install_compliance.html &gt; </a:t>
-            </a:r>
-            <a:r>
-              <a:rPr lang="en-US" sz="1200" b="0" i="0" kern="1200" dirty="0" smtClean="0">
-                <a:solidFill>
-                  <a:schemeClr val="tx1"/>
-                </a:solidFill>
-                <a:effectLst/>
-                <a:latin typeface="Arial" panose="020B0604020202020204" pitchFamily="34" charset="0"/>
-                <a:ea typeface="ＭＳ Ｐゴシック" charset="0"/>
-                <a:cs typeface="Arial" panose="020B0604020202020204" pitchFamily="34" charset="0"/>
-              </a:rPr>
-              <a:t>Configure SSL</a:t>
-            </a:r>
-          </a:p>
-          <a:p>
-            <a:endParaRPr lang="en-US" dirty="0" smtClean="0"/>
-          </a:p>
-          <a:p>
-            <a:endParaRPr lang="en-US" dirty="0" smtClean="0"/>
-          </a:p>
-          <a:p>
             <a:endParaRPr lang="en-US" dirty="0"/>
           </a:p>
         </p:txBody>
@@ -1153,7 +1104,7 @@
               <a:pPr>
                 <a:defRPr/>
               </a:pPr>
-              <a:t>13</a:t>
+              <a:t>12</a:t>
             </a:fld>
             <a:endParaRPr lang="en-US" dirty="0"/>
           </a:p>
@@ -1206,7 +1157,7 @@
     </p:spTree>
     <p:extLst>
       <p:ext uri="{BB962C8B-B14F-4D97-AF65-F5344CB8AC3E}">
-        <p14:creationId xmlns:p14="http://schemas.microsoft.com/office/powerpoint/2010/main" val="1812303767"/>
+        <p14:creationId xmlns:p14="http://schemas.microsoft.com/office/powerpoint/2010/main" val="694977390"/>
       </p:ext>
     </p:extLst>
   </p:cSld>
@@ -1260,15 +1211,204 @@
           <a:bodyPr/>
           <a:lstStyle/>
           <a:p>
+            <a:r>
+              <a:rPr lang="en-US" dirty="0" smtClean="0"/>
+              <a:t>In </a:t>
+            </a:r>
+            <a:r>
+              <a:rPr lang="en-US" dirty="0" smtClean="0"/>
+              <a:t>the workplace you would want to use SSL for connections to your Compliance Web UI.</a:t>
+            </a:r>
+          </a:p>
+          <a:p>
             <a:endParaRPr lang="en-US" dirty="0" smtClean="0"/>
           </a:p>
           <a:p>
             <a:endParaRPr lang="en-US" dirty="0" smtClean="0"/>
           </a:p>
           <a:p>
-            <a:r>
-              <a:rPr lang="en-US" dirty="0" smtClean="0"/>
-              <a:t>Instructor Note: If you needed</a:t>
+            <a:pPr marL="0" marR="0" indent="0" algn="l" defTabSz="1217613" rtl="0" eaLnBrk="1" fontAlgn="base" latinLnBrk="0" hangingPunct="1">
+              <a:lnSpc>
+                <a:spcPct val="90000"/>
+              </a:lnSpc>
+              <a:spcBef>
+                <a:spcPct val="30000"/>
+              </a:spcBef>
+              <a:spcAft>
+                <a:spcPts val="450"/>
+              </a:spcAft>
+              <a:buClrTx/>
+              <a:buSzTx/>
+              <a:buFontTx/>
+              <a:buNone/>
+              <a:tabLst/>
+              <a:defRPr/>
+            </a:pPr>
+            <a:r>
+              <a:rPr lang="en-US" dirty="0" smtClean="0"/>
+              <a:t>https://docs.chef.io/install_compliance.html &gt; </a:t>
+            </a:r>
+            <a:r>
+              <a:rPr lang="en-US" sz="1200" b="0" i="0" kern="1200" dirty="0" smtClean="0">
+                <a:solidFill>
+                  <a:schemeClr val="tx1"/>
+                </a:solidFill>
+                <a:effectLst/>
+                <a:latin typeface="Arial" panose="020B0604020202020204" pitchFamily="34" charset="0"/>
+                <a:ea typeface="ＭＳ Ｐゴシック" charset="0"/>
+                <a:cs typeface="Arial" panose="020B0604020202020204" pitchFamily="34" charset="0"/>
+              </a:rPr>
+              <a:t>Configure SSL</a:t>
+            </a:r>
+          </a:p>
+          <a:p>
+            <a:endParaRPr lang="en-US" dirty="0" smtClean="0"/>
+          </a:p>
+          <a:p>
+            <a:endParaRPr lang="en-US" dirty="0" smtClean="0"/>
+          </a:p>
+          <a:p>
+            <a:endParaRPr lang="en-US" dirty="0"/>
+          </a:p>
+        </p:txBody>
+      </p:sp>
+      <p:sp>
+        <p:nvSpPr>
+          <p:cNvPr id="4" name="Slide Number Placeholder 3"/>
+          <p:cNvSpPr>
+            <a:spLocks noGrp="1"/>
+          </p:cNvSpPr>
+          <p:nvPr>
+            <p:ph type="sldNum" sz="quarter" idx="10"/>
+          </p:nvPr>
+        </p:nvSpPr>
+        <p:spPr/>
+        <p:txBody>
+          <a:bodyPr/>
+          <a:lstStyle/>
+          <a:p>
+            <a:pPr>
+              <a:defRPr/>
+            </a:pPr>
+            <a:fld id="{DC3734AA-3150-D947-AC52-2F5DF48BFCD5}" type="slidenum">
+              <a:rPr lang="en-US" smtClean="0"/>
+              <a:pPr>
+                <a:defRPr/>
+              </a:pPr>
+              <a:t>13</a:t>
+            </a:fld>
+            <a:endParaRPr lang="en-US" dirty="0"/>
+          </a:p>
+        </p:txBody>
+      </p:sp>
+      <p:sp>
+        <p:nvSpPr>
+          <p:cNvPr id="5" name="Header Placeholder 4"/>
+          <p:cNvSpPr>
+            <a:spLocks noGrp="1"/>
+          </p:cNvSpPr>
+          <p:nvPr>
+            <p:ph type="hdr" sz="quarter" idx="11"/>
+          </p:nvPr>
+        </p:nvSpPr>
+        <p:spPr/>
+        <p:txBody>
+          <a:bodyPr/>
+          <a:lstStyle/>
+          <a:p>
+            <a:pPr>
+              <a:defRPr/>
+            </a:pPr>
+            <a:endParaRPr lang="en-US"/>
+          </a:p>
+        </p:txBody>
+      </p:sp>
+      <p:sp>
+        <p:nvSpPr>
+          <p:cNvPr id="6" name="Footer Placeholder 5"/>
+          <p:cNvSpPr>
+            <a:spLocks noGrp="1"/>
+          </p:cNvSpPr>
+          <p:nvPr>
+            <p:ph type="ftr" sz="quarter" idx="12"/>
+          </p:nvPr>
+        </p:nvSpPr>
+        <p:spPr/>
+        <p:txBody>
+          <a:bodyPr/>
+          <a:lstStyle/>
+          <a:p>
+            <a:pPr>
+              <a:defRPr/>
+            </a:pPr>
+            <a:endParaRPr lang="en-US"/>
+          </a:p>
+        </p:txBody>
+      </p:sp>
+    </p:spTree>
+    <p:extLst>
+      <p:ext uri="{BB962C8B-B14F-4D97-AF65-F5344CB8AC3E}">
+        <p14:creationId xmlns:p14="http://schemas.microsoft.com/office/powerpoint/2010/main" val="1812303767"/>
+      </p:ext>
+    </p:extLst>
+  </p:cSld>
+  <p:clrMapOvr>
+    <a:masterClrMapping/>
+  </p:clrMapOvr>
+</p:notes>
+</file>
+
+<file path=ppt/notesSlides/notesSlide12.xml><?xml version="1.0" encoding="utf-8"?>
+<p:notes xmlns:a="http://schemas.openxmlformats.org/drawingml/2006/main" xmlns:r="http://schemas.openxmlformats.org/officeDocument/2006/relationships" xmlns:p="http://schemas.openxmlformats.org/presentationml/2006/main">
+  <p:cSld>
+    <p:spTree>
+      <p:nvGrpSpPr>
+        <p:cNvPr id="1" name=""/>
+        <p:cNvGrpSpPr/>
+        <p:nvPr/>
+      </p:nvGrpSpPr>
+      <p:grpSpPr>
+        <a:xfrm>
+          <a:off x="0" y="0"/>
+          <a:ext cx="0" cy="0"/>
+          <a:chOff x="0" y="0"/>
+          <a:chExt cx="0" cy="0"/>
+        </a:xfrm>
+      </p:grpSpPr>
+      <p:sp>
+        <p:nvSpPr>
+          <p:cNvPr id="2" name="Slide Image Placeholder 1"/>
+          <p:cNvSpPr>
+            <a:spLocks noGrp="1" noRot="1" noChangeAspect="1"/>
+          </p:cNvSpPr>
+          <p:nvPr>
+            <p:ph type="sldImg"/>
+          </p:nvPr>
+        </p:nvSpPr>
+        <p:spPr/>
+      </p:sp>
+      <p:sp>
+        <p:nvSpPr>
+          <p:cNvPr id="3" name="Notes Placeholder 2"/>
+          <p:cNvSpPr>
+            <a:spLocks noGrp="1"/>
+          </p:cNvSpPr>
+          <p:nvPr>
+            <p:ph type="body" idx="1"/>
+          </p:nvPr>
+        </p:nvSpPr>
+        <p:spPr/>
+        <p:txBody>
+          <a:bodyPr/>
+          <a:lstStyle/>
+          <a:p>
+            <a:r>
+              <a:rPr lang="en-US" dirty="0" smtClean="0"/>
+              <a:t>Instructor </a:t>
+            </a:r>
+            <a:r>
+              <a:rPr lang="en-US" dirty="0" smtClean="0"/>
+              <a:t>Note: If you needed</a:t>
             </a:r>
             <a:r>
               <a:rPr lang="en-US" baseline="0" dirty="0" smtClean="0"/>
@@ -1288,13 +1428,8 @@
             </a:r>
             <a:r>
               <a:rPr lang="en-US" baseline="0" dirty="0" smtClean="0"/>
-              <a:t> version of the old package that you want to </a:t>
-            </a:r>
-            <a:r>
-              <a:rPr lang="en-US" baseline="0" smtClean="0"/>
-              <a:t>downgrade to:</a:t>
-            </a:r>
-            <a:endParaRPr lang="en-US" baseline="0" dirty="0" smtClean="0"/>
+              <a:t> version of the old package that you want to downgrade to:</a:t>
+            </a:r>
           </a:p>
           <a:p>
             <a:endParaRPr lang="en-US" baseline="0" dirty="0" smtClean="0"/>
@@ -1623,7 +1758,7 @@
               <a:pPr>
                 <a:defRPr/>
               </a:pPr>
-              <a:t>6</a:t>
+              <a:t>5</a:t>
             </a:fld>
             <a:endParaRPr lang="en-US" dirty="0"/>
           </a:p>
@@ -1676,7 +1811,7 @@
     </p:spTree>
     <p:extLst>
       <p:ext uri="{BB962C8B-B14F-4D97-AF65-F5344CB8AC3E}">
-        <p14:creationId xmlns:p14="http://schemas.microsoft.com/office/powerpoint/2010/main" val="4131952127"/>
+        <p14:creationId xmlns:p14="http://schemas.microsoft.com/office/powerpoint/2010/main" val="2910110818"/>
       </p:ext>
     </p:extLst>
   </p:cSld>
@@ -1730,61 +1865,6 @@
           <a:bodyPr/>
           <a:lstStyle/>
           <a:p>
-            <a:pPr marL="0" marR="0" indent="0" algn="l" defTabSz="1217613" rtl="0" eaLnBrk="1" fontAlgn="base" latinLnBrk="0" hangingPunct="1">
-              <a:lnSpc>
-                <a:spcPct val="90000"/>
-              </a:lnSpc>
-              <a:spcBef>
-                <a:spcPct val="30000"/>
-              </a:spcBef>
-              <a:spcAft>
-                <a:spcPts val="450"/>
-              </a:spcAft>
-              <a:buClrTx/>
-              <a:buSzTx/>
-              <a:buFontTx/>
-              <a:buNone/>
-              <a:tabLst/>
-              <a:defRPr/>
-            </a:pPr>
-            <a:r>
-              <a:rPr lang="en-US" dirty="0" smtClean="0"/>
-              <a:t>From the resulting web page, highlight and copy the URL for the latest </a:t>
-            </a:r>
-            <a:r>
-              <a:rPr lang="en-US" b="1" dirty="0" smtClean="0"/>
-              <a:t>Red Hat Enterprise Linux 6</a:t>
-            </a:r>
-            <a:r>
-              <a:rPr lang="en-US" dirty="0" smtClean="0"/>
-              <a:t> version. </a:t>
-            </a:r>
-            <a:r>
-              <a:rPr lang="en-US" u="sng" dirty="0" smtClean="0"/>
-              <a:t>Do not </a:t>
-            </a:r>
-            <a:r>
-              <a:rPr lang="en-US" dirty="0" smtClean="0"/>
-              <a:t>click the Download button. We don't want to download this directly to your laptop but instead we will </a:t>
-            </a:r>
-            <a:r>
-              <a:rPr lang="en-US" smtClean="0"/>
-              <a:t>download it</a:t>
-            </a:r>
-            <a:r>
-              <a:rPr lang="en-US" baseline="0" smtClean="0"/>
-              <a:t> </a:t>
-            </a:r>
-            <a:r>
-              <a:rPr lang="en-US" smtClean="0"/>
-              <a:t>directly </a:t>
-            </a:r>
-            <a:r>
-              <a:rPr lang="en-US" dirty="0" smtClean="0"/>
-              <a:t>to our node.</a:t>
-            </a:r>
-          </a:p>
-          <a:p>
             <a:endParaRPr lang="en-US" dirty="0"/>
           </a:p>
         </p:txBody>
@@ -1812,7 +1892,7 @@
               <a:pPr>
                 <a:defRPr/>
               </a:pPr>
-              <a:t>7</a:t>
+              <a:t>6</a:t>
             </a:fld>
             <a:endParaRPr lang="en-US" dirty="0"/>
           </a:p>
@@ -1865,7 +1945,7 @@
     </p:spTree>
     <p:extLst>
       <p:ext uri="{BB962C8B-B14F-4D97-AF65-F5344CB8AC3E}">
-        <p14:creationId xmlns:p14="http://schemas.microsoft.com/office/powerpoint/2010/main" val="77950305"/>
+        <p14:creationId xmlns:p14="http://schemas.microsoft.com/office/powerpoint/2010/main" val="4131952127"/>
       </p:ext>
     </p:extLst>
   </p:cSld>
@@ -1938,235 +2018,43 @@
             </a:pPr>
             <a:r>
               <a:rPr lang="en-US" dirty="0" smtClean="0"/>
-              <a:t>Execute </a:t>
+              <a:t>From the resulting web page, highlight and copy the URL for the latest </a:t>
             </a:r>
             <a:r>
               <a:rPr lang="en-US" b="1" dirty="0" smtClean="0"/>
-              <a:t>sudo rpm -</a:t>
-            </a:r>
-            <a:r>
-              <a:rPr lang="en-US" b="1" dirty="0" err="1" smtClean="0"/>
-              <a:t>Uvh</a:t>
-            </a:r>
-            <a:r>
-              <a:rPr lang="en-US" b="1" dirty="0" smtClean="0"/>
-              <a:t> https://packagecloud.io/chef/stable/packages/el/6/chef-compliance-0.9.5-2.el</a:t>
-            </a:r>
-            <a:r>
-              <a:rPr lang="en-US" b="1" i="1" dirty="0" smtClean="0">
-                <a:solidFill>
-                  <a:srgbClr val="FF0000"/>
-                </a:solidFill>
-              </a:rPr>
-              <a:t>X</a:t>
-            </a:r>
-            <a:r>
-              <a:rPr lang="en-US" b="1" dirty="0" smtClean="0"/>
-              <a:t>.x86_64.rpm/download </a:t>
-            </a:r>
-            <a:r>
-              <a:rPr lang="en-US" b="0" dirty="0" smtClean="0"/>
-              <a:t>but using the URL you just copied</a:t>
-            </a:r>
-            <a:r>
-              <a:rPr lang="en-US" b="0" baseline="0" dirty="0" smtClean="0"/>
+              <a:t>Red Hat Enterprise Linux 6</a:t>
+            </a:r>
+            <a:r>
+              <a:rPr lang="en-US" dirty="0" smtClean="0"/>
+              <a:t> version. </a:t>
+            </a:r>
+            <a:r>
+              <a:rPr lang="en-US" u="sng" dirty="0" smtClean="0"/>
+              <a:t>Do not </a:t>
+            </a:r>
+            <a:r>
+              <a:rPr lang="en-US" dirty="0" smtClean="0"/>
+              <a:t>click the Download button. We don't want to download this directly to your laptop but instead we will </a:t>
+            </a:r>
+            <a:r>
+              <a:rPr lang="en-US" smtClean="0"/>
+              <a:t>download it</a:t>
+            </a:r>
+            <a:r>
+              <a:rPr lang="en-US" baseline="0" smtClean="0"/>
               <a:t> </a:t>
             </a:r>
             <a:r>
-              <a:rPr lang="en-US" dirty="0" smtClean="0"/>
-              <a:t>to download and install the Compliance package. This could take some time.</a:t>
-            </a:r>
-          </a:p>
-          <a:p>
-            <a:pPr marL="0" marR="0" indent="0" algn="l" defTabSz="1217613" rtl="0" eaLnBrk="1" fontAlgn="base" latinLnBrk="0" hangingPunct="1">
-              <a:lnSpc>
-                <a:spcPct val="90000"/>
-              </a:lnSpc>
-              <a:spcBef>
-                <a:spcPct val="30000"/>
-              </a:spcBef>
-              <a:spcAft>
-                <a:spcPts val="450"/>
-              </a:spcAft>
-              <a:buClrTx/>
-              <a:buSzTx/>
-              <a:buFontTx/>
-              <a:buNone/>
-              <a:tabLst/>
-              <a:defRPr/>
-            </a:pPr>
-            <a:endParaRPr lang="en-US" dirty="0" smtClean="0"/>
-          </a:p>
-          <a:p>
-            <a:pPr marL="0" marR="0" indent="0" algn="l" defTabSz="1217613" rtl="0" eaLnBrk="1" fontAlgn="base" latinLnBrk="0" hangingPunct="1">
-              <a:lnSpc>
-                <a:spcPct val="90000"/>
-              </a:lnSpc>
-              <a:spcBef>
-                <a:spcPct val="30000"/>
-              </a:spcBef>
-              <a:spcAft>
-                <a:spcPts val="450"/>
-              </a:spcAft>
-              <a:buClrTx/>
-              <a:buSzTx/>
-              <a:buFontTx/>
-              <a:buNone/>
-              <a:tabLst/>
-              <a:defRPr/>
-            </a:pPr>
-            <a:r>
-              <a:rPr lang="en-US" b="1" dirty="0" smtClean="0">
-                <a:latin typeface="Courier New" panose="02070309020205020404" pitchFamily="49" charset="0"/>
-                <a:cs typeface="Courier New" panose="02070309020205020404" pitchFamily="49" charset="0"/>
-              </a:rPr>
-              <a:t>Note: </a:t>
-            </a:r>
-            <a:r>
-              <a:rPr lang="en-US" b="0" dirty="0" smtClean="0">
-                <a:latin typeface="Courier New" panose="02070309020205020404" pitchFamily="49" charset="0"/>
-                <a:cs typeface="Courier New" panose="02070309020205020404" pitchFamily="49" charset="0"/>
-              </a:rPr>
-              <a:t>The compliance package will be named </a:t>
-            </a:r>
-            <a:r>
-              <a:rPr lang="en-US" b="1" dirty="0" smtClean="0">
-                <a:latin typeface="Courier New" panose="02070309020205020404" pitchFamily="49" charset="0"/>
-                <a:cs typeface="Courier New" panose="02070309020205020404" pitchFamily="49" charset="0"/>
-              </a:rPr>
-              <a:t>download</a:t>
-            </a:r>
-            <a:r>
-              <a:rPr lang="en-US" b="0" dirty="0" smtClean="0">
-                <a:latin typeface="Courier New" panose="02070309020205020404" pitchFamily="49" charset="0"/>
-                <a:cs typeface="Courier New" panose="02070309020205020404" pitchFamily="49" charset="0"/>
-              </a:rPr>
-              <a:t> at this point.</a:t>
-            </a:r>
-          </a:p>
-          <a:p>
-            <a:endParaRPr lang="en-US" b="0" dirty="0" smtClean="0">
-              <a:latin typeface="Courier New" panose="02070309020205020404" pitchFamily="49" charset="0"/>
-              <a:cs typeface="Courier New" panose="02070309020205020404" pitchFamily="49" charset="0"/>
-            </a:endParaRPr>
-          </a:p>
-          <a:p>
-            <a:r>
-              <a:rPr lang="en-US" b="0" dirty="0" smtClean="0">
-                <a:latin typeface="Courier New" panose="02070309020205020404" pitchFamily="49" charset="0"/>
-                <a:cs typeface="Courier New" panose="02070309020205020404" pitchFamily="49" charset="0"/>
-              </a:rPr>
-              <a:t>Instructor Note: The </a:t>
-            </a:r>
-            <a:r>
-              <a:rPr lang="en-US" b="1" dirty="0" smtClean="0">
-                <a:latin typeface="Courier New" panose="02070309020205020404" pitchFamily="49" charset="0"/>
-                <a:cs typeface="Courier New" panose="02070309020205020404" pitchFamily="49" charset="0"/>
-              </a:rPr>
-              <a:t>X</a:t>
-            </a:r>
-            <a:r>
-              <a:rPr lang="en-US" b="0" dirty="0" smtClean="0">
-                <a:latin typeface="Courier New" panose="02070309020205020404" pitchFamily="49" charset="0"/>
-                <a:cs typeface="Courier New" panose="02070309020205020404" pitchFamily="49" charset="0"/>
-              </a:rPr>
-              <a:t> in this part of the file name - </a:t>
-            </a:r>
-            <a:r>
-              <a:rPr lang="en-US" b="1" dirty="0" smtClean="0">
-                <a:latin typeface="Courier New" panose="02070309020205020404" pitchFamily="49" charset="0"/>
-                <a:cs typeface="Courier New" panose="02070309020205020404" pitchFamily="49" charset="0"/>
-              </a:rPr>
-              <a:t>0.9.2-2.el</a:t>
-            </a:r>
-            <a:r>
-              <a:rPr lang="en-US" b="1" i="1" dirty="0" smtClean="0">
-                <a:latin typeface="Courier New" panose="02070309020205020404" pitchFamily="49" charset="0"/>
-                <a:cs typeface="Courier New" panose="02070309020205020404" pitchFamily="49" charset="0"/>
-              </a:rPr>
-              <a:t>X - </a:t>
-            </a:r>
-            <a:r>
-              <a:rPr lang="en-US" b="0" i="0" dirty="0" smtClean="0">
-                <a:latin typeface="Courier New" panose="02070309020205020404" pitchFamily="49" charset="0"/>
-                <a:cs typeface="Courier New" panose="02070309020205020404" pitchFamily="49" charset="0"/>
-              </a:rPr>
-              <a:t>was added so students will</a:t>
-            </a:r>
-            <a:r>
-              <a:rPr lang="en-US" b="0" i="0" baseline="0" dirty="0" smtClean="0">
-                <a:latin typeface="Courier New" panose="02070309020205020404" pitchFamily="49" charset="0"/>
-                <a:cs typeface="Courier New" panose="02070309020205020404" pitchFamily="49" charset="0"/>
-              </a:rPr>
-              <a:t> paste the latest version and not try to copy/paste the above command verbatim.</a:t>
-            </a:r>
-            <a:endParaRPr lang="en-US" b="0" i="0" dirty="0" smtClean="0">
-              <a:latin typeface="Courier New" panose="02070309020205020404" pitchFamily="49" charset="0"/>
-              <a:cs typeface="Courier New" panose="02070309020205020404" pitchFamily="49" charset="0"/>
-            </a:endParaRPr>
-          </a:p>
-          <a:p>
-            <a:pPr marL="0" marR="0" indent="0" algn="l" defTabSz="1217613" rtl="0" eaLnBrk="1" fontAlgn="base" latinLnBrk="0" hangingPunct="1">
-              <a:lnSpc>
-                <a:spcPct val="90000"/>
-              </a:lnSpc>
-              <a:spcBef>
-                <a:spcPct val="30000"/>
-              </a:spcBef>
-              <a:spcAft>
-                <a:spcPts val="450"/>
-              </a:spcAft>
-              <a:buClrTx/>
-              <a:buSzTx/>
-              <a:buFontTx/>
-              <a:buNone/>
-              <a:tabLst/>
-              <a:defRPr/>
-            </a:pPr>
-            <a:endParaRPr lang="en-US" b="0" dirty="0" smtClean="0">
-              <a:latin typeface="Courier New" panose="02070309020205020404" pitchFamily="49" charset="0"/>
-              <a:cs typeface="Courier New" panose="02070309020205020404" pitchFamily="49" charset="0"/>
-            </a:endParaRPr>
-          </a:p>
-          <a:p>
-            <a:pPr marL="0" marR="0" indent="0" algn="l" defTabSz="1217613" rtl="0" eaLnBrk="1" fontAlgn="base" latinLnBrk="0" hangingPunct="1">
-              <a:lnSpc>
-                <a:spcPct val="90000"/>
-              </a:lnSpc>
-              <a:spcBef>
-                <a:spcPct val="30000"/>
-              </a:spcBef>
-              <a:spcAft>
-                <a:spcPts val="450"/>
-              </a:spcAft>
-              <a:buClrTx/>
-              <a:buSzTx/>
-              <a:buFontTx/>
-              <a:buNone/>
-              <a:tabLst/>
-              <a:defRPr/>
-            </a:pPr>
-            <a:endParaRPr lang="en-US" dirty="0" smtClean="0"/>
-          </a:p>
-          <a:p>
-            <a:pPr marL="0" marR="0" indent="0" algn="l" defTabSz="1217613" rtl="0" eaLnBrk="1" fontAlgn="base" latinLnBrk="0" hangingPunct="1">
-              <a:lnSpc>
-                <a:spcPct val="90000"/>
-              </a:lnSpc>
-              <a:spcBef>
-                <a:spcPct val="30000"/>
-              </a:spcBef>
-              <a:spcAft>
-                <a:spcPts val="450"/>
-              </a:spcAft>
-              <a:buClrTx/>
-              <a:buSzTx/>
-              <a:buFontTx/>
-              <a:buNone/>
-              <a:tabLst/>
-              <a:defRPr/>
-            </a:pPr>
-            <a:endParaRPr lang="en-US" dirty="0" smtClean="0"/>
+              <a:rPr lang="en-US" smtClean="0"/>
+              <a:t>directly </a:t>
+            </a:r>
+            <a:r>
+              <a:rPr lang="en-US" dirty="0" smtClean="0"/>
+              <a:t>to our node.</a:t>
+            </a:r>
+          </a:p>
+          <a:p>
+            <a:endParaRPr lang="en-US" dirty="0"/>
           </a:p>
         </p:txBody>
       </p:sp>
@@ -2193,7 +2081,7 @@
               <a:pPr>
                 <a:defRPr/>
               </a:pPr>
-              <a:t>8</a:t>
+              <a:t>7</a:t>
             </a:fld>
             <a:endParaRPr lang="en-US" dirty="0"/>
           </a:p>
@@ -2246,7 +2134,7 @@
     </p:spTree>
     <p:extLst>
       <p:ext uri="{BB962C8B-B14F-4D97-AF65-F5344CB8AC3E}">
-        <p14:creationId xmlns:p14="http://schemas.microsoft.com/office/powerpoint/2010/main" val="1882353999"/>
+        <p14:creationId xmlns:p14="http://schemas.microsoft.com/office/powerpoint/2010/main" val="77950305"/>
       </p:ext>
     </p:extLst>
   </p:cSld>
@@ -2297,30 +2185,256 @@
         </p:nvSpPr>
         <p:spPr/>
         <p:txBody>
-          <a:bodyPr>
-            <a:normAutofit/>
-          </a:bodyPr>
+          <a:bodyPr/>
           <a:lstStyle/>
           <a:p>
-            <a:r>
-              <a:rPr lang="en-US" dirty="0" smtClean="0"/>
-              <a:t>This reconfiguration process could take 20 to 25 minutes to complete. </a:t>
-            </a:r>
-          </a:p>
-          <a:p>
-            <a:endParaRPr lang="en-US" b="1" dirty="0" smtClean="0"/>
-          </a:p>
-          <a:p>
+            <a:pPr marL="0" marR="0" indent="0" algn="l" defTabSz="1217613" rtl="0" eaLnBrk="1" fontAlgn="base" latinLnBrk="0" hangingPunct="1">
+              <a:lnSpc>
+                <a:spcPct val="90000"/>
+              </a:lnSpc>
+              <a:spcBef>
+                <a:spcPct val="30000"/>
+              </a:spcBef>
+              <a:spcAft>
+                <a:spcPts val="450"/>
+              </a:spcAft>
+              <a:buClrTx/>
+              <a:buSzTx/>
+              <a:buFontTx/>
+              <a:buNone/>
+              <a:tabLst/>
+              <a:defRPr/>
+            </a:pPr>
+            <a:r>
+              <a:rPr lang="en-US" dirty="0" smtClean="0"/>
+              <a:t>Execute </a:t>
+            </a:r>
             <a:r>
               <a:rPr lang="en-US" b="1" dirty="0" smtClean="0"/>
-              <a:t>Important</a:t>
-            </a:r>
-            <a:r>
-              <a:rPr lang="en-US" dirty="0" smtClean="0"/>
-              <a:t>: Do not use Ctrl c while this is running. </a:t>
-            </a:r>
-          </a:p>
-          <a:p>
+              <a:t>sudo rpm -</a:t>
+            </a:r>
+            <a:r>
+              <a:rPr lang="en-US" b="1" dirty="0" err="1" smtClean="0"/>
+              <a:t>Uvh</a:t>
+            </a:r>
+            <a:r>
+              <a:rPr lang="en-US" b="1" dirty="0" smtClean="0"/>
+              <a:t> https://packagecloud.io/chef/stable/packages/el/6/chef-compliance-0.9.5-2.el</a:t>
+            </a:r>
+            <a:r>
+              <a:rPr lang="en-US" b="1" i="1" dirty="0" smtClean="0">
+                <a:solidFill>
+                  <a:srgbClr val="FF0000"/>
+                </a:solidFill>
+              </a:rPr>
+              <a:t>X</a:t>
+            </a:r>
+            <a:r>
+              <a:rPr lang="en-US" b="1" dirty="0" smtClean="0"/>
+              <a:t>.x86_64.rpm/download </a:t>
+            </a:r>
+            <a:r>
+              <a:rPr lang="en-US" b="0" dirty="0" smtClean="0"/>
+              <a:t>but using the URL you just copied</a:t>
+            </a:r>
+            <a:r>
+              <a:rPr lang="en-US" b="0" baseline="0" dirty="0" smtClean="0"/>
+              <a:t> </a:t>
+            </a:r>
+            <a:r>
+              <a:rPr lang="en-US" dirty="0" smtClean="0"/>
+              <a:t>to download and install the Compliance package. This could take some time.</a:t>
+            </a:r>
+          </a:p>
+          <a:p>
+            <a:pPr marL="0" marR="0" indent="0" algn="l" defTabSz="1217613" rtl="0" eaLnBrk="1" fontAlgn="base" latinLnBrk="0" hangingPunct="1">
+              <a:lnSpc>
+                <a:spcPct val="90000"/>
+              </a:lnSpc>
+              <a:spcBef>
+                <a:spcPct val="30000"/>
+              </a:spcBef>
+              <a:spcAft>
+                <a:spcPts val="450"/>
+              </a:spcAft>
+              <a:buClrTx/>
+              <a:buSzTx/>
+              <a:buFontTx/>
+              <a:buNone/>
+              <a:tabLst/>
+              <a:defRPr/>
+            </a:pPr>
+            <a:endParaRPr lang="en-US" dirty="0" smtClean="0"/>
+          </a:p>
+          <a:p>
+            <a:pPr marL="0" marR="0" indent="0" algn="l" defTabSz="1217613" rtl="0" eaLnBrk="1" fontAlgn="base" latinLnBrk="0" hangingPunct="1">
+              <a:lnSpc>
+                <a:spcPct val="90000"/>
+              </a:lnSpc>
+              <a:spcBef>
+                <a:spcPct val="30000"/>
+              </a:spcBef>
+              <a:spcAft>
+                <a:spcPts val="450"/>
+              </a:spcAft>
+              <a:buClrTx/>
+              <a:buSzTx/>
+              <a:buFontTx/>
+              <a:buNone/>
+              <a:tabLst/>
+              <a:defRPr/>
+            </a:pPr>
+            <a:r>
+              <a:rPr lang="en-US" b="1" dirty="0" smtClean="0">
+                <a:latin typeface="Courier New" panose="02070309020205020404" pitchFamily="49" charset="0"/>
+                <a:cs typeface="Courier New" panose="02070309020205020404" pitchFamily="49" charset="0"/>
+              </a:rPr>
+              <a:t>Note: </a:t>
+            </a:r>
+            <a:r>
+              <a:rPr lang="en-US" b="0" dirty="0" smtClean="0">
+                <a:latin typeface="Courier New" panose="02070309020205020404" pitchFamily="49" charset="0"/>
+                <a:cs typeface="Courier New" panose="02070309020205020404" pitchFamily="49" charset="0"/>
+              </a:rPr>
+              <a:t>The compliance package will be named </a:t>
+            </a:r>
+            <a:r>
+              <a:rPr lang="en-US" b="1" dirty="0" smtClean="0">
+                <a:latin typeface="Courier New" panose="02070309020205020404" pitchFamily="49" charset="0"/>
+                <a:cs typeface="Courier New" panose="02070309020205020404" pitchFamily="49" charset="0"/>
+              </a:rPr>
+              <a:t>download</a:t>
+            </a:r>
+            <a:r>
+              <a:rPr lang="en-US" b="0" dirty="0" smtClean="0">
+                <a:latin typeface="Courier New" panose="02070309020205020404" pitchFamily="49" charset="0"/>
+                <a:cs typeface="Courier New" panose="02070309020205020404" pitchFamily="49" charset="0"/>
+              </a:rPr>
+              <a:t> at this point.</a:t>
+            </a:r>
+          </a:p>
+          <a:p>
+            <a:endParaRPr lang="en-US" b="0" dirty="0" smtClean="0">
+              <a:latin typeface="Courier New" panose="02070309020205020404" pitchFamily="49" charset="0"/>
+              <a:cs typeface="Courier New" panose="02070309020205020404" pitchFamily="49" charset="0"/>
+            </a:endParaRPr>
+          </a:p>
+          <a:p>
+            <a:r>
+              <a:rPr lang="en-US" b="0" dirty="0" smtClean="0">
+                <a:latin typeface="Courier New" panose="02070309020205020404" pitchFamily="49" charset="0"/>
+                <a:cs typeface="Courier New" panose="02070309020205020404" pitchFamily="49" charset="0"/>
+              </a:rPr>
+              <a:t>Instructor Note: The </a:t>
+            </a:r>
+            <a:r>
+              <a:rPr lang="en-US" b="1" dirty="0" smtClean="0">
+                <a:latin typeface="Courier New" panose="02070309020205020404" pitchFamily="49" charset="0"/>
+                <a:cs typeface="Courier New" panose="02070309020205020404" pitchFamily="49" charset="0"/>
+              </a:rPr>
+              <a:t>X</a:t>
+            </a:r>
+            <a:r>
+              <a:rPr lang="en-US" b="0" dirty="0" smtClean="0">
+                <a:latin typeface="Courier New" panose="02070309020205020404" pitchFamily="49" charset="0"/>
+                <a:cs typeface="Courier New" panose="02070309020205020404" pitchFamily="49" charset="0"/>
+              </a:rPr>
+              <a:t> in this part of the file name - </a:t>
+            </a:r>
+            <a:r>
+              <a:rPr lang="en-US" b="1" dirty="0" smtClean="0">
+                <a:latin typeface="Courier New" panose="02070309020205020404" pitchFamily="49" charset="0"/>
+                <a:cs typeface="Courier New" panose="02070309020205020404" pitchFamily="49" charset="0"/>
+              </a:rPr>
+              <a:t>0.9.2-2.el</a:t>
+            </a:r>
+            <a:r>
+              <a:rPr lang="en-US" b="1" i="1" dirty="0" smtClean="0">
+                <a:latin typeface="Courier New" panose="02070309020205020404" pitchFamily="49" charset="0"/>
+                <a:cs typeface="Courier New" panose="02070309020205020404" pitchFamily="49" charset="0"/>
+              </a:rPr>
+              <a:t>X - </a:t>
+            </a:r>
+            <a:r>
+              <a:rPr lang="en-US" b="0" i="0" dirty="0" smtClean="0">
+                <a:latin typeface="Courier New" panose="02070309020205020404" pitchFamily="49" charset="0"/>
+                <a:cs typeface="Courier New" panose="02070309020205020404" pitchFamily="49" charset="0"/>
+              </a:rPr>
+              <a:t>was added so students will</a:t>
+            </a:r>
+            <a:r>
+              <a:rPr lang="en-US" b="0" i="0" baseline="0" dirty="0" smtClean="0">
+                <a:latin typeface="Courier New" panose="02070309020205020404" pitchFamily="49" charset="0"/>
+                <a:cs typeface="Courier New" panose="02070309020205020404" pitchFamily="49" charset="0"/>
+              </a:rPr>
+              <a:t> paste the latest version and not try to copy/paste the above command verbatim.</a:t>
+            </a:r>
+            <a:endParaRPr lang="en-US" b="0" i="0" dirty="0" smtClean="0">
+              <a:latin typeface="Courier New" panose="02070309020205020404" pitchFamily="49" charset="0"/>
+              <a:cs typeface="Courier New" panose="02070309020205020404" pitchFamily="49" charset="0"/>
+            </a:endParaRPr>
+          </a:p>
+          <a:p>
+            <a:pPr marL="0" marR="0" indent="0" algn="l" defTabSz="1217613" rtl="0" eaLnBrk="1" fontAlgn="base" latinLnBrk="0" hangingPunct="1">
+              <a:lnSpc>
+                <a:spcPct val="90000"/>
+              </a:lnSpc>
+              <a:spcBef>
+                <a:spcPct val="30000"/>
+              </a:spcBef>
+              <a:spcAft>
+                <a:spcPts val="450"/>
+              </a:spcAft>
+              <a:buClrTx/>
+              <a:buSzTx/>
+              <a:buFontTx/>
+              <a:buNone/>
+              <a:tabLst/>
+              <a:defRPr/>
+            </a:pPr>
+            <a:endParaRPr lang="en-US" b="0" dirty="0" smtClean="0">
+              <a:latin typeface="Courier New" panose="02070309020205020404" pitchFamily="49" charset="0"/>
+              <a:cs typeface="Courier New" panose="02070309020205020404" pitchFamily="49" charset="0"/>
+            </a:endParaRPr>
+          </a:p>
+          <a:p>
+            <a:pPr marL="0" marR="0" indent="0" algn="l" defTabSz="1217613" rtl="0" eaLnBrk="1" fontAlgn="base" latinLnBrk="0" hangingPunct="1">
+              <a:lnSpc>
+                <a:spcPct val="90000"/>
+              </a:lnSpc>
+              <a:spcBef>
+                <a:spcPct val="30000"/>
+              </a:spcBef>
+              <a:spcAft>
+                <a:spcPts val="450"/>
+              </a:spcAft>
+              <a:buClrTx/>
+              <a:buSzTx/>
+              <a:buFontTx/>
+              <a:buNone/>
+              <a:tabLst/>
+              <a:defRPr/>
+            </a:pPr>
+            <a:endParaRPr lang="en-US" dirty="0" smtClean="0"/>
+          </a:p>
+          <a:p>
+            <a:pPr marL="0" marR="0" indent="0" algn="l" defTabSz="1217613" rtl="0" eaLnBrk="1" fontAlgn="base" latinLnBrk="0" hangingPunct="1">
+              <a:lnSpc>
+                <a:spcPct val="90000"/>
+              </a:lnSpc>
+              <a:spcBef>
+                <a:spcPct val="30000"/>
+              </a:spcBef>
+              <a:spcAft>
+                <a:spcPts val="450"/>
+              </a:spcAft>
+              <a:buClrTx/>
+              <a:buSzTx/>
+              <a:buFontTx/>
+              <a:buNone/>
+              <a:tabLst/>
+              <a:defRPr/>
+            </a:pPr>
             <a:endParaRPr lang="en-US" dirty="0" smtClean="0"/>
           </a:p>
         </p:txBody>
@@ -2348,7 +2462,7 @@
               <a:pPr>
                 <a:defRPr/>
               </a:pPr>
-              <a:t>9</a:t>
+              <a:t>8</a:t>
             </a:fld>
             <a:endParaRPr lang="en-US" dirty="0"/>
           </a:p>
@@ -2401,7 +2515,7 @@
     </p:spTree>
     <p:extLst>
       <p:ext uri="{BB962C8B-B14F-4D97-AF65-F5344CB8AC3E}">
-        <p14:creationId xmlns:p14="http://schemas.microsoft.com/office/powerpoint/2010/main" val="1230862567"/>
+        <p14:creationId xmlns:p14="http://schemas.microsoft.com/office/powerpoint/2010/main" val="1882353999"/>
       </p:ext>
     </p:extLst>
   </p:cSld>
@@ -2452,141 +2566,40 @@
         </p:nvSpPr>
         <p:spPr/>
         <p:txBody>
-          <a:bodyPr/>
+          <a:bodyPr>
+            <a:normAutofit/>
+          </a:bodyPr>
           <a:lstStyle/>
           <a:p>
-            <a:pPr marL="0" marR="0" indent="0" algn="l" defTabSz="1217613" rtl="0" eaLnBrk="1" fontAlgn="base" latinLnBrk="0" hangingPunct="1">
-              <a:lnSpc>
-                <a:spcPct val="90000"/>
-              </a:lnSpc>
-              <a:spcBef>
-                <a:spcPct val="30000"/>
-              </a:spcBef>
-              <a:spcAft>
-                <a:spcPts val="450"/>
-              </a:spcAft>
-              <a:buClrTx/>
-              <a:buSzTx/>
-              <a:buFontTx/>
-              <a:buNone/>
-              <a:tabLst/>
-              <a:defRPr/>
-            </a:pPr>
-            <a:r>
-              <a:rPr lang="en-US" dirty="0" smtClean="0"/>
-              <a:t>Execute </a:t>
-            </a:r>
+            <a:r>
+              <a:rPr lang="en-US" dirty="0" smtClean="0"/>
+              <a:t>This reconfiguration process could take 5 or more minutes to complete. </a:t>
+            </a:r>
+          </a:p>
+          <a:p>
+            <a:endParaRPr lang="en-US" b="1" dirty="0" smtClean="0"/>
+          </a:p>
+          <a:p>
             <a:r>
               <a:rPr lang="en-US" b="1" dirty="0" smtClean="0"/>
-              <a:t>sudo chef-compliance-</a:t>
-            </a:r>
-            <a:r>
-              <a:rPr lang="en-US" b="1" dirty="0" err="1" smtClean="0"/>
-              <a:t>ctl</a:t>
-            </a:r>
-            <a:r>
-              <a:rPr lang="en-US" b="1" dirty="0" smtClean="0"/>
-              <a:t> user-create admin </a:t>
-            </a:r>
-            <a:r>
-              <a:rPr lang="en-US" b="1" dirty="0" err="1" smtClean="0"/>
-              <a:t>admin</a:t>
-            </a:r>
-            <a:r>
-              <a:rPr lang="en-US" baseline="0" dirty="0" smtClean="0"/>
-              <a:t> .</a:t>
-            </a:r>
-          </a:p>
-          <a:p>
-            <a:pPr marL="0" marR="0" indent="0" algn="l" defTabSz="1217613" rtl="0" eaLnBrk="1" fontAlgn="base" latinLnBrk="0" hangingPunct="1">
-              <a:lnSpc>
-                <a:spcPct val="90000"/>
-              </a:lnSpc>
-              <a:spcBef>
-                <a:spcPct val="30000"/>
-              </a:spcBef>
-              <a:spcAft>
-                <a:spcPts val="450"/>
-              </a:spcAft>
-              <a:buClrTx/>
-              <a:buSzTx/>
-              <a:buFontTx/>
-              <a:buNone/>
-              <a:tabLst/>
-              <a:defRPr/>
-            </a:pPr>
-            <a:endParaRPr lang="en-US" baseline="0" dirty="0" smtClean="0"/>
-          </a:p>
-          <a:p>
-            <a:pPr marL="0" marR="0" indent="0" algn="l" defTabSz="1217613" rtl="0" eaLnBrk="1" fontAlgn="base" latinLnBrk="0" hangingPunct="1">
-              <a:lnSpc>
-                <a:spcPct val="90000"/>
-              </a:lnSpc>
-              <a:spcBef>
-                <a:spcPct val="30000"/>
-              </a:spcBef>
-              <a:spcAft>
-                <a:spcPts val="450"/>
-              </a:spcAft>
-              <a:buClrTx/>
-              <a:buSzTx/>
-              <a:buFontTx/>
-              <a:buNone/>
-              <a:tabLst/>
-              <a:defRPr/>
-            </a:pPr>
-            <a:r>
-              <a:rPr lang="en-US" baseline="0" dirty="0" smtClean="0"/>
-              <a:t>This will create a user named admin with a password of admin.</a:t>
-            </a:r>
-          </a:p>
-          <a:p>
-            <a:pPr marL="0" marR="0" indent="0" algn="l" defTabSz="1217613" rtl="0" eaLnBrk="1" fontAlgn="base" latinLnBrk="0" hangingPunct="1">
-              <a:lnSpc>
-                <a:spcPct val="90000"/>
-              </a:lnSpc>
-              <a:spcBef>
-                <a:spcPct val="30000"/>
-              </a:spcBef>
-              <a:spcAft>
-                <a:spcPts val="450"/>
-              </a:spcAft>
-              <a:buClrTx/>
-              <a:buSzTx/>
-              <a:buFontTx/>
-              <a:buNone/>
-              <a:tabLst/>
-              <a:defRPr/>
-            </a:pPr>
-            <a:endParaRPr lang="en-US" baseline="0" dirty="0" smtClean="0"/>
-          </a:p>
-          <a:p>
-            <a:pPr marL="0" marR="0" indent="0" algn="l" defTabSz="1217613" rtl="0" eaLnBrk="1" fontAlgn="base" latinLnBrk="0" hangingPunct="1">
-              <a:lnSpc>
-                <a:spcPct val="90000"/>
-              </a:lnSpc>
-              <a:spcBef>
-                <a:spcPct val="30000"/>
-              </a:spcBef>
-              <a:spcAft>
-                <a:spcPts val="450"/>
-              </a:spcAft>
-              <a:buClrTx/>
-              <a:buSzTx/>
-              <a:buFontTx/>
-              <a:buNone/>
-              <a:tabLst/>
-              <a:defRPr/>
-            </a:pPr>
-            <a:r>
-              <a:rPr lang="en-US" baseline="0" smtClean="0"/>
-              <a:t>In </a:t>
-            </a:r>
-            <a:r>
-              <a:rPr lang="en-US" baseline="0" dirty="0" smtClean="0"/>
-              <a:t>the workplace you should of course create a more secure password.</a:t>
-            </a:r>
-            <a:endParaRPr lang="en-US" dirty="0"/>
+              <a:t>Important</a:t>
+            </a:r>
+            <a:r>
+              <a:rPr lang="en-US" dirty="0" smtClean="0"/>
+              <a:t>: Do not use Ctrl c while this is running. </a:t>
+            </a:r>
+          </a:p>
+          <a:p>
+            <a:endParaRPr lang="en-US" dirty="0" smtClean="0"/>
+          </a:p>
+          <a:p>
+            <a:r>
+              <a:rPr lang="en-US" dirty="0" smtClean="0"/>
+              <a:t>TBD. check length</a:t>
+            </a:r>
+          </a:p>
+          <a:p>
+            <a:endParaRPr lang="en-US" dirty="0" smtClean="0"/>
           </a:p>
         </p:txBody>
       </p:sp>
@@ -2613,7 +2626,7 @@
               <a:pPr>
                 <a:defRPr/>
               </a:pPr>
-              <a:t>10</a:t>
+              <a:t>9</a:t>
             </a:fld>
             <a:endParaRPr lang="en-US" dirty="0"/>
           </a:p>
@@ -2666,7 +2679,7 @@
     </p:spTree>
     <p:extLst>
       <p:ext uri="{BB962C8B-B14F-4D97-AF65-F5344CB8AC3E}">
-        <p14:creationId xmlns:p14="http://schemas.microsoft.com/office/powerpoint/2010/main" val="1336534531"/>
+        <p14:creationId xmlns:p14="http://schemas.microsoft.com/office/powerpoint/2010/main" val="1230862567"/>
       </p:ext>
     </p:extLst>
   </p:cSld>
@@ -2720,9 +2733,145 @@
           <a:bodyPr/>
           <a:lstStyle/>
           <a:p>
-            <a:r>
-              <a:rPr lang="en-US" dirty="0" smtClean="0"/>
-              <a:t>We have not set up SSL so the https strikethrough is fine for now. In the workplace you would want to use SSL for connections to your Compliance Web UI.</a:t>
+            <a:pPr marL="0" marR="0" indent="0" algn="l" defTabSz="1217613" rtl="0" eaLnBrk="1" fontAlgn="base" latinLnBrk="0" hangingPunct="1">
+              <a:lnSpc>
+                <a:spcPct val="90000"/>
+              </a:lnSpc>
+              <a:spcBef>
+                <a:spcPct val="30000"/>
+              </a:spcBef>
+              <a:spcAft>
+                <a:spcPts val="450"/>
+              </a:spcAft>
+              <a:buClrTx/>
+              <a:buSzTx/>
+              <a:buFontTx/>
+              <a:buNone/>
+              <a:tabLst/>
+              <a:defRPr/>
+            </a:pPr>
+            <a:r>
+              <a:rPr lang="en-US" dirty="0" smtClean="0"/>
+              <a:t>Execute </a:t>
+            </a:r>
+            <a:r>
+              <a:rPr lang="en-US" b="1" dirty="0" smtClean="0"/>
+              <a:t>sudo chef-compliance-</a:t>
+            </a:r>
+            <a:r>
+              <a:rPr lang="en-US" b="1" dirty="0" err="1" smtClean="0"/>
+              <a:t>ctl</a:t>
+            </a:r>
+            <a:r>
+              <a:rPr lang="en-US" b="1" dirty="0" smtClean="0"/>
+              <a:t> user-create admin </a:t>
+            </a:r>
+            <a:r>
+              <a:rPr lang="en-US" b="1" dirty="0" err="1" smtClean="0"/>
+              <a:t>chefadmin</a:t>
+            </a:r>
+            <a:r>
+              <a:rPr lang="en-US" baseline="0" dirty="0" smtClean="0"/>
+              <a:t> </a:t>
+            </a:r>
+            <a:r>
+              <a:rPr lang="en-US" baseline="0" dirty="0" smtClean="0"/>
+              <a:t>.</a:t>
+            </a:r>
+          </a:p>
+          <a:p>
+            <a:pPr marL="0" marR="0" indent="0" algn="l" defTabSz="1217613" rtl="0" eaLnBrk="1" fontAlgn="base" latinLnBrk="0" hangingPunct="1">
+              <a:lnSpc>
+                <a:spcPct val="90000"/>
+              </a:lnSpc>
+              <a:spcBef>
+                <a:spcPct val="30000"/>
+              </a:spcBef>
+              <a:spcAft>
+                <a:spcPts val="450"/>
+              </a:spcAft>
+              <a:buClrTx/>
+              <a:buSzTx/>
+              <a:buFontTx/>
+              <a:buNone/>
+              <a:tabLst/>
+              <a:defRPr/>
+            </a:pPr>
+            <a:endParaRPr lang="en-US" baseline="0" dirty="0" smtClean="0"/>
+          </a:p>
+          <a:p>
+            <a:pPr marL="0" marR="0" indent="0" algn="l" defTabSz="1217613" rtl="0" eaLnBrk="1" fontAlgn="base" latinLnBrk="0" hangingPunct="1">
+              <a:lnSpc>
+                <a:spcPct val="90000"/>
+              </a:lnSpc>
+              <a:spcBef>
+                <a:spcPct val="30000"/>
+              </a:spcBef>
+              <a:spcAft>
+                <a:spcPts val="450"/>
+              </a:spcAft>
+              <a:buClrTx/>
+              <a:buSzTx/>
+              <a:buFontTx/>
+              <a:buNone/>
+              <a:tabLst/>
+              <a:defRPr/>
+            </a:pPr>
+            <a:r>
+              <a:rPr lang="en-US" baseline="0" dirty="0" smtClean="0"/>
+              <a:t>This will create a user named admin with a password of </a:t>
+            </a:r>
+            <a:r>
+              <a:rPr lang="en-US" baseline="0" dirty="0" err="1" smtClean="0"/>
+              <a:t>chefadmin</a:t>
+            </a:r>
+            <a:r>
+              <a:rPr lang="en-US" baseline="0" dirty="0" smtClean="0"/>
+              <a:t>.</a:t>
+            </a:r>
+            <a:endParaRPr lang="en-US" baseline="0" dirty="0" smtClean="0"/>
+          </a:p>
+          <a:p>
+            <a:pPr marL="0" marR="0" indent="0" algn="l" defTabSz="1217613" rtl="0" eaLnBrk="1" fontAlgn="base" latinLnBrk="0" hangingPunct="1">
+              <a:lnSpc>
+                <a:spcPct val="90000"/>
+              </a:lnSpc>
+              <a:spcBef>
+                <a:spcPct val="30000"/>
+              </a:spcBef>
+              <a:spcAft>
+                <a:spcPts val="450"/>
+              </a:spcAft>
+              <a:buClrTx/>
+              <a:buSzTx/>
+              <a:buFontTx/>
+              <a:buNone/>
+              <a:tabLst/>
+              <a:defRPr/>
+            </a:pPr>
+            <a:endParaRPr lang="en-US" baseline="0" dirty="0" smtClean="0"/>
+          </a:p>
+          <a:p>
+            <a:pPr marL="0" marR="0" indent="0" algn="l" defTabSz="1217613" rtl="0" eaLnBrk="1" fontAlgn="base" latinLnBrk="0" hangingPunct="1">
+              <a:lnSpc>
+                <a:spcPct val="90000"/>
+              </a:lnSpc>
+              <a:spcBef>
+                <a:spcPct val="30000"/>
+              </a:spcBef>
+              <a:spcAft>
+                <a:spcPts val="450"/>
+              </a:spcAft>
+              <a:buClrTx/>
+              <a:buSzTx/>
+              <a:buFontTx/>
+              <a:buNone/>
+              <a:tabLst/>
+              <a:defRPr/>
+            </a:pPr>
+            <a:r>
+              <a:rPr lang="en-US" baseline="0" dirty="0" smtClean="0"/>
+              <a:t>In the workplace you should of course create a more secure password.</a:t>
             </a:r>
             <a:endParaRPr lang="en-US" dirty="0"/>
           </a:p>
@@ -2751,7 +2900,7 @@
               <a:pPr>
                 <a:defRPr/>
               </a:pPr>
-              <a:t>11</a:t>
+              <a:t>10</a:t>
             </a:fld>
             <a:endParaRPr lang="en-US" dirty="0"/>
           </a:p>
@@ -2804,7 +2953,7 @@
     </p:spTree>
     <p:extLst>
       <p:ext uri="{BB962C8B-B14F-4D97-AF65-F5344CB8AC3E}">
-        <p14:creationId xmlns:p14="http://schemas.microsoft.com/office/powerpoint/2010/main" val="667353389"/>
+        <p14:creationId xmlns:p14="http://schemas.microsoft.com/office/powerpoint/2010/main" val="1336534531"/>
       </p:ext>
     </p:extLst>
   </p:cSld>
@@ -2889,7 +3038,7 @@
               <a:pPr>
                 <a:defRPr/>
               </a:pPr>
-              <a:t>12</a:t>
+              <a:t>11</a:t>
             </a:fld>
             <a:endParaRPr lang="en-US" dirty="0"/>
           </a:p>
@@ -2942,7 +3091,7 @@
     </p:spTree>
     <p:extLst>
       <p:ext uri="{BB962C8B-B14F-4D97-AF65-F5344CB8AC3E}">
-        <p14:creationId xmlns:p14="http://schemas.microsoft.com/office/powerpoint/2010/main" val="694977390"/>
+        <p14:creationId xmlns:p14="http://schemas.microsoft.com/office/powerpoint/2010/main" val="667353389"/>
       </p:ext>
     </p:extLst>
   </p:cSld>
@@ -11036,7 +11185,7 @@
             </a:r>
             <a:r>
               <a:rPr lang="en-US" dirty="0" err="1" smtClean="0"/>
-              <a:t>admin</a:t>
+              <a:t>chefadmin</a:t>
             </a:r>
             <a:endParaRPr lang="en-US" dirty="0"/>
           </a:p>
@@ -11188,8 +11337,9 @@
             </a:br>
             <a:r>
               <a:rPr lang="en-US" dirty="0" smtClean="0"/>
-              <a:t>ec2-52-92-32-225.compute-2.amazonaws.com</a:t>
-            </a:r>
+              <a:t>ec2-52-92-32-225.compute-2.amazonaws.com or simply the IP address.</a:t>
+            </a:r>
+            <a:endParaRPr lang="en-US" dirty="0" smtClean="0"/>
           </a:p>
           <a:p>
             <a:pPr marL="457200" indent="-457200">
@@ -12062,15 +12212,7 @@
                   <a:srgbClr val="7D868C"/>
                 </a:solidFill>
               </a:rPr>
-              <a:t>©2016 </a:t>
-            </a:r>
-            <a:r>
-              <a:rPr lang="en-US" dirty="0" smtClean="0">
-                <a:solidFill>
-                  <a:srgbClr val="7D868C"/>
-                </a:solidFill>
-              </a:rPr>
-              <a:t>Chef Software Inc</a:t>
+              <a:t>©2016 Chef Software Inc</a:t>
             </a:r>
             <a:r>
               <a:rPr lang="en-US" dirty="0" smtClean="0"/>
@@ -12633,22 +12775,22 @@
       </p:sp>
       <p:pic>
         <p:nvPicPr>
-          <p:cNvPr id="5" name="Picture 4"/>
+          <p:cNvPr id="6" name="Picture 5"/>
           <p:cNvPicPr>
             <a:picLocks noChangeAspect="1"/>
           </p:cNvPicPr>
           <p:nvPr/>
         </p:nvPicPr>
         <p:blipFill>
-          <a:blip r:embed="rId2"/>
+          <a:blip r:embed="rId3"/>
           <a:stretch>
             <a:fillRect/>
           </a:stretch>
         </p:blipFill>
         <p:spPr>
           <a:xfrm>
-            <a:off x="10469880" y="236220"/>
-            <a:ext cx="5326380" cy="7805902"/>
+            <a:off x="10570032" y="232755"/>
+            <a:ext cx="5324963" cy="7860659"/>
           </a:xfrm>
           <a:prstGeom prst="rect">
             <a:avLst/>
@@ -14851,6 +14993,52 @@
 </file>
 
 <file path=customXml/item1.xml><?xml version="1.0" encoding="utf-8"?>
+<?mso-contentType ?>
+<spe:Receivers xmlns:spe="http://schemas.microsoft.com/sharepoint/events">
+  <Receiver>
+    <Name>Document ID Generator</Name>
+    <Synchronization>Synchronous</Synchronization>
+    <Type>10001</Type>
+    <SequenceNumber>1000</SequenceNumber>
+    <Assembly>Microsoft.Office.DocumentManagement, Version=14.0.0.0, Culture=neutral, PublicKeyToken=71e9bce111e9429c</Assembly>
+    <Class>Microsoft.Office.DocumentManagement.Internal.DocIdHandler</Class>
+    <Data/>
+    <Filter/>
+  </Receiver>
+  <Receiver>
+    <Name>Document ID Generator</Name>
+    <Synchronization>Synchronous</Synchronization>
+    <Type>10002</Type>
+    <SequenceNumber>1001</SequenceNumber>
+    <Assembly>Microsoft.Office.DocumentManagement, Version=14.0.0.0, Culture=neutral, PublicKeyToken=71e9bce111e9429c</Assembly>
+    <Class>Microsoft.Office.DocumentManagement.Internal.DocIdHandler</Class>
+    <Data/>
+    <Filter/>
+  </Receiver>
+  <Receiver>
+    <Name>Document ID Generator</Name>
+    <Synchronization>Synchronous</Synchronization>
+    <Type>10004</Type>
+    <SequenceNumber>1002</SequenceNumber>
+    <Assembly>Microsoft.Office.DocumentManagement, Version=14.0.0.0, Culture=neutral, PublicKeyToken=71e9bce111e9429c</Assembly>
+    <Class>Microsoft.Office.DocumentManagement.Internal.DocIdHandler</Class>
+    <Data/>
+    <Filter/>
+  </Receiver>
+  <Receiver>
+    <Name>Document ID Generator</Name>
+    <Synchronization>Synchronous</Synchronization>
+    <Type>10006</Type>
+    <SequenceNumber>1003</SequenceNumber>
+    <Assembly>Microsoft.Office.DocumentManagement, Version=14.0.0.0, Culture=neutral, PublicKeyToken=71e9bce111e9429c</Assembly>
+    <Class>Microsoft.Office.DocumentManagement.Internal.DocIdHandler</Class>
+    <Data/>
+    <Filter/>
+  </Receiver>
+</spe:Receivers>
+</file>
+
+<file path=customXml/item2.xml><?xml version="1.0" encoding="utf-8"?>
 <ct:contentTypeSchema xmlns:ct="http://schemas.microsoft.com/office/2006/metadata/contentType" xmlns:ma="http://schemas.microsoft.com/office/2006/metadata/properties/metaAttributes" ct:_="" ma:_="" ma:contentTypeName="Document" ma:contentTypeID="0x0101000812F700BE7F874999720E88173FE491" ma:contentTypeVersion="0" ma:contentTypeDescription="Create a new document." ma:contentTypeScope="" ma:versionID="3f79f408e2ca720b7aba6e0e32464d0c">
   <xsd:schema xmlns:xsd="http://www.w3.org/2001/XMLSchema" xmlns:xs="http://www.w3.org/2001/XMLSchema" xmlns:p="http://schemas.microsoft.com/office/2006/metadata/properties" xmlns:ns2="7bb5d761-a2ea-4873-95f7-7a6658fb3ef0" targetNamespace="http://schemas.microsoft.com/office/2006/metadata/properties" ma:root="true" ma:fieldsID="1e062cd38ba31e406bfc4340fbc7f87a" ns2:_="">
     <xsd:import namespace="7bb5d761-a2ea-4873-95f7-7a6658fb3ef0"/>
@@ -14995,7 +15183,7 @@
 </ct:contentTypeSchema>
 </file>
 
-<file path=customXml/item2.xml><?xml version="1.0" encoding="utf-8"?>
+<file path=customXml/item3.xml><?xml version="1.0" encoding="utf-8"?>
 <p:properties xmlns:p="http://schemas.microsoft.com/office/2006/metadata/properties" xmlns:xsi="http://www.w3.org/2001/XMLSchema-instance" xmlns:pc="http://schemas.microsoft.com/office/infopath/2007/PartnerControls">
   <documentManagement>
     <_dlc_DocId xmlns="7bb5d761-a2ea-4873-95f7-7a6658fb3ef0">M4CWTKMW727E-592-73</_dlc_DocId>
@@ -15007,7 +15195,7 @@
 </p:properties>
 </file>
 
-<file path=customXml/item3.xml><?xml version="1.0" encoding="utf-8"?>
+<file path=customXml/item4.xml><?xml version="1.0" encoding="utf-8"?>
 <?mso-contentType ?>
 <FormTemplates xmlns="http://schemas.microsoft.com/sharepoint/v3/contenttype/forms">
   <Display>DocumentLibraryForm</Display>
@@ -15016,53 +15204,15 @@
 </FormTemplates>
 </file>
 
-<file path=customXml/item4.xml><?xml version="1.0" encoding="utf-8"?>
-<?mso-contentType ?>
-<spe:Receivers xmlns:spe="http://schemas.microsoft.com/sharepoint/events">
-  <Receiver>
-    <Name>Document ID Generator</Name>
-    <Synchronization>Synchronous</Synchronization>
-    <Type>10001</Type>
-    <SequenceNumber>1000</SequenceNumber>
-    <Assembly>Microsoft.Office.DocumentManagement, Version=14.0.0.0, Culture=neutral, PublicKeyToken=71e9bce111e9429c</Assembly>
-    <Class>Microsoft.Office.DocumentManagement.Internal.DocIdHandler</Class>
-    <Data/>
-    <Filter/>
-  </Receiver>
-  <Receiver>
-    <Name>Document ID Generator</Name>
-    <Synchronization>Synchronous</Synchronization>
-    <Type>10002</Type>
-    <SequenceNumber>1001</SequenceNumber>
-    <Assembly>Microsoft.Office.DocumentManagement, Version=14.0.0.0, Culture=neutral, PublicKeyToken=71e9bce111e9429c</Assembly>
-    <Class>Microsoft.Office.DocumentManagement.Internal.DocIdHandler</Class>
-    <Data/>
-    <Filter/>
-  </Receiver>
-  <Receiver>
-    <Name>Document ID Generator</Name>
-    <Synchronization>Synchronous</Synchronization>
-    <Type>10004</Type>
-    <SequenceNumber>1002</SequenceNumber>
-    <Assembly>Microsoft.Office.DocumentManagement, Version=14.0.0.0, Culture=neutral, PublicKeyToken=71e9bce111e9429c</Assembly>
-    <Class>Microsoft.Office.DocumentManagement.Internal.DocIdHandler</Class>
-    <Data/>
-    <Filter/>
-  </Receiver>
-  <Receiver>
-    <Name>Document ID Generator</Name>
-    <Synchronization>Synchronous</Synchronization>
-    <Type>10006</Type>
-    <SequenceNumber>1003</SequenceNumber>
-    <Assembly>Microsoft.Office.DocumentManagement, Version=14.0.0.0, Culture=neutral, PublicKeyToken=71e9bce111e9429c</Assembly>
-    <Class>Microsoft.Office.DocumentManagement.Internal.DocIdHandler</Class>
-    <Data/>
-    <Filter/>
-  </Receiver>
-</spe:Receivers>
+<file path=customXml/itemProps1.xml><?xml version="1.0" encoding="utf-8"?>
+<ds:datastoreItem xmlns:ds="http://schemas.openxmlformats.org/officeDocument/2006/customXml" ds:itemID="{B13EBC30-FE27-4C6A-B723-23FC2188F7DC}">
+  <ds:schemaRefs>
+    <ds:schemaRef ds:uri="http://schemas.microsoft.com/sharepoint/events"/>
+  </ds:schemaRefs>
+</ds:datastoreItem>
 </file>
 
-<file path=customXml/itemProps1.xml><?xml version="1.0" encoding="utf-8"?>
+<file path=customXml/itemProps2.xml><?xml version="1.0" encoding="utf-8"?>
 <ds:datastoreItem xmlns:ds="http://schemas.openxmlformats.org/officeDocument/2006/customXml" ds:itemID="{164479E5-0B02-49AC-B79E-EC1D6164DDD3}">
   <ds:schemaRefs>
     <ds:schemaRef ds:uri="http://schemas.microsoft.com/office/2006/metadata/contentType"/>
@@ -15080,7 +15230,7 @@
 </ds:datastoreItem>
 </file>
 
-<file path=customXml/itemProps2.xml><?xml version="1.0" encoding="utf-8"?>
+<file path=customXml/itemProps3.xml><?xml version="1.0" encoding="utf-8"?>
 <ds:datastoreItem xmlns:ds="http://schemas.openxmlformats.org/officeDocument/2006/customXml" ds:itemID="{6921749B-AEB7-461B-845F-603CABD25259}">
   <ds:schemaRefs>
     <ds:schemaRef ds:uri="http://schemas.microsoft.com/office/2006/documentManagement/types"/>
@@ -15096,18 +15246,10 @@
 </ds:datastoreItem>
 </file>
 
-<file path=customXml/itemProps3.xml><?xml version="1.0" encoding="utf-8"?>
+<file path=customXml/itemProps4.xml><?xml version="1.0" encoding="utf-8"?>
 <ds:datastoreItem xmlns:ds="http://schemas.openxmlformats.org/officeDocument/2006/customXml" ds:itemID="{5CDEB364-43EC-4510-9881-539C2A3FCE9E}">
   <ds:schemaRefs>
     <ds:schemaRef ds:uri="http://schemas.microsoft.com/sharepoint/v3/contenttype/forms"/>
   </ds:schemaRefs>
 </ds:datastoreItem>
-</file>
-
-<file path=customXml/itemProps4.xml><?xml version="1.0" encoding="utf-8"?>
-<ds:datastoreItem xmlns:ds="http://schemas.openxmlformats.org/officeDocument/2006/customXml" ds:itemID="{B13EBC30-FE27-4C6A-B723-23FC2188F7DC}">
-  <ds:schemaRefs>
-    <ds:schemaRef ds:uri="http://schemas.microsoft.com/sharepoint/events"/>
-  </ds:schemaRefs>
-</ds:datastoreItem>
 </file>
</xml_diff>

<commit_message>
An updated empty Compliance dashboard screen shot
</commit_message>
<xml_diff>
--- a/02-Install.pptx
+++ b/02-Install.pptx
@@ -158,7 +158,7 @@
   </p:defaultTextStyle>
   <p:extLst>
     <p:ext uri="{EFAFB233-063F-42B5-8137-9DF3F51BA10A}">
-      <p15:sldGuideLst xmlns:p15="http://schemas.microsoft.com/office/powerpoint/2012/main">
+      <p15:sldGuideLst xmlns:p15="http://schemas.microsoft.com/office/powerpoint/2012/main" xmlns="">
         <p15:guide id="1" orient="horz" pos="894">
           <p15:clr>
             <a:srgbClr val="A4A3A4"/>
@@ -172,7 +172,7 @@
       </p15:sldGuideLst>
     </p:ext>
     <p:ext uri="{2D200454-40CA-4A62-9FC3-DE9A4176ACB9}">
-      <p15:notesGuideLst xmlns:p15="http://schemas.microsoft.com/office/powerpoint/2012/main"/>
+      <p15:notesGuideLst xmlns:p15="http://schemas.microsoft.com/office/powerpoint/2012/main" xmlns=""/>
     </p:ext>
   </p:extLst>
 </p:presentation>
@@ -289,7 +289,7 @@
               <a:pPr>
                 <a:defRPr/>
               </a:pPr>
-              <a:t>2016-01-14</a:t>
+              <a:t>1/19/16</a:t>
             </a:fld>
             <a:endParaRPr lang="en-US" dirty="0"/>
           </a:p>
@@ -472,7 +472,7 @@
               <a:pPr>
                 <a:defRPr/>
               </a:pPr>
-              <a:t>2016-01-14</a:t>
+              <a:t>1/19/16</a:t>
             </a:fld>
             <a:endParaRPr lang="en-US" dirty="0"/>
           </a:p>
@@ -1213,11 +1213,7 @@
           <a:p>
             <a:r>
               <a:rPr lang="en-US" dirty="0" smtClean="0"/>
-              <a:t>In </a:t>
-            </a:r>
-            <a:r>
-              <a:rPr lang="en-US" dirty="0" smtClean="0"/>
-              <a:t>the workplace you would want to use SSL for connections to your Compliance Web UI.</a:t>
+              <a:t>In the workplace you would want to use SSL for connections to your Compliance Web UI.</a:t>
             </a:r>
           </a:p>
           <a:p>
@@ -1404,11 +1400,7 @@
           <a:p>
             <a:r>
               <a:rPr lang="en-US" dirty="0" smtClean="0"/>
-              <a:t>Instructor </a:t>
-            </a:r>
-            <a:r>
-              <a:rPr lang="en-US" dirty="0" smtClean="0"/>
-              <a:t>Note: If you needed</a:t>
+              <a:t>Instructor Note: If you needed</a:t>
             </a:r>
             <a:r>
               <a:rPr lang="en-US" baseline="0" dirty="0" smtClean="0"/>
@@ -2772,11 +2764,7 @@
             </a:r>
             <a:r>
               <a:rPr lang="en-US" baseline="0" dirty="0" smtClean="0"/>
-              <a:t> </a:t>
-            </a:r>
-            <a:r>
-              <a:rPr lang="en-US" baseline="0" dirty="0" smtClean="0"/>
-              <a:t>.</a:t>
+              <a:t> .</a:t>
             </a:r>
           </a:p>
           <a:p>
@@ -2829,7 +2817,6 @@
               <a:rPr lang="en-US" baseline="0" dirty="0" smtClean="0"/>
               <a:t>.</a:t>
             </a:r>
-            <a:endParaRPr lang="en-US" baseline="0" dirty="0" smtClean="0"/>
           </a:p>
           <a:p>
             <a:pPr marL="0" marR="0" indent="0" algn="l" defTabSz="1217613" rtl="0" eaLnBrk="1" fontAlgn="base" latinLnBrk="0" hangingPunct="1">
@@ -3238,7 +3225,7 @@
   <p:clrMapOvr>
     <a:masterClrMapping/>
   </p:clrMapOvr>
-  <p:transition spd="med">
+  <p:transition xmlns:p14="http://schemas.microsoft.com/office/powerpoint/2010/main" spd="med">
     <p:fade/>
   </p:transition>
 </p:sldLayout>
@@ -3533,7 +3520,7 @@
   <p:clrMapOvr>
     <a:overrideClrMapping bg1="lt1" tx1="dk1" bg2="lt2" tx2="dk2" accent1="accent1" accent2="accent2" accent3="accent3" accent4="accent4" accent5="accent5" accent6="accent6" hlink="hlink" folHlink="folHlink"/>
   </p:clrMapOvr>
-  <p:transition spd="med">
+  <p:transition xmlns:p14="http://schemas.microsoft.com/office/powerpoint/2010/main" spd="med">
     <p:fade/>
   </p:transition>
 </p:sldLayout>
@@ -3666,14 +3653,14 @@
           </a:ln>
           <a:extLst>
             <a:ext uri="{909E8E84-426E-40dd-AFC4-6F175D3DCCD1}">
-              <a14:hiddenFill xmlns:a14="http://schemas.microsoft.com/office/drawing/2010/main" xmlns="">
+              <a14:hiddenFill xmlns:a14="http://schemas.microsoft.com/office/drawing/2010/main">
                 <a:solidFill>
                   <a:srgbClr val="FFFFFF"/>
                 </a:solidFill>
               </a14:hiddenFill>
             </a:ext>
             <a:ext uri="{91240B29-F687-4f45-9708-019B960494DF}">
-              <a14:hiddenLine xmlns:a14="http://schemas.microsoft.com/office/drawing/2010/main" xmlns="" w="9525">
+              <a14:hiddenLine xmlns:a14="http://schemas.microsoft.com/office/drawing/2010/main" w="9525">
                 <a:solidFill>
                   <a:srgbClr val="000000"/>
                 </a:solidFill>
@@ -3821,14 +3808,14 @@
           </a:ln>
           <a:extLst>
             <a:ext uri="{909E8E84-426E-40dd-AFC4-6F175D3DCCD1}">
-              <a14:hiddenFill xmlns:a14="http://schemas.microsoft.com/office/drawing/2010/main" xmlns="">
+              <a14:hiddenFill xmlns:a14="http://schemas.microsoft.com/office/drawing/2010/main">
                 <a:solidFill>
                   <a:srgbClr val="FFFFFF"/>
                 </a:solidFill>
               </a14:hiddenFill>
             </a:ext>
             <a:ext uri="{91240B29-F687-4f45-9708-019B960494DF}">
-              <a14:hiddenLine xmlns:a14="http://schemas.microsoft.com/office/drawing/2010/main" xmlns="" w="9525">
+              <a14:hiddenLine xmlns:a14="http://schemas.microsoft.com/office/drawing/2010/main" w="9525">
                 <a:solidFill>
                   <a:srgbClr val="000000"/>
                 </a:solidFill>
@@ -4226,7 +4213,7 @@
   <p:clrMapOvr>
     <a:overrideClrMapping bg1="lt1" tx1="dk1" bg2="lt2" tx2="dk2" accent1="accent1" accent2="accent2" accent3="accent3" accent4="accent4" accent5="accent5" accent6="accent6" hlink="hlink" folHlink="folHlink"/>
   </p:clrMapOvr>
-  <p:transition spd="med">
+  <p:transition xmlns:p14="http://schemas.microsoft.com/office/powerpoint/2010/main" spd="med">
     <p:fade/>
   </p:transition>
 </p:sldLayout>
@@ -4319,14 +4306,14 @@
           </a:ln>
           <a:extLst>
             <a:ext uri="{909E8E84-426E-40dd-AFC4-6F175D3DCCD1}">
-              <a14:hiddenFill xmlns:a14="http://schemas.microsoft.com/office/drawing/2010/main" xmlns="">
+              <a14:hiddenFill xmlns:a14="http://schemas.microsoft.com/office/drawing/2010/main">
                 <a:solidFill>
                   <a:srgbClr val="FFFFFF"/>
                 </a:solidFill>
               </a14:hiddenFill>
             </a:ext>
             <a:ext uri="{91240B29-F687-4f45-9708-019B960494DF}">
-              <a14:hiddenLine xmlns:a14="http://schemas.microsoft.com/office/drawing/2010/main" xmlns="" w="9525">
+              <a14:hiddenLine xmlns:a14="http://schemas.microsoft.com/office/drawing/2010/main" w="9525">
                 <a:solidFill>
                   <a:srgbClr val="000000"/>
                 </a:solidFill>
@@ -4348,7 +4335,7 @@
   <p:clrMapOvr>
     <a:masterClrMapping/>
   </p:clrMapOvr>
-  <p:transition spd="med">
+  <p:transition xmlns:p14="http://schemas.microsoft.com/office/powerpoint/2010/main" spd="med">
     <p:fade/>
   </p:transition>
 </p:sldLayout>
@@ -4635,7 +4622,7 @@
   <p:clrMapOvr>
     <a:masterClrMapping/>
   </p:clrMapOvr>
-  <p:transition spd="med">
+  <p:transition xmlns:p14="http://schemas.microsoft.com/office/powerpoint/2010/main" spd="med">
     <p:fade/>
   </p:transition>
 </p:sldLayout>
@@ -4922,7 +4909,7 @@
   <p:clrMapOvr>
     <a:masterClrMapping/>
   </p:clrMapOvr>
-  <p:transition spd="med">
+  <p:transition xmlns:p14="http://schemas.microsoft.com/office/powerpoint/2010/main" spd="med">
     <p:fade/>
   </p:transition>
 </p:sldLayout>
@@ -5209,7 +5196,7 @@
   <p:clrMapOvr>
     <a:masterClrMapping/>
   </p:clrMapOvr>
-  <p:transition spd="med">
+  <p:transition xmlns:p14="http://schemas.microsoft.com/office/powerpoint/2010/main" spd="med">
     <p:fade/>
   </p:transition>
 </p:sldLayout>
@@ -5558,7 +5545,7 @@
   <p:clrMapOvr>
     <a:masterClrMapping/>
   </p:clrMapOvr>
-  <p:transition spd="med">
+  <p:transition xmlns:p14="http://schemas.microsoft.com/office/powerpoint/2010/main" spd="med">
     <p:fade/>
   </p:transition>
 </p:sldLayout>
@@ -5845,7 +5832,7 @@
   <p:clrMapOvr>
     <a:masterClrMapping/>
   </p:clrMapOvr>
-  <p:transition spd="med">
+  <p:transition xmlns:p14="http://schemas.microsoft.com/office/powerpoint/2010/main" spd="med">
     <p:fade/>
   </p:transition>
 </p:sldLayout>
@@ -6062,14 +6049,14 @@
           </a:ln>
           <a:extLst>
             <a:ext uri="{909E8E84-426E-40dd-AFC4-6F175D3DCCD1}">
-              <a14:hiddenFill xmlns:a14="http://schemas.microsoft.com/office/drawing/2010/main" xmlns="">
+              <a14:hiddenFill xmlns:a14="http://schemas.microsoft.com/office/drawing/2010/main">
                 <a:solidFill>
                   <a:srgbClr val="FFFFFF"/>
                 </a:solidFill>
               </a14:hiddenFill>
             </a:ext>
             <a:ext uri="{91240B29-F687-4f45-9708-019B960494DF}">
-              <a14:hiddenLine xmlns:a14="http://schemas.microsoft.com/office/drawing/2010/main" xmlns="" w="9525">
+              <a14:hiddenLine xmlns:a14="http://schemas.microsoft.com/office/drawing/2010/main" w="9525">
                 <a:solidFill>
                   <a:srgbClr val="000000"/>
                 </a:solidFill>
@@ -6266,7 +6253,7 @@
   <p:clrMapOvr>
     <a:masterClrMapping/>
   </p:clrMapOvr>
-  <p:transition spd="med">
+  <p:transition xmlns:p14="http://schemas.microsoft.com/office/powerpoint/2010/main" spd="med">
     <p:fade/>
   </p:transition>
 </p:sldLayout>
@@ -6554,7 +6541,7 @@
   <p:clrMapOvr>
     <a:masterClrMapping/>
   </p:clrMapOvr>
-  <p:transition spd="med">
+  <p:transition xmlns:p14="http://schemas.microsoft.com/office/powerpoint/2010/main" spd="med">
     <p:fade/>
   </p:transition>
 </p:sldLayout>
@@ -6731,7 +6718,7 @@
   <p:clrMapOvr>
     <a:masterClrMapping/>
   </p:clrMapOvr>
-  <p:transition spd="med">
+  <p:transition xmlns:p14="http://schemas.microsoft.com/office/powerpoint/2010/main" spd="med">
     <p:fade/>
   </p:transition>
 </p:sldLayout>
@@ -7043,7 +7030,7 @@
   <p:clrMapOvr>
     <a:masterClrMapping/>
   </p:clrMapOvr>
-  <p:transition spd="med">
+  <p:transition xmlns:p14="http://schemas.microsoft.com/office/powerpoint/2010/main" spd="med">
     <p:fade/>
   </p:transition>
 </p:sldLayout>
@@ -7347,7 +7334,7 @@
   <p:clrMapOvr>
     <a:masterClrMapping/>
   </p:clrMapOvr>
-  <p:transition spd="med">
+  <p:transition xmlns:p14="http://schemas.microsoft.com/office/powerpoint/2010/main" spd="med">
     <p:fade/>
   </p:transition>
 </p:sldLayout>
@@ -7423,14 +7410,14 @@
           </a:ln>
           <a:extLst>
             <a:ext uri="{909E8E84-426E-40dd-AFC4-6F175D3DCCD1}">
-              <a14:hiddenFill xmlns:a14="http://schemas.microsoft.com/office/drawing/2010/main" xmlns="">
+              <a14:hiddenFill xmlns:a14="http://schemas.microsoft.com/office/drawing/2010/main">
                 <a:solidFill>
                   <a:srgbClr val="FFFFFF"/>
                 </a:solidFill>
               </a14:hiddenFill>
             </a:ext>
             <a:ext uri="{91240B29-F687-4f45-9708-019B960494DF}">
-              <a14:hiddenLine xmlns:a14="http://schemas.microsoft.com/office/drawing/2010/main" xmlns="" w="9525">
+              <a14:hiddenLine xmlns:a14="http://schemas.microsoft.com/office/drawing/2010/main" w="9525">
                 <a:solidFill>
                   <a:srgbClr val="000000"/>
                 </a:solidFill>
@@ -7706,7 +7693,7 @@
   <p:clrMapOvr>
     <a:overrideClrMapping bg1="lt1" tx1="dk1" bg2="lt2" tx2="dk2" accent1="accent1" accent2="accent2" accent3="accent3" accent4="accent4" accent5="accent5" accent6="accent6" hlink="hlink" folHlink="folHlink"/>
   </p:clrMapOvr>
-  <p:transition spd="med">
+  <p:transition xmlns:p14="http://schemas.microsoft.com/office/powerpoint/2010/main" spd="med">
     <p:fade/>
   </p:transition>
 </p:sldLayout>
@@ -7912,7 +7899,7 @@
   <p:clrMapOvr>
     <a:overrideClrMapping bg1="lt1" tx1="dk1" bg2="lt2" tx2="dk2" accent1="accent1" accent2="accent2" accent3="accent3" accent4="accent4" accent5="accent5" accent6="accent6" hlink="hlink" folHlink="folHlink"/>
   </p:clrMapOvr>
-  <p:transition spd="med">
+  <p:transition xmlns:p14="http://schemas.microsoft.com/office/powerpoint/2010/main" spd="med">
     <p:fade/>
   </p:transition>
 </p:sldLayout>
@@ -7988,14 +7975,14 @@
           </a:ln>
           <a:extLst>
             <a:ext uri="{909E8E84-426E-40dd-AFC4-6F175D3DCCD1}">
-              <a14:hiddenFill xmlns:a14="http://schemas.microsoft.com/office/drawing/2010/main" xmlns="">
+              <a14:hiddenFill xmlns:a14="http://schemas.microsoft.com/office/drawing/2010/main">
                 <a:solidFill>
                   <a:srgbClr val="FFFFFF"/>
                 </a:solidFill>
               </a14:hiddenFill>
             </a:ext>
             <a:ext uri="{91240B29-F687-4f45-9708-019B960494DF}">
-              <a14:hiddenLine xmlns:a14="http://schemas.microsoft.com/office/drawing/2010/main" xmlns="" w="9525">
+              <a14:hiddenLine xmlns:a14="http://schemas.microsoft.com/office/drawing/2010/main" w="9525">
                 <a:solidFill>
                   <a:srgbClr val="000000"/>
                 </a:solidFill>
@@ -8278,7 +8265,7 @@
   <p:clrMapOvr>
     <a:overrideClrMapping bg1="lt1" tx1="dk1" bg2="lt2" tx2="dk2" accent1="accent1" accent2="accent2" accent3="accent3" accent4="accent4" accent5="accent5" accent6="accent6" hlink="hlink" folHlink="folHlink"/>
   </p:clrMapOvr>
-  <p:transition spd="med">
+  <p:transition xmlns:p14="http://schemas.microsoft.com/office/powerpoint/2010/main" spd="med">
     <p:fade/>
   </p:transition>
 </p:sldLayout>
@@ -8486,7 +8473,7 @@
   <p:clrMapOvr>
     <a:overrideClrMapping bg1="lt1" tx1="dk1" bg2="lt2" tx2="dk2" accent1="accent1" accent2="accent2" accent3="accent3" accent4="accent4" accent5="accent5" accent6="accent6" hlink="hlink" folHlink="folHlink"/>
   </p:clrMapOvr>
-  <p:transition spd="med">
+  <p:transition xmlns:p14="http://schemas.microsoft.com/office/powerpoint/2010/main" spd="med">
     <p:fade/>
   </p:transition>
 </p:sldLayout>
@@ -8562,14 +8549,14 @@
           </a:ln>
           <a:extLst>
             <a:ext uri="{909E8E84-426E-40dd-AFC4-6F175D3DCCD1}">
-              <a14:hiddenFill xmlns:a14="http://schemas.microsoft.com/office/drawing/2010/main" xmlns="">
+              <a14:hiddenFill xmlns:a14="http://schemas.microsoft.com/office/drawing/2010/main">
                 <a:solidFill>
                   <a:srgbClr val="FFFFFF"/>
                 </a:solidFill>
               </a14:hiddenFill>
             </a:ext>
             <a:ext uri="{91240B29-F687-4f45-9708-019B960494DF}">
-              <a14:hiddenLine xmlns:a14="http://schemas.microsoft.com/office/drawing/2010/main" xmlns="" w="9525">
+              <a14:hiddenLine xmlns:a14="http://schemas.microsoft.com/office/drawing/2010/main" w="9525">
                 <a:solidFill>
                   <a:srgbClr val="000000"/>
                 </a:solidFill>
@@ -8837,7 +8824,7 @@
   <p:clrMapOvr>
     <a:overrideClrMapping bg1="lt1" tx1="dk1" bg2="lt2" tx2="dk2" accent1="accent1" accent2="accent2" accent3="accent3" accent4="accent4" accent5="accent5" accent6="accent6" hlink="hlink" folHlink="folHlink"/>
   </p:clrMapOvr>
-  <p:transition spd="med">
+  <p:transition xmlns:p14="http://schemas.microsoft.com/office/powerpoint/2010/main" spd="med">
     <p:fade/>
   </p:transition>
 </p:sldLayout>
@@ -9065,7 +9052,7 @@
   <p:clrMapOvr>
     <a:overrideClrMapping bg1="lt1" tx1="dk1" bg2="lt2" tx2="dk2" accent1="accent1" accent2="accent2" accent3="accent3" accent4="accent4" accent5="accent5" accent6="accent6" hlink="hlink" folHlink="folHlink"/>
   </p:clrMapOvr>
-  <p:transition spd="med">
+  <p:transition xmlns:p14="http://schemas.microsoft.com/office/powerpoint/2010/main" spd="med">
     <p:fade/>
   </p:transition>
 </p:sldLayout>
@@ -9353,7 +9340,7 @@
   <p:clrMapOvr>
     <a:overrideClrMapping bg1="lt1" tx1="dk1" bg2="lt2" tx2="dk2" accent1="accent1" accent2="accent2" accent3="accent3" accent4="accent4" accent5="accent5" accent6="accent6" hlink="hlink" folHlink="folHlink"/>
   </p:clrMapOvr>
-  <p:transition spd="med">
+  <p:transition xmlns:p14="http://schemas.microsoft.com/office/powerpoint/2010/main" spd="med">
     <p:fade/>
   </p:transition>
 </p:sldLayout>
@@ -9509,14 +9496,14 @@
           </a:ln>
           <a:extLst>
             <a:ext uri="{909E8E84-426E-40dd-AFC4-6F175D3DCCD1}">
-              <a14:hiddenFill xmlns:a14="http://schemas.microsoft.com/office/drawing/2010/main" xmlns="">
+              <a14:hiddenFill xmlns:a14="http://schemas.microsoft.com/office/drawing/2010/main">
                 <a:solidFill>
                   <a:srgbClr val="FFFFFF"/>
                 </a:solidFill>
               </a14:hiddenFill>
             </a:ext>
             <a:ext uri="{91240B29-F687-4f45-9708-019B960494DF}">
-              <a14:hiddenLine xmlns:a14="http://schemas.microsoft.com/office/drawing/2010/main" xmlns="" w="9525">
+              <a14:hiddenLine xmlns:a14="http://schemas.microsoft.com/office/drawing/2010/main" w="9525">
                 <a:solidFill>
                   <a:srgbClr val="000000"/>
                 </a:solidFill>
@@ -9734,13 +9721,13 @@
     <p:sldLayoutId id="2147483843" r:id="rId12"/>
     <p:sldLayoutId id="2147483867" r:id="rId13"/>
   </p:sldLayoutIdLst>
-  <p:transition spd="med">
+  <p:transition xmlns:p14="http://schemas.microsoft.com/office/powerpoint/2010/main" spd="med">
     <p:fade/>
   </p:transition>
   <p:timing>
     <p:tnLst>
       <p:par>
-        <p:cTn id="1" dur="indefinite" restart="never" nodeType="tmRoot"/>
+        <p:cTn xmlns:p14="http://schemas.microsoft.com/office/powerpoint/2010/main" id="1" dur="indefinite" restart="never" nodeType="tmRoot"/>
       </p:par>
     </p:tnLst>
   </p:timing>
@@ -10268,14 +10255,14 @@
           </a:ln>
           <a:extLst>
             <a:ext uri="{909E8E84-426E-40dd-AFC4-6F175D3DCCD1}">
-              <a14:hiddenFill xmlns:a14="http://schemas.microsoft.com/office/drawing/2010/main" xmlns="">
+              <a14:hiddenFill xmlns:a14="http://schemas.microsoft.com/office/drawing/2010/main">
                 <a:solidFill>
                   <a:srgbClr val="FFFFFF"/>
                 </a:solidFill>
               </a14:hiddenFill>
             </a:ext>
             <a:ext uri="{91240B29-F687-4f45-9708-019B960494DF}">
-              <a14:hiddenLine xmlns:a14="http://schemas.microsoft.com/office/drawing/2010/main" xmlns="" w="9525">
+              <a14:hiddenLine xmlns:a14="http://schemas.microsoft.com/office/drawing/2010/main" w="9525">
                 <a:solidFill>
                   <a:srgbClr val="000000"/>
                 </a:solidFill>
@@ -10563,13 +10550,13 @@
     <p:sldLayoutId id="2147483856" r:id="rId7"/>
     <p:sldLayoutId id="2147483866" r:id="rId8"/>
   </p:sldLayoutIdLst>
-  <p:transition spd="med">
+  <p:transition xmlns:p14="http://schemas.microsoft.com/office/powerpoint/2010/main" spd="med">
     <p:fade/>
   </p:transition>
   <p:timing>
     <p:tnLst>
       <p:par>
-        <p:cTn id="1" dur="indefinite" restart="never" nodeType="tmRoot"/>
+        <p:cTn xmlns:p14="http://schemas.microsoft.com/office/powerpoint/2010/main" id="1" dur="indefinite" restart="never" nodeType="tmRoot"/>
       </p:par>
     </p:tnLst>
   </p:timing>
@@ -11072,13 +11059,13 @@
   <p:clrMapOvr>
     <a:masterClrMapping/>
   </p:clrMapOvr>
-  <p:transition spd="med">
+  <p:transition xmlns:p14="http://schemas.microsoft.com/office/powerpoint/2010/main" spd="med">
     <p:fade/>
   </p:transition>
   <p:timing>
     <p:tnLst>
       <p:par>
-        <p:cTn id="1" dur="indefinite" restart="never" nodeType="tmRoot"/>
+        <p:cTn xmlns:p14="http://schemas.microsoft.com/office/powerpoint/2010/main" id="1" dur="indefinite" restart="never" nodeType="tmRoot"/>
       </p:par>
     </p:tnLst>
   </p:timing>
@@ -11224,7 +11211,7 @@
   <p:clrMapOvr>
     <a:masterClrMapping/>
   </p:clrMapOvr>
-  <p:transition spd="med">
+  <p:transition xmlns:p14="http://schemas.microsoft.com/office/powerpoint/2010/main" spd="med">
     <p:fade/>
   </p:transition>
 </p:sld>
@@ -11339,7 +11326,6 @@
               <a:rPr lang="en-US" dirty="0" smtClean="0"/>
               <a:t>ec2-52-92-32-225.compute-2.amazonaws.com or simply the IP address.</a:t>
             </a:r>
-            <a:endParaRPr lang="en-US" dirty="0" smtClean="0"/>
           </a:p>
           <a:p>
             <a:pPr marL="457200" indent="-457200">
@@ -11384,13 +11370,13 @@
   <p:clrMapOvr>
     <a:masterClrMapping/>
   </p:clrMapOvr>
-  <p:transition spd="med">
+  <p:transition xmlns:p14="http://schemas.microsoft.com/office/powerpoint/2010/main" spd="med">
     <p:fade/>
   </p:transition>
   <p:timing>
     <p:tnLst>
       <p:par>
-        <p:cTn id="1" dur="indefinite" restart="never" nodeType="tmRoot"/>
+        <p:cTn xmlns:p14="http://schemas.microsoft.com/office/powerpoint/2010/main" id="1" dur="indefinite" restart="never" nodeType="tmRoot"/>
       </p:par>
     </p:tnLst>
   </p:timing>
@@ -11508,13 +11494,13 @@
   <p:clrMapOvr>
     <a:masterClrMapping/>
   </p:clrMapOvr>
-  <p:transition spd="med">
+  <p:transition xmlns:p14="http://schemas.microsoft.com/office/powerpoint/2010/main" spd="med">
     <p:fade/>
   </p:transition>
   <p:timing>
     <p:tnLst>
       <p:par>
-        <p:cTn id="1" dur="indefinite" restart="never" nodeType="tmRoot"/>
+        <p:cTn xmlns:p14="http://schemas.microsoft.com/office/powerpoint/2010/main" id="1" dur="indefinite" restart="never" nodeType="tmRoot"/>
       </p:par>
     </p:tnLst>
   </p:timing>
@@ -11589,74 +11575,36 @@
           </a:p>
         </p:txBody>
       </p:sp>
-      <p:grpSp>
-        <p:nvGrpSpPr>
-          <p:cNvPr id="8" name="Group 7"/>
-          <p:cNvGrpSpPr/>
+      <p:pic>
+        <p:nvPicPr>
+          <p:cNvPr id="9" name="Picture 8" descr="Chef_Compliance_Dashboard.png"/>
+          <p:cNvPicPr>
+            <a:picLocks noChangeAspect="1"/>
+          </p:cNvPicPr>
           <p:nvPr/>
-        </p:nvGrpSpPr>
-        <p:grpSpPr>
+        </p:nvPicPr>
+        <p:blipFill>
+          <a:blip r:embed="rId3">
+            <a:extLst>
+              <a:ext uri="{28A0092B-C50C-407E-A947-70E740481C1C}">
+                <a14:useLocalDpi xmlns:a14="http://schemas.microsoft.com/office/drawing/2010/main" val="0"/>
+              </a:ext>
+            </a:extLst>
+          </a:blip>
+          <a:stretch>
+            <a:fillRect/>
+          </a:stretch>
+        </p:blipFill>
+        <p:spPr>
           <a:xfrm>
-            <a:off x="1055688" y="2606040"/>
-            <a:ext cx="14144625" cy="5486400"/>
-            <a:chOff x="1055688" y="2606040"/>
-            <a:chExt cx="14144625" cy="5486400"/>
+            <a:off x="568186" y="2313651"/>
+            <a:ext cx="15003045" cy="5589706"/>
           </a:xfrm>
-        </p:grpSpPr>
-        <p:pic>
-          <p:nvPicPr>
-            <p:cNvPr id="4" name="Picture 3"/>
-            <p:cNvPicPr>
-              <a:picLocks noChangeAspect="1"/>
-            </p:cNvPicPr>
-            <p:nvPr/>
-          </p:nvPicPr>
-          <p:blipFill>
-            <a:blip r:embed="rId3"/>
-            <a:stretch>
-              <a:fillRect/>
-            </a:stretch>
-          </p:blipFill>
-          <p:spPr>
-            <a:xfrm>
-              <a:off x="1055688" y="2606040"/>
-              <a:ext cx="14144625" cy="5486400"/>
-            </a:xfrm>
-            <a:prstGeom prst="rect">
-              <a:avLst/>
-            </a:prstGeom>
-            <a:ln>
-              <a:solidFill>
-                <a:schemeClr val="accent1"/>
-              </a:solidFill>
-            </a:ln>
-          </p:spPr>
-        </p:pic>
-        <p:pic>
-          <p:nvPicPr>
-            <p:cNvPr id="7" name="Picture 6"/>
-            <p:cNvPicPr>
-              <a:picLocks noChangeAspect="1"/>
-            </p:cNvPicPr>
-            <p:nvPr/>
-          </p:nvPicPr>
-          <p:blipFill>
-            <a:blip r:embed="rId4"/>
-            <a:stretch>
-              <a:fillRect/>
-            </a:stretch>
-          </p:blipFill>
-          <p:spPr>
-            <a:xfrm>
-              <a:off x="9509760" y="4846319"/>
-              <a:ext cx="5378133" cy="502921"/>
-            </a:xfrm>
-            <a:prstGeom prst="rect">
-              <a:avLst/>
-            </a:prstGeom>
-          </p:spPr>
-        </p:pic>
-      </p:grpSp>
+          <a:prstGeom prst="rect">
+            <a:avLst/>
+          </a:prstGeom>
+        </p:spPr>
+      </p:pic>
     </p:spTree>
     <p:extLst>
       <p:ext uri="{BB962C8B-B14F-4D97-AF65-F5344CB8AC3E}">
@@ -11667,13 +11615,13 @@
   <p:clrMapOvr>
     <a:masterClrMapping/>
   </p:clrMapOvr>
-  <p:transition spd="med">
+  <p:transition xmlns:p14="http://schemas.microsoft.com/office/powerpoint/2010/main" spd="med">
     <p:fade/>
   </p:transition>
   <p:timing>
     <p:tnLst>
       <p:par>
-        <p:cTn id="1" dur="indefinite" restart="never" nodeType="tmRoot"/>
+        <p:cTn xmlns:p14="http://schemas.microsoft.com/office/powerpoint/2010/main" id="1" dur="indefinite" restart="never" nodeType="tmRoot"/>
       </p:par>
     </p:tnLst>
   </p:timing>
@@ -11858,7 +11806,7 @@
   <p:clrMapOvr>
     <a:masterClrMapping/>
   </p:clrMapOvr>
-  <p:transition spd="med">
+  <p:transition xmlns:p14="http://schemas.microsoft.com/office/powerpoint/2010/main" spd="med">
     <p:fade/>
   </p:transition>
 </p:sld>
@@ -12038,7 +11986,7 @@
   <p:clrMapOvr>
     <a:masterClrMapping/>
   </p:clrMapOvr>
-  <p:transition spd="med">
+  <p:transition xmlns:p14="http://schemas.microsoft.com/office/powerpoint/2010/main" spd="med">
     <p:fade/>
   </p:transition>
 </p:sld>
@@ -12232,7 +12180,7 @@
   <p:clrMapOvr>
     <a:masterClrMapping/>
   </p:clrMapOvr>
-  <p:transition spd="med">
+  <p:transition xmlns:p14="http://schemas.microsoft.com/office/powerpoint/2010/main" spd="med">
     <p:fade/>
   </p:transition>
 </p:sld>
@@ -12359,13 +12307,13 @@
   <p:clrMapOvr>
     <a:masterClrMapping/>
   </p:clrMapOvr>
-  <p:transition spd="med">
+  <p:transition xmlns:p14="http://schemas.microsoft.com/office/powerpoint/2010/main" spd="med">
     <p:fade/>
   </p:transition>
   <p:timing>
     <p:tnLst>
       <p:par>
-        <p:cTn id="1" dur="indefinite" restart="never" nodeType="tmRoot"/>
+        <p:cTn xmlns:p14="http://schemas.microsoft.com/office/powerpoint/2010/main" id="1" dur="indefinite" restart="never" nodeType="tmRoot"/>
       </p:par>
     </p:tnLst>
   </p:timing>
@@ -12499,7 +12447,7 @@
   <p:clrMapOvr>
     <a:masterClrMapping/>
   </p:clrMapOvr>
-  <p:transition spd="med">
+  <p:transition xmlns:p14="http://schemas.microsoft.com/office/powerpoint/2010/main" spd="med">
     <p:fade/>
   </p:transition>
 </p:sld>
@@ -12688,7 +12636,7 @@
   <p:clrMapOvr>
     <a:masterClrMapping/>
   </p:clrMapOvr>
-  <p:transition spd="med">
+  <p:transition xmlns:p14="http://schemas.microsoft.com/office/powerpoint/2010/main" spd="med">
     <p:fade/>
   </p:transition>
 </p:sld>
@@ -12812,13 +12760,13 @@
   <p:clrMapOvr>
     <a:masterClrMapping/>
   </p:clrMapOvr>
-  <p:transition spd="med">
+  <p:transition xmlns:p14="http://schemas.microsoft.com/office/powerpoint/2010/main" spd="med">
     <p:fade/>
   </p:transition>
   <p:timing>
     <p:tnLst>
       <p:par>
-        <p:cTn id="1" dur="indefinite" restart="never" nodeType="tmRoot"/>
+        <p:cTn xmlns:p14="http://schemas.microsoft.com/office/powerpoint/2010/main" id="1" dur="indefinite" restart="never" nodeType="tmRoot"/>
       </p:par>
     </p:tnLst>
   </p:timing>
@@ -12971,13 +12919,13 @@
   <p:clrMapOvr>
     <a:masterClrMapping/>
   </p:clrMapOvr>
-  <p:transition spd="med">
+  <p:transition xmlns:p14="http://schemas.microsoft.com/office/powerpoint/2010/main" spd="med">
     <p:fade/>
   </p:transition>
   <p:timing>
     <p:tnLst>
       <p:par>
-        <p:cTn id="1" dur="indefinite" restart="never" nodeType="tmRoot"/>
+        <p:cTn xmlns:p14="http://schemas.microsoft.com/office/powerpoint/2010/main" id="1" dur="indefinite" restart="never" nodeType="tmRoot"/>
       </p:par>
     </p:tnLst>
   </p:timing>
@@ -13129,13 +13077,13 @@
   <p:clrMapOvr>
     <a:masterClrMapping/>
   </p:clrMapOvr>
-  <p:transition spd="med">
+  <p:transition xmlns:p14="http://schemas.microsoft.com/office/powerpoint/2010/main" spd="med">
     <p:fade/>
   </p:transition>
   <p:timing>
     <p:tnLst>
       <p:par>
-        <p:cTn id="1" dur="indefinite" restart="never" nodeType="tmRoot"/>
+        <p:cTn xmlns:p14="http://schemas.microsoft.com/office/powerpoint/2010/main" id="1" dur="indefinite" restart="never" nodeType="tmRoot"/>
       </p:par>
     </p:tnLst>
   </p:timing>
@@ -13443,7 +13391,7 @@
   <p:clrMapOvr>
     <a:masterClrMapping/>
   </p:clrMapOvr>
-  <p:transition spd="med">
+  <p:transition xmlns:p14="http://schemas.microsoft.com/office/powerpoint/2010/main" spd="med">
     <p:fade/>
   </p:transition>
 </p:sld>
@@ -13656,7 +13604,7 @@
   <p:clrMapOvr>
     <a:masterClrMapping/>
   </p:clrMapOvr>
-  <p:transition spd="med">
+  <p:transition xmlns:p14="http://schemas.microsoft.com/office/powerpoint/2010/main" spd="med">
     <p:fade/>
   </p:transition>
 </p:sld>
@@ -14038,7 +13986,7 @@
   <a:extraClrSchemeLst/>
   <a:extLst>
     <a:ext uri="{05A4C25C-085E-4340-85A3-A5531E510DB2}">
-      <thm15:themeFamily xmlns:thm15="http://schemas.microsoft.com/office/thememl/2012/main" name="Chef-TemplateComps_v09-16x9-Light.potx" id="{078CEFDB-FA7A-4E36-9964-13EF367585CB}" vid="{8B87B0F3-7308-43D5-8388-E1B49EA02652}"/>
+      <thm15:themeFamily xmlns:thm15="http://schemas.microsoft.com/office/thememl/2012/main" xmlns="" name="Chef-TemplateComps_v09-16x9-Light.potx" id="{078CEFDB-FA7A-4E36-9964-13EF367585CB}" vid="{8B87B0F3-7308-43D5-8388-E1B49EA02652}"/>
     </a:ext>
   </a:extLst>
 </a:theme>
@@ -14420,7 +14368,7 @@
   <a:extraClrSchemeLst/>
   <a:extLst>
     <a:ext uri="{05A4C25C-085E-4340-85A3-A5531E510DB2}">
-      <thm15:themeFamily xmlns:thm15="http://schemas.microsoft.com/office/thememl/2012/main" name="Chef-TemplateComps_v09-16x9-Light.potx" id="{078CEFDB-FA7A-4E36-9964-13EF367585CB}" vid="{8B87B0F3-7308-43D5-8388-E1B49EA02652}"/>
+      <thm15:themeFamily xmlns:thm15="http://schemas.microsoft.com/office/thememl/2012/main" xmlns="" name="Chef-TemplateComps_v09-16x9-Light.potx" id="{078CEFDB-FA7A-4E36-9964-13EF367585CB}" vid="{8B87B0F3-7308-43D5-8388-E1B49EA02652}"/>
     </a:ext>
   </a:extLst>
 </a:theme>

</xml_diff>

<commit_message>
committing minor updates so beta instructor has latest edits
</commit_message>
<xml_diff>
--- a/02-Install.pptx
+++ b/02-Install.pptx
@@ -289,7 +289,7 @@
               <a:pPr>
                 <a:defRPr/>
               </a:pPr>
-              <a:t>2016-01-21</a:t>
+              <a:t>2016-01-26</a:t>
             </a:fld>
             <a:endParaRPr lang="en-US" dirty="0"/>
           </a:p>
@@ -472,7 +472,7 @@
               <a:pPr>
                 <a:defRPr/>
               </a:pPr>
-              <a:t>2016-01-21</a:t>
+              <a:t>2016-01-26</a:t>
             </a:fld>
             <a:endParaRPr lang="en-US" dirty="0"/>
           </a:p>
@@ -3653,14 +3653,14 @@
           </a:ln>
           <a:extLst>
             <a:ext uri="{909E8E84-426E-40dd-AFC4-6F175D3DCCD1}">
-              <a14:hiddenFill xmlns:a14="http://schemas.microsoft.com/office/drawing/2010/main" xmlns="">
+              <a14:hiddenFill xmlns="" xmlns:a14="http://schemas.microsoft.com/office/drawing/2010/main">
                 <a:solidFill>
                   <a:srgbClr val="FFFFFF"/>
                 </a:solidFill>
               </a14:hiddenFill>
             </a:ext>
             <a:ext uri="{91240B29-F687-4f45-9708-019B960494DF}">
-              <a14:hiddenLine xmlns:a14="http://schemas.microsoft.com/office/drawing/2010/main" xmlns="" w="9525">
+              <a14:hiddenLine xmlns="" xmlns:a14="http://schemas.microsoft.com/office/drawing/2010/main" w="9525">
                 <a:solidFill>
                   <a:srgbClr val="000000"/>
                 </a:solidFill>
@@ -3808,14 +3808,14 @@
           </a:ln>
           <a:extLst>
             <a:ext uri="{909E8E84-426E-40dd-AFC4-6F175D3DCCD1}">
-              <a14:hiddenFill xmlns:a14="http://schemas.microsoft.com/office/drawing/2010/main" xmlns="">
+              <a14:hiddenFill xmlns="" xmlns:a14="http://schemas.microsoft.com/office/drawing/2010/main">
                 <a:solidFill>
                   <a:srgbClr val="FFFFFF"/>
                 </a:solidFill>
               </a14:hiddenFill>
             </a:ext>
             <a:ext uri="{91240B29-F687-4f45-9708-019B960494DF}">
-              <a14:hiddenLine xmlns:a14="http://schemas.microsoft.com/office/drawing/2010/main" xmlns="" w="9525">
+              <a14:hiddenLine xmlns="" xmlns:a14="http://schemas.microsoft.com/office/drawing/2010/main" w="9525">
                 <a:solidFill>
                   <a:srgbClr val="000000"/>
                 </a:solidFill>
@@ -4306,14 +4306,14 @@
           </a:ln>
           <a:extLst>
             <a:ext uri="{909E8E84-426E-40dd-AFC4-6F175D3DCCD1}">
-              <a14:hiddenFill xmlns:a14="http://schemas.microsoft.com/office/drawing/2010/main" xmlns="">
+              <a14:hiddenFill xmlns="" xmlns:a14="http://schemas.microsoft.com/office/drawing/2010/main">
                 <a:solidFill>
                   <a:srgbClr val="FFFFFF"/>
                 </a:solidFill>
               </a14:hiddenFill>
             </a:ext>
             <a:ext uri="{91240B29-F687-4f45-9708-019B960494DF}">
-              <a14:hiddenLine xmlns:a14="http://schemas.microsoft.com/office/drawing/2010/main" xmlns="" w="9525">
+              <a14:hiddenLine xmlns="" xmlns:a14="http://schemas.microsoft.com/office/drawing/2010/main" w="9525">
                 <a:solidFill>
                   <a:srgbClr val="000000"/>
                 </a:solidFill>
@@ -6049,14 +6049,14 @@
           </a:ln>
           <a:extLst>
             <a:ext uri="{909E8E84-426E-40dd-AFC4-6F175D3DCCD1}">
-              <a14:hiddenFill xmlns:a14="http://schemas.microsoft.com/office/drawing/2010/main" xmlns="">
+              <a14:hiddenFill xmlns="" xmlns:a14="http://schemas.microsoft.com/office/drawing/2010/main">
                 <a:solidFill>
                   <a:srgbClr val="FFFFFF"/>
                 </a:solidFill>
               </a14:hiddenFill>
             </a:ext>
             <a:ext uri="{91240B29-F687-4f45-9708-019B960494DF}">
-              <a14:hiddenLine xmlns:a14="http://schemas.microsoft.com/office/drawing/2010/main" xmlns="" w="9525">
+              <a14:hiddenLine xmlns="" xmlns:a14="http://schemas.microsoft.com/office/drawing/2010/main" w="9525">
                 <a:solidFill>
                   <a:srgbClr val="000000"/>
                 </a:solidFill>
@@ -7410,14 +7410,14 @@
           </a:ln>
           <a:extLst>
             <a:ext uri="{909E8E84-426E-40dd-AFC4-6F175D3DCCD1}">
-              <a14:hiddenFill xmlns:a14="http://schemas.microsoft.com/office/drawing/2010/main" xmlns="">
+              <a14:hiddenFill xmlns="" xmlns:a14="http://schemas.microsoft.com/office/drawing/2010/main">
                 <a:solidFill>
                   <a:srgbClr val="FFFFFF"/>
                 </a:solidFill>
               </a14:hiddenFill>
             </a:ext>
             <a:ext uri="{91240B29-F687-4f45-9708-019B960494DF}">
-              <a14:hiddenLine xmlns:a14="http://schemas.microsoft.com/office/drawing/2010/main" xmlns="" w="9525">
+              <a14:hiddenLine xmlns="" xmlns:a14="http://schemas.microsoft.com/office/drawing/2010/main" w="9525">
                 <a:solidFill>
                   <a:srgbClr val="000000"/>
                 </a:solidFill>
@@ -7975,14 +7975,14 @@
           </a:ln>
           <a:extLst>
             <a:ext uri="{909E8E84-426E-40dd-AFC4-6F175D3DCCD1}">
-              <a14:hiddenFill xmlns:a14="http://schemas.microsoft.com/office/drawing/2010/main" xmlns="">
+              <a14:hiddenFill xmlns="" xmlns:a14="http://schemas.microsoft.com/office/drawing/2010/main">
                 <a:solidFill>
                   <a:srgbClr val="FFFFFF"/>
                 </a:solidFill>
               </a14:hiddenFill>
             </a:ext>
             <a:ext uri="{91240B29-F687-4f45-9708-019B960494DF}">
-              <a14:hiddenLine xmlns:a14="http://schemas.microsoft.com/office/drawing/2010/main" xmlns="" w="9525">
+              <a14:hiddenLine xmlns="" xmlns:a14="http://schemas.microsoft.com/office/drawing/2010/main" w="9525">
                 <a:solidFill>
                   <a:srgbClr val="000000"/>
                 </a:solidFill>
@@ -8549,14 +8549,14 @@
           </a:ln>
           <a:extLst>
             <a:ext uri="{909E8E84-426E-40dd-AFC4-6F175D3DCCD1}">
-              <a14:hiddenFill xmlns:a14="http://schemas.microsoft.com/office/drawing/2010/main" xmlns="">
+              <a14:hiddenFill xmlns="" xmlns:a14="http://schemas.microsoft.com/office/drawing/2010/main">
                 <a:solidFill>
                   <a:srgbClr val="FFFFFF"/>
                 </a:solidFill>
               </a14:hiddenFill>
             </a:ext>
             <a:ext uri="{91240B29-F687-4f45-9708-019B960494DF}">
-              <a14:hiddenLine xmlns:a14="http://schemas.microsoft.com/office/drawing/2010/main" xmlns="" w="9525">
+              <a14:hiddenLine xmlns="" xmlns:a14="http://schemas.microsoft.com/office/drawing/2010/main" w="9525">
                 <a:solidFill>
                   <a:srgbClr val="000000"/>
                 </a:solidFill>
@@ -9496,14 +9496,14 @@
           </a:ln>
           <a:extLst>
             <a:ext uri="{909E8E84-426E-40dd-AFC4-6F175D3DCCD1}">
-              <a14:hiddenFill xmlns:a14="http://schemas.microsoft.com/office/drawing/2010/main" xmlns="">
+              <a14:hiddenFill xmlns="" xmlns:a14="http://schemas.microsoft.com/office/drawing/2010/main">
                 <a:solidFill>
                   <a:srgbClr val="FFFFFF"/>
                 </a:solidFill>
               </a14:hiddenFill>
             </a:ext>
             <a:ext uri="{91240B29-F687-4f45-9708-019B960494DF}">
-              <a14:hiddenLine xmlns:a14="http://schemas.microsoft.com/office/drawing/2010/main" xmlns="" w="9525">
+              <a14:hiddenLine xmlns="" xmlns:a14="http://schemas.microsoft.com/office/drawing/2010/main" w="9525">
                 <a:solidFill>
                   <a:srgbClr val="000000"/>
                 </a:solidFill>
@@ -10255,14 +10255,14 @@
           </a:ln>
           <a:extLst>
             <a:ext uri="{909E8E84-426E-40dd-AFC4-6F175D3DCCD1}">
-              <a14:hiddenFill xmlns:a14="http://schemas.microsoft.com/office/drawing/2010/main" xmlns="">
+              <a14:hiddenFill xmlns="" xmlns:a14="http://schemas.microsoft.com/office/drawing/2010/main">
                 <a:solidFill>
                   <a:srgbClr val="FFFFFF"/>
                 </a:solidFill>
               </a14:hiddenFill>
             </a:ext>
             <a:ext uri="{91240B29-F687-4f45-9708-019B960494DF}">
-              <a14:hiddenLine xmlns:a14="http://schemas.microsoft.com/office/drawing/2010/main" xmlns="" w="9525">
+              <a14:hiddenLine xmlns="" xmlns:a14="http://schemas.microsoft.com/office/drawing/2010/main" w="9525">
                 <a:solidFill>
                   <a:srgbClr val="000000"/>
                 </a:solidFill>
@@ -11195,11 +11195,7 @@
           <a:p>
             <a:r>
               <a:rPr lang="en-US" dirty="0" smtClean="0"/>
-              <a:t>GL: </a:t>
-            </a:r>
-            <a:r>
-              <a:rPr lang="en-US" dirty="0" smtClean="0"/>
-              <a:t>Create Administrator Credentials</a:t>
+              <a:t>GL: Create Administrator Credentials</a:t>
             </a:r>
             <a:endParaRPr lang="en-US" dirty="0"/>
           </a:p>
@@ -11255,11 +11251,7 @@
           <a:p>
             <a:r>
               <a:rPr lang="en-US" dirty="0" smtClean="0"/>
-              <a:t>GL: </a:t>
-            </a:r>
-            <a:r>
-              <a:rPr lang="en-US" dirty="0" smtClean="0"/>
-              <a:t>Connect to your Compliance Web UI</a:t>
+              <a:t>GL: Connect to your Compliance Web UI</a:t>
             </a:r>
             <a:endParaRPr lang="en-US" dirty="0"/>
           </a:p>
@@ -11425,11 +11417,7 @@
           <a:p>
             <a:r>
               <a:rPr lang="en-US" dirty="0" smtClean="0"/>
-              <a:t>GL: </a:t>
-            </a:r>
-            <a:r>
-              <a:rPr lang="en-US" dirty="0" smtClean="0"/>
-              <a:t>Log into your Compliance Web UI</a:t>
+              <a:t>GL: Log into your Compliance Web UI</a:t>
             </a:r>
             <a:endParaRPr lang="en-US" dirty="0"/>
           </a:p>
@@ -11553,11 +11541,7 @@
           <a:p>
             <a:r>
               <a:rPr lang="en-US" dirty="0" smtClean="0"/>
-              <a:t>GL: </a:t>
-            </a:r>
-            <a:r>
-              <a:rPr lang="en-US" dirty="0" smtClean="0"/>
-              <a:t>Test your Compliance Web UI</a:t>
+              <a:t>GL: Test your Compliance Web UI</a:t>
             </a:r>
             <a:endParaRPr lang="en-US" dirty="0"/>
           </a:p>
@@ -11619,6 +11603,11 @@
           <a:prstGeom prst="rect">
             <a:avLst/>
           </a:prstGeom>
+          <a:ln>
+            <a:solidFill>
+              <a:schemeClr val="accent1"/>
+            </a:solidFill>
+          </a:ln>
         </p:spPr>
       </p:pic>
     </p:spTree>
@@ -12510,15 +12499,7 @@
           <a:p>
             <a:r>
               <a:rPr lang="en-US" dirty="0" smtClean="0"/>
-              <a:t>Group </a:t>
-            </a:r>
-            <a:r>
-              <a:rPr lang="en-US" dirty="0" smtClean="0"/>
-              <a:t>Lab</a:t>
-            </a:r>
-            <a:r>
-              <a:rPr lang="en-US" dirty="0" smtClean="0"/>
-              <a:t/>
+              <a:t>Group Lab</a:t>
             </a:r>
             <a:br>
               <a:rPr lang="en-US" dirty="0" smtClean="0"/>
@@ -12700,11 +12681,7 @@
           <a:p>
             <a:r>
               <a:rPr lang="en-US" dirty="0" smtClean="0"/>
-              <a:t>GL: </a:t>
-            </a:r>
-            <a:r>
-              <a:rPr lang="en-US" dirty="0" smtClean="0"/>
-              <a:t>Standalone Installation</a:t>
+              <a:t>GL: Standalone Installation</a:t>
             </a:r>
             <a:endParaRPr lang="en-US" dirty="0"/>
           </a:p>
@@ -12835,11 +12812,7 @@
           <a:p>
             <a:r>
               <a:rPr lang="en-US" dirty="0" smtClean="0"/>
-              <a:t>GL: </a:t>
-            </a:r>
-            <a:r>
-              <a:rPr lang="en-US" dirty="0" smtClean="0"/>
-              <a:t>Standalone Installation</a:t>
+              <a:t>GL: Standalone Installation</a:t>
             </a:r>
             <a:endParaRPr lang="en-US" dirty="0"/>
           </a:p>
@@ -12998,11 +12971,7 @@
           <a:p>
             <a:r>
               <a:rPr lang="en-US" dirty="0" smtClean="0"/>
-              <a:t>GL: </a:t>
-            </a:r>
-            <a:r>
-              <a:rPr lang="en-US" dirty="0" smtClean="0"/>
-              <a:t>Standalone Installation</a:t>
+              <a:t>GL: Standalone Installation</a:t>
             </a:r>
             <a:endParaRPr lang="en-US" dirty="0"/>
           </a:p>
@@ -13407,11 +13376,7 @@
           <a:p>
             <a:r>
               <a:rPr lang="en-US" dirty="0" smtClean="0"/>
-              <a:t>GL: </a:t>
-            </a:r>
-            <a:r>
-              <a:rPr lang="en-US" dirty="0" smtClean="0"/>
-              <a:t>Install and Install Compliance Package</a:t>
+              <a:t>GL: Install and Install Compliance Package</a:t>
             </a:r>
             <a:endParaRPr lang="en-US" dirty="0"/>
           </a:p>
@@ -13624,11 +13589,7 @@
           <a:p>
             <a:r>
               <a:rPr lang="en-US" dirty="0" smtClean="0"/>
-              <a:t>GL: </a:t>
-            </a:r>
-            <a:r>
-              <a:rPr lang="en-US" dirty="0" smtClean="0"/>
-              <a:t>Initial Configuration of Compliance</a:t>
+              <a:t>GL: Initial Configuration of Compliance</a:t>
             </a:r>
             <a:endParaRPr lang="en-US" dirty="0"/>
           </a:p>
@@ -14981,6 +14942,52 @@
 </file>
 
 <file path=customXml/item1.xml><?xml version="1.0" encoding="utf-8"?>
+<?mso-contentType ?>
+<spe:Receivers xmlns:spe="http://schemas.microsoft.com/sharepoint/events">
+  <Receiver>
+    <Name>Document ID Generator</Name>
+    <Synchronization>Synchronous</Synchronization>
+    <Type>10001</Type>
+    <SequenceNumber>1000</SequenceNumber>
+    <Assembly>Microsoft.Office.DocumentManagement, Version=14.0.0.0, Culture=neutral, PublicKeyToken=71e9bce111e9429c</Assembly>
+    <Class>Microsoft.Office.DocumentManagement.Internal.DocIdHandler</Class>
+    <Data/>
+    <Filter/>
+  </Receiver>
+  <Receiver>
+    <Name>Document ID Generator</Name>
+    <Synchronization>Synchronous</Synchronization>
+    <Type>10002</Type>
+    <SequenceNumber>1001</SequenceNumber>
+    <Assembly>Microsoft.Office.DocumentManagement, Version=14.0.0.0, Culture=neutral, PublicKeyToken=71e9bce111e9429c</Assembly>
+    <Class>Microsoft.Office.DocumentManagement.Internal.DocIdHandler</Class>
+    <Data/>
+    <Filter/>
+  </Receiver>
+  <Receiver>
+    <Name>Document ID Generator</Name>
+    <Synchronization>Synchronous</Synchronization>
+    <Type>10004</Type>
+    <SequenceNumber>1002</SequenceNumber>
+    <Assembly>Microsoft.Office.DocumentManagement, Version=14.0.0.0, Culture=neutral, PublicKeyToken=71e9bce111e9429c</Assembly>
+    <Class>Microsoft.Office.DocumentManagement.Internal.DocIdHandler</Class>
+    <Data/>
+    <Filter/>
+  </Receiver>
+  <Receiver>
+    <Name>Document ID Generator</Name>
+    <Synchronization>Synchronous</Synchronization>
+    <Type>10006</Type>
+    <SequenceNumber>1003</SequenceNumber>
+    <Assembly>Microsoft.Office.DocumentManagement, Version=14.0.0.0, Culture=neutral, PublicKeyToken=71e9bce111e9429c</Assembly>
+    <Class>Microsoft.Office.DocumentManagement.Internal.DocIdHandler</Class>
+    <Data/>
+    <Filter/>
+  </Receiver>
+</spe:Receivers>
+</file>
+
+<file path=customXml/item2.xml><?xml version="1.0" encoding="utf-8"?>
 <ct:contentTypeSchema xmlns:ct="http://schemas.microsoft.com/office/2006/metadata/contentType" xmlns:ma="http://schemas.microsoft.com/office/2006/metadata/properties/metaAttributes" ct:_="" ma:_="" ma:contentTypeName="Document" ma:contentTypeID="0x0101000812F700BE7F874999720E88173FE491" ma:contentTypeVersion="0" ma:contentTypeDescription="Create a new document." ma:contentTypeScope="" ma:versionID="3f79f408e2ca720b7aba6e0e32464d0c">
   <xsd:schema xmlns:xsd="http://www.w3.org/2001/XMLSchema" xmlns:xs="http://www.w3.org/2001/XMLSchema" xmlns:p="http://schemas.microsoft.com/office/2006/metadata/properties" xmlns:ns2="7bb5d761-a2ea-4873-95f7-7a6658fb3ef0" targetNamespace="http://schemas.microsoft.com/office/2006/metadata/properties" ma:root="true" ma:fieldsID="1e062cd38ba31e406bfc4340fbc7f87a" ns2:_="">
     <xsd:import namespace="7bb5d761-a2ea-4873-95f7-7a6658fb3ef0"/>
@@ -15125,62 +15132,7 @@
 </ct:contentTypeSchema>
 </file>
 
-<file path=customXml/item2.xml><?xml version="1.0" encoding="utf-8"?>
-<?mso-contentType ?>
-<spe:Receivers xmlns:spe="http://schemas.microsoft.com/sharepoint/events">
-  <Receiver>
-    <Name>Document ID Generator</Name>
-    <Synchronization>Synchronous</Synchronization>
-    <Type>10001</Type>
-    <SequenceNumber>1000</SequenceNumber>
-    <Assembly>Microsoft.Office.DocumentManagement, Version=14.0.0.0, Culture=neutral, PublicKeyToken=71e9bce111e9429c</Assembly>
-    <Class>Microsoft.Office.DocumentManagement.Internal.DocIdHandler</Class>
-    <Data/>
-    <Filter/>
-  </Receiver>
-  <Receiver>
-    <Name>Document ID Generator</Name>
-    <Synchronization>Synchronous</Synchronization>
-    <Type>10002</Type>
-    <SequenceNumber>1001</SequenceNumber>
-    <Assembly>Microsoft.Office.DocumentManagement, Version=14.0.0.0, Culture=neutral, PublicKeyToken=71e9bce111e9429c</Assembly>
-    <Class>Microsoft.Office.DocumentManagement.Internal.DocIdHandler</Class>
-    <Data/>
-    <Filter/>
-  </Receiver>
-  <Receiver>
-    <Name>Document ID Generator</Name>
-    <Synchronization>Synchronous</Synchronization>
-    <Type>10004</Type>
-    <SequenceNumber>1002</SequenceNumber>
-    <Assembly>Microsoft.Office.DocumentManagement, Version=14.0.0.0, Culture=neutral, PublicKeyToken=71e9bce111e9429c</Assembly>
-    <Class>Microsoft.Office.DocumentManagement.Internal.DocIdHandler</Class>
-    <Data/>
-    <Filter/>
-  </Receiver>
-  <Receiver>
-    <Name>Document ID Generator</Name>
-    <Synchronization>Synchronous</Synchronization>
-    <Type>10006</Type>
-    <SequenceNumber>1003</SequenceNumber>
-    <Assembly>Microsoft.Office.DocumentManagement, Version=14.0.0.0, Culture=neutral, PublicKeyToken=71e9bce111e9429c</Assembly>
-    <Class>Microsoft.Office.DocumentManagement.Internal.DocIdHandler</Class>
-    <Data/>
-    <Filter/>
-  </Receiver>
-</spe:Receivers>
-</file>
-
 <file path=customXml/item3.xml><?xml version="1.0" encoding="utf-8"?>
-<?mso-contentType ?>
-<FormTemplates xmlns="http://schemas.microsoft.com/sharepoint/v3/contenttype/forms">
-  <Display>DocumentLibraryForm</Display>
-  <Edit>DocumentLibraryForm</Edit>
-  <New>DocumentLibraryForm</New>
-</FormTemplates>
-</file>
-
-<file path=customXml/item4.xml><?xml version="1.0" encoding="utf-8"?>
 <p:properties xmlns:p="http://schemas.microsoft.com/office/2006/metadata/properties" xmlns:xsi="http://www.w3.org/2001/XMLSchema-instance" xmlns:pc="http://schemas.microsoft.com/office/infopath/2007/PartnerControls">
   <documentManagement>
     <_dlc_DocId xmlns="7bb5d761-a2ea-4873-95f7-7a6658fb3ef0">M4CWTKMW727E-592-73</_dlc_DocId>
@@ -15192,7 +15144,24 @@
 </p:properties>
 </file>
 
+<file path=customXml/item4.xml><?xml version="1.0" encoding="utf-8"?>
+<?mso-contentType ?>
+<FormTemplates xmlns="http://schemas.microsoft.com/sharepoint/v3/contenttype/forms">
+  <Display>DocumentLibraryForm</Display>
+  <Edit>DocumentLibraryForm</Edit>
+  <New>DocumentLibraryForm</New>
+</FormTemplates>
+</file>
+
 <file path=customXml/itemProps1.xml><?xml version="1.0" encoding="utf-8"?>
+<ds:datastoreItem xmlns:ds="http://schemas.openxmlformats.org/officeDocument/2006/customXml" ds:itemID="{B13EBC30-FE27-4C6A-B723-23FC2188F7DC}">
+  <ds:schemaRefs>
+    <ds:schemaRef ds:uri="http://schemas.microsoft.com/sharepoint/events"/>
+  </ds:schemaRefs>
+</ds:datastoreItem>
+</file>
+
+<file path=customXml/itemProps2.xml><?xml version="1.0" encoding="utf-8"?>
 <ds:datastoreItem xmlns:ds="http://schemas.openxmlformats.org/officeDocument/2006/customXml" ds:itemID="{164479E5-0B02-49AC-B79E-EC1D6164DDD3}">
   <ds:schemaRefs>
     <ds:schemaRef ds:uri="http://schemas.microsoft.com/office/2006/metadata/contentType"/>
@@ -15210,23 +15179,7 @@
 </ds:datastoreItem>
 </file>
 
-<file path=customXml/itemProps2.xml><?xml version="1.0" encoding="utf-8"?>
-<ds:datastoreItem xmlns:ds="http://schemas.openxmlformats.org/officeDocument/2006/customXml" ds:itemID="{B13EBC30-FE27-4C6A-B723-23FC2188F7DC}">
-  <ds:schemaRefs>
-    <ds:schemaRef ds:uri="http://schemas.microsoft.com/sharepoint/events"/>
-  </ds:schemaRefs>
-</ds:datastoreItem>
-</file>
-
 <file path=customXml/itemProps3.xml><?xml version="1.0" encoding="utf-8"?>
-<ds:datastoreItem xmlns:ds="http://schemas.openxmlformats.org/officeDocument/2006/customXml" ds:itemID="{5CDEB364-43EC-4510-9881-539C2A3FCE9E}">
-  <ds:schemaRefs>
-    <ds:schemaRef ds:uri="http://schemas.microsoft.com/sharepoint/v3/contenttype/forms"/>
-  </ds:schemaRefs>
-</ds:datastoreItem>
-</file>
-
-<file path=customXml/itemProps4.xml><?xml version="1.0" encoding="utf-8"?>
 <ds:datastoreItem xmlns:ds="http://schemas.openxmlformats.org/officeDocument/2006/customXml" ds:itemID="{6921749B-AEB7-461B-845F-603CABD25259}">
   <ds:schemaRefs>
     <ds:schemaRef ds:uri="http://schemas.microsoft.com/office/2006/documentManagement/types"/>
@@ -15240,4 +15193,12 @@
     <ds:schemaRef ds:uri="http://purl.org/dc/dcmitype/"/>
   </ds:schemaRefs>
 </ds:datastoreItem>
+</file>
+
+<file path=customXml/itemProps4.xml><?xml version="1.0" encoding="utf-8"?>
+<ds:datastoreItem xmlns:ds="http://schemas.openxmlformats.org/officeDocument/2006/customXml" ds:itemID="{5CDEB364-43EC-4510-9881-539C2A3FCE9E}">
+  <ds:schemaRefs>
+    <ds:schemaRef ds:uri="http://schemas.microsoft.com/sharepoint/v3/contenttype/forms"/>
+  </ds:schemaRefs>
+</ds:datastoreItem>
 </file>
</xml_diff>

<commit_message>
redid the Configure the Compliance Server slides from s2-10 to the end.
</commit_message>
<xml_diff>
--- a/02-Install.pptx
+++ b/02-Install.pptx
@@ -6,10 +6,10 @@
     <p:sldMasterId id="2147483847" r:id="rId6"/>
   </p:sldMasterIdLst>
   <p:notesMasterIdLst>
-    <p:notesMasterId r:id="rId23"/>
+    <p:notesMasterId r:id="rId26"/>
   </p:notesMasterIdLst>
   <p:handoutMasterIdLst>
-    <p:handoutMasterId r:id="rId24"/>
+    <p:handoutMasterId r:id="rId27"/>
   </p:handoutMasterIdLst>
   <p:sldIdLst>
     <p:sldId id="256" r:id="rId7"/>
@@ -21,13 +21,16 @@
     <p:sldId id="286" r:id="rId13"/>
     <p:sldId id="278" r:id="rId14"/>
     <p:sldId id="279" r:id="rId15"/>
-    <p:sldId id="281" r:id="rId16"/>
-    <p:sldId id="288" r:id="rId17"/>
+    <p:sldId id="288" r:id="rId16"/>
+    <p:sldId id="291" r:id="rId17"/>
     <p:sldId id="280" r:id="rId18"/>
-    <p:sldId id="289" r:id="rId19"/>
-    <p:sldId id="290" r:id="rId20"/>
-    <p:sldId id="276" r:id="rId21"/>
-    <p:sldId id="267" r:id="rId22"/>
+    <p:sldId id="292" r:id="rId19"/>
+    <p:sldId id="293" r:id="rId20"/>
+    <p:sldId id="294" r:id="rId21"/>
+    <p:sldId id="289" r:id="rId22"/>
+    <p:sldId id="290" r:id="rId23"/>
+    <p:sldId id="276" r:id="rId24"/>
+    <p:sldId id="267" r:id="rId25"/>
   </p:sldIdLst>
   <p:sldSz cx="16256000" cy="9144000"/>
   <p:notesSz cx="6858000" cy="9144000"/>
@@ -289,7 +292,7 @@
               <a:pPr>
                 <a:defRPr/>
               </a:pPr>
-              <a:t>2016-01-27</a:t>
+              <a:t>2016-01-28</a:t>
             </a:fld>
             <a:endParaRPr lang="en-US" dirty="0"/>
           </a:p>
@@ -472,7 +475,7 @@
               <a:pPr>
                 <a:defRPr/>
               </a:pPr>
-              <a:t>2016-01-27</a:t>
+              <a:t>2016-01-28</a:t>
             </a:fld>
             <a:endParaRPr lang="en-US" dirty="0"/>
           </a:p>
@@ -1213,57 +1216,12 @@
           <a:p>
             <a:r>
               <a:rPr lang="en-US" dirty="0" smtClean="0"/>
-              <a:t>In the workplace you would want to use SSL for connections to your Compliance Web UI.</a:t>
-            </a:r>
-          </a:p>
-          <a:p>
-            <a:endParaRPr lang="en-US" dirty="0" smtClean="0"/>
-          </a:p>
-          <a:p>
-            <a:endParaRPr lang="en-US" dirty="0" smtClean="0"/>
-          </a:p>
-          <a:p>
-            <a:pPr marL="0" marR="0" indent="0" algn="l" defTabSz="1217613" rtl="0" eaLnBrk="1" fontAlgn="base" latinLnBrk="0" hangingPunct="1">
-              <a:lnSpc>
-                <a:spcPct val="90000"/>
-              </a:lnSpc>
-              <a:spcBef>
-                <a:spcPct val="30000"/>
-              </a:spcBef>
-              <a:spcAft>
-                <a:spcPts val="450"/>
-              </a:spcAft>
-              <a:buClrTx/>
-              <a:buSzTx/>
-              <a:buFontTx/>
-              <a:buNone/>
-              <a:tabLst/>
-              <a:defRPr/>
-            </a:pPr>
-            <a:r>
-              <a:rPr lang="en-US" dirty="0" smtClean="0"/>
-              <a:t>https://docs.chef.io/install_compliance.html &gt; </a:t>
-            </a:r>
-            <a:r>
-              <a:rPr lang="en-US" sz="1200" b="0" i="0" kern="1200" dirty="0" smtClean="0">
-                <a:solidFill>
-                  <a:schemeClr val="tx1"/>
-                </a:solidFill>
-                <a:effectLst/>
-                <a:latin typeface="Arial" panose="020B0604020202020204" pitchFamily="34" charset="0"/>
-                <a:ea typeface="ＭＳ Ｐゴシック" charset="0"/>
-                <a:cs typeface="Arial" panose="020B0604020202020204" pitchFamily="34" charset="0"/>
-              </a:rPr>
-              <a:t>Configure SSL</a:t>
-            </a:r>
-          </a:p>
-          <a:p>
-            <a:endParaRPr lang="en-US" dirty="0" smtClean="0"/>
-          </a:p>
-          <a:p>
-            <a:endParaRPr lang="en-US" dirty="0" smtClean="0"/>
-          </a:p>
-          <a:p>
+              <a:t>In</a:t>
+            </a:r>
+            <a:r>
+              <a:rPr lang="en-US" baseline="0" dirty="0" smtClean="0"/>
+              <a:t> the workplace you should of course create a more secure password.</a:t>
+            </a:r>
             <a:endParaRPr lang="en-US" dirty="0"/>
           </a:p>
         </p:txBody>
@@ -1344,7 +1302,7 @@
     </p:spTree>
     <p:extLst>
       <p:ext uri="{BB962C8B-B14F-4D97-AF65-F5344CB8AC3E}">
-        <p14:creationId xmlns:p14="http://schemas.microsoft.com/office/powerpoint/2010/main" val="1812303767"/>
+        <p14:creationId xmlns:p14="http://schemas.microsoft.com/office/powerpoint/2010/main" val="2225630033"/>
       </p:ext>
     </p:extLst>
   </p:cSld>
@@ -1398,63 +1356,6 @@
           <a:bodyPr/>
           <a:lstStyle/>
           <a:p>
-            <a:r>
-              <a:rPr lang="en-US" dirty="0" smtClean="0"/>
-              <a:t>Instructor Note: If you needed</a:t>
-            </a:r>
-            <a:r>
-              <a:rPr lang="en-US" baseline="0" dirty="0" smtClean="0"/>
-              <a:t> to downgrade Compliance to a previous version, the `--</a:t>
-            </a:r>
-            <a:r>
-              <a:rPr lang="en-US" baseline="0" dirty="0" err="1" smtClean="0"/>
-              <a:t>oldpackage</a:t>
-            </a:r>
-            <a:r>
-              <a:rPr lang="en-US" baseline="0" dirty="0" smtClean="0"/>
-              <a:t>' option will do that for you. In the following example, the `</a:t>
-            </a:r>
-            <a:r>
-              <a:rPr lang="en-US" dirty="0" smtClean="0"/>
-              <a:t>https://package...` would be the</a:t>
-            </a:r>
-            <a:r>
-              <a:rPr lang="en-US" baseline="0" dirty="0" smtClean="0"/>
-              <a:t> version of the old package that you want to downgrade to:</a:t>
-            </a:r>
-          </a:p>
-          <a:p>
-            <a:endParaRPr lang="en-US" baseline="0" dirty="0" smtClean="0"/>
-          </a:p>
-          <a:p>
-            <a:r>
-              <a:rPr lang="en-US" dirty="0" smtClean="0"/>
-              <a:t> sudo rpm -</a:t>
-            </a:r>
-            <a:r>
-              <a:rPr lang="en-US" dirty="0" err="1" smtClean="0"/>
-              <a:t>Uvh</a:t>
-            </a:r>
-            <a:r>
-              <a:rPr lang="en-US" dirty="0" smtClean="0"/>
-              <a:t> </a:t>
-            </a:r>
-            <a:r>
-              <a:rPr lang="en-US" b="1" dirty="0" smtClean="0"/>
-              <a:t>--</a:t>
-            </a:r>
-            <a:r>
-              <a:rPr lang="en-US" b="1" dirty="0" err="1" smtClean="0"/>
-              <a:t>oldpackage</a:t>
-            </a:r>
-            <a:r>
-              <a:rPr lang="en-US" b="1" dirty="0" smtClean="0"/>
-              <a:t> </a:t>
-            </a:r>
-            <a:r>
-              <a:rPr lang="en-US" dirty="0" smtClean="0"/>
-              <a:t>https://packagecloud.io/chef/stable/packages/el/6/chef-compliance-0.9.6-1.el6.x86_64.rpm/download</a:t>
-            </a:r>
             <a:endParaRPr lang="en-US" dirty="0"/>
           </a:p>
         </p:txBody>
@@ -1483,6 +1384,518 @@
                 <a:defRPr/>
               </a:pPr>
               <a:t>14</a:t>
+            </a:fld>
+            <a:endParaRPr lang="en-US" dirty="0"/>
+          </a:p>
+        </p:txBody>
+      </p:sp>
+      <p:sp>
+        <p:nvSpPr>
+          <p:cNvPr id="5" name="Header Placeholder 4"/>
+          <p:cNvSpPr>
+            <a:spLocks noGrp="1"/>
+          </p:cNvSpPr>
+          <p:nvPr>
+            <p:ph type="hdr" sz="quarter" idx="11"/>
+          </p:nvPr>
+        </p:nvSpPr>
+        <p:spPr/>
+        <p:txBody>
+          <a:bodyPr/>
+          <a:lstStyle/>
+          <a:p>
+            <a:pPr>
+              <a:defRPr/>
+            </a:pPr>
+            <a:endParaRPr lang="en-US"/>
+          </a:p>
+        </p:txBody>
+      </p:sp>
+      <p:sp>
+        <p:nvSpPr>
+          <p:cNvPr id="6" name="Footer Placeholder 5"/>
+          <p:cNvSpPr>
+            <a:spLocks noGrp="1"/>
+          </p:cNvSpPr>
+          <p:nvPr>
+            <p:ph type="ftr" sz="quarter" idx="12"/>
+          </p:nvPr>
+        </p:nvSpPr>
+        <p:spPr/>
+        <p:txBody>
+          <a:bodyPr/>
+          <a:lstStyle/>
+          <a:p>
+            <a:pPr>
+              <a:defRPr/>
+            </a:pPr>
+            <a:endParaRPr lang="en-US"/>
+          </a:p>
+        </p:txBody>
+      </p:sp>
+    </p:spTree>
+    <p:extLst>
+      <p:ext uri="{BB962C8B-B14F-4D97-AF65-F5344CB8AC3E}">
+        <p14:creationId xmlns:p14="http://schemas.microsoft.com/office/powerpoint/2010/main" val="1105980774"/>
+      </p:ext>
+    </p:extLst>
+  </p:cSld>
+  <p:clrMapOvr>
+    <a:masterClrMapping/>
+  </p:clrMapOvr>
+</p:notes>
+</file>
+
+<file path=ppt/notesSlides/notesSlide13.xml><?xml version="1.0" encoding="utf-8"?>
+<p:notes xmlns:a="http://schemas.openxmlformats.org/drawingml/2006/main" xmlns:r="http://schemas.openxmlformats.org/officeDocument/2006/relationships" xmlns:p="http://schemas.openxmlformats.org/presentationml/2006/main">
+  <p:cSld>
+    <p:spTree>
+      <p:nvGrpSpPr>
+        <p:cNvPr id="1" name=""/>
+        <p:cNvGrpSpPr/>
+        <p:nvPr/>
+      </p:nvGrpSpPr>
+      <p:grpSpPr>
+        <a:xfrm>
+          <a:off x="0" y="0"/>
+          <a:ext cx="0" cy="0"/>
+          <a:chOff x="0" y="0"/>
+          <a:chExt cx="0" cy="0"/>
+        </a:xfrm>
+      </p:grpSpPr>
+      <p:sp>
+        <p:nvSpPr>
+          <p:cNvPr id="2" name="Slide Image Placeholder 1"/>
+          <p:cNvSpPr>
+            <a:spLocks noGrp="1" noRot="1" noChangeAspect="1"/>
+          </p:cNvSpPr>
+          <p:nvPr>
+            <p:ph type="sldImg"/>
+          </p:nvPr>
+        </p:nvSpPr>
+        <p:spPr/>
+      </p:sp>
+      <p:sp>
+        <p:nvSpPr>
+          <p:cNvPr id="3" name="Notes Placeholder 2"/>
+          <p:cNvSpPr>
+            <a:spLocks noGrp="1"/>
+          </p:cNvSpPr>
+          <p:nvPr>
+            <p:ph type="body" idx="1"/>
+          </p:nvPr>
+        </p:nvSpPr>
+        <p:spPr/>
+        <p:txBody>
+          <a:bodyPr/>
+          <a:lstStyle/>
+          <a:p>
+            <a:endParaRPr lang="en-US" dirty="0"/>
+          </a:p>
+        </p:txBody>
+      </p:sp>
+      <p:sp>
+        <p:nvSpPr>
+          <p:cNvPr id="4" name="Slide Number Placeholder 3"/>
+          <p:cNvSpPr>
+            <a:spLocks noGrp="1"/>
+          </p:cNvSpPr>
+          <p:nvPr>
+            <p:ph type="sldNum" sz="quarter" idx="10"/>
+          </p:nvPr>
+        </p:nvSpPr>
+        <p:spPr/>
+        <p:txBody>
+          <a:bodyPr/>
+          <a:lstStyle/>
+          <a:p>
+            <a:pPr>
+              <a:defRPr/>
+            </a:pPr>
+            <a:fld id="{DC3734AA-3150-D947-AC52-2F5DF48BFCD5}" type="slidenum">
+              <a:rPr lang="en-US" smtClean="0"/>
+              <a:pPr>
+                <a:defRPr/>
+              </a:pPr>
+              <a:t>15</a:t>
+            </a:fld>
+            <a:endParaRPr lang="en-US" dirty="0"/>
+          </a:p>
+        </p:txBody>
+      </p:sp>
+      <p:sp>
+        <p:nvSpPr>
+          <p:cNvPr id="5" name="Header Placeholder 4"/>
+          <p:cNvSpPr>
+            <a:spLocks noGrp="1"/>
+          </p:cNvSpPr>
+          <p:nvPr>
+            <p:ph type="hdr" sz="quarter" idx="11"/>
+          </p:nvPr>
+        </p:nvSpPr>
+        <p:spPr/>
+        <p:txBody>
+          <a:bodyPr/>
+          <a:lstStyle/>
+          <a:p>
+            <a:pPr>
+              <a:defRPr/>
+            </a:pPr>
+            <a:endParaRPr lang="en-US"/>
+          </a:p>
+        </p:txBody>
+      </p:sp>
+      <p:sp>
+        <p:nvSpPr>
+          <p:cNvPr id="6" name="Footer Placeholder 5"/>
+          <p:cNvSpPr>
+            <a:spLocks noGrp="1"/>
+          </p:cNvSpPr>
+          <p:nvPr>
+            <p:ph type="ftr" sz="quarter" idx="12"/>
+          </p:nvPr>
+        </p:nvSpPr>
+        <p:spPr/>
+        <p:txBody>
+          <a:bodyPr/>
+          <a:lstStyle/>
+          <a:p>
+            <a:pPr>
+              <a:defRPr/>
+            </a:pPr>
+            <a:endParaRPr lang="en-US"/>
+          </a:p>
+        </p:txBody>
+      </p:sp>
+    </p:spTree>
+    <p:extLst>
+      <p:ext uri="{BB962C8B-B14F-4D97-AF65-F5344CB8AC3E}">
+        <p14:creationId xmlns:p14="http://schemas.microsoft.com/office/powerpoint/2010/main" val="3591492319"/>
+      </p:ext>
+    </p:extLst>
+  </p:cSld>
+  <p:clrMapOvr>
+    <a:masterClrMapping/>
+  </p:clrMapOvr>
+</p:notes>
+</file>
+
+<file path=ppt/notesSlides/notesSlide14.xml><?xml version="1.0" encoding="utf-8"?>
+<p:notes xmlns:a="http://schemas.openxmlformats.org/drawingml/2006/main" xmlns:r="http://schemas.openxmlformats.org/officeDocument/2006/relationships" xmlns:p="http://schemas.openxmlformats.org/presentationml/2006/main">
+  <p:cSld>
+    <p:spTree>
+      <p:nvGrpSpPr>
+        <p:cNvPr id="1" name=""/>
+        <p:cNvGrpSpPr/>
+        <p:nvPr/>
+      </p:nvGrpSpPr>
+      <p:grpSpPr>
+        <a:xfrm>
+          <a:off x="0" y="0"/>
+          <a:ext cx="0" cy="0"/>
+          <a:chOff x="0" y="0"/>
+          <a:chExt cx="0" cy="0"/>
+        </a:xfrm>
+      </p:grpSpPr>
+      <p:sp>
+        <p:nvSpPr>
+          <p:cNvPr id="2" name="Slide Image Placeholder 1"/>
+          <p:cNvSpPr>
+            <a:spLocks noGrp="1" noRot="1" noChangeAspect="1"/>
+          </p:cNvSpPr>
+          <p:nvPr>
+            <p:ph type="sldImg"/>
+          </p:nvPr>
+        </p:nvSpPr>
+        <p:spPr/>
+      </p:sp>
+      <p:sp>
+        <p:nvSpPr>
+          <p:cNvPr id="3" name="Notes Placeholder 2"/>
+          <p:cNvSpPr>
+            <a:spLocks noGrp="1"/>
+          </p:cNvSpPr>
+          <p:nvPr>
+            <p:ph type="body" idx="1"/>
+          </p:nvPr>
+        </p:nvSpPr>
+        <p:spPr/>
+        <p:txBody>
+          <a:bodyPr/>
+          <a:lstStyle/>
+          <a:p>
+            <a:r>
+              <a:rPr lang="en-US" dirty="0" smtClean="0"/>
+              <a:t>In the workplace you would want to use SSL for connections to your Compliance Web UI.</a:t>
+            </a:r>
+          </a:p>
+          <a:p>
+            <a:endParaRPr lang="en-US" dirty="0" smtClean="0"/>
+          </a:p>
+          <a:p>
+            <a:endParaRPr lang="en-US" dirty="0" smtClean="0"/>
+          </a:p>
+          <a:p>
+            <a:pPr marL="0" marR="0" indent="0" algn="l" defTabSz="1217613" rtl="0" eaLnBrk="1" fontAlgn="base" latinLnBrk="0" hangingPunct="1">
+              <a:lnSpc>
+                <a:spcPct val="90000"/>
+              </a:lnSpc>
+              <a:spcBef>
+                <a:spcPct val="30000"/>
+              </a:spcBef>
+              <a:spcAft>
+                <a:spcPts val="450"/>
+              </a:spcAft>
+              <a:buClrTx/>
+              <a:buSzTx/>
+              <a:buFontTx/>
+              <a:buNone/>
+              <a:tabLst/>
+              <a:defRPr/>
+            </a:pPr>
+            <a:r>
+              <a:rPr lang="en-US" dirty="0" smtClean="0"/>
+              <a:t>https://docs.chef.io/install_compliance.html &gt; </a:t>
+            </a:r>
+            <a:r>
+              <a:rPr lang="en-US" sz="1200" b="0" i="0" kern="1200" dirty="0" smtClean="0">
+                <a:solidFill>
+                  <a:schemeClr val="tx1"/>
+                </a:solidFill>
+                <a:effectLst/>
+                <a:latin typeface="Arial" panose="020B0604020202020204" pitchFamily="34" charset="0"/>
+                <a:ea typeface="ＭＳ Ｐゴシック" charset="0"/>
+                <a:cs typeface="Arial" panose="020B0604020202020204" pitchFamily="34" charset="0"/>
+              </a:rPr>
+              <a:t>Configure SSL</a:t>
+            </a:r>
+          </a:p>
+          <a:p>
+            <a:endParaRPr lang="en-US" dirty="0" smtClean="0"/>
+          </a:p>
+          <a:p>
+            <a:endParaRPr lang="en-US" dirty="0" smtClean="0"/>
+          </a:p>
+          <a:p>
+            <a:endParaRPr lang="en-US" dirty="0"/>
+          </a:p>
+        </p:txBody>
+      </p:sp>
+      <p:sp>
+        <p:nvSpPr>
+          <p:cNvPr id="4" name="Slide Number Placeholder 3"/>
+          <p:cNvSpPr>
+            <a:spLocks noGrp="1"/>
+          </p:cNvSpPr>
+          <p:nvPr>
+            <p:ph type="sldNum" sz="quarter" idx="10"/>
+          </p:nvPr>
+        </p:nvSpPr>
+        <p:spPr/>
+        <p:txBody>
+          <a:bodyPr/>
+          <a:lstStyle/>
+          <a:p>
+            <a:pPr>
+              <a:defRPr/>
+            </a:pPr>
+            <a:fld id="{DC3734AA-3150-D947-AC52-2F5DF48BFCD5}" type="slidenum">
+              <a:rPr lang="en-US" smtClean="0"/>
+              <a:pPr>
+                <a:defRPr/>
+              </a:pPr>
+              <a:t>16</a:t>
+            </a:fld>
+            <a:endParaRPr lang="en-US" dirty="0"/>
+          </a:p>
+        </p:txBody>
+      </p:sp>
+      <p:sp>
+        <p:nvSpPr>
+          <p:cNvPr id="5" name="Header Placeholder 4"/>
+          <p:cNvSpPr>
+            <a:spLocks noGrp="1"/>
+          </p:cNvSpPr>
+          <p:nvPr>
+            <p:ph type="hdr" sz="quarter" idx="11"/>
+          </p:nvPr>
+        </p:nvSpPr>
+        <p:spPr/>
+        <p:txBody>
+          <a:bodyPr/>
+          <a:lstStyle/>
+          <a:p>
+            <a:pPr>
+              <a:defRPr/>
+            </a:pPr>
+            <a:endParaRPr lang="en-US"/>
+          </a:p>
+        </p:txBody>
+      </p:sp>
+      <p:sp>
+        <p:nvSpPr>
+          <p:cNvPr id="6" name="Footer Placeholder 5"/>
+          <p:cNvSpPr>
+            <a:spLocks noGrp="1"/>
+          </p:cNvSpPr>
+          <p:nvPr>
+            <p:ph type="ftr" sz="quarter" idx="12"/>
+          </p:nvPr>
+        </p:nvSpPr>
+        <p:spPr/>
+        <p:txBody>
+          <a:bodyPr/>
+          <a:lstStyle/>
+          <a:p>
+            <a:pPr>
+              <a:defRPr/>
+            </a:pPr>
+            <a:endParaRPr lang="en-US"/>
+          </a:p>
+        </p:txBody>
+      </p:sp>
+    </p:spTree>
+    <p:extLst>
+      <p:ext uri="{BB962C8B-B14F-4D97-AF65-F5344CB8AC3E}">
+        <p14:creationId xmlns:p14="http://schemas.microsoft.com/office/powerpoint/2010/main" val="1812303767"/>
+      </p:ext>
+    </p:extLst>
+  </p:cSld>
+  <p:clrMapOvr>
+    <a:masterClrMapping/>
+  </p:clrMapOvr>
+</p:notes>
+</file>
+
+<file path=ppt/notesSlides/notesSlide15.xml><?xml version="1.0" encoding="utf-8"?>
+<p:notes xmlns:a="http://schemas.openxmlformats.org/drawingml/2006/main" xmlns:r="http://schemas.openxmlformats.org/officeDocument/2006/relationships" xmlns:p="http://schemas.openxmlformats.org/presentationml/2006/main">
+  <p:cSld>
+    <p:spTree>
+      <p:nvGrpSpPr>
+        <p:cNvPr id="1" name=""/>
+        <p:cNvGrpSpPr/>
+        <p:nvPr/>
+      </p:nvGrpSpPr>
+      <p:grpSpPr>
+        <a:xfrm>
+          <a:off x="0" y="0"/>
+          <a:ext cx="0" cy="0"/>
+          <a:chOff x="0" y="0"/>
+          <a:chExt cx="0" cy="0"/>
+        </a:xfrm>
+      </p:grpSpPr>
+      <p:sp>
+        <p:nvSpPr>
+          <p:cNvPr id="2" name="Slide Image Placeholder 1"/>
+          <p:cNvSpPr>
+            <a:spLocks noGrp="1" noRot="1" noChangeAspect="1"/>
+          </p:cNvSpPr>
+          <p:nvPr>
+            <p:ph type="sldImg"/>
+          </p:nvPr>
+        </p:nvSpPr>
+        <p:spPr/>
+      </p:sp>
+      <p:sp>
+        <p:nvSpPr>
+          <p:cNvPr id="3" name="Notes Placeholder 2"/>
+          <p:cNvSpPr>
+            <a:spLocks noGrp="1"/>
+          </p:cNvSpPr>
+          <p:nvPr>
+            <p:ph type="body" idx="1"/>
+          </p:nvPr>
+        </p:nvSpPr>
+        <p:spPr/>
+        <p:txBody>
+          <a:bodyPr/>
+          <a:lstStyle/>
+          <a:p>
+            <a:r>
+              <a:rPr lang="en-US" dirty="0" smtClean="0"/>
+              <a:t>Instructor Note: If you needed</a:t>
+            </a:r>
+            <a:r>
+              <a:rPr lang="en-US" baseline="0" dirty="0" smtClean="0"/>
+              <a:t> to downgrade Compliance to a previous version, the `--</a:t>
+            </a:r>
+            <a:r>
+              <a:rPr lang="en-US" baseline="0" dirty="0" err="1" smtClean="0"/>
+              <a:t>oldpackage</a:t>
+            </a:r>
+            <a:r>
+              <a:rPr lang="en-US" baseline="0" dirty="0" smtClean="0"/>
+              <a:t>' option will do that for you. In the following example, the `</a:t>
+            </a:r>
+            <a:r>
+              <a:rPr lang="en-US" dirty="0" smtClean="0"/>
+              <a:t>https://package...` would be the</a:t>
+            </a:r>
+            <a:r>
+              <a:rPr lang="en-US" baseline="0" dirty="0" smtClean="0"/>
+              <a:t> version of the old package that you want to downgrade to:</a:t>
+            </a:r>
+          </a:p>
+          <a:p>
+            <a:endParaRPr lang="en-US" baseline="0" dirty="0" smtClean="0"/>
+          </a:p>
+          <a:p>
+            <a:r>
+              <a:rPr lang="en-US" dirty="0" smtClean="0"/>
+              <a:t> sudo rpm -</a:t>
+            </a:r>
+            <a:r>
+              <a:rPr lang="en-US" dirty="0" err="1" smtClean="0"/>
+              <a:t>Uvh</a:t>
+            </a:r>
+            <a:r>
+              <a:rPr lang="en-US" dirty="0" smtClean="0"/>
+              <a:t> </a:t>
+            </a:r>
+            <a:r>
+              <a:rPr lang="en-US" b="1" dirty="0" smtClean="0"/>
+              <a:t>--</a:t>
+            </a:r>
+            <a:r>
+              <a:rPr lang="en-US" b="1" dirty="0" err="1" smtClean="0"/>
+              <a:t>oldpackage</a:t>
+            </a:r>
+            <a:r>
+              <a:rPr lang="en-US" b="1" dirty="0" smtClean="0"/>
+              <a:t> </a:t>
+            </a:r>
+            <a:r>
+              <a:rPr lang="en-US" dirty="0" smtClean="0"/>
+              <a:t>https://packagecloud.io/chef/stable/packages/el/6/chef-compliance-0.9.6-1.el6.x86_64.rpm/download</a:t>
+            </a:r>
+            <a:endParaRPr lang="en-US" dirty="0"/>
+          </a:p>
+        </p:txBody>
+      </p:sp>
+      <p:sp>
+        <p:nvSpPr>
+          <p:cNvPr id="4" name="Slide Number Placeholder 3"/>
+          <p:cNvSpPr>
+            <a:spLocks noGrp="1"/>
+          </p:cNvSpPr>
+          <p:nvPr>
+            <p:ph type="sldNum" sz="quarter" idx="10"/>
+          </p:nvPr>
+        </p:nvSpPr>
+        <p:spPr/>
+        <p:txBody>
+          <a:bodyPr/>
+          <a:lstStyle/>
+          <a:p>
+            <a:pPr>
+              <a:defRPr/>
+            </a:pPr>
+            <a:fld id="{DC3734AA-3150-D947-AC52-2F5DF48BFCD5}" type="slidenum">
+              <a:rPr lang="en-US" smtClean="0"/>
+              <a:pPr>
+                <a:defRPr/>
+              </a:pPr>
+              <a:t>17</a:t>
             </a:fld>
             <a:endParaRPr lang="en-US" dirty="0"/>
           </a:p>
@@ -2585,12 +2998,6 @@
             <a:endParaRPr lang="en-US" dirty="0" smtClean="0"/>
           </a:p>
           <a:p>
-            <a:r>
-              <a:rPr lang="en-US" dirty="0" smtClean="0"/>
-              <a:t>TBD. check length</a:t>
-            </a:r>
-          </a:p>
-          <a:p>
             <a:endParaRPr lang="en-US" dirty="0" smtClean="0"/>
           </a:p>
         </p:txBody>
@@ -2725,141 +3132,6 @@
           <a:bodyPr/>
           <a:lstStyle/>
           <a:p>
-            <a:pPr marL="0" marR="0" indent="0" algn="l" defTabSz="1217613" rtl="0" eaLnBrk="1" fontAlgn="base" latinLnBrk="0" hangingPunct="1">
-              <a:lnSpc>
-                <a:spcPct val="90000"/>
-              </a:lnSpc>
-              <a:spcBef>
-                <a:spcPct val="30000"/>
-              </a:spcBef>
-              <a:spcAft>
-                <a:spcPts val="450"/>
-              </a:spcAft>
-              <a:buClrTx/>
-              <a:buSzTx/>
-              <a:buFontTx/>
-              <a:buNone/>
-              <a:tabLst/>
-              <a:defRPr/>
-            </a:pPr>
-            <a:r>
-              <a:rPr lang="en-US" dirty="0" smtClean="0"/>
-              <a:t>Execute </a:t>
-            </a:r>
-            <a:r>
-              <a:rPr lang="en-US" b="1" dirty="0" smtClean="0"/>
-              <a:t>sudo chef-compliance-</a:t>
-            </a:r>
-            <a:r>
-              <a:rPr lang="en-US" b="1" dirty="0" err="1" smtClean="0"/>
-              <a:t>ctl</a:t>
-            </a:r>
-            <a:r>
-              <a:rPr lang="en-US" b="1" dirty="0" smtClean="0"/>
-              <a:t> user-create admin </a:t>
-            </a:r>
-            <a:r>
-              <a:rPr lang="en-US" b="1" dirty="0" err="1" smtClean="0"/>
-              <a:t>chefadmin</a:t>
-            </a:r>
-            <a:r>
-              <a:rPr lang="en-US" baseline="0" dirty="0" smtClean="0"/>
-              <a:t> .</a:t>
-            </a:r>
-          </a:p>
-          <a:p>
-            <a:pPr marL="0" marR="0" indent="0" algn="l" defTabSz="1217613" rtl="0" eaLnBrk="1" fontAlgn="base" latinLnBrk="0" hangingPunct="1">
-              <a:lnSpc>
-                <a:spcPct val="90000"/>
-              </a:lnSpc>
-              <a:spcBef>
-                <a:spcPct val="30000"/>
-              </a:spcBef>
-              <a:spcAft>
-                <a:spcPts val="450"/>
-              </a:spcAft>
-              <a:buClrTx/>
-              <a:buSzTx/>
-              <a:buFontTx/>
-              <a:buNone/>
-              <a:tabLst/>
-              <a:defRPr/>
-            </a:pPr>
-            <a:endParaRPr lang="en-US" baseline="0" dirty="0" smtClean="0"/>
-          </a:p>
-          <a:p>
-            <a:pPr marL="0" marR="0" indent="0" algn="l" defTabSz="1217613" rtl="0" eaLnBrk="1" fontAlgn="base" latinLnBrk="0" hangingPunct="1">
-              <a:lnSpc>
-                <a:spcPct val="90000"/>
-              </a:lnSpc>
-              <a:spcBef>
-                <a:spcPct val="30000"/>
-              </a:spcBef>
-              <a:spcAft>
-                <a:spcPts val="450"/>
-              </a:spcAft>
-              <a:buClrTx/>
-              <a:buSzTx/>
-              <a:buFontTx/>
-              <a:buNone/>
-              <a:tabLst/>
-              <a:defRPr/>
-            </a:pPr>
-            <a:r>
-              <a:rPr lang="en-US" baseline="0" dirty="0" smtClean="0"/>
-              <a:t>This will create a user named admin with a password of </a:t>
-            </a:r>
-            <a:r>
-              <a:rPr lang="en-US" baseline="0" dirty="0" err="1" smtClean="0"/>
-              <a:t>chefadmin</a:t>
-            </a:r>
-            <a:r>
-              <a:rPr lang="en-US" baseline="0" dirty="0" smtClean="0"/>
-              <a:t>.</a:t>
-            </a:r>
-          </a:p>
-          <a:p>
-            <a:pPr marL="0" marR="0" indent="0" algn="l" defTabSz="1217613" rtl="0" eaLnBrk="1" fontAlgn="base" latinLnBrk="0" hangingPunct="1">
-              <a:lnSpc>
-                <a:spcPct val="90000"/>
-              </a:lnSpc>
-              <a:spcBef>
-                <a:spcPct val="30000"/>
-              </a:spcBef>
-              <a:spcAft>
-                <a:spcPts val="450"/>
-              </a:spcAft>
-              <a:buClrTx/>
-              <a:buSzTx/>
-              <a:buFontTx/>
-              <a:buNone/>
-              <a:tabLst/>
-              <a:defRPr/>
-            </a:pPr>
-            <a:endParaRPr lang="en-US" baseline="0" dirty="0" smtClean="0"/>
-          </a:p>
-          <a:p>
-            <a:pPr marL="0" marR="0" indent="0" algn="l" defTabSz="1217613" rtl="0" eaLnBrk="1" fontAlgn="base" latinLnBrk="0" hangingPunct="1">
-              <a:lnSpc>
-                <a:spcPct val="90000"/>
-              </a:lnSpc>
-              <a:spcBef>
-                <a:spcPct val="30000"/>
-              </a:spcBef>
-              <a:spcAft>
-                <a:spcPts val="450"/>
-              </a:spcAft>
-              <a:buClrTx/>
-              <a:buSzTx/>
-              <a:buFontTx/>
-              <a:buNone/>
-              <a:tabLst/>
-              <a:defRPr/>
-            </a:pPr>
-            <a:r>
-              <a:rPr lang="en-US" baseline="0" dirty="0" smtClean="0"/>
-              <a:t>In the workplace you should of course create a more secure password.</a:t>
-            </a:r>
             <a:endParaRPr lang="en-US" dirty="0"/>
           </a:p>
         </p:txBody>
@@ -2940,7 +3212,7 @@
     </p:spTree>
     <p:extLst>
       <p:ext uri="{BB962C8B-B14F-4D97-AF65-F5344CB8AC3E}">
-        <p14:creationId xmlns:p14="http://schemas.microsoft.com/office/powerpoint/2010/main" val="1336534531"/>
+        <p14:creationId xmlns:p14="http://schemas.microsoft.com/office/powerpoint/2010/main" val="667353389"/>
       </p:ext>
     </p:extLst>
   </p:cSld>
@@ -3078,7 +3350,7 @@
     </p:spTree>
     <p:extLst>
       <p:ext uri="{BB962C8B-B14F-4D97-AF65-F5344CB8AC3E}">
-        <p14:creationId xmlns:p14="http://schemas.microsoft.com/office/powerpoint/2010/main" val="667353389"/>
+        <p14:creationId xmlns:p14="http://schemas.microsoft.com/office/powerpoint/2010/main" val="3756941173"/>
       </p:ext>
     </p:extLst>
   </p:cSld>
@@ -3653,14 +3925,14 @@
           </a:ln>
           <a:extLst>
             <a:ext uri="{909E8E84-426E-40dd-AFC4-6F175D3DCCD1}">
-              <a14:hiddenFill xmlns:a14="http://schemas.microsoft.com/office/drawing/2010/main" xmlns="">
+              <a14:hiddenFill xmlns="" xmlns:a14="http://schemas.microsoft.com/office/drawing/2010/main">
                 <a:solidFill>
                   <a:srgbClr val="FFFFFF"/>
                 </a:solidFill>
               </a14:hiddenFill>
             </a:ext>
             <a:ext uri="{91240B29-F687-4f45-9708-019B960494DF}">
-              <a14:hiddenLine xmlns:a14="http://schemas.microsoft.com/office/drawing/2010/main" xmlns="" w="9525">
+              <a14:hiddenLine xmlns="" xmlns:a14="http://schemas.microsoft.com/office/drawing/2010/main" w="9525">
                 <a:solidFill>
                   <a:srgbClr val="000000"/>
                 </a:solidFill>
@@ -3808,14 +4080,14 @@
           </a:ln>
           <a:extLst>
             <a:ext uri="{909E8E84-426E-40dd-AFC4-6F175D3DCCD1}">
-              <a14:hiddenFill xmlns:a14="http://schemas.microsoft.com/office/drawing/2010/main" xmlns="">
+              <a14:hiddenFill xmlns="" xmlns:a14="http://schemas.microsoft.com/office/drawing/2010/main">
                 <a:solidFill>
                   <a:srgbClr val="FFFFFF"/>
                 </a:solidFill>
               </a14:hiddenFill>
             </a:ext>
             <a:ext uri="{91240B29-F687-4f45-9708-019B960494DF}">
-              <a14:hiddenLine xmlns:a14="http://schemas.microsoft.com/office/drawing/2010/main" xmlns="" w="9525">
+              <a14:hiddenLine xmlns="" xmlns:a14="http://schemas.microsoft.com/office/drawing/2010/main" w="9525">
                 <a:solidFill>
                   <a:srgbClr val="000000"/>
                 </a:solidFill>
@@ -4306,14 +4578,14 @@
           </a:ln>
           <a:extLst>
             <a:ext uri="{909E8E84-426E-40dd-AFC4-6F175D3DCCD1}">
-              <a14:hiddenFill xmlns:a14="http://schemas.microsoft.com/office/drawing/2010/main" xmlns="">
+              <a14:hiddenFill xmlns="" xmlns:a14="http://schemas.microsoft.com/office/drawing/2010/main">
                 <a:solidFill>
                   <a:srgbClr val="FFFFFF"/>
                 </a:solidFill>
               </a14:hiddenFill>
             </a:ext>
             <a:ext uri="{91240B29-F687-4f45-9708-019B960494DF}">
-              <a14:hiddenLine xmlns:a14="http://schemas.microsoft.com/office/drawing/2010/main" xmlns="" w="9525">
+              <a14:hiddenLine xmlns="" xmlns:a14="http://schemas.microsoft.com/office/drawing/2010/main" w="9525">
                 <a:solidFill>
                   <a:srgbClr val="000000"/>
                 </a:solidFill>
@@ -6049,14 +6321,14 @@
           </a:ln>
           <a:extLst>
             <a:ext uri="{909E8E84-426E-40dd-AFC4-6F175D3DCCD1}">
-              <a14:hiddenFill xmlns:a14="http://schemas.microsoft.com/office/drawing/2010/main" xmlns="">
+              <a14:hiddenFill xmlns="" xmlns:a14="http://schemas.microsoft.com/office/drawing/2010/main">
                 <a:solidFill>
                   <a:srgbClr val="FFFFFF"/>
                 </a:solidFill>
               </a14:hiddenFill>
             </a:ext>
             <a:ext uri="{91240B29-F687-4f45-9708-019B960494DF}">
-              <a14:hiddenLine xmlns:a14="http://schemas.microsoft.com/office/drawing/2010/main" xmlns="" w="9525">
+              <a14:hiddenLine xmlns="" xmlns:a14="http://schemas.microsoft.com/office/drawing/2010/main" w="9525">
                 <a:solidFill>
                   <a:srgbClr val="000000"/>
                 </a:solidFill>
@@ -7410,14 +7682,14 @@
           </a:ln>
           <a:extLst>
             <a:ext uri="{909E8E84-426E-40dd-AFC4-6F175D3DCCD1}">
-              <a14:hiddenFill xmlns:a14="http://schemas.microsoft.com/office/drawing/2010/main" xmlns="">
+              <a14:hiddenFill xmlns="" xmlns:a14="http://schemas.microsoft.com/office/drawing/2010/main">
                 <a:solidFill>
                   <a:srgbClr val="FFFFFF"/>
                 </a:solidFill>
               </a14:hiddenFill>
             </a:ext>
             <a:ext uri="{91240B29-F687-4f45-9708-019B960494DF}">
-              <a14:hiddenLine xmlns:a14="http://schemas.microsoft.com/office/drawing/2010/main" xmlns="" w="9525">
+              <a14:hiddenLine xmlns="" xmlns:a14="http://schemas.microsoft.com/office/drawing/2010/main" w="9525">
                 <a:solidFill>
                   <a:srgbClr val="000000"/>
                 </a:solidFill>
@@ -7975,14 +8247,14 @@
           </a:ln>
           <a:extLst>
             <a:ext uri="{909E8E84-426E-40dd-AFC4-6F175D3DCCD1}">
-              <a14:hiddenFill xmlns:a14="http://schemas.microsoft.com/office/drawing/2010/main" xmlns="">
+              <a14:hiddenFill xmlns="" xmlns:a14="http://schemas.microsoft.com/office/drawing/2010/main">
                 <a:solidFill>
                   <a:srgbClr val="FFFFFF"/>
                 </a:solidFill>
               </a14:hiddenFill>
             </a:ext>
             <a:ext uri="{91240B29-F687-4f45-9708-019B960494DF}">
-              <a14:hiddenLine xmlns:a14="http://schemas.microsoft.com/office/drawing/2010/main" xmlns="" w="9525">
+              <a14:hiddenLine xmlns="" xmlns:a14="http://schemas.microsoft.com/office/drawing/2010/main" w="9525">
                 <a:solidFill>
                   <a:srgbClr val="000000"/>
                 </a:solidFill>
@@ -8549,14 +8821,14 @@
           </a:ln>
           <a:extLst>
             <a:ext uri="{909E8E84-426E-40dd-AFC4-6F175D3DCCD1}">
-              <a14:hiddenFill xmlns:a14="http://schemas.microsoft.com/office/drawing/2010/main" xmlns="">
+              <a14:hiddenFill xmlns="" xmlns:a14="http://schemas.microsoft.com/office/drawing/2010/main">
                 <a:solidFill>
                   <a:srgbClr val="FFFFFF"/>
                 </a:solidFill>
               </a14:hiddenFill>
             </a:ext>
             <a:ext uri="{91240B29-F687-4f45-9708-019B960494DF}">
-              <a14:hiddenLine xmlns:a14="http://schemas.microsoft.com/office/drawing/2010/main" xmlns="" w="9525">
+              <a14:hiddenLine xmlns="" xmlns:a14="http://schemas.microsoft.com/office/drawing/2010/main" w="9525">
                 <a:solidFill>
                   <a:srgbClr val="000000"/>
                 </a:solidFill>
@@ -9496,14 +9768,14 @@
           </a:ln>
           <a:extLst>
             <a:ext uri="{909E8E84-426E-40dd-AFC4-6F175D3DCCD1}">
-              <a14:hiddenFill xmlns:a14="http://schemas.microsoft.com/office/drawing/2010/main" xmlns="">
+              <a14:hiddenFill xmlns="" xmlns:a14="http://schemas.microsoft.com/office/drawing/2010/main">
                 <a:solidFill>
                   <a:srgbClr val="FFFFFF"/>
                 </a:solidFill>
               </a14:hiddenFill>
             </a:ext>
             <a:ext uri="{91240B29-F687-4f45-9708-019B960494DF}">
-              <a14:hiddenLine xmlns:a14="http://schemas.microsoft.com/office/drawing/2010/main" xmlns="" w="9525">
+              <a14:hiddenLine xmlns="" xmlns:a14="http://schemas.microsoft.com/office/drawing/2010/main" w="9525">
                 <a:solidFill>
                   <a:srgbClr val="000000"/>
                 </a:solidFill>
@@ -10255,14 +10527,14 @@
           </a:ln>
           <a:extLst>
             <a:ext uri="{909E8E84-426E-40dd-AFC4-6F175D3DCCD1}">
-              <a14:hiddenFill xmlns:a14="http://schemas.microsoft.com/office/drawing/2010/main" xmlns="">
+              <a14:hiddenFill xmlns="" xmlns:a14="http://schemas.microsoft.com/office/drawing/2010/main">
                 <a:solidFill>
                   <a:srgbClr val="FFFFFF"/>
                 </a:solidFill>
               </a14:hiddenFill>
             </a:ext>
             <a:ext uri="{91240B29-F687-4f45-9708-019B960494DF}">
-              <a14:hiddenLine xmlns:a14="http://schemas.microsoft.com/office/drawing/2010/main" xmlns="" w="9525">
+              <a14:hiddenLine xmlns="" xmlns:a14="http://schemas.microsoft.com/office/drawing/2010/main" w="9525">
                 <a:solidFill>
                   <a:srgbClr val="000000"/>
                 </a:solidFill>
@@ -11091,12 +11363,12 @@
       </p:grpSpPr>
       <p:sp>
         <p:nvSpPr>
-          <p:cNvPr id="2" name="Content Placeholder 1"/>
-          <p:cNvSpPr>
-            <a:spLocks noGrp="1"/>
-          </p:cNvSpPr>
-          <p:nvPr>
-            <p:ph sz="quarter" idx="10"/>
+          <p:cNvPr id="2" name="Title 1"/>
+          <p:cNvSpPr>
+            <a:spLocks noGrp="1"/>
+          </p:cNvSpPr>
+          <p:nvPr>
+            <p:ph type="title"/>
           </p:nvPr>
         </p:nvSpPr>
         <p:spPr/>
@@ -11106,105 +11378,169 @@
           <a:p>
             <a:r>
               <a:rPr lang="en-US" dirty="0" smtClean="0"/>
-              <a:t>20:22:20.388 </a:t>
-            </a:r>
-            <a:r>
-              <a:rPr lang="en-US" dirty="0"/>
-              <a:t>DEB  ▶ Use PostgreSQL backend </a:t>
-            </a:r>
-            <a:r>
-              <a:rPr lang="en-US" dirty="0" smtClean="0"/>
-              <a:t>chef_compliance@227.0.0.2:5432</a:t>
+              <a:t>GL: </a:t>
+            </a:r>
+            <a:r>
+              <a:rPr lang="en-US" dirty="0" smtClean="0"/>
+              <a:t>Configure the Compliance Server</a:t>
             </a:r>
             <a:endParaRPr lang="en-US" dirty="0"/>
           </a:p>
-          <a:p>
-            <a:r>
-              <a:rPr lang="en-US" dirty="0" smtClean="0"/>
-              <a:t>20:22:20.573 </a:t>
-            </a:r>
-            <a:r>
-              <a:rPr lang="en-US" dirty="0"/>
-              <a:t>DEB  ▶ Save user admin</a:t>
-            </a:r>
-          </a:p>
-          <a:p>
-            <a:endParaRPr lang="en-US" dirty="0" smtClean="0"/>
-          </a:p>
-          <a:p>
-            <a:r>
-              <a:rPr lang="en-US" dirty="0"/>
-              <a:t> </a:t>
-            </a:r>
-          </a:p>
-        </p:txBody>
-      </p:sp>
-      <p:sp>
-        <p:nvSpPr>
-          <p:cNvPr id="3" name="Text Placeholder 2"/>
-          <p:cNvSpPr>
-            <a:spLocks noGrp="1"/>
-          </p:cNvSpPr>
-          <p:nvPr>
-            <p:ph type="body" sz="quarter" idx="11"/>
-          </p:nvPr>
-        </p:nvSpPr>
-        <p:spPr/>
+        </p:txBody>
+      </p:sp>
+      <p:sp>
+        <p:nvSpPr>
+          <p:cNvPr id="6" name="Text Placeholder 2"/>
+          <p:cNvSpPr>
+            <a:spLocks noGrp="1"/>
+          </p:cNvSpPr>
+          <p:nvPr>
+            <p:ph type="body" sz="quarter" idx="12"/>
+          </p:nvPr>
+        </p:nvSpPr>
+        <p:spPr>
+          <a:xfrm>
+            <a:off x="274319" y="1559018"/>
+            <a:ext cx="7821465" cy="5961922"/>
+          </a:xfrm>
+        </p:spPr>
         <p:txBody>
           <a:bodyPr/>
           <a:lstStyle/>
           <a:p>
-            <a:r>
-              <a:rPr lang="en-US" dirty="0" smtClean="0"/>
-              <a:t>$ sudo </a:t>
-            </a:r>
+            <a:pPr marL="457200" indent="-457200">
+              <a:buFont typeface="Arial" panose="020B0604020202020204" pitchFamily="34" charset="0"/>
+              <a:buChar char="•"/>
+            </a:pPr>
+            <a:r>
+              <a:rPr lang="en-US" dirty="0" smtClean="0"/>
+              <a:t>From your laptop, </a:t>
+            </a:r>
+            <a:r>
+              <a:rPr lang="en-US" dirty="0" smtClean="0"/>
+              <a:t>open a </a:t>
+            </a:r>
+            <a:r>
+              <a:rPr lang="en-US" dirty="0" smtClean="0"/>
+              <a:t>web browser </a:t>
+            </a:r>
+            <a:r>
+              <a:rPr lang="en-US" dirty="0" smtClean="0"/>
+              <a:t>and point it to:</a:t>
+            </a:r>
+            <a:br>
+              <a:rPr lang="en-US" dirty="0" smtClean="0"/>
+            </a:br>
+            <a:r>
+              <a:rPr lang="en-US" dirty="0" smtClean="0"/>
+              <a:t/>
+            </a:r>
+            <a:br>
+              <a:rPr lang="en-US" dirty="0" smtClean="0"/>
+            </a:br>
+            <a:r>
+              <a:rPr lang="en-US" b="1" dirty="0"/>
+              <a:t>https</a:t>
+            </a:r>
+            <a:r>
+              <a:rPr lang="en-US" b="1" dirty="0" smtClean="0"/>
+              <a:t>://IPADDRESS/#/setup </a:t>
+            </a:r>
+            <a:r>
+              <a:rPr lang="en-US" dirty="0" smtClean="0"/>
+              <a:t>where IPADDRESS is the IP addressed you are using for your Compliance Server.</a:t>
+            </a:r>
+            <a:endParaRPr lang="en-US" dirty="0"/>
+          </a:p>
+          <a:p>
+            <a:pPr marL="457200" indent="-457200">
+              <a:buFont typeface="Arial" panose="020B0604020202020204" pitchFamily="34" charset="0"/>
+              <a:buChar char="•"/>
+            </a:pPr>
+            <a:r>
+              <a:rPr lang="en-US" dirty="0" smtClean="0"/>
+              <a:t>For </a:t>
+            </a:r>
+            <a:r>
+              <a:rPr lang="en-US" dirty="0" smtClean="0"/>
+              <a:t>example</a:t>
+            </a:r>
+            <a:br>
+              <a:rPr lang="en-US" dirty="0" smtClean="0"/>
+            </a:br>
             <a:r>
               <a:rPr lang="en-US" dirty="0"/>
-              <a:t>chef-compliance-</a:t>
-            </a:r>
-            <a:r>
-              <a:rPr lang="en-US" dirty="0" err="1"/>
-              <a:t>ctl</a:t>
-            </a:r>
-            <a:r>
-              <a:rPr lang="en-US" dirty="0"/>
-              <a:t> user-create admin </a:t>
-            </a:r>
-            <a:r>
-              <a:rPr lang="en-US" dirty="0" err="1" smtClean="0"/>
-              <a:t>chefadmin</a:t>
-            </a:r>
+              <a:t>https://54.173.238.187/#/setup </a:t>
+            </a:r>
+            <a:endParaRPr lang="en-US" dirty="0" smtClean="0"/>
+          </a:p>
+          <a:p>
+            <a:pPr marL="457200" indent="-457200">
+              <a:buFont typeface="Arial" panose="020B0604020202020204" pitchFamily="34" charset="0"/>
+              <a:buChar char="•"/>
+            </a:pPr>
+            <a:r>
+              <a:rPr lang="en-US" dirty="0" smtClean="0"/>
+              <a:t>Click </a:t>
+            </a:r>
+            <a:r>
+              <a:rPr lang="en-US" b="1" dirty="0" smtClean="0"/>
+              <a:t>Advanced</a:t>
+            </a:r>
+            <a:r>
+              <a:rPr lang="en-US" dirty="0" smtClean="0"/>
+              <a:t> from the warning page. </a:t>
+            </a:r>
+            <a:endParaRPr lang="en-US" b="1" dirty="0" smtClean="0"/>
+          </a:p>
+          <a:p>
             <a:endParaRPr lang="en-US" dirty="0"/>
           </a:p>
-        </p:txBody>
-      </p:sp>
-      <p:sp>
-        <p:nvSpPr>
-          <p:cNvPr id="5" name="Title 4"/>
-          <p:cNvSpPr>
-            <a:spLocks noGrp="1"/>
-          </p:cNvSpPr>
-          <p:nvPr>
-            <p:ph type="title"/>
-          </p:nvPr>
-        </p:nvSpPr>
-        <p:spPr/>
-        <p:txBody>
-          <a:bodyPr/>
-          <a:lstStyle/>
-          <a:p>
-            <a:r>
-              <a:rPr lang="en-US" dirty="0" smtClean="0"/>
-              <a:t>GL: Create Administrator Credentials</a:t>
-            </a:r>
+          <a:p>
+            <a:endParaRPr lang="en-US" dirty="0" smtClean="0"/>
+          </a:p>
+          <a:p>
+            <a:pPr marL="457200" indent="-457200">
+              <a:buFont typeface="Arial" panose="020B0604020202020204" pitchFamily="34" charset="0"/>
+              <a:buChar char="•"/>
+            </a:pPr>
             <a:endParaRPr lang="en-US" dirty="0"/>
           </a:p>
         </p:txBody>
       </p:sp>
+      <p:pic>
+        <p:nvPicPr>
+          <p:cNvPr id="4" name="Picture 3"/>
+          <p:cNvPicPr>
+            <a:picLocks noChangeAspect="1"/>
+          </p:cNvPicPr>
+          <p:nvPr/>
+        </p:nvPicPr>
+        <p:blipFill>
+          <a:blip r:embed="rId3"/>
+          <a:stretch>
+            <a:fillRect/>
+          </a:stretch>
+        </p:blipFill>
+        <p:spPr>
+          <a:xfrm>
+            <a:off x="9542114" y="1161415"/>
+            <a:ext cx="5712754" cy="6706731"/>
+          </a:xfrm>
+          <a:prstGeom prst="rect">
+            <a:avLst/>
+          </a:prstGeom>
+          <a:ln>
+            <a:solidFill>
+              <a:schemeClr val="accent1"/>
+            </a:solidFill>
+          </a:ln>
+        </p:spPr>
+      </p:pic>
     </p:spTree>
     <p:extLst>
       <p:ext uri="{BB962C8B-B14F-4D97-AF65-F5344CB8AC3E}">
-        <p14:creationId xmlns:p14="http://schemas.microsoft.com/office/powerpoint/2010/main" val="382025897"/>
+        <p14:creationId xmlns:p14="http://schemas.microsoft.com/office/powerpoint/2010/main" val="1203532607"/>
       </p:ext>
     </p:extLst>
   </p:cSld>
@@ -11214,6 +11550,13 @@
   <p:transition spd="med">
     <p:fade/>
   </p:transition>
+  <p:timing>
+    <p:tnLst>
+      <p:par>
+        <p:cTn id="1" dur="indefinite" restart="never" nodeType="tmRoot"/>
+      </p:par>
+    </p:tnLst>
+  </p:timing>
 </p:sld>
 </file>
 
@@ -11251,15 +11594,129 @@
           <a:p>
             <a:r>
               <a:rPr lang="en-US" dirty="0" smtClean="0"/>
-              <a:t>GL: Connect to your Compliance Web UI</a:t>
-            </a:r>
+              <a:t>GL: </a:t>
+            </a:r>
+            <a:r>
+              <a:rPr lang="en-US" dirty="0"/>
+              <a:t>Configure the Compliance Server</a:t>
+            </a:r>
+            <a:endParaRPr lang="en-US" dirty="0"/>
+          </a:p>
+        </p:txBody>
+      </p:sp>
+      <p:sp>
+        <p:nvSpPr>
+          <p:cNvPr id="6" name="Text Placeholder 2"/>
+          <p:cNvSpPr>
+            <a:spLocks noGrp="1"/>
+          </p:cNvSpPr>
+          <p:nvPr>
+            <p:ph type="body" sz="quarter" idx="12"/>
+          </p:nvPr>
+        </p:nvSpPr>
+        <p:spPr>
+          <a:xfrm>
+            <a:off x="274320" y="1559018"/>
+            <a:ext cx="5806440" cy="5961922"/>
+          </a:xfrm>
+        </p:spPr>
+        <p:txBody>
+          <a:bodyPr/>
+          <a:lstStyle/>
+          <a:p>
+            <a:pPr marL="457200" indent="-457200">
+              <a:buFont typeface="Arial" panose="020B0604020202020204" pitchFamily="34" charset="0"/>
+              <a:buChar char="•"/>
+            </a:pPr>
+            <a:r>
+              <a:rPr lang="en-US" dirty="0" smtClean="0"/>
+              <a:t>Click the </a:t>
+            </a:r>
+            <a:r>
+              <a:rPr lang="en-US" b="1" dirty="0" smtClean="0"/>
+              <a:t>Proceed </a:t>
+            </a:r>
+            <a:r>
+              <a:rPr lang="en-US" b="1" dirty="0"/>
+              <a:t>to </a:t>
+            </a:r>
+            <a:r>
+              <a:rPr lang="en-US" b="1" dirty="0" smtClean="0"/>
+              <a:t>54.173.238.xxx ... </a:t>
+            </a:r>
+            <a:r>
+              <a:rPr lang="en-US" dirty="0" smtClean="0"/>
+              <a:t>link.</a:t>
+            </a:r>
+          </a:p>
+          <a:p>
+            <a:pPr marL="457200" indent="-457200">
+              <a:buFont typeface="Arial" panose="020B0604020202020204" pitchFamily="34" charset="0"/>
+              <a:buChar char="•"/>
+            </a:pPr>
+            <a:endParaRPr lang="en-US" dirty="0"/>
+          </a:p>
+          <a:p>
+            <a:pPr marL="457200" indent="-457200">
+              <a:buFont typeface="Arial" panose="020B0604020202020204" pitchFamily="34" charset="0"/>
+              <a:buChar char="•"/>
+            </a:pPr>
+            <a:endParaRPr lang="en-US" dirty="0" smtClean="0"/>
+          </a:p>
+          <a:p>
+            <a:r>
+              <a:rPr lang="en-US" b="1" dirty="0"/>
+              <a:t>Note</a:t>
+            </a:r>
+            <a:r>
+              <a:rPr lang="en-US" dirty="0"/>
+              <a:t>: We have not set up SSL so the https </a:t>
+            </a:r>
+            <a:r>
+              <a:rPr lang="en-US" dirty="0" smtClean="0"/>
+              <a:t>strikethrough and warning </a:t>
+            </a:r>
+            <a:r>
+              <a:rPr lang="en-US" dirty="0"/>
+              <a:t>is fine for now.</a:t>
+            </a:r>
+          </a:p>
+          <a:p>
+            <a:pPr marL="457200" indent="-457200">
+              <a:buFont typeface="Arial" panose="020B0604020202020204" pitchFamily="34" charset="0"/>
+              <a:buChar char="•"/>
+            </a:pPr>
+            <a:endParaRPr lang="en-US" dirty="0" smtClean="0"/>
+          </a:p>
+          <a:p>
+            <a:pPr marL="457200" indent="-457200">
+              <a:buFont typeface="Arial" panose="020B0604020202020204" pitchFamily="34" charset="0"/>
+              <a:buChar char="•"/>
+            </a:pPr>
+            <a:endParaRPr lang="en-US" dirty="0" smtClean="0"/>
+          </a:p>
+          <a:p>
+            <a:pPr marL="457200" indent="-457200">
+              <a:buFont typeface="Arial" panose="020B0604020202020204" pitchFamily="34" charset="0"/>
+              <a:buChar char="•"/>
+            </a:pPr>
+            <a:endParaRPr lang="en-US" dirty="0"/>
+          </a:p>
+          <a:p>
+            <a:endParaRPr lang="en-US" dirty="0" smtClean="0"/>
+          </a:p>
+          <a:p>
+            <a:pPr marL="457200" indent="-457200">
+              <a:buFont typeface="Arial" panose="020B0604020202020204" pitchFamily="34" charset="0"/>
+              <a:buChar char="•"/>
+            </a:pPr>
             <a:endParaRPr lang="en-US" dirty="0"/>
           </a:p>
         </p:txBody>
       </p:sp>
       <p:pic>
         <p:nvPicPr>
-          <p:cNvPr id="3" name="Picture 2"/>
+          <p:cNvPr id="5" name="Picture 4"/>
           <p:cNvPicPr>
             <a:picLocks noChangeAspect="1"/>
           </p:cNvPicPr>
@@ -11273,97 +11730,23 @@
         </p:blipFill>
         <p:spPr>
           <a:xfrm>
-            <a:off x="6848854" y="1367929"/>
-            <a:ext cx="8967726" cy="5741532"/>
+            <a:off x="8923135" y="1133475"/>
+            <a:ext cx="5395980" cy="6962209"/>
           </a:xfrm>
           <a:prstGeom prst="rect">
             <a:avLst/>
           </a:prstGeom>
+          <a:ln>
+            <a:solidFill>
+              <a:schemeClr val="accent1"/>
+            </a:solidFill>
+          </a:ln>
         </p:spPr>
       </p:pic>
-      <p:sp>
-        <p:nvSpPr>
-          <p:cNvPr id="6" name="Text Placeholder 2"/>
-          <p:cNvSpPr>
-            <a:spLocks noGrp="1"/>
-          </p:cNvSpPr>
-          <p:nvPr>
-            <p:ph type="body" sz="quarter" idx="12"/>
-          </p:nvPr>
-        </p:nvSpPr>
-        <p:spPr>
-          <a:xfrm>
-            <a:off x="274320" y="1559018"/>
-            <a:ext cx="5806440" cy="5961922"/>
-          </a:xfrm>
-        </p:spPr>
-        <p:txBody>
-          <a:bodyPr/>
-          <a:lstStyle/>
-          <a:p>
-            <a:pPr marL="457200" indent="-457200">
-              <a:buFont typeface="Arial" panose="020B0604020202020204" pitchFamily="34" charset="0"/>
-              <a:buChar char="•"/>
-            </a:pPr>
-            <a:r>
-              <a:rPr lang="en-US" dirty="0" smtClean="0"/>
-              <a:t>From your laptop, point a web browser to the FQDN of your Compliance server.</a:t>
-            </a:r>
-          </a:p>
-          <a:p>
-            <a:pPr marL="457200" indent="-457200">
-              <a:buFont typeface="Arial" panose="020B0604020202020204" pitchFamily="34" charset="0"/>
-              <a:buChar char="•"/>
-            </a:pPr>
-            <a:r>
-              <a:rPr lang="en-US" dirty="0" smtClean="0"/>
-              <a:t>For example</a:t>
-            </a:r>
-            <a:br>
-              <a:rPr lang="en-US" dirty="0" smtClean="0"/>
-            </a:br>
-            <a:r>
-              <a:rPr lang="en-US" dirty="0" smtClean="0"/>
-              <a:t>ec2-52-92-32-225.compute-2.amazonaws.com or simply the IP address.</a:t>
-            </a:r>
-          </a:p>
-          <a:p>
-            <a:pPr marL="457200" indent="-457200">
-              <a:buFont typeface="Arial" panose="020B0604020202020204" pitchFamily="34" charset="0"/>
-              <a:buChar char="•"/>
-            </a:pPr>
-            <a:r>
-              <a:rPr lang="en-US" b="1" dirty="0" smtClean="0"/>
-              <a:t>Note</a:t>
-            </a:r>
-            <a:r>
-              <a:rPr lang="en-US" dirty="0" smtClean="0"/>
-              <a:t>: We have not set up SSL so the https strikethrough is fine for now.</a:t>
-            </a:r>
-          </a:p>
-          <a:p>
-            <a:pPr marL="457200" indent="-457200">
-              <a:buFont typeface="Arial" panose="020B0604020202020204" pitchFamily="34" charset="0"/>
-              <a:buChar char="•"/>
-            </a:pPr>
-            <a:endParaRPr lang="en-US" dirty="0"/>
-          </a:p>
-          <a:p>
-            <a:endParaRPr lang="en-US" dirty="0" smtClean="0"/>
-          </a:p>
-          <a:p>
-            <a:pPr marL="457200" indent="-457200">
-              <a:buFont typeface="Arial" panose="020B0604020202020204" pitchFamily="34" charset="0"/>
-              <a:buChar char="•"/>
-            </a:pPr>
-            <a:endParaRPr lang="en-US" dirty="0"/>
-          </a:p>
-        </p:txBody>
-      </p:sp>
     </p:spTree>
     <p:extLst>
       <p:ext uri="{BB962C8B-B14F-4D97-AF65-F5344CB8AC3E}">
-        <p14:creationId xmlns:p14="http://schemas.microsoft.com/office/powerpoint/2010/main" val="1203532607"/>
+        <p14:creationId xmlns:p14="http://schemas.microsoft.com/office/powerpoint/2010/main" val="567259820"/>
       </p:ext>
     </p:extLst>
   </p:cSld>
@@ -11417,15 +11800,11 @@
           <a:p>
             <a:r>
               <a:rPr lang="en-US" dirty="0" smtClean="0"/>
-              <a:t>GL: Log </a:t>
-            </a:r>
-            <a:r>
-              <a:rPr lang="en-US" dirty="0" smtClean="0"/>
-              <a:t>in to </a:t>
-            </a:r>
-            <a:r>
-              <a:rPr lang="en-US" dirty="0" smtClean="0"/>
-              <a:t>your Compliance Web UI</a:t>
+              <a:t>GL: </a:t>
+            </a:r>
+            <a:r>
+              <a:rPr lang="en-US" dirty="0"/>
+              <a:t>Configure the Compliance Server</a:t>
             </a:r>
             <a:endParaRPr lang="en-US" dirty="0"/>
           </a:p>
@@ -11456,16 +11835,16 @@
               <a:buChar char="•"/>
             </a:pPr>
             <a:r>
-              <a:rPr lang="en-US" smtClean="0"/>
-              <a:t>Log </a:t>
-            </a:r>
-            <a:r>
-              <a:rPr lang="en-US" smtClean="0"/>
-              <a:t>in to </a:t>
-            </a:r>
-            <a:r>
-              <a:rPr lang="en-US" dirty="0" smtClean="0"/>
-              <a:t>your Compliance Dashboard using the admin credentials you created previously.</a:t>
+              <a:rPr lang="en-US" dirty="0" smtClean="0"/>
+              <a:t>From the resulting page, click the </a:t>
+            </a:r>
+            <a:r>
+              <a:rPr lang="en-US" b="1" dirty="0" smtClean="0"/>
+              <a:t>Setup Chef Compliance </a:t>
+            </a:r>
+            <a:r>
+              <a:rPr lang="en-US" dirty="0" smtClean="0"/>
+              <a:t>button.</a:t>
             </a:r>
             <a:endParaRPr lang="en-US" dirty="0"/>
           </a:p>
@@ -11473,7 +11852,7 @@
       </p:sp>
       <p:pic>
         <p:nvPicPr>
-          <p:cNvPr id="9" name="Picture 8"/>
+          <p:cNvPr id="3" name="Picture 2"/>
           <p:cNvPicPr>
             <a:picLocks noChangeAspect="1"/>
           </p:cNvPicPr>
@@ -11487,8 +11866,8 @@
         </p:blipFill>
         <p:spPr>
           <a:xfrm>
-            <a:off x="6053218" y="1390650"/>
-            <a:ext cx="9915445" cy="6248400"/>
+            <a:off x="7023107" y="1559018"/>
+            <a:ext cx="8521693" cy="6086923"/>
           </a:xfrm>
           <a:prstGeom prst="rect">
             <a:avLst/>
@@ -11557,7 +11936,11 @@
           <a:p>
             <a:r>
               <a:rPr lang="en-US" dirty="0" smtClean="0"/>
-              <a:t>GL: Test your Compliance Web UI</a:t>
+              <a:t>GL: </a:t>
+            </a:r>
+            <a:r>
+              <a:rPr lang="en-US" dirty="0"/>
+              <a:t>Configure the Compliance Server</a:t>
             </a:r>
             <a:endParaRPr lang="en-US" dirty="0"/>
           </a:p>
@@ -11576,45 +11959,116 @@
         <p:spPr>
           <a:xfrm>
             <a:off x="274320" y="1559018"/>
-            <a:ext cx="15270480" cy="726982"/>
+            <a:ext cx="6050280" cy="4194082"/>
           </a:xfrm>
         </p:spPr>
         <p:txBody>
           <a:bodyPr/>
           <a:lstStyle/>
           <a:p>
-            <a:r>
-              <a:rPr lang="en-US" dirty="0" smtClean="0"/>
-              <a:t>You should now see an empty Compliance Dashboard.</a:t>
-            </a:r>
+            <a:pPr marL="457200" indent="-457200">
+              <a:buFont typeface="Arial" panose="020B0604020202020204" pitchFamily="34" charset="0"/>
+              <a:buChar char="•"/>
+            </a:pPr>
+            <a:r>
+              <a:rPr lang="en-US" dirty="0" smtClean="0"/>
+              <a:t>Accept the </a:t>
+            </a:r>
+            <a:r>
+              <a:rPr lang="en-US" dirty="0"/>
+              <a:t>Online Master License and Services </a:t>
+            </a:r>
+            <a:r>
+              <a:rPr lang="en-US" dirty="0" smtClean="0"/>
+              <a:t>Agreement.</a:t>
+            </a:r>
+            <a:br>
+              <a:rPr lang="en-US" dirty="0" smtClean="0"/>
+            </a:br>
+            <a:r>
+              <a:rPr lang="en-US" dirty="0" smtClean="0"/>
+              <a:t/>
+            </a:r>
+            <a:br>
+              <a:rPr lang="en-US" dirty="0" smtClean="0"/>
+            </a:br>
+            <a:endParaRPr lang="en-US" dirty="0" smtClean="0"/>
+          </a:p>
+          <a:p>
+            <a:pPr marL="457200" indent="-457200">
+              <a:buFont typeface="Arial" panose="020B0604020202020204" pitchFamily="34" charset="0"/>
+              <a:buChar char="•"/>
+            </a:pPr>
+            <a:r>
+              <a:rPr lang="en-US" dirty="0" smtClean="0"/>
+              <a:t>Create an Administrator Account using </a:t>
+            </a:r>
+            <a:r>
+              <a:rPr lang="en-US" b="1" dirty="0" smtClean="0"/>
+              <a:t>admin/admin</a:t>
+            </a:r>
+            <a:r>
+              <a:rPr lang="en-US" dirty="0" smtClean="0"/>
+              <a:t> for credentials.</a:t>
+            </a:r>
+            <a:endParaRPr lang="en-US" dirty="0"/>
+          </a:p>
+          <a:p>
+            <a:pPr marL="457200" indent="-457200">
+              <a:buFont typeface="Arial" panose="020B0604020202020204" pitchFamily="34" charset="0"/>
+              <a:buChar char="•"/>
+            </a:pPr>
             <a:endParaRPr lang="en-US" dirty="0"/>
           </a:p>
         </p:txBody>
       </p:sp>
       <p:pic>
         <p:nvPicPr>
-          <p:cNvPr id="9" name="Picture 8" descr="Chef_Compliance_Dashboard.png"/>
+          <p:cNvPr id="4" name="Picture 3"/>
           <p:cNvPicPr>
             <a:picLocks noChangeAspect="1"/>
           </p:cNvPicPr>
           <p:nvPr/>
         </p:nvPicPr>
         <p:blipFill>
-          <a:blip r:embed="rId3">
-            <a:extLst>
-              <a:ext uri="{28A0092B-C50C-407E-A947-70E740481C1C}">
-                <a14:useLocalDpi xmlns:a14="http://schemas.microsoft.com/office/drawing/2010/main" val="0"/>
-              </a:ext>
-            </a:extLst>
-          </a:blip>
+          <a:blip r:embed="rId3"/>
           <a:stretch>
             <a:fillRect/>
           </a:stretch>
         </p:blipFill>
         <p:spPr>
           <a:xfrm>
-            <a:off x="568186" y="2313651"/>
-            <a:ext cx="15003045" cy="5589706"/>
+            <a:off x="7645939" y="1133475"/>
+            <a:ext cx="6947925" cy="2320919"/>
+          </a:xfrm>
+          <a:prstGeom prst="rect">
+            <a:avLst/>
+          </a:prstGeom>
+          <a:ln>
+            <a:solidFill>
+              <a:schemeClr val="accent1"/>
+            </a:solidFill>
+          </a:ln>
+        </p:spPr>
+      </p:pic>
+      <p:pic>
+        <p:nvPicPr>
+          <p:cNvPr id="5" name="Picture 4"/>
+          <p:cNvPicPr>
+            <a:picLocks noChangeAspect="1"/>
+          </p:cNvPicPr>
+          <p:nvPr/>
+        </p:nvPicPr>
+        <p:blipFill>
+          <a:blip r:embed="rId4"/>
+          <a:stretch>
+            <a:fillRect/>
+          </a:stretch>
+        </p:blipFill>
+        <p:spPr>
+          <a:xfrm>
+            <a:off x="7412477" y="3599816"/>
+            <a:ext cx="8179948" cy="4396827"/>
           </a:xfrm>
           <a:prstGeom prst="rect">
             <a:avLst/>
@@ -11629,7 +12083,7 @@
     </p:spTree>
     <p:extLst>
       <p:ext uri="{BB962C8B-B14F-4D97-AF65-F5344CB8AC3E}">
-        <p14:creationId xmlns:p14="http://schemas.microsoft.com/office/powerpoint/2010/main" val="2164646115"/>
+        <p14:creationId xmlns:p14="http://schemas.microsoft.com/office/powerpoint/2010/main" val="4040321699"/>
       </p:ext>
     </p:extLst>
   </p:cSld>
@@ -11673,6 +12127,404 @@
             <a:spLocks noGrp="1"/>
           </p:cNvSpPr>
           <p:nvPr>
+            <p:ph type="title"/>
+          </p:nvPr>
+        </p:nvSpPr>
+        <p:spPr/>
+        <p:txBody>
+          <a:bodyPr/>
+          <a:lstStyle/>
+          <a:p>
+            <a:r>
+              <a:rPr lang="en-US" dirty="0" smtClean="0"/>
+              <a:t>GL: </a:t>
+            </a:r>
+            <a:r>
+              <a:rPr lang="en-US" dirty="0"/>
+              <a:t>Configure the Compliance Server</a:t>
+            </a:r>
+            <a:endParaRPr lang="en-US" dirty="0"/>
+          </a:p>
+        </p:txBody>
+      </p:sp>
+      <p:sp>
+        <p:nvSpPr>
+          <p:cNvPr id="6" name="Text Placeholder 2"/>
+          <p:cNvSpPr>
+            <a:spLocks noGrp="1"/>
+          </p:cNvSpPr>
+          <p:nvPr>
+            <p:ph type="body" sz="quarter" idx="12"/>
+          </p:nvPr>
+        </p:nvSpPr>
+        <p:spPr>
+          <a:xfrm>
+            <a:off x="274320" y="1559018"/>
+            <a:ext cx="6050280" cy="4194082"/>
+          </a:xfrm>
+        </p:spPr>
+        <p:txBody>
+          <a:bodyPr/>
+          <a:lstStyle/>
+          <a:p>
+            <a:pPr marL="457200" indent="-457200">
+              <a:buFont typeface="Arial" panose="020B0604020202020204" pitchFamily="34" charset="0"/>
+              <a:buChar char="•"/>
+            </a:pPr>
+            <a:r>
+              <a:rPr lang="en-US" dirty="0" smtClean="0"/>
+              <a:t>On the resulting page click the Configure button.</a:t>
+            </a:r>
+            <a:endParaRPr lang="en-US" dirty="0"/>
+          </a:p>
+          <a:p>
+            <a:pPr marL="457200" indent="-457200">
+              <a:buFont typeface="Arial" panose="020B0604020202020204" pitchFamily="34" charset="0"/>
+              <a:buChar char="•"/>
+            </a:pPr>
+            <a:endParaRPr lang="en-US" dirty="0"/>
+          </a:p>
+        </p:txBody>
+      </p:sp>
+      <p:pic>
+        <p:nvPicPr>
+          <p:cNvPr id="7" name="Picture 6"/>
+          <p:cNvPicPr>
+            <a:picLocks noChangeAspect="1"/>
+          </p:cNvPicPr>
+          <p:nvPr/>
+        </p:nvPicPr>
+        <p:blipFill>
+          <a:blip r:embed="rId3"/>
+          <a:stretch>
+            <a:fillRect/>
+          </a:stretch>
+        </p:blipFill>
+        <p:spPr>
+          <a:xfrm>
+            <a:off x="7840494" y="1360455"/>
+            <a:ext cx="7490298" cy="3583004"/>
+          </a:xfrm>
+          <a:prstGeom prst="rect">
+            <a:avLst/>
+          </a:prstGeom>
+          <a:ln>
+            <a:solidFill>
+              <a:schemeClr val="accent1"/>
+            </a:solidFill>
+          </a:ln>
+        </p:spPr>
+      </p:pic>
+    </p:spTree>
+    <p:extLst>
+      <p:ext uri="{BB962C8B-B14F-4D97-AF65-F5344CB8AC3E}">
+        <p14:creationId xmlns:p14="http://schemas.microsoft.com/office/powerpoint/2010/main" val="160485978"/>
+      </p:ext>
+    </p:extLst>
+  </p:cSld>
+  <p:clrMapOvr>
+    <a:masterClrMapping/>
+  </p:clrMapOvr>
+  <p:transition spd="med">
+    <p:fade/>
+  </p:transition>
+  <p:timing>
+    <p:tnLst>
+      <p:par>
+        <p:cTn id="1" dur="indefinite" restart="never" nodeType="tmRoot"/>
+      </p:par>
+    </p:tnLst>
+  </p:timing>
+</p:sld>
+</file>
+
+<file path=ppt/slides/slide15.xml><?xml version="1.0" encoding="utf-8"?>
+<p:sld xmlns:a="http://schemas.openxmlformats.org/drawingml/2006/main" xmlns:r="http://schemas.openxmlformats.org/officeDocument/2006/relationships" xmlns:p="http://schemas.openxmlformats.org/presentationml/2006/main">
+  <p:cSld>
+    <p:spTree>
+      <p:nvGrpSpPr>
+        <p:cNvPr id="1" name=""/>
+        <p:cNvGrpSpPr/>
+        <p:nvPr/>
+      </p:nvGrpSpPr>
+      <p:grpSpPr>
+        <a:xfrm>
+          <a:off x="0" y="0"/>
+          <a:ext cx="0" cy="0"/>
+          <a:chOff x="0" y="0"/>
+          <a:chExt cx="0" cy="0"/>
+        </a:xfrm>
+      </p:grpSpPr>
+      <p:sp>
+        <p:nvSpPr>
+          <p:cNvPr id="2" name="Title 1"/>
+          <p:cNvSpPr>
+            <a:spLocks noGrp="1"/>
+          </p:cNvSpPr>
+          <p:nvPr>
+            <p:ph type="title"/>
+          </p:nvPr>
+        </p:nvSpPr>
+        <p:spPr/>
+        <p:txBody>
+          <a:bodyPr/>
+          <a:lstStyle/>
+          <a:p>
+            <a:r>
+              <a:rPr lang="en-US" dirty="0" smtClean="0"/>
+              <a:t>GL: </a:t>
+            </a:r>
+            <a:r>
+              <a:rPr lang="en-US" dirty="0"/>
+              <a:t>Configure the Compliance Server</a:t>
+            </a:r>
+            <a:endParaRPr lang="en-US" dirty="0"/>
+          </a:p>
+        </p:txBody>
+      </p:sp>
+      <p:sp>
+        <p:nvSpPr>
+          <p:cNvPr id="6" name="Text Placeholder 2"/>
+          <p:cNvSpPr>
+            <a:spLocks noGrp="1"/>
+          </p:cNvSpPr>
+          <p:nvPr>
+            <p:ph type="body" sz="quarter" idx="12"/>
+          </p:nvPr>
+        </p:nvSpPr>
+        <p:spPr>
+          <a:xfrm>
+            <a:off x="274320" y="1559018"/>
+            <a:ext cx="6050280" cy="4194082"/>
+          </a:xfrm>
+        </p:spPr>
+        <p:txBody>
+          <a:bodyPr/>
+          <a:lstStyle/>
+          <a:p>
+            <a:pPr marL="457200" indent="-457200">
+              <a:buFont typeface="Arial" panose="020B0604020202020204" pitchFamily="34" charset="0"/>
+              <a:buChar char="•"/>
+            </a:pPr>
+            <a:r>
+              <a:rPr lang="en-US" dirty="0" smtClean="0"/>
+              <a:t>On the resulting page sign in using admin/adm</a:t>
+            </a:r>
+            <a:r>
+              <a:rPr lang="en-US" dirty="0" smtClean="0"/>
+              <a:t>in.</a:t>
+            </a:r>
+            <a:endParaRPr lang="en-US" dirty="0"/>
+          </a:p>
+          <a:p>
+            <a:pPr marL="457200" indent="-457200">
+              <a:buFont typeface="Arial" panose="020B0604020202020204" pitchFamily="34" charset="0"/>
+              <a:buChar char="•"/>
+            </a:pPr>
+            <a:endParaRPr lang="en-US" dirty="0"/>
+          </a:p>
+        </p:txBody>
+      </p:sp>
+      <p:pic>
+        <p:nvPicPr>
+          <p:cNvPr id="3" name="Picture 2"/>
+          <p:cNvPicPr>
+            <a:picLocks noChangeAspect="1"/>
+          </p:cNvPicPr>
+          <p:nvPr/>
+        </p:nvPicPr>
+        <p:blipFill>
+          <a:blip r:embed="rId3"/>
+          <a:stretch>
+            <a:fillRect/>
+          </a:stretch>
+        </p:blipFill>
+        <p:spPr>
+          <a:xfrm>
+            <a:off x="8259221" y="1133475"/>
+            <a:ext cx="6391275" cy="6696075"/>
+          </a:xfrm>
+          <a:prstGeom prst="rect">
+            <a:avLst/>
+          </a:prstGeom>
+          <a:ln>
+            <a:solidFill>
+              <a:schemeClr val="accent1"/>
+            </a:solidFill>
+          </a:ln>
+        </p:spPr>
+      </p:pic>
+    </p:spTree>
+    <p:extLst>
+      <p:ext uri="{BB962C8B-B14F-4D97-AF65-F5344CB8AC3E}">
+        <p14:creationId xmlns:p14="http://schemas.microsoft.com/office/powerpoint/2010/main" val="927861609"/>
+      </p:ext>
+    </p:extLst>
+  </p:cSld>
+  <p:clrMapOvr>
+    <a:masterClrMapping/>
+  </p:clrMapOvr>
+  <p:transition spd="med">
+    <p:fade/>
+  </p:transition>
+  <p:timing>
+    <p:tnLst>
+      <p:par>
+        <p:cTn id="1" dur="indefinite" restart="never" nodeType="tmRoot"/>
+      </p:par>
+    </p:tnLst>
+  </p:timing>
+</p:sld>
+</file>
+
+<file path=ppt/slides/slide16.xml><?xml version="1.0" encoding="utf-8"?>
+<p:sld xmlns:a="http://schemas.openxmlformats.org/drawingml/2006/main" xmlns:r="http://schemas.openxmlformats.org/officeDocument/2006/relationships" xmlns:p="http://schemas.openxmlformats.org/presentationml/2006/main">
+  <p:cSld>
+    <p:spTree>
+      <p:nvGrpSpPr>
+        <p:cNvPr id="1" name=""/>
+        <p:cNvGrpSpPr/>
+        <p:nvPr/>
+      </p:nvGrpSpPr>
+      <p:grpSpPr>
+        <a:xfrm>
+          <a:off x="0" y="0"/>
+          <a:ext cx="0" cy="0"/>
+          <a:chOff x="0" y="0"/>
+          <a:chExt cx="0" cy="0"/>
+        </a:xfrm>
+      </p:grpSpPr>
+      <p:sp>
+        <p:nvSpPr>
+          <p:cNvPr id="2" name="Title 1"/>
+          <p:cNvSpPr>
+            <a:spLocks noGrp="1"/>
+          </p:cNvSpPr>
+          <p:nvPr>
+            <p:ph type="title"/>
+          </p:nvPr>
+        </p:nvSpPr>
+        <p:spPr/>
+        <p:txBody>
+          <a:bodyPr/>
+          <a:lstStyle/>
+          <a:p>
+            <a:r>
+              <a:rPr lang="en-US" dirty="0" smtClean="0"/>
+              <a:t>GL: </a:t>
+            </a:r>
+            <a:r>
+              <a:rPr lang="en-US" dirty="0"/>
+              <a:t>Configure the Compliance Server</a:t>
+            </a:r>
+            <a:endParaRPr lang="en-US" dirty="0"/>
+          </a:p>
+        </p:txBody>
+      </p:sp>
+      <p:sp>
+        <p:nvSpPr>
+          <p:cNvPr id="6" name="Text Placeholder 2"/>
+          <p:cNvSpPr>
+            <a:spLocks noGrp="1"/>
+          </p:cNvSpPr>
+          <p:nvPr>
+            <p:ph type="body" sz="quarter" idx="12"/>
+          </p:nvPr>
+        </p:nvSpPr>
+        <p:spPr>
+          <a:xfrm>
+            <a:off x="274320" y="1559018"/>
+            <a:ext cx="6107025" cy="5308710"/>
+          </a:xfrm>
+        </p:spPr>
+        <p:txBody>
+          <a:bodyPr/>
+          <a:lstStyle/>
+          <a:p>
+            <a:r>
+              <a:rPr lang="en-US" dirty="0" smtClean="0"/>
+              <a:t>You should now see an empty Compliance Dashboard.</a:t>
+            </a:r>
+            <a:endParaRPr lang="en-US" dirty="0"/>
+          </a:p>
+        </p:txBody>
+      </p:sp>
+      <p:pic>
+        <p:nvPicPr>
+          <p:cNvPr id="3" name="Picture 2"/>
+          <p:cNvPicPr>
+            <a:picLocks noChangeAspect="1"/>
+          </p:cNvPicPr>
+          <p:nvPr/>
+        </p:nvPicPr>
+        <p:blipFill>
+          <a:blip r:embed="rId3"/>
+          <a:stretch>
+            <a:fillRect/>
+          </a:stretch>
+        </p:blipFill>
+        <p:spPr>
+          <a:xfrm>
+            <a:off x="6761417" y="1559018"/>
+            <a:ext cx="9095918" cy="5791200"/>
+          </a:xfrm>
+          <a:prstGeom prst="rect">
+            <a:avLst/>
+          </a:prstGeom>
+          <a:ln>
+            <a:solidFill>
+              <a:schemeClr val="accent1"/>
+            </a:solidFill>
+          </a:ln>
+        </p:spPr>
+      </p:pic>
+    </p:spTree>
+    <p:extLst>
+      <p:ext uri="{BB962C8B-B14F-4D97-AF65-F5344CB8AC3E}">
+        <p14:creationId xmlns:p14="http://schemas.microsoft.com/office/powerpoint/2010/main" val="2164646115"/>
+      </p:ext>
+    </p:extLst>
+  </p:cSld>
+  <p:clrMapOvr>
+    <a:masterClrMapping/>
+  </p:clrMapOvr>
+  <p:transition spd="med">
+    <p:fade/>
+  </p:transition>
+  <p:timing>
+    <p:tnLst>
+      <p:par>
+        <p:cTn id="1" dur="indefinite" restart="never" nodeType="tmRoot"/>
+      </p:par>
+    </p:tnLst>
+  </p:timing>
+</p:sld>
+</file>
+
+<file path=ppt/slides/slide17.xml><?xml version="1.0" encoding="utf-8"?>
+<p:sld xmlns:a="http://schemas.openxmlformats.org/drawingml/2006/main" xmlns:r="http://schemas.openxmlformats.org/officeDocument/2006/relationships" xmlns:p="http://schemas.openxmlformats.org/presentationml/2006/main">
+  <p:cSld>
+    <p:spTree>
+      <p:nvGrpSpPr>
+        <p:cNvPr id="1" name=""/>
+        <p:cNvGrpSpPr/>
+        <p:nvPr/>
+      </p:nvGrpSpPr>
+      <p:grpSpPr>
+        <a:xfrm>
+          <a:off x="0" y="0"/>
+          <a:ext cx="0" cy="0"/>
+          <a:chOff x="0" y="0"/>
+          <a:chExt cx="0" cy="0"/>
+        </a:xfrm>
+      </p:grpSpPr>
+      <p:sp>
+        <p:nvSpPr>
+          <p:cNvPr id="2" name="Title 1"/>
+          <p:cNvSpPr>
+            <a:spLocks noGrp="1"/>
+          </p:cNvSpPr>
+          <p:nvPr>
             <p:ph type="ctrTitle"/>
           </p:nvPr>
         </p:nvSpPr>
@@ -11833,7 +12685,7 @@
 </p:sld>
 </file>
 
-<file path=ppt/slides/slide15.xml><?xml version="1.0" encoding="utf-8"?>
+<file path=ppt/slides/slide18.xml><?xml version="1.0" encoding="utf-8"?>
 <p:sld xmlns:a="http://schemas.openxmlformats.org/drawingml/2006/main" xmlns:r="http://schemas.openxmlformats.org/officeDocument/2006/relationships" xmlns:p="http://schemas.openxmlformats.org/presentationml/2006/main">
   <p:cSld>
     <p:bg>
@@ -12013,7 +12865,7 @@
 </p:sld>
 </file>
 
-<file path=ppt/slides/slide16.xml><?xml version="1.0" encoding="utf-8"?>
+<file path=ppt/slides/slide19.xml><?xml version="1.0" encoding="utf-8"?>
 <p:sld xmlns:a="http://schemas.openxmlformats.org/drawingml/2006/main" xmlns:r="http://schemas.openxmlformats.org/officeDocument/2006/relationships" xmlns:p="http://schemas.openxmlformats.org/presentationml/2006/main">
   <p:cSld>
     <p:spTree>
@@ -12574,15 +13426,7 @@
             </a:pPr>
             <a:r>
               <a:rPr lang="en-US" dirty="0" smtClean="0"/>
-              <a:t>ssh </a:t>
-            </a:r>
-            <a:r>
-              <a:rPr lang="en-US" dirty="0" smtClean="0"/>
-              <a:t>in to </a:t>
-            </a:r>
-            <a:r>
-              <a:rPr lang="en-US" dirty="0" smtClean="0"/>
-              <a:t>your Compliance Server node</a:t>
+              <a:t>ssh in to your Compliance Server node</a:t>
             </a:r>
           </a:p>
           <a:p>
@@ -12737,15 +13581,7 @@
             </a:pPr>
             <a:r>
               <a:rPr lang="en-US" dirty="0" smtClean="0"/>
-              <a:t>ssh </a:t>
-            </a:r>
-            <a:r>
-              <a:rPr lang="en-US" dirty="0" smtClean="0"/>
-              <a:t>in to </a:t>
-            </a:r>
-            <a:r>
-              <a:rPr lang="en-US" dirty="0" smtClean="0"/>
-              <a:t>the node you want to install the Compliance server on. </a:t>
+              <a:t>ssh in to the node you want to install the Compliance server on. </a:t>
             </a:r>
           </a:p>
           <a:p>
@@ -14974,6 +15810,52 @@
 </file>
 
 <file path=customXml/item1.xml><?xml version="1.0" encoding="utf-8"?>
+<?mso-contentType ?>
+<spe:Receivers xmlns:spe="http://schemas.microsoft.com/sharepoint/events">
+  <Receiver>
+    <Name>Document ID Generator</Name>
+    <Synchronization>Synchronous</Synchronization>
+    <Type>10001</Type>
+    <SequenceNumber>1000</SequenceNumber>
+    <Assembly>Microsoft.Office.DocumentManagement, Version=14.0.0.0, Culture=neutral, PublicKeyToken=71e9bce111e9429c</Assembly>
+    <Class>Microsoft.Office.DocumentManagement.Internal.DocIdHandler</Class>
+    <Data/>
+    <Filter/>
+  </Receiver>
+  <Receiver>
+    <Name>Document ID Generator</Name>
+    <Synchronization>Synchronous</Synchronization>
+    <Type>10002</Type>
+    <SequenceNumber>1001</SequenceNumber>
+    <Assembly>Microsoft.Office.DocumentManagement, Version=14.0.0.0, Culture=neutral, PublicKeyToken=71e9bce111e9429c</Assembly>
+    <Class>Microsoft.Office.DocumentManagement.Internal.DocIdHandler</Class>
+    <Data/>
+    <Filter/>
+  </Receiver>
+  <Receiver>
+    <Name>Document ID Generator</Name>
+    <Synchronization>Synchronous</Synchronization>
+    <Type>10004</Type>
+    <SequenceNumber>1002</SequenceNumber>
+    <Assembly>Microsoft.Office.DocumentManagement, Version=14.0.0.0, Culture=neutral, PublicKeyToken=71e9bce111e9429c</Assembly>
+    <Class>Microsoft.Office.DocumentManagement.Internal.DocIdHandler</Class>
+    <Data/>
+    <Filter/>
+  </Receiver>
+  <Receiver>
+    <Name>Document ID Generator</Name>
+    <Synchronization>Synchronous</Synchronization>
+    <Type>10006</Type>
+    <SequenceNumber>1003</SequenceNumber>
+    <Assembly>Microsoft.Office.DocumentManagement, Version=14.0.0.0, Culture=neutral, PublicKeyToken=71e9bce111e9429c</Assembly>
+    <Class>Microsoft.Office.DocumentManagement.Internal.DocIdHandler</Class>
+    <Data/>
+    <Filter/>
+  </Receiver>
+</spe:Receivers>
+</file>
+
+<file path=customXml/item2.xml><?xml version="1.0" encoding="utf-8"?>
 <ct:contentTypeSchema xmlns:ct="http://schemas.microsoft.com/office/2006/metadata/contentType" xmlns:ma="http://schemas.microsoft.com/office/2006/metadata/properties/metaAttributes" ct:_="" ma:_="" ma:contentTypeName="Document" ma:contentTypeID="0x0101000812F700BE7F874999720E88173FE491" ma:contentTypeVersion="0" ma:contentTypeDescription="Create a new document." ma:contentTypeScope="" ma:versionID="3f79f408e2ca720b7aba6e0e32464d0c">
   <xsd:schema xmlns:xsd="http://www.w3.org/2001/XMLSchema" xmlns:xs="http://www.w3.org/2001/XMLSchema" xmlns:p="http://schemas.microsoft.com/office/2006/metadata/properties" xmlns:ns2="7bb5d761-a2ea-4873-95f7-7a6658fb3ef0" targetNamespace="http://schemas.microsoft.com/office/2006/metadata/properties" ma:root="true" ma:fieldsID="1e062cd38ba31e406bfc4340fbc7f87a" ns2:_="">
     <xsd:import namespace="7bb5d761-a2ea-4873-95f7-7a6658fb3ef0"/>
@@ -15118,62 +16000,7 @@
 </ct:contentTypeSchema>
 </file>
 
-<file path=customXml/item2.xml><?xml version="1.0" encoding="utf-8"?>
-<?mso-contentType ?>
-<spe:Receivers xmlns:spe="http://schemas.microsoft.com/sharepoint/events">
-  <Receiver>
-    <Name>Document ID Generator</Name>
-    <Synchronization>Synchronous</Synchronization>
-    <Type>10001</Type>
-    <SequenceNumber>1000</SequenceNumber>
-    <Assembly>Microsoft.Office.DocumentManagement, Version=14.0.0.0, Culture=neutral, PublicKeyToken=71e9bce111e9429c</Assembly>
-    <Class>Microsoft.Office.DocumentManagement.Internal.DocIdHandler</Class>
-    <Data/>
-    <Filter/>
-  </Receiver>
-  <Receiver>
-    <Name>Document ID Generator</Name>
-    <Synchronization>Synchronous</Synchronization>
-    <Type>10002</Type>
-    <SequenceNumber>1001</SequenceNumber>
-    <Assembly>Microsoft.Office.DocumentManagement, Version=14.0.0.0, Culture=neutral, PublicKeyToken=71e9bce111e9429c</Assembly>
-    <Class>Microsoft.Office.DocumentManagement.Internal.DocIdHandler</Class>
-    <Data/>
-    <Filter/>
-  </Receiver>
-  <Receiver>
-    <Name>Document ID Generator</Name>
-    <Synchronization>Synchronous</Synchronization>
-    <Type>10004</Type>
-    <SequenceNumber>1002</SequenceNumber>
-    <Assembly>Microsoft.Office.DocumentManagement, Version=14.0.0.0, Culture=neutral, PublicKeyToken=71e9bce111e9429c</Assembly>
-    <Class>Microsoft.Office.DocumentManagement.Internal.DocIdHandler</Class>
-    <Data/>
-    <Filter/>
-  </Receiver>
-  <Receiver>
-    <Name>Document ID Generator</Name>
-    <Synchronization>Synchronous</Synchronization>
-    <Type>10006</Type>
-    <SequenceNumber>1003</SequenceNumber>
-    <Assembly>Microsoft.Office.DocumentManagement, Version=14.0.0.0, Culture=neutral, PublicKeyToken=71e9bce111e9429c</Assembly>
-    <Class>Microsoft.Office.DocumentManagement.Internal.DocIdHandler</Class>
-    <Data/>
-    <Filter/>
-  </Receiver>
-</spe:Receivers>
-</file>
-
 <file path=customXml/item3.xml><?xml version="1.0" encoding="utf-8"?>
-<?mso-contentType ?>
-<FormTemplates xmlns="http://schemas.microsoft.com/sharepoint/v3/contenttype/forms">
-  <Display>DocumentLibraryForm</Display>
-  <Edit>DocumentLibraryForm</Edit>
-  <New>DocumentLibraryForm</New>
-</FormTemplates>
-</file>
-
-<file path=customXml/item4.xml><?xml version="1.0" encoding="utf-8"?>
 <p:properties xmlns:p="http://schemas.microsoft.com/office/2006/metadata/properties" xmlns:xsi="http://www.w3.org/2001/XMLSchema-instance" xmlns:pc="http://schemas.microsoft.com/office/infopath/2007/PartnerControls">
   <documentManagement>
     <_dlc_DocId xmlns="7bb5d761-a2ea-4873-95f7-7a6658fb3ef0">M4CWTKMW727E-592-73</_dlc_DocId>
@@ -15185,7 +16012,24 @@
 </p:properties>
 </file>
 
+<file path=customXml/item4.xml><?xml version="1.0" encoding="utf-8"?>
+<?mso-contentType ?>
+<FormTemplates xmlns="http://schemas.microsoft.com/sharepoint/v3/contenttype/forms">
+  <Display>DocumentLibraryForm</Display>
+  <Edit>DocumentLibraryForm</Edit>
+  <New>DocumentLibraryForm</New>
+</FormTemplates>
+</file>
+
 <file path=customXml/itemProps1.xml><?xml version="1.0" encoding="utf-8"?>
+<ds:datastoreItem xmlns:ds="http://schemas.openxmlformats.org/officeDocument/2006/customXml" ds:itemID="{B13EBC30-FE27-4C6A-B723-23FC2188F7DC}">
+  <ds:schemaRefs>
+    <ds:schemaRef ds:uri="http://schemas.microsoft.com/sharepoint/events"/>
+  </ds:schemaRefs>
+</ds:datastoreItem>
+</file>
+
+<file path=customXml/itemProps2.xml><?xml version="1.0" encoding="utf-8"?>
 <ds:datastoreItem xmlns:ds="http://schemas.openxmlformats.org/officeDocument/2006/customXml" ds:itemID="{164479E5-0B02-49AC-B79E-EC1D6164DDD3}">
   <ds:schemaRefs>
     <ds:schemaRef ds:uri="http://schemas.microsoft.com/office/2006/metadata/contentType"/>
@@ -15203,23 +16047,7 @@
 </ds:datastoreItem>
 </file>
 
-<file path=customXml/itemProps2.xml><?xml version="1.0" encoding="utf-8"?>
-<ds:datastoreItem xmlns:ds="http://schemas.openxmlformats.org/officeDocument/2006/customXml" ds:itemID="{B13EBC30-FE27-4C6A-B723-23FC2188F7DC}">
-  <ds:schemaRefs>
-    <ds:schemaRef ds:uri="http://schemas.microsoft.com/sharepoint/events"/>
-  </ds:schemaRefs>
-</ds:datastoreItem>
-</file>
-
 <file path=customXml/itemProps3.xml><?xml version="1.0" encoding="utf-8"?>
-<ds:datastoreItem xmlns:ds="http://schemas.openxmlformats.org/officeDocument/2006/customXml" ds:itemID="{5CDEB364-43EC-4510-9881-539C2A3FCE9E}">
-  <ds:schemaRefs>
-    <ds:schemaRef ds:uri="http://schemas.microsoft.com/sharepoint/v3/contenttype/forms"/>
-  </ds:schemaRefs>
-</ds:datastoreItem>
-</file>
-
-<file path=customXml/itemProps4.xml><?xml version="1.0" encoding="utf-8"?>
 <ds:datastoreItem xmlns:ds="http://schemas.openxmlformats.org/officeDocument/2006/customXml" ds:itemID="{6921749B-AEB7-461B-845F-603CABD25259}">
   <ds:schemaRefs>
     <ds:schemaRef ds:uri="http://schemas.microsoft.com/office/2006/documentManagement/types"/>
@@ -15233,4 +16061,12 @@
     <ds:schemaRef ds:uri="http://purl.org/dc/dcmitype/"/>
   </ds:schemaRefs>
 </ds:datastoreItem>
+</file>
+
+<file path=customXml/itemProps4.xml><?xml version="1.0" encoding="utf-8"?>
+<ds:datastoreItem xmlns:ds="http://schemas.openxmlformats.org/officeDocument/2006/customXml" ds:itemID="{5CDEB364-43EC-4510-9881-539C2A3FCE9E}">
+  <ds:schemaRefs>
+    <ds:schemaRef ds:uri="http://schemas.microsoft.com/sharepoint/v3/contenttype/forms"/>
+  </ds:schemaRefs>
+</ds:datastoreItem>
 </file>
</xml_diff>

<commit_message>
modified 02-Install.pptx slides 2-6 and 2-7 standalone install Made instrictor note a speaker note on 2-18 Compliance Upgrades
</commit_message>
<xml_diff>
--- a/02-Install.pptx
+++ b/02-Install.pptx
@@ -6,10 +6,10 @@
     <p:sldMasterId id="2147483847" r:id="rId6"/>
   </p:sldMasterIdLst>
   <p:notesMasterIdLst>
-    <p:notesMasterId r:id="rId26"/>
+    <p:notesMasterId r:id="rId27"/>
   </p:notesMasterIdLst>
   <p:handoutMasterIdLst>
-    <p:handoutMasterId r:id="rId27"/>
+    <p:handoutMasterId r:id="rId28"/>
   </p:handoutMasterIdLst>
   <p:sldIdLst>
     <p:sldId id="256" r:id="rId7"/>
@@ -19,18 +19,19 @@
     <p:sldId id="283" r:id="rId11"/>
     <p:sldId id="285" r:id="rId12"/>
     <p:sldId id="286" r:id="rId13"/>
-    <p:sldId id="278" r:id="rId14"/>
-    <p:sldId id="279" r:id="rId15"/>
-    <p:sldId id="288" r:id="rId16"/>
-    <p:sldId id="291" r:id="rId17"/>
-    <p:sldId id="280" r:id="rId18"/>
-    <p:sldId id="292" r:id="rId19"/>
-    <p:sldId id="293" r:id="rId20"/>
-    <p:sldId id="294" r:id="rId21"/>
-    <p:sldId id="289" r:id="rId22"/>
-    <p:sldId id="290" r:id="rId23"/>
-    <p:sldId id="276" r:id="rId24"/>
-    <p:sldId id="267" r:id="rId25"/>
+    <p:sldId id="295" r:id="rId14"/>
+    <p:sldId id="278" r:id="rId15"/>
+    <p:sldId id="279" r:id="rId16"/>
+    <p:sldId id="288" r:id="rId17"/>
+    <p:sldId id="291" r:id="rId18"/>
+    <p:sldId id="280" r:id="rId19"/>
+    <p:sldId id="292" r:id="rId20"/>
+    <p:sldId id="293" r:id="rId21"/>
+    <p:sldId id="294" r:id="rId22"/>
+    <p:sldId id="289" r:id="rId23"/>
+    <p:sldId id="290" r:id="rId24"/>
+    <p:sldId id="276" r:id="rId25"/>
+    <p:sldId id="267" r:id="rId26"/>
   </p:sldIdLst>
   <p:sldSz cx="16256000" cy="9144000"/>
   <p:notesSz cx="6858000" cy="9144000"/>
@@ -292,7 +293,7 @@
               <a:pPr>
                 <a:defRPr/>
               </a:pPr>
-              <a:t>2016-01-28</a:t>
+              <a:t>2016-02-03</a:t>
             </a:fld>
             <a:endParaRPr lang="en-US" dirty="0"/>
           </a:p>
@@ -475,7 +476,7 @@
               <a:pPr>
                 <a:defRPr/>
               </a:pPr>
-              <a:t>2016-01-28</a:t>
+              <a:t>2016-02-03</a:t>
             </a:fld>
             <a:endParaRPr lang="en-US" dirty="0"/>
           </a:p>
@@ -920,28 +921,6 @@
           <a:bodyPr/>
           <a:lstStyle/>
           <a:p>
-            <a:r>
-              <a:rPr lang="en-US" dirty="0" smtClean="0"/>
-              <a:t>You can install the Chef Compliance server as a an Amazon Machine Images (AMI) instance or as a Standalone installation.</a:t>
-            </a:r>
-          </a:p>
-          <a:p>
-            <a:endParaRPr lang="en-US" dirty="0" smtClean="0"/>
-          </a:p>
-          <a:p>
-            <a:r>
-              <a:rPr lang="en-US" dirty="0" smtClean="0"/>
-              <a:t>The standalone installation of Chef Compliance server creates a working installation on a single server. </a:t>
-            </a:r>
-          </a:p>
-          <a:p>
-            <a:endParaRPr lang="en-US" dirty="0" smtClean="0"/>
-          </a:p>
-          <a:p>
-            <a:r>
-              <a:rPr lang="en-US" dirty="0" smtClean="0"/>
-              <a:t>This installation is also useful when you are installing Chef Compliance in a virtual machine, for proof-of-concept deployments, or as a part of a development or testing loop</a:t>
-            </a:r>
             <a:endParaRPr lang="en-US" dirty="0"/>
           </a:p>
         </p:txBody>
@@ -969,7 +948,7 @@
               <a:pPr>
                 <a:defRPr/>
               </a:pPr>
-              <a:t>3</a:t>
+              <a:t>1</a:t>
             </a:fld>
             <a:endParaRPr lang="en-US" dirty="0"/>
           </a:p>
@@ -1022,7 +1001,7 @@
     </p:spTree>
     <p:extLst>
       <p:ext uri="{BB962C8B-B14F-4D97-AF65-F5344CB8AC3E}">
-        <p14:creationId xmlns:p14="http://schemas.microsoft.com/office/powerpoint/2010/main" val="1083675655"/>
+        <p14:creationId xmlns:p14="http://schemas.microsoft.com/office/powerpoint/2010/main" val="2437767239"/>
       </p:ext>
     </p:extLst>
   </p:cSld>
@@ -1076,10 +1055,6 @@
           <a:bodyPr/>
           <a:lstStyle/>
           <a:p>
-            <a:r>
-              <a:rPr lang="en-US" dirty="0" smtClean="0"/>
-              <a:t>We have not set up SSL so the https strikethrough is fine for now. In the workplace you would want to use SSL for connections to your Compliance Web UI.</a:t>
-            </a:r>
             <a:endParaRPr lang="en-US" dirty="0"/>
           </a:p>
         </p:txBody>
@@ -1107,7 +1082,7 @@
               <a:pPr>
                 <a:defRPr/>
               </a:pPr>
-              <a:t>12</a:t>
+              <a:t>11</a:t>
             </a:fld>
             <a:endParaRPr lang="en-US" dirty="0"/>
           </a:p>
@@ -1160,7 +1135,7 @@
     </p:spTree>
     <p:extLst>
       <p:ext uri="{BB962C8B-B14F-4D97-AF65-F5344CB8AC3E}">
-        <p14:creationId xmlns:p14="http://schemas.microsoft.com/office/powerpoint/2010/main" val="694977390"/>
+        <p14:creationId xmlns:p14="http://schemas.microsoft.com/office/powerpoint/2010/main" val="667353389"/>
       </p:ext>
     </p:extLst>
   </p:cSld>
@@ -1216,11 +1191,7 @@
           <a:p>
             <a:r>
               <a:rPr lang="en-US" dirty="0" smtClean="0"/>
-              <a:t>In</a:t>
-            </a:r>
-            <a:r>
-              <a:rPr lang="en-US" baseline="0" dirty="0" smtClean="0"/>
-              <a:t> the workplace you should of course create a more secure password.</a:t>
+              <a:t>We have not set up SSL so the https strikethrough is fine for now. In the workplace you would want to use SSL for connections to your Compliance Web UI.</a:t>
             </a:r>
             <a:endParaRPr lang="en-US" dirty="0"/>
           </a:p>
@@ -1249,7 +1220,7 @@
               <a:pPr>
                 <a:defRPr/>
               </a:pPr>
-              <a:t>13</a:t>
+              <a:t>12</a:t>
             </a:fld>
             <a:endParaRPr lang="en-US" dirty="0"/>
           </a:p>
@@ -1302,7 +1273,7 @@
     </p:spTree>
     <p:extLst>
       <p:ext uri="{BB962C8B-B14F-4D97-AF65-F5344CB8AC3E}">
-        <p14:creationId xmlns:p14="http://schemas.microsoft.com/office/powerpoint/2010/main" val="2225630033"/>
+        <p14:creationId xmlns:p14="http://schemas.microsoft.com/office/powerpoint/2010/main" val="3756941173"/>
       </p:ext>
     </p:extLst>
   </p:cSld>
@@ -1356,6 +1327,10 @@
           <a:bodyPr/>
           <a:lstStyle/>
           <a:p>
+            <a:r>
+              <a:rPr lang="en-US" dirty="0" smtClean="0"/>
+              <a:t>We have not set up SSL so the https strikethrough is fine for now. In the workplace you would want to use SSL for connections to your Compliance Web UI.</a:t>
+            </a:r>
             <a:endParaRPr lang="en-US" dirty="0"/>
           </a:p>
         </p:txBody>
@@ -1383,7 +1358,7 @@
               <a:pPr>
                 <a:defRPr/>
               </a:pPr>
-              <a:t>14</a:t>
+              <a:t>13</a:t>
             </a:fld>
             <a:endParaRPr lang="en-US" dirty="0"/>
           </a:p>
@@ -1436,7 +1411,7 @@
     </p:spTree>
     <p:extLst>
       <p:ext uri="{BB962C8B-B14F-4D97-AF65-F5344CB8AC3E}">
-        <p14:creationId xmlns:p14="http://schemas.microsoft.com/office/powerpoint/2010/main" val="1105980774"/>
+        <p14:creationId xmlns:p14="http://schemas.microsoft.com/office/powerpoint/2010/main" val="694977390"/>
       </p:ext>
     </p:extLst>
   </p:cSld>
@@ -1490,6 +1465,14 @@
           <a:bodyPr/>
           <a:lstStyle/>
           <a:p>
+            <a:r>
+              <a:rPr lang="en-US" dirty="0" smtClean="0"/>
+              <a:t>In</a:t>
+            </a:r>
+            <a:r>
+              <a:rPr lang="en-US" baseline="0" dirty="0" smtClean="0"/>
+              <a:t> the workplace you should of course create a more secure password.</a:t>
+            </a:r>
             <a:endParaRPr lang="en-US" dirty="0"/>
           </a:p>
         </p:txBody>
@@ -1517,7 +1500,7 @@
               <a:pPr>
                 <a:defRPr/>
               </a:pPr>
-              <a:t>15</a:t>
+              <a:t>14</a:t>
             </a:fld>
             <a:endParaRPr lang="en-US" dirty="0"/>
           </a:p>
@@ -1570,7 +1553,7 @@
     </p:spTree>
     <p:extLst>
       <p:ext uri="{BB962C8B-B14F-4D97-AF65-F5344CB8AC3E}">
-        <p14:creationId xmlns:p14="http://schemas.microsoft.com/office/powerpoint/2010/main" val="3591492319"/>
+        <p14:creationId xmlns:p14="http://schemas.microsoft.com/office/powerpoint/2010/main" val="2225630033"/>
       </p:ext>
     </p:extLst>
   </p:cSld>
@@ -1624,59 +1607,6 @@
           <a:bodyPr/>
           <a:lstStyle/>
           <a:p>
-            <a:r>
-              <a:rPr lang="en-US" dirty="0" smtClean="0"/>
-              <a:t>In the workplace you would want to use SSL for connections to your Compliance Web UI.</a:t>
-            </a:r>
-          </a:p>
-          <a:p>
-            <a:endParaRPr lang="en-US" dirty="0" smtClean="0"/>
-          </a:p>
-          <a:p>
-            <a:endParaRPr lang="en-US" dirty="0" smtClean="0"/>
-          </a:p>
-          <a:p>
-            <a:pPr marL="0" marR="0" indent="0" algn="l" defTabSz="1217613" rtl="0" eaLnBrk="1" fontAlgn="base" latinLnBrk="0" hangingPunct="1">
-              <a:lnSpc>
-                <a:spcPct val="90000"/>
-              </a:lnSpc>
-              <a:spcBef>
-                <a:spcPct val="30000"/>
-              </a:spcBef>
-              <a:spcAft>
-                <a:spcPts val="450"/>
-              </a:spcAft>
-              <a:buClrTx/>
-              <a:buSzTx/>
-              <a:buFontTx/>
-              <a:buNone/>
-              <a:tabLst/>
-              <a:defRPr/>
-            </a:pPr>
-            <a:r>
-              <a:rPr lang="en-US" dirty="0" smtClean="0"/>
-              <a:t>https://docs.chef.io/install_compliance.html &gt; </a:t>
-            </a:r>
-            <a:r>
-              <a:rPr lang="en-US" sz="1200" b="0" i="0" kern="1200" dirty="0" smtClean="0">
-                <a:solidFill>
-                  <a:schemeClr val="tx1"/>
-                </a:solidFill>
-                <a:effectLst/>
-                <a:latin typeface="Arial" panose="020B0604020202020204" pitchFamily="34" charset="0"/>
-                <a:ea typeface="ＭＳ Ｐゴシック" charset="0"/>
-                <a:cs typeface="Arial" panose="020B0604020202020204" pitchFamily="34" charset="0"/>
-              </a:rPr>
-              <a:t>Configure SSL</a:t>
-            </a:r>
-          </a:p>
-          <a:p>
-            <a:endParaRPr lang="en-US" dirty="0" smtClean="0"/>
-          </a:p>
-          <a:p>
-            <a:endParaRPr lang="en-US" dirty="0" smtClean="0"/>
-          </a:p>
-          <a:p>
             <a:endParaRPr lang="en-US" dirty="0"/>
           </a:p>
         </p:txBody>
@@ -1704,7 +1634,7 @@
               <a:pPr>
                 <a:defRPr/>
               </a:pPr>
-              <a:t>16</a:t>
+              <a:t>15</a:t>
             </a:fld>
             <a:endParaRPr lang="en-US" dirty="0"/>
           </a:p>
@@ -1757,7 +1687,7 @@
     </p:spTree>
     <p:extLst>
       <p:ext uri="{BB962C8B-B14F-4D97-AF65-F5344CB8AC3E}">
-        <p14:creationId xmlns:p14="http://schemas.microsoft.com/office/powerpoint/2010/main" val="1812303767"/>
+        <p14:creationId xmlns:p14="http://schemas.microsoft.com/office/powerpoint/2010/main" val="1105980774"/>
       </p:ext>
     </p:extLst>
   </p:cSld>
@@ -1811,63 +1741,193 @@
           <a:bodyPr/>
           <a:lstStyle/>
           <a:p>
-            <a:r>
-              <a:rPr lang="en-US" dirty="0" smtClean="0"/>
-              <a:t>Instructor Note: If you needed</a:t>
-            </a:r>
-            <a:r>
-              <a:rPr lang="en-US" baseline="0" dirty="0" smtClean="0"/>
-              <a:t> to downgrade Compliance to a previous version, the `--</a:t>
-            </a:r>
-            <a:r>
-              <a:rPr lang="en-US" baseline="0" dirty="0" err="1" smtClean="0"/>
-              <a:t>oldpackage</a:t>
-            </a:r>
-            <a:r>
-              <a:rPr lang="en-US" baseline="0" dirty="0" smtClean="0"/>
-              <a:t>' option will do that for you. In the following example, the `</a:t>
-            </a:r>
-            <a:r>
-              <a:rPr lang="en-US" dirty="0" smtClean="0"/>
-              <a:t>https://package...` would be the</a:t>
-            </a:r>
-            <a:r>
-              <a:rPr lang="en-US" baseline="0" dirty="0" smtClean="0"/>
-              <a:t> version of the old package that you want to downgrade to:</a:t>
-            </a:r>
-          </a:p>
-          <a:p>
-            <a:endParaRPr lang="en-US" baseline="0" dirty="0" smtClean="0"/>
-          </a:p>
-          <a:p>
-            <a:r>
-              <a:rPr lang="en-US" dirty="0" smtClean="0"/>
-              <a:t> sudo rpm -</a:t>
-            </a:r>
-            <a:r>
-              <a:rPr lang="en-US" dirty="0" err="1" smtClean="0"/>
-              <a:t>Uvh</a:t>
-            </a:r>
-            <a:r>
-              <a:rPr lang="en-US" dirty="0" smtClean="0"/>
-              <a:t> </a:t>
-            </a:r>
-            <a:r>
-              <a:rPr lang="en-US" b="1" dirty="0" smtClean="0"/>
-              <a:t>--</a:t>
-            </a:r>
-            <a:r>
-              <a:rPr lang="en-US" b="1" dirty="0" err="1" smtClean="0"/>
-              <a:t>oldpackage</a:t>
-            </a:r>
-            <a:r>
-              <a:rPr lang="en-US" b="1" dirty="0" smtClean="0"/>
-              <a:t> </a:t>
-            </a:r>
-            <a:r>
-              <a:rPr lang="en-US" dirty="0" smtClean="0"/>
-              <a:t>https://packagecloud.io/chef/stable/packages/el/6/chef-compliance-0.9.6-1.el6.x86_64.rpm/download</a:t>
-            </a:r>
+            <a:endParaRPr lang="en-US" dirty="0"/>
+          </a:p>
+        </p:txBody>
+      </p:sp>
+      <p:sp>
+        <p:nvSpPr>
+          <p:cNvPr id="4" name="Slide Number Placeholder 3"/>
+          <p:cNvSpPr>
+            <a:spLocks noGrp="1"/>
+          </p:cNvSpPr>
+          <p:nvPr>
+            <p:ph type="sldNum" sz="quarter" idx="10"/>
+          </p:nvPr>
+        </p:nvSpPr>
+        <p:spPr/>
+        <p:txBody>
+          <a:bodyPr/>
+          <a:lstStyle/>
+          <a:p>
+            <a:pPr>
+              <a:defRPr/>
+            </a:pPr>
+            <a:fld id="{DC3734AA-3150-D947-AC52-2F5DF48BFCD5}" type="slidenum">
+              <a:rPr lang="en-US" smtClean="0"/>
+              <a:pPr>
+                <a:defRPr/>
+              </a:pPr>
+              <a:t>16</a:t>
+            </a:fld>
+            <a:endParaRPr lang="en-US" dirty="0"/>
+          </a:p>
+        </p:txBody>
+      </p:sp>
+      <p:sp>
+        <p:nvSpPr>
+          <p:cNvPr id="5" name="Header Placeholder 4"/>
+          <p:cNvSpPr>
+            <a:spLocks noGrp="1"/>
+          </p:cNvSpPr>
+          <p:nvPr>
+            <p:ph type="hdr" sz="quarter" idx="11"/>
+          </p:nvPr>
+        </p:nvSpPr>
+        <p:spPr/>
+        <p:txBody>
+          <a:bodyPr/>
+          <a:lstStyle/>
+          <a:p>
+            <a:pPr>
+              <a:defRPr/>
+            </a:pPr>
+            <a:endParaRPr lang="en-US"/>
+          </a:p>
+        </p:txBody>
+      </p:sp>
+      <p:sp>
+        <p:nvSpPr>
+          <p:cNvPr id="6" name="Footer Placeholder 5"/>
+          <p:cNvSpPr>
+            <a:spLocks noGrp="1"/>
+          </p:cNvSpPr>
+          <p:nvPr>
+            <p:ph type="ftr" sz="quarter" idx="12"/>
+          </p:nvPr>
+        </p:nvSpPr>
+        <p:spPr/>
+        <p:txBody>
+          <a:bodyPr/>
+          <a:lstStyle/>
+          <a:p>
+            <a:pPr>
+              <a:defRPr/>
+            </a:pPr>
+            <a:endParaRPr lang="en-US"/>
+          </a:p>
+        </p:txBody>
+      </p:sp>
+    </p:spTree>
+    <p:extLst>
+      <p:ext uri="{BB962C8B-B14F-4D97-AF65-F5344CB8AC3E}">
+        <p14:creationId xmlns:p14="http://schemas.microsoft.com/office/powerpoint/2010/main" val="3591492319"/>
+      </p:ext>
+    </p:extLst>
+  </p:cSld>
+  <p:clrMapOvr>
+    <a:masterClrMapping/>
+  </p:clrMapOvr>
+</p:notes>
+</file>
+
+<file path=ppt/notesSlides/notesSlide16.xml><?xml version="1.0" encoding="utf-8"?>
+<p:notes xmlns:a="http://schemas.openxmlformats.org/drawingml/2006/main" xmlns:r="http://schemas.openxmlformats.org/officeDocument/2006/relationships" xmlns:p="http://schemas.openxmlformats.org/presentationml/2006/main">
+  <p:cSld>
+    <p:spTree>
+      <p:nvGrpSpPr>
+        <p:cNvPr id="1" name=""/>
+        <p:cNvGrpSpPr/>
+        <p:nvPr/>
+      </p:nvGrpSpPr>
+      <p:grpSpPr>
+        <a:xfrm>
+          <a:off x="0" y="0"/>
+          <a:ext cx="0" cy="0"/>
+          <a:chOff x="0" y="0"/>
+          <a:chExt cx="0" cy="0"/>
+        </a:xfrm>
+      </p:grpSpPr>
+      <p:sp>
+        <p:nvSpPr>
+          <p:cNvPr id="2" name="Slide Image Placeholder 1"/>
+          <p:cNvSpPr>
+            <a:spLocks noGrp="1" noRot="1" noChangeAspect="1"/>
+          </p:cNvSpPr>
+          <p:nvPr>
+            <p:ph type="sldImg"/>
+          </p:nvPr>
+        </p:nvSpPr>
+        <p:spPr/>
+      </p:sp>
+      <p:sp>
+        <p:nvSpPr>
+          <p:cNvPr id="3" name="Notes Placeholder 2"/>
+          <p:cNvSpPr>
+            <a:spLocks noGrp="1"/>
+          </p:cNvSpPr>
+          <p:nvPr>
+            <p:ph type="body" idx="1"/>
+          </p:nvPr>
+        </p:nvSpPr>
+        <p:spPr/>
+        <p:txBody>
+          <a:bodyPr/>
+          <a:lstStyle/>
+          <a:p>
+            <a:r>
+              <a:rPr lang="en-US" dirty="0" smtClean="0"/>
+              <a:t>In the workplace you would want to use SSL for connections to your Compliance Web UI.</a:t>
+            </a:r>
+          </a:p>
+          <a:p>
+            <a:endParaRPr lang="en-US" dirty="0" smtClean="0"/>
+          </a:p>
+          <a:p>
+            <a:endParaRPr lang="en-US" dirty="0" smtClean="0"/>
+          </a:p>
+          <a:p>
+            <a:pPr marL="0" marR="0" indent="0" algn="l" defTabSz="1217613" rtl="0" eaLnBrk="1" fontAlgn="base" latinLnBrk="0" hangingPunct="1">
+              <a:lnSpc>
+                <a:spcPct val="90000"/>
+              </a:lnSpc>
+              <a:spcBef>
+                <a:spcPct val="30000"/>
+              </a:spcBef>
+              <a:spcAft>
+                <a:spcPts val="450"/>
+              </a:spcAft>
+              <a:buClrTx/>
+              <a:buSzTx/>
+              <a:buFontTx/>
+              <a:buNone/>
+              <a:tabLst/>
+              <a:defRPr/>
+            </a:pPr>
+            <a:r>
+              <a:rPr lang="en-US" dirty="0" smtClean="0"/>
+              <a:t>https://docs.chef.io/install_compliance.html &gt; </a:t>
+            </a:r>
+            <a:r>
+              <a:rPr lang="en-US" sz="1200" b="0" i="0" kern="1200" dirty="0" smtClean="0">
+                <a:solidFill>
+                  <a:schemeClr val="tx1"/>
+                </a:solidFill>
+                <a:effectLst/>
+                <a:latin typeface="Arial" panose="020B0604020202020204" pitchFamily="34" charset="0"/>
+                <a:ea typeface="ＭＳ Ｐゴシック" charset="0"/>
+                <a:cs typeface="Arial" panose="020B0604020202020204" pitchFamily="34" charset="0"/>
+              </a:rPr>
+              <a:t>Configure SSL</a:t>
+            </a:r>
+          </a:p>
+          <a:p>
+            <a:endParaRPr lang="en-US" dirty="0" smtClean="0"/>
+          </a:p>
+          <a:p>
+            <a:endParaRPr lang="en-US" dirty="0" smtClean="0"/>
+          </a:p>
+          <a:p>
             <a:endParaRPr lang="en-US" dirty="0"/>
           </a:p>
         </p:txBody>
@@ -1896,6 +1956,197 @@
                 <a:defRPr/>
               </a:pPr>
               <a:t>17</a:t>
+            </a:fld>
+            <a:endParaRPr lang="en-US" dirty="0"/>
+          </a:p>
+        </p:txBody>
+      </p:sp>
+      <p:sp>
+        <p:nvSpPr>
+          <p:cNvPr id="5" name="Header Placeholder 4"/>
+          <p:cNvSpPr>
+            <a:spLocks noGrp="1"/>
+          </p:cNvSpPr>
+          <p:nvPr>
+            <p:ph type="hdr" sz="quarter" idx="11"/>
+          </p:nvPr>
+        </p:nvSpPr>
+        <p:spPr/>
+        <p:txBody>
+          <a:bodyPr/>
+          <a:lstStyle/>
+          <a:p>
+            <a:pPr>
+              <a:defRPr/>
+            </a:pPr>
+            <a:endParaRPr lang="en-US"/>
+          </a:p>
+        </p:txBody>
+      </p:sp>
+      <p:sp>
+        <p:nvSpPr>
+          <p:cNvPr id="6" name="Footer Placeholder 5"/>
+          <p:cNvSpPr>
+            <a:spLocks noGrp="1"/>
+          </p:cNvSpPr>
+          <p:nvPr>
+            <p:ph type="ftr" sz="quarter" idx="12"/>
+          </p:nvPr>
+        </p:nvSpPr>
+        <p:spPr/>
+        <p:txBody>
+          <a:bodyPr/>
+          <a:lstStyle/>
+          <a:p>
+            <a:pPr>
+              <a:defRPr/>
+            </a:pPr>
+            <a:endParaRPr lang="en-US"/>
+          </a:p>
+        </p:txBody>
+      </p:sp>
+    </p:spTree>
+    <p:extLst>
+      <p:ext uri="{BB962C8B-B14F-4D97-AF65-F5344CB8AC3E}">
+        <p14:creationId xmlns:p14="http://schemas.microsoft.com/office/powerpoint/2010/main" val="1812303767"/>
+      </p:ext>
+    </p:extLst>
+  </p:cSld>
+  <p:clrMapOvr>
+    <a:masterClrMapping/>
+  </p:clrMapOvr>
+</p:notes>
+</file>
+
+<file path=ppt/notesSlides/notesSlide17.xml><?xml version="1.0" encoding="utf-8"?>
+<p:notes xmlns:a="http://schemas.openxmlformats.org/drawingml/2006/main" xmlns:r="http://schemas.openxmlformats.org/officeDocument/2006/relationships" xmlns:p="http://schemas.openxmlformats.org/presentationml/2006/main">
+  <p:cSld>
+    <p:spTree>
+      <p:nvGrpSpPr>
+        <p:cNvPr id="1" name=""/>
+        <p:cNvGrpSpPr/>
+        <p:nvPr/>
+      </p:nvGrpSpPr>
+      <p:grpSpPr>
+        <a:xfrm>
+          <a:off x="0" y="0"/>
+          <a:ext cx="0" cy="0"/>
+          <a:chOff x="0" y="0"/>
+          <a:chExt cx="0" cy="0"/>
+        </a:xfrm>
+      </p:grpSpPr>
+      <p:sp>
+        <p:nvSpPr>
+          <p:cNvPr id="2" name="Slide Image Placeholder 1"/>
+          <p:cNvSpPr>
+            <a:spLocks noGrp="1" noRot="1" noChangeAspect="1"/>
+          </p:cNvSpPr>
+          <p:nvPr>
+            <p:ph type="sldImg"/>
+          </p:nvPr>
+        </p:nvSpPr>
+        <p:spPr/>
+      </p:sp>
+      <p:sp>
+        <p:nvSpPr>
+          <p:cNvPr id="3" name="Notes Placeholder 2"/>
+          <p:cNvSpPr>
+            <a:spLocks noGrp="1"/>
+          </p:cNvSpPr>
+          <p:nvPr>
+            <p:ph type="body" idx="1"/>
+          </p:nvPr>
+        </p:nvSpPr>
+        <p:spPr/>
+        <p:txBody>
+          <a:bodyPr/>
+          <a:lstStyle/>
+          <a:p>
+            <a:r>
+              <a:rPr lang="en-US" dirty="0" smtClean="0"/>
+              <a:t>If you needed</a:t>
+            </a:r>
+            <a:r>
+              <a:rPr lang="en-US" baseline="0" dirty="0" smtClean="0"/>
+              <a:t> to downgrade Compliance to a previous version, the `--</a:t>
+            </a:r>
+            <a:r>
+              <a:rPr lang="en-US" baseline="0" dirty="0" err="1" smtClean="0"/>
+              <a:t>oldpackage</a:t>
+            </a:r>
+            <a:r>
+              <a:rPr lang="en-US" baseline="0" dirty="0" smtClean="0"/>
+              <a:t>' option will do that for you. In the following example, the `</a:t>
+            </a:r>
+            <a:r>
+              <a:rPr lang="en-US" dirty="0" smtClean="0"/>
+              <a:t>https://package...` would be the</a:t>
+            </a:r>
+            <a:r>
+              <a:rPr lang="en-US" baseline="0" dirty="0" smtClean="0"/>
+              <a:t> version of the old package that you want to downgrade to:</a:t>
+            </a:r>
+          </a:p>
+          <a:p>
+            <a:endParaRPr lang="en-US" baseline="0" dirty="0" smtClean="0"/>
+          </a:p>
+          <a:p>
+            <a:r>
+              <a:rPr lang="en-US" dirty="0" smtClean="0"/>
+              <a:t> sudo rpm -</a:t>
+            </a:r>
+            <a:r>
+              <a:rPr lang="en-US" dirty="0" err="1" smtClean="0"/>
+              <a:t>Uvh</a:t>
+            </a:r>
+            <a:r>
+              <a:rPr lang="en-US" dirty="0" smtClean="0"/>
+              <a:t> </a:t>
+            </a:r>
+            <a:r>
+              <a:rPr lang="en-US" b="1" dirty="0" smtClean="0"/>
+              <a:t>--</a:t>
+            </a:r>
+            <a:r>
+              <a:rPr lang="en-US" b="1" dirty="0" err="1" smtClean="0"/>
+              <a:t>oldpackage</a:t>
+            </a:r>
+            <a:r>
+              <a:rPr lang="en-US" b="1" dirty="0" smtClean="0"/>
+              <a:t> </a:t>
+            </a:r>
+            <a:r>
+              <a:rPr lang="en-US" dirty="0" smtClean="0"/>
+              <a:t>https://packagecloud.io/chef/stable/packages/el/6/chef-compliance-0.9.6-1.el6.x86_64.rpm/download</a:t>
+            </a:r>
+            <a:endParaRPr lang="en-US" dirty="0"/>
+          </a:p>
+        </p:txBody>
+      </p:sp>
+      <p:sp>
+        <p:nvSpPr>
+          <p:cNvPr id="4" name="Slide Number Placeholder 3"/>
+          <p:cNvSpPr>
+            <a:spLocks noGrp="1"/>
+          </p:cNvSpPr>
+          <p:nvPr>
+            <p:ph type="sldNum" sz="quarter" idx="10"/>
+          </p:nvPr>
+        </p:nvSpPr>
+        <p:spPr/>
+        <p:txBody>
+          <a:bodyPr/>
+          <a:lstStyle/>
+          <a:p>
+            <a:pPr>
+              <a:defRPr/>
+            </a:pPr>
+            <a:fld id="{DC3734AA-3150-D947-AC52-2F5DF48BFCD5}" type="slidenum">
+              <a:rPr lang="en-US" smtClean="0"/>
+              <a:pPr>
+                <a:defRPr/>
+              </a:pPr>
+              <a:t>18</a:t>
             </a:fld>
             <a:endParaRPr lang="en-US" dirty="0"/>
           </a:p>
@@ -2002,6 +2253,28 @@
           <a:bodyPr/>
           <a:lstStyle/>
           <a:p>
+            <a:r>
+              <a:rPr lang="en-US" dirty="0" smtClean="0"/>
+              <a:t>You can install the Chef Compliance server as a an Amazon Machine Images (AMI) instance or as a Standalone installation.</a:t>
+            </a:r>
+          </a:p>
+          <a:p>
+            <a:endParaRPr lang="en-US" dirty="0" smtClean="0"/>
+          </a:p>
+          <a:p>
+            <a:r>
+              <a:rPr lang="en-US" dirty="0" smtClean="0"/>
+              <a:t>The standalone installation of Chef Compliance server creates a working installation on a single server. </a:t>
+            </a:r>
+          </a:p>
+          <a:p>
+            <a:endParaRPr lang="en-US" dirty="0" smtClean="0"/>
+          </a:p>
+          <a:p>
+            <a:r>
+              <a:rPr lang="en-US" dirty="0" smtClean="0"/>
+              <a:t>This installation is also useful when you are installing Chef Compliance in a virtual machine, for proof-of-concept deployments, or as a part of a development or testing loop</a:t>
+            </a:r>
             <a:endParaRPr lang="en-US" dirty="0"/>
           </a:p>
         </p:txBody>
@@ -2029,7 +2302,7 @@
               <a:pPr>
                 <a:defRPr/>
               </a:pPr>
-              <a:t>4</a:t>
+              <a:t>3</a:t>
             </a:fld>
             <a:endParaRPr lang="en-US" dirty="0"/>
           </a:p>
@@ -2082,7 +2355,7 @@
     </p:spTree>
     <p:extLst>
       <p:ext uri="{BB962C8B-B14F-4D97-AF65-F5344CB8AC3E}">
-        <p14:creationId xmlns:p14="http://schemas.microsoft.com/office/powerpoint/2010/main" val="3964402445"/>
+        <p14:creationId xmlns:p14="http://schemas.microsoft.com/office/powerpoint/2010/main" val="1083675655"/>
       </p:ext>
     </p:extLst>
   </p:cSld>
@@ -2163,7 +2436,7 @@
               <a:pPr>
                 <a:defRPr/>
               </a:pPr>
-              <a:t>5</a:t>
+              <a:t>4</a:t>
             </a:fld>
             <a:endParaRPr lang="en-US" dirty="0"/>
           </a:p>
@@ -2216,7 +2489,7 @@
     </p:spTree>
     <p:extLst>
       <p:ext uri="{BB962C8B-B14F-4D97-AF65-F5344CB8AC3E}">
-        <p14:creationId xmlns:p14="http://schemas.microsoft.com/office/powerpoint/2010/main" val="2910110818"/>
+        <p14:creationId xmlns:p14="http://schemas.microsoft.com/office/powerpoint/2010/main" val="3964402445"/>
       </p:ext>
     </p:extLst>
   </p:cSld>
@@ -2297,7 +2570,7 @@
               <a:pPr>
                 <a:defRPr/>
               </a:pPr>
-              <a:t>6</a:t>
+              <a:t>5</a:t>
             </a:fld>
             <a:endParaRPr lang="en-US" dirty="0"/>
           </a:p>
@@ -2350,7 +2623,7 @@
     </p:spTree>
     <p:extLst>
       <p:ext uri="{BB962C8B-B14F-4D97-AF65-F5344CB8AC3E}">
-        <p14:creationId xmlns:p14="http://schemas.microsoft.com/office/powerpoint/2010/main" val="4131952127"/>
+        <p14:creationId xmlns:p14="http://schemas.microsoft.com/office/powerpoint/2010/main" val="2910110818"/>
       </p:ext>
     </p:extLst>
   </p:cSld>
@@ -2404,61 +2677,6 @@
           <a:bodyPr/>
           <a:lstStyle/>
           <a:p>
-            <a:pPr marL="0" marR="0" indent="0" algn="l" defTabSz="1217613" rtl="0" eaLnBrk="1" fontAlgn="base" latinLnBrk="0" hangingPunct="1">
-              <a:lnSpc>
-                <a:spcPct val="90000"/>
-              </a:lnSpc>
-              <a:spcBef>
-                <a:spcPct val="30000"/>
-              </a:spcBef>
-              <a:spcAft>
-                <a:spcPts val="450"/>
-              </a:spcAft>
-              <a:buClrTx/>
-              <a:buSzTx/>
-              <a:buFontTx/>
-              <a:buNone/>
-              <a:tabLst/>
-              <a:defRPr/>
-            </a:pPr>
-            <a:r>
-              <a:rPr lang="en-US" dirty="0" smtClean="0"/>
-              <a:t>From the resulting web page, highlight and copy the URL for the latest </a:t>
-            </a:r>
-            <a:r>
-              <a:rPr lang="en-US" b="1" dirty="0" smtClean="0"/>
-              <a:t>Red Hat Enterprise Linux 6</a:t>
-            </a:r>
-            <a:r>
-              <a:rPr lang="en-US" dirty="0" smtClean="0"/>
-              <a:t> version. </a:t>
-            </a:r>
-            <a:r>
-              <a:rPr lang="en-US" u="sng" dirty="0" smtClean="0"/>
-              <a:t>Do not </a:t>
-            </a:r>
-            <a:r>
-              <a:rPr lang="en-US" dirty="0" smtClean="0"/>
-              <a:t>click the Download button. We don't want to download this directly to your laptop but instead we will </a:t>
-            </a:r>
-            <a:r>
-              <a:rPr lang="en-US" smtClean="0"/>
-              <a:t>download it</a:t>
-            </a:r>
-            <a:r>
-              <a:rPr lang="en-US" baseline="0" smtClean="0"/>
-              <a:t> </a:t>
-            </a:r>
-            <a:r>
-              <a:rPr lang="en-US" smtClean="0"/>
-              <a:t>directly </a:t>
-            </a:r>
-            <a:r>
-              <a:rPr lang="en-US" dirty="0" smtClean="0"/>
-              <a:t>to our node.</a:t>
-            </a:r>
-          </a:p>
-          <a:p>
             <a:endParaRPr lang="en-US" dirty="0"/>
           </a:p>
         </p:txBody>
@@ -2486,7 +2704,7 @@
               <a:pPr>
                 <a:defRPr/>
               </a:pPr>
-              <a:t>7</a:t>
+              <a:t>6</a:t>
             </a:fld>
             <a:endParaRPr lang="en-US" dirty="0"/>
           </a:p>
@@ -2539,7 +2757,7 @@
     </p:spTree>
     <p:extLst>
       <p:ext uri="{BB962C8B-B14F-4D97-AF65-F5344CB8AC3E}">
-        <p14:creationId xmlns:p14="http://schemas.microsoft.com/office/powerpoint/2010/main" val="77950305"/>
+        <p14:creationId xmlns:p14="http://schemas.microsoft.com/office/powerpoint/2010/main" val="4131952127"/>
       </p:ext>
     </p:extLst>
   </p:cSld>
@@ -2612,235 +2830,28 @@
             </a:pPr>
             <a:r>
               <a:rPr lang="en-US" dirty="0" smtClean="0"/>
-              <a:t>Execute </a:t>
-            </a:r>
-            <a:r>
-              <a:rPr lang="en-US" b="1" dirty="0" smtClean="0"/>
-              <a:t>sudo rpm -</a:t>
-            </a:r>
-            <a:r>
-              <a:rPr lang="en-US" b="1" dirty="0" err="1" smtClean="0"/>
-              <a:t>Uvh</a:t>
-            </a:r>
-            <a:r>
-              <a:rPr lang="en-US" b="1" dirty="0" smtClean="0"/>
-              <a:t> https://packagecloud.io/chef/stable/packages/el/6/chef-compliance-0.9.5-2.el</a:t>
-            </a:r>
-            <a:r>
-              <a:rPr lang="en-US" b="1" i="1" dirty="0" smtClean="0">
-                <a:solidFill>
-                  <a:srgbClr val="FF0000"/>
-                </a:solidFill>
+              <a:t>Instructor Note: This course has been tested on</a:t>
+            </a:r>
+            <a:r>
+              <a:rPr lang="en-US" baseline="0" dirty="0" smtClean="0"/>
+              <a:t> </a:t>
+            </a:r>
+            <a:r>
+              <a:rPr lang="en-US" sz="1200" kern="1200" dirty="0" smtClean="0">
+                <a:solidFill>
+                  <a:schemeClr val="tx1"/>
+                </a:solidFill>
+                <a:effectLst/>
+                <a:latin typeface="Arial" panose="020B0604020202020204" pitchFamily="34" charset="0"/>
+                <a:ea typeface="ＭＳ Ｐゴシック" charset="0"/>
+                <a:cs typeface="Arial" panose="020B0604020202020204" pitchFamily="34" charset="0"/>
               </a:rPr>
-              <a:t>X</a:t>
-            </a:r>
-            <a:r>
-              <a:rPr lang="en-US" b="1" dirty="0" smtClean="0"/>
-              <a:t>.x86_64.rpm/download </a:t>
-            </a:r>
-            <a:r>
-              <a:rPr lang="en-US" b="0" dirty="0" smtClean="0"/>
-              <a:t>but using the URL you just copied</a:t>
-            </a:r>
-            <a:r>
-              <a:rPr lang="en-US" b="0" baseline="0" dirty="0" smtClean="0"/>
-              <a:t> </a:t>
-            </a:r>
-            <a:r>
-              <a:rPr lang="en-US" dirty="0" smtClean="0"/>
-              <a:t>to download and install the Compliance package. This could take some time.</a:t>
-            </a:r>
-          </a:p>
-          <a:p>
-            <a:pPr marL="0" marR="0" indent="0" algn="l" defTabSz="1217613" rtl="0" eaLnBrk="1" fontAlgn="base" latinLnBrk="0" hangingPunct="1">
-              <a:lnSpc>
-                <a:spcPct val="90000"/>
-              </a:lnSpc>
-              <a:spcBef>
-                <a:spcPct val="30000"/>
-              </a:spcBef>
-              <a:spcAft>
-                <a:spcPts val="450"/>
-              </a:spcAft>
-              <a:buClrTx/>
-              <a:buSzTx/>
-              <a:buFontTx/>
-              <a:buNone/>
-              <a:tabLst/>
-              <a:defRPr/>
-            </a:pPr>
+              <a:t>Compliance Server v0.9.11.</a:t>
+            </a:r>
             <a:endParaRPr lang="en-US" dirty="0" smtClean="0"/>
           </a:p>
           <a:p>
-            <a:pPr marL="0" marR="0" indent="0" algn="l" defTabSz="1217613" rtl="0" eaLnBrk="1" fontAlgn="base" latinLnBrk="0" hangingPunct="1">
-              <a:lnSpc>
-                <a:spcPct val="90000"/>
-              </a:lnSpc>
-              <a:spcBef>
-                <a:spcPct val="30000"/>
-              </a:spcBef>
-              <a:spcAft>
-                <a:spcPts val="450"/>
-              </a:spcAft>
-              <a:buClrTx/>
-              <a:buSzTx/>
-              <a:buFontTx/>
-              <a:buNone/>
-              <a:tabLst/>
-              <a:defRPr/>
-            </a:pPr>
-            <a:r>
-              <a:rPr lang="en-US" b="1" dirty="0" smtClean="0">
-                <a:latin typeface="Courier New" panose="02070309020205020404" pitchFamily="49" charset="0"/>
-                <a:cs typeface="Courier New" panose="02070309020205020404" pitchFamily="49" charset="0"/>
-              </a:rPr>
-              <a:t>Note: </a:t>
-            </a:r>
-            <a:r>
-              <a:rPr lang="en-US" b="0" dirty="0" smtClean="0">
-                <a:latin typeface="Courier New" panose="02070309020205020404" pitchFamily="49" charset="0"/>
-                <a:cs typeface="Courier New" panose="02070309020205020404" pitchFamily="49" charset="0"/>
-              </a:rPr>
-              <a:t>The compliance package will be named </a:t>
-            </a:r>
-            <a:r>
-              <a:rPr lang="en-US" b="1" dirty="0" smtClean="0">
-                <a:latin typeface="Courier New" panose="02070309020205020404" pitchFamily="49" charset="0"/>
-                <a:cs typeface="Courier New" panose="02070309020205020404" pitchFamily="49" charset="0"/>
-              </a:rPr>
-              <a:t>download</a:t>
-            </a:r>
-            <a:r>
-              <a:rPr lang="en-US" b="0" dirty="0" smtClean="0">
-                <a:latin typeface="Courier New" panose="02070309020205020404" pitchFamily="49" charset="0"/>
-                <a:cs typeface="Courier New" panose="02070309020205020404" pitchFamily="49" charset="0"/>
-              </a:rPr>
-              <a:t> at this point.</a:t>
-            </a:r>
-          </a:p>
-          <a:p>
-            <a:endParaRPr lang="en-US" b="0" dirty="0" smtClean="0">
-              <a:latin typeface="Courier New" panose="02070309020205020404" pitchFamily="49" charset="0"/>
-              <a:cs typeface="Courier New" panose="02070309020205020404" pitchFamily="49" charset="0"/>
-            </a:endParaRPr>
-          </a:p>
-          <a:p>
-            <a:r>
-              <a:rPr lang="en-US" b="0" dirty="0" smtClean="0">
-                <a:latin typeface="Courier New" panose="02070309020205020404" pitchFamily="49" charset="0"/>
-                <a:cs typeface="Courier New" panose="02070309020205020404" pitchFamily="49" charset="0"/>
-              </a:rPr>
-              <a:t>Instructor Note: The </a:t>
-            </a:r>
-            <a:r>
-              <a:rPr lang="en-US" b="1" dirty="0" smtClean="0">
-                <a:latin typeface="Courier New" panose="02070309020205020404" pitchFamily="49" charset="0"/>
-                <a:cs typeface="Courier New" panose="02070309020205020404" pitchFamily="49" charset="0"/>
-              </a:rPr>
-              <a:t>X</a:t>
-            </a:r>
-            <a:r>
-              <a:rPr lang="en-US" b="0" dirty="0" smtClean="0">
-                <a:latin typeface="Courier New" panose="02070309020205020404" pitchFamily="49" charset="0"/>
-                <a:cs typeface="Courier New" panose="02070309020205020404" pitchFamily="49" charset="0"/>
-              </a:rPr>
-              <a:t> in this part of the file name - </a:t>
-            </a:r>
-            <a:r>
-              <a:rPr lang="en-US" b="1" dirty="0" smtClean="0">
-                <a:latin typeface="Courier New" panose="02070309020205020404" pitchFamily="49" charset="0"/>
-                <a:cs typeface="Courier New" panose="02070309020205020404" pitchFamily="49" charset="0"/>
-              </a:rPr>
-              <a:t>0.9.2-2.el</a:t>
-            </a:r>
-            <a:r>
-              <a:rPr lang="en-US" b="1" i="1" dirty="0" smtClean="0">
-                <a:latin typeface="Courier New" panose="02070309020205020404" pitchFamily="49" charset="0"/>
-                <a:cs typeface="Courier New" panose="02070309020205020404" pitchFamily="49" charset="0"/>
-              </a:rPr>
-              <a:t>X - </a:t>
-            </a:r>
-            <a:r>
-              <a:rPr lang="en-US" b="0" i="0" dirty="0" smtClean="0">
-                <a:latin typeface="Courier New" panose="02070309020205020404" pitchFamily="49" charset="0"/>
-                <a:cs typeface="Courier New" panose="02070309020205020404" pitchFamily="49" charset="0"/>
-              </a:rPr>
-              <a:t>was added so students will</a:t>
-            </a:r>
-            <a:r>
-              <a:rPr lang="en-US" b="0" i="0" baseline="0" dirty="0" smtClean="0">
-                <a:latin typeface="Courier New" panose="02070309020205020404" pitchFamily="49" charset="0"/>
-                <a:cs typeface="Courier New" panose="02070309020205020404" pitchFamily="49" charset="0"/>
-              </a:rPr>
-              <a:t> paste the latest version and not try to copy/paste the above command verbatim.</a:t>
-            </a:r>
-            <a:endParaRPr lang="en-US" b="0" i="0" dirty="0" smtClean="0">
-              <a:latin typeface="Courier New" panose="02070309020205020404" pitchFamily="49" charset="0"/>
-              <a:cs typeface="Courier New" panose="02070309020205020404" pitchFamily="49" charset="0"/>
-            </a:endParaRPr>
-          </a:p>
-          <a:p>
-            <a:pPr marL="0" marR="0" indent="0" algn="l" defTabSz="1217613" rtl="0" eaLnBrk="1" fontAlgn="base" latinLnBrk="0" hangingPunct="1">
-              <a:lnSpc>
-                <a:spcPct val="90000"/>
-              </a:lnSpc>
-              <a:spcBef>
-                <a:spcPct val="30000"/>
-              </a:spcBef>
-              <a:spcAft>
-                <a:spcPts val="450"/>
-              </a:spcAft>
-              <a:buClrTx/>
-              <a:buSzTx/>
-              <a:buFontTx/>
-              <a:buNone/>
-              <a:tabLst/>
-              <a:defRPr/>
-            </a:pPr>
-            <a:endParaRPr lang="en-US" b="0" dirty="0" smtClean="0">
-              <a:latin typeface="Courier New" panose="02070309020205020404" pitchFamily="49" charset="0"/>
-              <a:cs typeface="Courier New" panose="02070309020205020404" pitchFamily="49" charset="0"/>
-            </a:endParaRPr>
-          </a:p>
-          <a:p>
-            <a:pPr marL="0" marR="0" indent="0" algn="l" defTabSz="1217613" rtl="0" eaLnBrk="1" fontAlgn="base" latinLnBrk="0" hangingPunct="1">
-              <a:lnSpc>
-                <a:spcPct val="90000"/>
-              </a:lnSpc>
-              <a:spcBef>
-                <a:spcPct val="30000"/>
-              </a:spcBef>
-              <a:spcAft>
-                <a:spcPts val="450"/>
-              </a:spcAft>
-              <a:buClrTx/>
-              <a:buSzTx/>
-              <a:buFontTx/>
-              <a:buNone/>
-              <a:tabLst/>
-              <a:defRPr/>
-            </a:pPr>
-            <a:endParaRPr lang="en-US" dirty="0" smtClean="0"/>
-          </a:p>
-          <a:p>
-            <a:pPr marL="0" marR="0" indent="0" algn="l" defTabSz="1217613" rtl="0" eaLnBrk="1" fontAlgn="base" latinLnBrk="0" hangingPunct="1">
-              <a:lnSpc>
-                <a:spcPct val="90000"/>
-              </a:lnSpc>
-              <a:spcBef>
-                <a:spcPct val="30000"/>
-              </a:spcBef>
-              <a:spcAft>
-                <a:spcPts val="450"/>
-              </a:spcAft>
-              <a:buClrTx/>
-              <a:buSzTx/>
-              <a:buFontTx/>
-              <a:buNone/>
-              <a:tabLst/>
-              <a:defRPr/>
-            </a:pPr>
-            <a:endParaRPr lang="en-US" dirty="0" smtClean="0"/>
+            <a:endParaRPr lang="en-US" dirty="0"/>
           </a:p>
         </p:txBody>
       </p:sp>
@@ -2867,7 +2878,7 @@
               <a:pPr>
                 <a:defRPr/>
               </a:pPr>
-              <a:t>8</a:t>
+              <a:t>7</a:t>
             </a:fld>
             <a:endParaRPr lang="en-US" dirty="0"/>
           </a:p>
@@ -2920,7 +2931,7 @@
     </p:spTree>
     <p:extLst>
       <p:ext uri="{BB962C8B-B14F-4D97-AF65-F5344CB8AC3E}">
-        <p14:creationId xmlns:p14="http://schemas.microsoft.com/office/powerpoint/2010/main" val="1882353999"/>
+        <p14:creationId xmlns:p14="http://schemas.microsoft.com/office/powerpoint/2010/main" val="77950305"/>
       </p:ext>
     </p:extLst>
   </p:cSld>
@@ -2971,34 +2982,129 @@
         </p:nvSpPr>
         <p:spPr/>
         <p:txBody>
-          <a:bodyPr>
-            <a:normAutofit/>
-          </a:bodyPr>
+          <a:bodyPr/>
           <a:lstStyle/>
           <a:p>
-            <a:r>
-              <a:rPr lang="en-US" dirty="0" smtClean="0"/>
-              <a:t>This reconfiguration process could take 5 or more minutes to complete. </a:t>
-            </a:r>
-          </a:p>
-          <a:p>
-            <a:endParaRPr lang="en-US" b="1" dirty="0" smtClean="0"/>
-          </a:p>
-          <a:p>
+            <a:pPr marL="0" marR="0" indent="0" algn="l" defTabSz="1217613" rtl="0" eaLnBrk="1" fontAlgn="base" latinLnBrk="0" hangingPunct="1">
+              <a:lnSpc>
+                <a:spcPct val="90000"/>
+              </a:lnSpc>
+              <a:spcBef>
+                <a:spcPct val="30000"/>
+              </a:spcBef>
+              <a:spcAft>
+                <a:spcPts val="450"/>
+              </a:spcAft>
+              <a:buClrTx/>
+              <a:buSzTx/>
+              <a:buFontTx/>
+              <a:buNone/>
+              <a:tabLst/>
+              <a:defRPr/>
+            </a:pPr>
+            <a:r>
+              <a:rPr lang="en-US" dirty="0" smtClean="0"/>
+              <a:t>From the resulting web page, highlight and copy the URL for </a:t>
+            </a:r>
+            <a:r>
+              <a:rPr lang="en-US" smtClean="0"/>
+              <a:t>the </a:t>
+            </a:r>
+            <a:r>
+              <a:rPr lang="en-US" b="1" smtClean="0"/>
+              <a:t>Red </a:t>
+            </a:r>
             <a:r>
               <a:rPr lang="en-US" b="1" dirty="0" smtClean="0"/>
-              <a:t>Important</a:t>
-            </a:r>
-            <a:r>
-              <a:rPr lang="en-US" dirty="0" smtClean="0"/>
-              <a:t>: Do not use Ctrl c while this is running. </a:t>
-            </a:r>
-          </a:p>
-          <a:p>
+              <a:t>Hat Enterprise Linux </a:t>
+            </a:r>
+            <a:r>
+              <a:rPr lang="en-US" b="1" smtClean="0"/>
+              <a:t>6</a:t>
+            </a:r>
+            <a:r>
+              <a:rPr lang="en-US" smtClean="0"/>
+              <a:t> version </a:t>
+            </a:r>
+            <a:r>
+              <a:rPr lang="en-US" u="sng" dirty="0" smtClean="0"/>
+              <a:t>Do not </a:t>
+            </a:r>
+            <a:r>
+              <a:rPr lang="en-US" dirty="0" smtClean="0"/>
+              <a:t>click the Download button. We don't want to download this directly to your laptop but instead we will download it</a:t>
+            </a:r>
+            <a:r>
+              <a:rPr lang="en-US" baseline="0" dirty="0" smtClean="0"/>
+              <a:t> </a:t>
+            </a:r>
+            <a:r>
+              <a:rPr lang="en-US" dirty="0" smtClean="0"/>
+              <a:t>directly to our node.</a:t>
+            </a:r>
+          </a:p>
+          <a:p>
+            <a:pPr marL="0" marR="0" indent="0" algn="l" defTabSz="1217613" rtl="0" eaLnBrk="1" fontAlgn="base" latinLnBrk="0" hangingPunct="1">
+              <a:lnSpc>
+                <a:spcPct val="90000"/>
+              </a:lnSpc>
+              <a:spcBef>
+                <a:spcPct val="30000"/>
+              </a:spcBef>
+              <a:spcAft>
+                <a:spcPts val="450"/>
+              </a:spcAft>
+              <a:buClrTx/>
+              <a:buSzTx/>
+              <a:buFontTx/>
+              <a:buNone/>
+              <a:tabLst/>
+              <a:defRPr/>
+            </a:pPr>
             <a:endParaRPr lang="en-US" dirty="0" smtClean="0"/>
           </a:p>
           <a:p>
+            <a:pPr marL="0" marR="0" indent="0" algn="l" defTabSz="1217613" rtl="0" eaLnBrk="1" fontAlgn="base" latinLnBrk="0" hangingPunct="1">
+              <a:lnSpc>
+                <a:spcPct val="90000"/>
+              </a:lnSpc>
+              <a:spcBef>
+                <a:spcPct val="30000"/>
+              </a:spcBef>
+              <a:spcAft>
+                <a:spcPts val="450"/>
+              </a:spcAft>
+              <a:buClrTx/>
+              <a:buSzTx/>
+              <a:buFontTx/>
+              <a:buNone/>
+              <a:tabLst/>
+              <a:defRPr/>
+            </a:pPr>
+            <a:r>
+              <a:rPr lang="en-US" dirty="0" smtClean="0"/>
+              <a:t>Instructor Note: This course has been tested on</a:t>
+            </a:r>
+            <a:r>
+              <a:rPr lang="en-US" baseline="0" dirty="0" smtClean="0"/>
+              <a:t> </a:t>
+            </a:r>
+            <a:r>
+              <a:rPr lang="en-US" sz="1200" kern="1200" dirty="0" smtClean="0">
+                <a:solidFill>
+                  <a:schemeClr val="tx1"/>
+                </a:solidFill>
+                <a:effectLst/>
+                <a:latin typeface="Arial" panose="020B0604020202020204" pitchFamily="34" charset="0"/>
+                <a:ea typeface="ＭＳ Ｐゴシック" charset="0"/>
+                <a:cs typeface="Arial" panose="020B0604020202020204" pitchFamily="34" charset="0"/>
+              </a:rPr>
+              <a:t>Compliance Server v0.9.11.</a:t>
+            </a:r>
             <a:endParaRPr lang="en-US" dirty="0" smtClean="0"/>
+          </a:p>
+          <a:p>
+            <a:endParaRPr lang="en-US" dirty="0"/>
           </a:p>
         </p:txBody>
       </p:sp>
@@ -3025,7 +3131,7 @@
               <a:pPr>
                 <a:defRPr/>
               </a:pPr>
-              <a:t>9</a:t>
+              <a:t>8</a:t>
             </a:fld>
             <a:endParaRPr lang="en-US" dirty="0"/>
           </a:p>
@@ -3078,7 +3184,7 @@
     </p:spTree>
     <p:extLst>
       <p:ext uri="{BB962C8B-B14F-4D97-AF65-F5344CB8AC3E}">
-        <p14:creationId xmlns:p14="http://schemas.microsoft.com/office/powerpoint/2010/main" val="1230862567"/>
+        <p14:creationId xmlns:p14="http://schemas.microsoft.com/office/powerpoint/2010/main" val="2266783448"/>
       </p:ext>
     </p:extLst>
   </p:cSld>
@@ -3132,7 +3238,261 @@
           <a:bodyPr/>
           <a:lstStyle/>
           <a:p>
-            <a:endParaRPr lang="en-US" dirty="0"/>
+            <a:pPr marL="0" marR="0" indent="0" algn="l" defTabSz="1217613" rtl="0" eaLnBrk="1" fontAlgn="base" latinLnBrk="0" hangingPunct="1">
+              <a:lnSpc>
+                <a:spcPct val="90000"/>
+              </a:lnSpc>
+              <a:spcBef>
+                <a:spcPct val="30000"/>
+              </a:spcBef>
+              <a:spcAft>
+                <a:spcPts val="450"/>
+              </a:spcAft>
+              <a:buClrTx/>
+              <a:buSzTx/>
+              <a:buFontTx/>
+              <a:buNone/>
+              <a:tabLst/>
+              <a:defRPr/>
+            </a:pPr>
+            <a:r>
+              <a:rPr lang="en-US" dirty="0" smtClean="0"/>
+              <a:t>Execute </a:t>
+            </a:r>
+            <a:r>
+              <a:rPr lang="en-US" b="1" dirty="0" smtClean="0"/>
+              <a:t>sudo rpm -</a:t>
+            </a:r>
+            <a:r>
+              <a:rPr lang="en-US" b="1" dirty="0" err="1" smtClean="0"/>
+              <a:t>Uvh</a:t>
+            </a:r>
+            <a:r>
+              <a:rPr lang="en-US" b="1" dirty="0" smtClean="0"/>
+              <a:t> https://packagecloud.io/chef/stable/packages/el/6/chef-compliance-0.9.5-2.el</a:t>
+            </a:r>
+            <a:r>
+              <a:rPr lang="en-US" b="1" i="1" dirty="0" smtClean="0">
+                <a:solidFill>
+                  <a:srgbClr val="FF0000"/>
+                </a:solidFill>
+              </a:rPr>
+              <a:t>X</a:t>
+            </a:r>
+            <a:r>
+              <a:rPr lang="en-US" b="1" dirty="0" smtClean="0"/>
+              <a:t>.x86_64.rpm/download </a:t>
+            </a:r>
+            <a:r>
+              <a:rPr lang="en-US" b="0" dirty="0" smtClean="0"/>
+              <a:t>but using the URL you just copied</a:t>
+            </a:r>
+            <a:r>
+              <a:rPr lang="en-US" b="0" baseline="0" dirty="0" smtClean="0"/>
+              <a:t> </a:t>
+            </a:r>
+            <a:r>
+              <a:rPr lang="en-US" dirty="0" smtClean="0"/>
+              <a:t>to download and install the Compliance package. This could take some time.</a:t>
+            </a:r>
+          </a:p>
+          <a:p>
+            <a:pPr marL="0" marR="0" indent="0" algn="l" defTabSz="1217613" rtl="0" eaLnBrk="1" fontAlgn="base" latinLnBrk="0" hangingPunct="1">
+              <a:lnSpc>
+                <a:spcPct val="90000"/>
+              </a:lnSpc>
+              <a:spcBef>
+                <a:spcPct val="30000"/>
+              </a:spcBef>
+              <a:spcAft>
+                <a:spcPts val="450"/>
+              </a:spcAft>
+              <a:buClrTx/>
+              <a:buSzTx/>
+              <a:buFontTx/>
+              <a:buNone/>
+              <a:tabLst/>
+              <a:defRPr/>
+            </a:pPr>
+            <a:endParaRPr lang="en-US" dirty="0" smtClean="0"/>
+          </a:p>
+          <a:p>
+            <a:pPr marL="0" marR="0" indent="0" algn="l" defTabSz="1217613" rtl="0" eaLnBrk="1" fontAlgn="base" latinLnBrk="0" hangingPunct="1">
+              <a:lnSpc>
+                <a:spcPct val="90000"/>
+              </a:lnSpc>
+              <a:spcBef>
+                <a:spcPct val="30000"/>
+              </a:spcBef>
+              <a:spcAft>
+                <a:spcPts val="450"/>
+              </a:spcAft>
+              <a:buClrTx/>
+              <a:buSzTx/>
+              <a:buFontTx/>
+              <a:buNone/>
+              <a:tabLst/>
+              <a:defRPr/>
+            </a:pPr>
+            <a:r>
+              <a:rPr lang="en-US" b="1" dirty="0" smtClean="0">
+                <a:latin typeface="Courier New" panose="02070309020205020404" pitchFamily="49" charset="0"/>
+                <a:cs typeface="Courier New" panose="02070309020205020404" pitchFamily="49" charset="0"/>
+              </a:rPr>
+              <a:t>Note: </a:t>
+            </a:r>
+            <a:r>
+              <a:rPr lang="en-US" b="0" dirty="0" smtClean="0">
+                <a:latin typeface="Courier New" panose="02070309020205020404" pitchFamily="49" charset="0"/>
+                <a:cs typeface="Courier New" panose="02070309020205020404" pitchFamily="49" charset="0"/>
+              </a:rPr>
+              <a:t>The compliance package will be named </a:t>
+            </a:r>
+            <a:r>
+              <a:rPr lang="en-US" b="1" dirty="0" smtClean="0">
+                <a:latin typeface="Courier New" panose="02070309020205020404" pitchFamily="49" charset="0"/>
+                <a:cs typeface="Courier New" panose="02070309020205020404" pitchFamily="49" charset="0"/>
+              </a:rPr>
+              <a:t>download</a:t>
+            </a:r>
+            <a:r>
+              <a:rPr lang="en-US" b="0" dirty="0" smtClean="0">
+                <a:latin typeface="Courier New" panose="02070309020205020404" pitchFamily="49" charset="0"/>
+                <a:cs typeface="Courier New" panose="02070309020205020404" pitchFamily="49" charset="0"/>
+              </a:rPr>
+              <a:t> at this point.</a:t>
+            </a:r>
+          </a:p>
+          <a:p>
+            <a:endParaRPr lang="en-US" b="0" dirty="0" smtClean="0">
+              <a:latin typeface="Courier New" panose="02070309020205020404" pitchFamily="49" charset="0"/>
+              <a:cs typeface="Courier New" panose="02070309020205020404" pitchFamily="49" charset="0"/>
+            </a:endParaRPr>
+          </a:p>
+          <a:p>
+            <a:r>
+              <a:rPr lang="en-US" b="0" dirty="0" smtClean="0">
+                <a:latin typeface="Courier New" panose="02070309020205020404" pitchFamily="49" charset="0"/>
+                <a:cs typeface="Courier New" panose="02070309020205020404" pitchFamily="49" charset="0"/>
+              </a:rPr>
+              <a:t>Instructor Note: The </a:t>
+            </a:r>
+            <a:r>
+              <a:rPr lang="en-US" b="1" dirty="0" smtClean="0">
+                <a:latin typeface="Courier New" panose="02070309020205020404" pitchFamily="49" charset="0"/>
+                <a:cs typeface="Courier New" panose="02070309020205020404" pitchFamily="49" charset="0"/>
+              </a:rPr>
+              <a:t>X</a:t>
+            </a:r>
+            <a:r>
+              <a:rPr lang="en-US" b="0" dirty="0" smtClean="0">
+                <a:latin typeface="Courier New" panose="02070309020205020404" pitchFamily="49" charset="0"/>
+                <a:cs typeface="Courier New" panose="02070309020205020404" pitchFamily="49" charset="0"/>
+              </a:rPr>
+              <a:t> in this part of the file name - </a:t>
+            </a:r>
+            <a:r>
+              <a:rPr lang="en-US" b="1" dirty="0" smtClean="0">
+                <a:latin typeface="Courier New" panose="02070309020205020404" pitchFamily="49" charset="0"/>
+                <a:cs typeface="Courier New" panose="02070309020205020404" pitchFamily="49" charset="0"/>
+              </a:rPr>
+              <a:t>0.9.2-2.el</a:t>
+            </a:r>
+            <a:r>
+              <a:rPr lang="en-US" b="1" i="1" dirty="0" smtClean="0">
+                <a:latin typeface="Courier New" panose="02070309020205020404" pitchFamily="49" charset="0"/>
+                <a:cs typeface="Courier New" panose="02070309020205020404" pitchFamily="49" charset="0"/>
+              </a:rPr>
+              <a:t>X - </a:t>
+            </a:r>
+            <a:r>
+              <a:rPr lang="en-US" b="0" i="0" dirty="0" smtClean="0">
+                <a:latin typeface="Courier New" panose="02070309020205020404" pitchFamily="49" charset="0"/>
+                <a:cs typeface="Courier New" panose="02070309020205020404" pitchFamily="49" charset="0"/>
+              </a:rPr>
+              <a:t>was added so students will</a:t>
+            </a:r>
+            <a:r>
+              <a:rPr lang="en-US" b="0" i="0" baseline="0" dirty="0" smtClean="0">
+                <a:latin typeface="Courier New" panose="02070309020205020404" pitchFamily="49" charset="0"/>
+                <a:cs typeface="Courier New" panose="02070309020205020404" pitchFamily="49" charset="0"/>
+              </a:rPr>
+              <a:t> paste the latest version and not try to copy/paste the above command verbatim. It could take about a minute to download </a:t>
+            </a:r>
+            <a:r>
+              <a:rPr lang="en-US" b="0" i="0" baseline="0" smtClean="0">
+                <a:latin typeface="Courier New" panose="02070309020205020404" pitchFamily="49" charset="0"/>
+                <a:cs typeface="Courier New" panose="02070309020205020404" pitchFamily="49" charset="0"/>
+              </a:rPr>
+              <a:t>Compliance server.</a:t>
+            </a:r>
+            <a:endParaRPr lang="en-US" b="0" i="0" dirty="0" smtClean="0">
+              <a:latin typeface="Courier New" panose="02070309020205020404" pitchFamily="49" charset="0"/>
+              <a:cs typeface="Courier New" panose="02070309020205020404" pitchFamily="49" charset="0"/>
+            </a:endParaRPr>
+          </a:p>
+          <a:p>
+            <a:pPr marL="0" marR="0" indent="0" algn="l" defTabSz="1217613" rtl="0" eaLnBrk="1" fontAlgn="base" latinLnBrk="0" hangingPunct="1">
+              <a:lnSpc>
+                <a:spcPct val="90000"/>
+              </a:lnSpc>
+              <a:spcBef>
+                <a:spcPct val="30000"/>
+              </a:spcBef>
+              <a:spcAft>
+                <a:spcPts val="450"/>
+              </a:spcAft>
+              <a:buClrTx/>
+              <a:buSzTx/>
+              <a:buFontTx/>
+              <a:buNone/>
+              <a:tabLst/>
+              <a:defRPr/>
+            </a:pPr>
+            <a:endParaRPr lang="en-US" b="0" dirty="0" smtClean="0">
+              <a:latin typeface="Courier New" panose="02070309020205020404" pitchFamily="49" charset="0"/>
+              <a:cs typeface="Courier New" panose="02070309020205020404" pitchFamily="49" charset="0"/>
+            </a:endParaRPr>
+          </a:p>
+          <a:p>
+            <a:pPr marL="0" marR="0" indent="0" algn="l" defTabSz="1217613" rtl="0" eaLnBrk="1" fontAlgn="base" latinLnBrk="0" hangingPunct="1">
+              <a:lnSpc>
+                <a:spcPct val="90000"/>
+              </a:lnSpc>
+              <a:spcBef>
+                <a:spcPct val="30000"/>
+              </a:spcBef>
+              <a:spcAft>
+                <a:spcPts val="450"/>
+              </a:spcAft>
+              <a:buClrTx/>
+              <a:buSzTx/>
+              <a:buFontTx/>
+              <a:buNone/>
+              <a:tabLst/>
+              <a:defRPr/>
+            </a:pPr>
+            <a:endParaRPr lang="en-US" dirty="0" smtClean="0"/>
+          </a:p>
+          <a:p>
+            <a:pPr marL="0" marR="0" indent="0" algn="l" defTabSz="1217613" rtl="0" eaLnBrk="1" fontAlgn="base" latinLnBrk="0" hangingPunct="1">
+              <a:lnSpc>
+                <a:spcPct val="90000"/>
+              </a:lnSpc>
+              <a:spcBef>
+                <a:spcPct val="30000"/>
+              </a:spcBef>
+              <a:spcAft>
+                <a:spcPts val="450"/>
+              </a:spcAft>
+              <a:buClrTx/>
+              <a:buSzTx/>
+              <a:buFontTx/>
+              <a:buNone/>
+              <a:tabLst/>
+              <a:defRPr/>
+            </a:pPr>
+            <a:endParaRPr lang="en-US" dirty="0" smtClean="0"/>
           </a:p>
         </p:txBody>
       </p:sp>
@@ -3159,7 +3519,7 @@
               <a:pPr>
                 <a:defRPr/>
               </a:pPr>
-              <a:t>10</a:t>
+              <a:t>9</a:t>
             </a:fld>
             <a:endParaRPr lang="en-US" dirty="0"/>
           </a:p>
@@ -3212,7 +3572,7 @@
     </p:spTree>
     <p:extLst>
       <p:ext uri="{BB962C8B-B14F-4D97-AF65-F5344CB8AC3E}">
-        <p14:creationId xmlns:p14="http://schemas.microsoft.com/office/powerpoint/2010/main" val="667353389"/>
+        <p14:creationId xmlns:p14="http://schemas.microsoft.com/office/powerpoint/2010/main" val="1882353999"/>
       </p:ext>
     </p:extLst>
   </p:cSld>
@@ -3263,14 +3623,34 @@
         </p:nvSpPr>
         <p:spPr/>
         <p:txBody>
-          <a:bodyPr/>
+          <a:bodyPr>
+            <a:normAutofit/>
+          </a:bodyPr>
           <a:lstStyle/>
           <a:p>
             <a:r>
               <a:rPr lang="en-US" dirty="0" smtClean="0"/>
-              <a:t>We have not set up SSL so the https strikethrough is fine for now. In the workplace you would want to use SSL for connections to your Compliance Web UI.</a:t>
-            </a:r>
-            <a:endParaRPr lang="en-US" dirty="0"/>
+              <a:t>This reconfiguration process could take 5 or more minutes to complete. </a:t>
+            </a:r>
+          </a:p>
+          <a:p>
+            <a:endParaRPr lang="en-US" b="1" dirty="0" smtClean="0"/>
+          </a:p>
+          <a:p>
+            <a:r>
+              <a:rPr lang="en-US" b="1" dirty="0" smtClean="0"/>
+              <a:t>Important</a:t>
+            </a:r>
+            <a:r>
+              <a:rPr lang="en-US" dirty="0" smtClean="0"/>
+              <a:t>: Do not use Ctrl c while this is running. </a:t>
+            </a:r>
+          </a:p>
+          <a:p>
+            <a:endParaRPr lang="en-US" dirty="0" smtClean="0"/>
+          </a:p>
+          <a:p>
+            <a:endParaRPr lang="en-US" dirty="0" smtClean="0"/>
           </a:p>
         </p:txBody>
       </p:sp>
@@ -3297,7 +3677,7 @@
               <a:pPr>
                 <a:defRPr/>
               </a:pPr>
-              <a:t>11</a:t>
+              <a:t>10</a:t>
             </a:fld>
             <a:endParaRPr lang="en-US" dirty="0"/>
           </a:p>
@@ -3350,7 +3730,7 @@
     </p:spTree>
     <p:extLst>
       <p:ext uri="{BB962C8B-B14F-4D97-AF65-F5344CB8AC3E}">
-        <p14:creationId xmlns:p14="http://schemas.microsoft.com/office/powerpoint/2010/main" val="3756941173"/>
+        <p14:creationId xmlns:p14="http://schemas.microsoft.com/office/powerpoint/2010/main" val="1230862567"/>
       </p:ext>
     </p:extLst>
   </p:cSld>
@@ -11363,12 +11743,12 @@
       </p:grpSpPr>
       <p:sp>
         <p:nvSpPr>
-          <p:cNvPr id="2" name="Title 1"/>
-          <p:cNvSpPr>
-            <a:spLocks noGrp="1"/>
-          </p:cNvSpPr>
-          <p:nvPr>
-            <p:ph type="title"/>
+          <p:cNvPr id="2" name="Content Placeholder 1"/>
+          <p:cNvSpPr>
+            <a:spLocks noGrp="1"/>
+          </p:cNvSpPr>
+          <p:nvPr>
+            <p:ph sz="quarter" idx="10"/>
           </p:nvPr>
         </p:nvSpPr>
         <p:spPr/>
@@ -11378,11 +11758,227 @@
           <a:p>
             <a:r>
               <a:rPr lang="en-US" dirty="0" smtClean="0"/>
-              <a:t>GL: </a:t>
-            </a:r>
-            <a:r>
-              <a:rPr lang="en-US" dirty="0" smtClean="0"/>
-              <a:t>Configure the Compliance Server</a:t>
+              <a:t>...    </a:t>
+            </a:r>
+          </a:p>
+          <a:p>
+            <a:r>
+              <a:rPr lang="en-US" dirty="0" smtClean="0"/>
+              <a:t>- </a:t>
+            </a:r>
+            <a:r>
+              <a:rPr lang="en-US" dirty="0"/>
+              <a:t>change mode from '' to '0644'</a:t>
+            </a:r>
+          </a:p>
+          <a:p>
+            <a:r>
+              <a:rPr lang="en-US" dirty="0"/>
+              <a:t>Recipe: </a:t>
+            </a:r>
+            <a:r>
+              <a:rPr lang="en-US" dirty="0" err="1"/>
+              <a:t>sysctl</a:t>
+            </a:r>
+            <a:r>
+              <a:rPr lang="en-US" dirty="0"/>
+              <a:t>::service</a:t>
+            </a:r>
+          </a:p>
+          <a:p>
+            <a:r>
+              <a:rPr lang="en-US" dirty="0"/>
+              <a:t>  * service[</a:t>
+            </a:r>
+            <a:r>
+              <a:rPr lang="en-US" dirty="0" err="1"/>
+              <a:t>procps</a:t>
+            </a:r>
+            <a:r>
+              <a:rPr lang="en-US" dirty="0"/>
+              <a:t>] action start</a:t>
+            </a:r>
+          </a:p>
+          <a:p>
+            <a:r>
+              <a:rPr lang="en-US" dirty="0"/>
+              <a:t>    - start service service[</a:t>
+            </a:r>
+            <a:r>
+              <a:rPr lang="en-US" dirty="0" err="1"/>
+              <a:t>procps</a:t>
+            </a:r>
+            <a:r>
+              <a:rPr lang="en-US" dirty="0"/>
+              <a:t>]</a:t>
+            </a:r>
+          </a:p>
+          <a:p>
+            <a:endParaRPr lang="en-US" dirty="0"/>
+          </a:p>
+          <a:p>
+            <a:r>
+              <a:rPr lang="en-US" dirty="0"/>
+              <a:t>Running handlers:</a:t>
+            </a:r>
+          </a:p>
+          <a:p>
+            <a:r>
+              <a:rPr lang="en-US" dirty="0"/>
+              <a:t>Running handlers complete</a:t>
+            </a:r>
+          </a:p>
+          <a:p>
+            <a:r>
+              <a:rPr lang="en-US" dirty="0"/>
+              <a:t>Chef Client finished, </a:t>
+            </a:r>
+            <a:r>
+              <a:rPr lang="en-US" dirty="0" smtClean="0"/>
+              <a:t>228/224 </a:t>
+            </a:r>
+            <a:r>
+              <a:rPr lang="en-US" dirty="0"/>
+              <a:t>resources updated in </a:t>
+            </a:r>
+            <a:r>
+              <a:rPr lang="en-US" dirty="0" smtClean="0"/>
+              <a:t>259.522030572 </a:t>
+            </a:r>
+            <a:r>
+              <a:rPr lang="en-US" dirty="0"/>
+              <a:t>seconds</a:t>
+            </a:r>
+          </a:p>
+          <a:p>
+            <a:r>
+              <a:rPr lang="en-US" dirty="0"/>
+              <a:t>chef-compliance Reconfigured!</a:t>
+            </a:r>
+          </a:p>
+          <a:p>
+            <a:endParaRPr lang="en-US" dirty="0"/>
+          </a:p>
+          <a:p>
+            <a:endParaRPr lang="en-US" dirty="0"/>
+          </a:p>
+        </p:txBody>
+      </p:sp>
+      <p:sp>
+        <p:nvSpPr>
+          <p:cNvPr id="3" name="Text Placeholder 2"/>
+          <p:cNvSpPr>
+            <a:spLocks noGrp="1"/>
+          </p:cNvSpPr>
+          <p:nvPr>
+            <p:ph type="body" sz="quarter" idx="11"/>
+          </p:nvPr>
+        </p:nvSpPr>
+        <p:spPr/>
+        <p:txBody>
+          <a:bodyPr/>
+          <a:lstStyle/>
+          <a:p>
+            <a:r>
+              <a:rPr lang="en-US" dirty="0" smtClean="0"/>
+              <a:t>$ sudo </a:t>
+            </a:r>
+            <a:r>
+              <a:rPr lang="en-US" dirty="0"/>
+              <a:t>chef-compliance-</a:t>
+            </a:r>
+            <a:r>
+              <a:rPr lang="en-US" dirty="0" err="1"/>
+              <a:t>ctl</a:t>
+            </a:r>
+            <a:r>
+              <a:rPr lang="en-US" dirty="0"/>
+              <a:t> reconfigure</a:t>
+            </a:r>
+          </a:p>
+        </p:txBody>
+      </p:sp>
+      <p:sp>
+        <p:nvSpPr>
+          <p:cNvPr id="5" name="Title 4"/>
+          <p:cNvSpPr>
+            <a:spLocks noGrp="1"/>
+          </p:cNvSpPr>
+          <p:nvPr>
+            <p:ph type="title"/>
+          </p:nvPr>
+        </p:nvSpPr>
+        <p:spPr/>
+        <p:txBody>
+          <a:bodyPr/>
+          <a:lstStyle/>
+          <a:p>
+            <a:r>
+              <a:rPr lang="en-US" dirty="0" smtClean="0"/>
+              <a:t>GL: Initial Configuration of Compliance</a:t>
+            </a:r>
+            <a:endParaRPr lang="en-US" dirty="0"/>
+          </a:p>
+        </p:txBody>
+      </p:sp>
+    </p:spTree>
+    <p:extLst>
+      <p:ext uri="{BB962C8B-B14F-4D97-AF65-F5344CB8AC3E}">
+        <p14:creationId xmlns:p14="http://schemas.microsoft.com/office/powerpoint/2010/main" val="1887887408"/>
+      </p:ext>
+    </p:extLst>
+  </p:cSld>
+  <p:clrMapOvr>
+    <a:masterClrMapping/>
+  </p:clrMapOvr>
+  <p:transition spd="med">
+    <p:fade/>
+  </p:transition>
+  <p:timing>
+    <p:tnLst>
+      <p:par>
+        <p:cTn id="1" dur="indefinite" restart="never" nodeType="tmRoot"/>
+      </p:par>
+    </p:tnLst>
+  </p:timing>
+</p:sld>
+</file>
+
+<file path=ppt/slides/slide11.xml><?xml version="1.0" encoding="utf-8"?>
+<p:sld xmlns:a="http://schemas.openxmlformats.org/drawingml/2006/main" xmlns:r="http://schemas.openxmlformats.org/officeDocument/2006/relationships" xmlns:p="http://schemas.openxmlformats.org/presentationml/2006/main">
+  <p:cSld>
+    <p:spTree>
+      <p:nvGrpSpPr>
+        <p:cNvPr id="1" name=""/>
+        <p:cNvGrpSpPr/>
+        <p:nvPr/>
+      </p:nvGrpSpPr>
+      <p:grpSpPr>
+        <a:xfrm>
+          <a:off x="0" y="0"/>
+          <a:ext cx="0" cy="0"/>
+          <a:chOff x="0" y="0"/>
+          <a:chExt cx="0" cy="0"/>
+        </a:xfrm>
+      </p:grpSpPr>
+      <p:sp>
+        <p:nvSpPr>
+          <p:cNvPr id="2" name="Title 1"/>
+          <p:cNvSpPr>
+            <a:spLocks noGrp="1"/>
+          </p:cNvSpPr>
+          <p:nvPr>
+            <p:ph type="title"/>
+          </p:nvPr>
+        </p:nvSpPr>
+        <p:spPr/>
+        <p:txBody>
+          <a:bodyPr/>
+          <a:lstStyle/>
+          <a:p>
+            <a:r>
+              <a:rPr lang="en-US" dirty="0" smtClean="0"/>
+              <a:t>GL: Configure the Compliance Server</a:t>
             </a:r>
             <a:endParaRPr lang="en-US" dirty="0"/>
           </a:p>
@@ -11414,19 +12010,7 @@
             </a:pPr>
             <a:r>
               <a:rPr lang="en-US" dirty="0" smtClean="0"/>
-              <a:t>From your laptop, </a:t>
-            </a:r>
-            <a:r>
-              <a:rPr lang="en-US" dirty="0" smtClean="0"/>
-              <a:t>open a </a:t>
-            </a:r>
-            <a:r>
-              <a:rPr lang="en-US" dirty="0" smtClean="0"/>
-              <a:t>web browser </a:t>
-            </a:r>
-            <a:r>
-              <a:rPr lang="en-US" dirty="0" smtClean="0"/>
-              <a:t>and point it to:</a:t>
+              <a:t>From your laptop, open a web browser and point it to:</a:t>
             </a:r>
             <a:br>
               <a:rPr lang="en-US" dirty="0" smtClean="0"/>
@@ -11459,11 +12043,7 @@
             </a:pPr>
             <a:r>
               <a:rPr lang="en-US" dirty="0" smtClean="0"/>
-              <a:t>For </a:t>
-            </a:r>
-            <a:r>
-              <a:rPr lang="en-US" dirty="0" smtClean="0"/>
-              <a:t>example</a:t>
+              <a:t>For example</a:t>
             </a:r>
             <a:br>
               <a:rPr lang="en-US" dirty="0" smtClean="0"/>
@@ -11560,7 +12140,7 @@
 </p:sld>
 </file>
 
-<file path=ppt/slides/slide11.xml><?xml version="1.0" encoding="utf-8"?>
+<file path=ppt/slides/slide12.xml><?xml version="1.0" encoding="utf-8"?>
 <p:sld xmlns:a="http://schemas.openxmlformats.org/drawingml/2006/main" xmlns:r="http://schemas.openxmlformats.org/officeDocument/2006/relationships" xmlns:p="http://schemas.openxmlformats.org/presentationml/2006/main">
   <p:cSld>
     <p:spTree>
@@ -11600,7 +12180,6 @@
               <a:rPr lang="en-US" dirty="0"/>
               <a:t>Configure the Compliance Server</a:t>
             </a:r>
-            <a:endParaRPr lang="en-US" dirty="0"/>
           </a:p>
         </p:txBody>
       </p:sp>
@@ -11766,7 +12345,7 @@
 </p:sld>
 </file>
 
-<file path=ppt/slides/slide12.xml><?xml version="1.0" encoding="utf-8"?>
+<file path=ppt/slides/slide13.xml><?xml version="1.0" encoding="utf-8"?>
 <p:sld xmlns:a="http://schemas.openxmlformats.org/drawingml/2006/main" xmlns:r="http://schemas.openxmlformats.org/officeDocument/2006/relationships" xmlns:p="http://schemas.openxmlformats.org/presentationml/2006/main">
   <p:cSld>
     <p:spTree>
@@ -11806,7 +12385,6 @@
               <a:rPr lang="en-US" dirty="0"/>
               <a:t>Configure the Compliance Server</a:t>
             </a:r>
-            <a:endParaRPr lang="en-US" dirty="0"/>
           </a:p>
         </p:txBody>
       </p:sp>
@@ -11902,7 +12480,7 @@
 </p:sld>
 </file>
 
-<file path=ppt/slides/slide13.xml><?xml version="1.0" encoding="utf-8"?>
+<file path=ppt/slides/slide14.xml><?xml version="1.0" encoding="utf-8"?>
 <p:sld xmlns:a="http://schemas.openxmlformats.org/drawingml/2006/main" xmlns:r="http://schemas.openxmlformats.org/officeDocument/2006/relationships" xmlns:p="http://schemas.openxmlformats.org/presentationml/2006/main">
   <p:cSld>
     <p:spTree>
@@ -11942,7 +12520,6 @@
               <a:rPr lang="en-US" dirty="0"/>
               <a:t>Configure the Compliance Server</a:t>
             </a:r>
-            <a:endParaRPr lang="en-US" dirty="0"/>
           </a:p>
         </p:txBody>
       </p:sp>
@@ -12103,7 +12680,7 @@
 </p:sld>
 </file>
 
-<file path=ppt/slides/slide14.xml><?xml version="1.0" encoding="utf-8"?>
+<file path=ppt/slides/slide15.xml><?xml version="1.0" encoding="utf-8"?>
 <p:sld xmlns:a="http://schemas.openxmlformats.org/drawingml/2006/main" xmlns:r="http://schemas.openxmlformats.org/officeDocument/2006/relationships" xmlns:p="http://schemas.openxmlformats.org/presentationml/2006/main">
   <p:cSld>
     <p:spTree>
@@ -12143,7 +12720,6 @@
               <a:rPr lang="en-US" dirty="0"/>
               <a:t>Configure the Compliance Server</a:t>
             </a:r>
-            <a:endParaRPr lang="en-US" dirty="0"/>
           </a:p>
         </p:txBody>
       </p:sp>
@@ -12238,7 +12814,7 @@
 </p:sld>
 </file>
 
-<file path=ppt/slides/slide15.xml><?xml version="1.0" encoding="utf-8"?>
+<file path=ppt/slides/slide16.xml><?xml version="1.0" encoding="utf-8"?>
 <p:sld xmlns:a="http://schemas.openxmlformats.org/drawingml/2006/main" xmlns:r="http://schemas.openxmlformats.org/officeDocument/2006/relationships" xmlns:p="http://schemas.openxmlformats.org/presentationml/2006/main">
   <p:cSld>
     <p:spTree>
@@ -12278,7 +12854,6 @@
               <a:rPr lang="en-US" dirty="0"/>
               <a:t>Configure the Compliance Server</a:t>
             </a:r>
-            <a:endParaRPr lang="en-US" dirty="0"/>
           </a:p>
         </p:txBody>
       </p:sp>
@@ -12308,11 +12883,7 @@
             </a:pPr>
             <a:r>
               <a:rPr lang="en-US" dirty="0" smtClean="0"/>
-              <a:t>On the resulting page sign in using admin/adm</a:t>
-            </a:r>
-            <a:r>
-              <a:rPr lang="en-US" dirty="0" smtClean="0"/>
-              <a:t>in.</a:t>
+              <a:t>On the resulting page sign in using admin/admin.</a:t>
             </a:r>
             <a:endParaRPr lang="en-US" dirty="0"/>
           </a:p>
@@ -12377,7 +12948,7 @@
 </p:sld>
 </file>
 
-<file path=ppt/slides/slide16.xml><?xml version="1.0" encoding="utf-8"?>
+<file path=ppt/slides/slide17.xml><?xml version="1.0" encoding="utf-8"?>
 <p:sld xmlns:a="http://schemas.openxmlformats.org/drawingml/2006/main" xmlns:r="http://schemas.openxmlformats.org/officeDocument/2006/relationships" xmlns:p="http://schemas.openxmlformats.org/presentationml/2006/main">
   <p:cSld>
     <p:spTree>
@@ -12417,7 +12988,6 @@
               <a:rPr lang="en-US" dirty="0"/>
               <a:t>Configure the Compliance Server</a:t>
             </a:r>
-            <a:endParaRPr lang="en-US" dirty="0"/>
           </a:p>
         </p:txBody>
       </p:sp>
@@ -12501,7 +13071,7 @@
 </p:sld>
 </file>
 
-<file path=ppt/slides/slide17.xml><?xml version="1.0" encoding="utf-8"?>
+<file path=ppt/slides/slide18.xml><?xml version="1.0" encoding="utf-8"?>
 <p:sld xmlns:a="http://schemas.openxmlformats.org/drawingml/2006/main" xmlns:r="http://schemas.openxmlformats.org/officeDocument/2006/relationships" xmlns:p="http://schemas.openxmlformats.org/presentationml/2006/main">
   <p:cSld>
     <p:spTree>
@@ -12685,7 +13255,7 @@
 </p:sld>
 </file>
 
-<file path=ppt/slides/slide18.xml><?xml version="1.0" encoding="utf-8"?>
+<file path=ppt/slides/slide19.xml><?xml version="1.0" encoding="utf-8"?>
 <p:sld xmlns:a="http://schemas.openxmlformats.org/drawingml/2006/main" xmlns:r="http://schemas.openxmlformats.org/officeDocument/2006/relationships" xmlns:p="http://schemas.openxmlformats.org/presentationml/2006/main">
   <p:cSld>
     <p:bg>
@@ -12853,200 +13423,6 @@
     <p:extLst>
       <p:ext uri="{BB962C8B-B14F-4D97-AF65-F5344CB8AC3E}">
         <p14:creationId xmlns:p14="http://schemas.microsoft.com/office/powerpoint/2010/main" val="321457963"/>
-      </p:ext>
-    </p:extLst>
-  </p:cSld>
-  <p:clrMapOvr>
-    <a:masterClrMapping/>
-  </p:clrMapOvr>
-  <p:transition spd="med">
-    <p:fade/>
-  </p:transition>
-</p:sld>
-</file>
-
-<file path=ppt/slides/slide19.xml><?xml version="1.0" encoding="utf-8"?>
-<p:sld xmlns:a="http://schemas.openxmlformats.org/drawingml/2006/main" xmlns:r="http://schemas.openxmlformats.org/officeDocument/2006/relationships" xmlns:p="http://schemas.openxmlformats.org/presentationml/2006/main">
-  <p:cSld>
-    <p:spTree>
-      <p:nvGrpSpPr>
-        <p:cNvPr id="1" name=""/>
-        <p:cNvGrpSpPr/>
-        <p:nvPr/>
-      </p:nvGrpSpPr>
-      <p:grpSpPr>
-        <a:xfrm>
-          <a:off x="0" y="0"/>
-          <a:ext cx="0" cy="0"/>
-          <a:chOff x="0" y="0"/>
-          <a:chExt cx="0" cy="0"/>
-        </a:xfrm>
-      </p:grpSpPr>
-      <p:sp>
-        <p:nvSpPr>
-          <p:cNvPr id="2" name="Footer Placeholder 1"/>
-          <p:cNvSpPr txBox="1">
-            <a:spLocks/>
-          </p:cNvSpPr>
-          <p:nvPr/>
-        </p:nvSpPr>
-        <p:spPr>
-          <a:xfrm>
-            <a:off x="324400" y="8579607"/>
-            <a:ext cx="5681953" cy="507556"/>
-          </a:xfrm>
-          <a:prstGeom prst="rect">
-            <a:avLst/>
-          </a:prstGeom>
-        </p:spPr>
-        <p:txBody>
-          <a:bodyPr/>
-          <a:lstStyle>
-            <a:defPPr>
-              <a:defRPr lang="en-US"/>
-            </a:defPPr>
-            <a:lvl1pPr algn="l" defTabSz="1217613" rtl="0" fontAlgn="base">
-              <a:spcBef>
-                <a:spcPct val="0"/>
-              </a:spcBef>
-              <a:spcAft>
-                <a:spcPct val="0"/>
-              </a:spcAft>
-              <a:defRPr sz="2400" kern="1200">
-                <a:solidFill>
-                  <a:schemeClr val="tx1"/>
-                </a:solidFill>
-                <a:latin typeface="Arial" charset="0"/>
-                <a:ea typeface="ＭＳ Ｐゴシック" charset="0"/>
-                <a:cs typeface="ＭＳ Ｐゴシック" charset="0"/>
-              </a:defRPr>
-            </a:lvl1pPr>
-            <a:lvl2pPr marL="608013" indent="-150813" algn="l" defTabSz="1217613" rtl="0" fontAlgn="base">
-              <a:spcBef>
-                <a:spcPct val="0"/>
-              </a:spcBef>
-              <a:spcAft>
-                <a:spcPct val="0"/>
-              </a:spcAft>
-              <a:defRPr sz="2400" kern="1200">
-                <a:solidFill>
-                  <a:schemeClr val="tx1"/>
-                </a:solidFill>
-                <a:latin typeface="Arial" charset="0"/>
-                <a:ea typeface="ＭＳ Ｐゴシック" charset="0"/>
-                <a:cs typeface="ＭＳ Ｐゴシック" charset="0"/>
-              </a:defRPr>
-            </a:lvl2pPr>
-            <a:lvl3pPr marL="1217613" indent="-303213" algn="l" defTabSz="1217613" rtl="0" fontAlgn="base">
-              <a:spcBef>
-                <a:spcPct val="0"/>
-              </a:spcBef>
-              <a:spcAft>
-                <a:spcPct val="0"/>
-              </a:spcAft>
-              <a:defRPr sz="2400" kern="1200">
-                <a:solidFill>
-                  <a:schemeClr val="tx1"/>
-                </a:solidFill>
-                <a:latin typeface="Arial" charset="0"/>
-                <a:ea typeface="ＭＳ Ｐゴシック" charset="0"/>
-                <a:cs typeface="ＭＳ Ｐゴシック" charset="0"/>
-              </a:defRPr>
-            </a:lvl3pPr>
-            <a:lvl4pPr marL="1827213" indent="-455613" algn="l" defTabSz="1217613" rtl="0" fontAlgn="base">
-              <a:spcBef>
-                <a:spcPct val="0"/>
-              </a:spcBef>
-              <a:spcAft>
-                <a:spcPct val="0"/>
-              </a:spcAft>
-              <a:defRPr sz="2400" kern="1200">
-                <a:solidFill>
-                  <a:schemeClr val="tx1"/>
-                </a:solidFill>
-                <a:latin typeface="Arial" charset="0"/>
-                <a:ea typeface="ＭＳ Ｐゴシック" charset="0"/>
-                <a:cs typeface="ＭＳ Ｐゴシック" charset="0"/>
-              </a:defRPr>
-            </a:lvl4pPr>
-            <a:lvl5pPr marL="2436813" indent="-608013" algn="l" defTabSz="1217613" rtl="0" fontAlgn="base">
-              <a:spcBef>
-                <a:spcPct val="0"/>
-              </a:spcBef>
-              <a:spcAft>
-                <a:spcPct val="0"/>
-              </a:spcAft>
-              <a:defRPr sz="2400" kern="1200">
-                <a:solidFill>
-                  <a:schemeClr val="tx1"/>
-                </a:solidFill>
-                <a:latin typeface="Arial" charset="0"/>
-                <a:ea typeface="ＭＳ Ｐゴシック" charset="0"/>
-                <a:cs typeface="ＭＳ Ｐゴシック" charset="0"/>
-              </a:defRPr>
-            </a:lvl5pPr>
-            <a:lvl6pPr marL="2286000" algn="l" defTabSz="457200" rtl="0" eaLnBrk="1" latinLnBrk="0" hangingPunct="1">
-              <a:defRPr sz="2400" kern="1200">
-                <a:solidFill>
-                  <a:schemeClr val="tx1"/>
-                </a:solidFill>
-                <a:latin typeface="Arial" charset="0"/>
-                <a:ea typeface="ＭＳ Ｐゴシック" charset="0"/>
-                <a:cs typeface="ＭＳ Ｐゴシック" charset="0"/>
-              </a:defRPr>
-            </a:lvl6pPr>
-            <a:lvl7pPr marL="2743200" algn="l" defTabSz="457200" rtl="0" eaLnBrk="1" latinLnBrk="0" hangingPunct="1">
-              <a:defRPr sz="2400" kern="1200">
-                <a:solidFill>
-                  <a:schemeClr val="tx1"/>
-                </a:solidFill>
-                <a:latin typeface="Arial" charset="0"/>
-                <a:ea typeface="ＭＳ Ｐゴシック" charset="0"/>
-                <a:cs typeface="ＭＳ Ｐゴシック" charset="0"/>
-              </a:defRPr>
-            </a:lvl7pPr>
-            <a:lvl8pPr marL="3200400" algn="l" defTabSz="457200" rtl="0" eaLnBrk="1" latinLnBrk="0" hangingPunct="1">
-              <a:defRPr sz="2400" kern="1200">
-                <a:solidFill>
-                  <a:schemeClr val="tx1"/>
-                </a:solidFill>
-                <a:latin typeface="Arial" charset="0"/>
-                <a:ea typeface="ＭＳ Ｐゴシック" charset="0"/>
-                <a:cs typeface="ＭＳ Ｐゴシック" charset="0"/>
-              </a:defRPr>
-            </a:lvl8pPr>
-            <a:lvl9pPr marL="3657600" algn="l" defTabSz="457200" rtl="0" eaLnBrk="1" latinLnBrk="0" hangingPunct="1">
-              <a:defRPr sz="2400" kern="1200">
-                <a:solidFill>
-                  <a:schemeClr val="tx1"/>
-                </a:solidFill>
-                <a:latin typeface="Arial" charset="0"/>
-                <a:ea typeface="ＭＳ Ｐゴシック" charset="0"/>
-                <a:cs typeface="ＭＳ Ｐゴシック" charset="0"/>
-              </a:defRPr>
-            </a:lvl9pPr>
-          </a:lstStyle>
-          <a:p>
-            <a:r>
-              <a:rPr lang="en-US" dirty="0" smtClean="0">
-                <a:solidFill>
-                  <a:srgbClr val="7D868C"/>
-                </a:solidFill>
-              </a:rPr>
-              <a:t>©2016 Chef Software Inc</a:t>
-            </a:r>
-            <a:r>
-              <a:rPr lang="en-US" dirty="0" smtClean="0"/>
-              <a:t>.</a:t>
-            </a:r>
-            <a:endParaRPr lang="en-US" dirty="0"/>
-          </a:p>
-        </p:txBody>
-      </p:sp>
-    </p:spTree>
-    <p:extLst>
-      <p:ext uri="{BB962C8B-B14F-4D97-AF65-F5344CB8AC3E}">
-        <p14:creationId xmlns:p14="http://schemas.microsoft.com/office/powerpoint/2010/main" val="522763473"/>
       </p:ext>
     </p:extLst>
   </p:cSld>
@@ -13193,6 +13569,200 @@
 </p:sld>
 </file>
 
+<file path=ppt/slides/slide20.xml><?xml version="1.0" encoding="utf-8"?>
+<p:sld xmlns:a="http://schemas.openxmlformats.org/drawingml/2006/main" xmlns:r="http://schemas.openxmlformats.org/officeDocument/2006/relationships" xmlns:p="http://schemas.openxmlformats.org/presentationml/2006/main">
+  <p:cSld>
+    <p:spTree>
+      <p:nvGrpSpPr>
+        <p:cNvPr id="1" name=""/>
+        <p:cNvGrpSpPr/>
+        <p:nvPr/>
+      </p:nvGrpSpPr>
+      <p:grpSpPr>
+        <a:xfrm>
+          <a:off x="0" y="0"/>
+          <a:ext cx="0" cy="0"/>
+          <a:chOff x="0" y="0"/>
+          <a:chExt cx="0" cy="0"/>
+        </a:xfrm>
+      </p:grpSpPr>
+      <p:sp>
+        <p:nvSpPr>
+          <p:cNvPr id="2" name="Footer Placeholder 1"/>
+          <p:cNvSpPr txBox="1">
+            <a:spLocks/>
+          </p:cNvSpPr>
+          <p:nvPr/>
+        </p:nvSpPr>
+        <p:spPr>
+          <a:xfrm>
+            <a:off x="324400" y="8579607"/>
+            <a:ext cx="5681953" cy="507556"/>
+          </a:xfrm>
+          <a:prstGeom prst="rect">
+            <a:avLst/>
+          </a:prstGeom>
+        </p:spPr>
+        <p:txBody>
+          <a:bodyPr/>
+          <a:lstStyle>
+            <a:defPPr>
+              <a:defRPr lang="en-US"/>
+            </a:defPPr>
+            <a:lvl1pPr algn="l" defTabSz="1217613" rtl="0" fontAlgn="base">
+              <a:spcBef>
+                <a:spcPct val="0"/>
+              </a:spcBef>
+              <a:spcAft>
+                <a:spcPct val="0"/>
+              </a:spcAft>
+              <a:defRPr sz="2400" kern="1200">
+                <a:solidFill>
+                  <a:schemeClr val="tx1"/>
+                </a:solidFill>
+                <a:latin typeface="Arial" charset="0"/>
+                <a:ea typeface="ＭＳ Ｐゴシック" charset="0"/>
+                <a:cs typeface="ＭＳ Ｐゴシック" charset="0"/>
+              </a:defRPr>
+            </a:lvl1pPr>
+            <a:lvl2pPr marL="608013" indent="-150813" algn="l" defTabSz="1217613" rtl="0" fontAlgn="base">
+              <a:spcBef>
+                <a:spcPct val="0"/>
+              </a:spcBef>
+              <a:spcAft>
+                <a:spcPct val="0"/>
+              </a:spcAft>
+              <a:defRPr sz="2400" kern="1200">
+                <a:solidFill>
+                  <a:schemeClr val="tx1"/>
+                </a:solidFill>
+                <a:latin typeface="Arial" charset="0"/>
+                <a:ea typeface="ＭＳ Ｐゴシック" charset="0"/>
+                <a:cs typeface="ＭＳ Ｐゴシック" charset="0"/>
+              </a:defRPr>
+            </a:lvl2pPr>
+            <a:lvl3pPr marL="1217613" indent="-303213" algn="l" defTabSz="1217613" rtl="0" fontAlgn="base">
+              <a:spcBef>
+                <a:spcPct val="0"/>
+              </a:spcBef>
+              <a:spcAft>
+                <a:spcPct val="0"/>
+              </a:spcAft>
+              <a:defRPr sz="2400" kern="1200">
+                <a:solidFill>
+                  <a:schemeClr val="tx1"/>
+                </a:solidFill>
+                <a:latin typeface="Arial" charset="0"/>
+                <a:ea typeface="ＭＳ Ｐゴシック" charset="0"/>
+                <a:cs typeface="ＭＳ Ｐゴシック" charset="0"/>
+              </a:defRPr>
+            </a:lvl3pPr>
+            <a:lvl4pPr marL="1827213" indent="-455613" algn="l" defTabSz="1217613" rtl="0" fontAlgn="base">
+              <a:spcBef>
+                <a:spcPct val="0"/>
+              </a:spcBef>
+              <a:spcAft>
+                <a:spcPct val="0"/>
+              </a:spcAft>
+              <a:defRPr sz="2400" kern="1200">
+                <a:solidFill>
+                  <a:schemeClr val="tx1"/>
+                </a:solidFill>
+                <a:latin typeface="Arial" charset="0"/>
+                <a:ea typeface="ＭＳ Ｐゴシック" charset="0"/>
+                <a:cs typeface="ＭＳ Ｐゴシック" charset="0"/>
+              </a:defRPr>
+            </a:lvl4pPr>
+            <a:lvl5pPr marL="2436813" indent="-608013" algn="l" defTabSz="1217613" rtl="0" fontAlgn="base">
+              <a:spcBef>
+                <a:spcPct val="0"/>
+              </a:spcBef>
+              <a:spcAft>
+                <a:spcPct val="0"/>
+              </a:spcAft>
+              <a:defRPr sz="2400" kern="1200">
+                <a:solidFill>
+                  <a:schemeClr val="tx1"/>
+                </a:solidFill>
+                <a:latin typeface="Arial" charset="0"/>
+                <a:ea typeface="ＭＳ Ｐゴシック" charset="0"/>
+                <a:cs typeface="ＭＳ Ｐゴシック" charset="0"/>
+              </a:defRPr>
+            </a:lvl5pPr>
+            <a:lvl6pPr marL="2286000" algn="l" defTabSz="457200" rtl="0" eaLnBrk="1" latinLnBrk="0" hangingPunct="1">
+              <a:defRPr sz="2400" kern="1200">
+                <a:solidFill>
+                  <a:schemeClr val="tx1"/>
+                </a:solidFill>
+                <a:latin typeface="Arial" charset="0"/>
+                <a:ea typeface="ＭＳ Ｐゴシック" charset="0"/>
+                <a:cs typeface="ＭＳ Ｐゴシック" charset="0"/>
+              </a:defRPr>
+            </a:lvl6pPr>
+            <a:lvl7pPr marL="2743200" algn="l" defTabSz="457200" rtl="0" eaLnBrk="1" latinLnBrk="0" hangingPunct="1">
+              <a:defRPr sz="2400" kern="1200">
+                <a:solidFill>
+                  <a:schemeClr val="tx1"/>
+                </a:solidFill>
+                <a:latin typeface="Arial" charset="0"/>
+                <a:ea typeface="ＭＳ Ｐゴシック" charset="0"/>
+                <a:cs typeface="ＭＳ Ｐゴシック" charset="0"/>
+              </a:defRPr>
+            </a:lvl7pPr>
+            <a:lvl8pPr marL="3200400" algn="l" defTabSz="457200" rtl="0" eaLnBrk="1" latinLnBrk="0" hangingPunct="1">
+              <a:defRPr sz="2400" kern="1200">
+                <a:solidFill>
+                  <a:schemeClr val="tx1"/>
+                </a:solidFill>
+                <a:latin typeface="Arial" charset="0"/>
+                <a:ea typeface="ＭＳ Ｐゴシック" charset="0"/>
+                <a:cs typeface="ＭＳ Ｐゴシック" charset="0"/>
+              </a:defRPr>
+            </a:lvl8pPr>
+            <a:lvl9pPr marL="3657600" algn="l" defTabSz="457200" rtl="0" eaLnBrk="1" latinLnBrk="0" hangingPunct="1">
+              <a:defRPr sz="2400" kern="1200">
+                <a:solidFill>
+                  <a:schemeClr val="tx1"/>
+                </a:solidFill>
+                <a:latin typeface="Arial" charset="0"/>
+                <a:ea typeface="ＭＳ Ｐゴシック" charset="0"/>
+                <a:cs typeface="ＭＳ Ｐゴシック" charset="0"/>
+              </a:defRPr>
+            </a:lvl9pPr>
+          </a:lstStyle>
+          <a:p>
+            <a:r>
+              <a:rPr lang="en-US" dirty="0" smtClean="0">
+                <a:solidFill>
+                  <a:srgbClr val="7D868C"/>
+                </a:solidFill>
+              </a:rPr>
+              <a:t>©2016 Chef Software Inc</a:t>
+            </a:r>
+            <a:r>
+              <a:rPr lang="en-US" dirty="0" smtClean="0"/>
+              <a:t>.</a:t>
+            </a:r>
+            <a:endParaRPr lang="en-US" dirty="0"/>
+          </a:p>
+        </p:txBody>
+      </p:sp>
+    </p:spTree>
+    <p:extLst>
+      <p:ext uri="{BB962C8B-B14F-4D97-AF65-F5344CB8AC3E}">
+        <p14:creationId xmlns:p14="http://schemas.microsoft.com/office/powerpoint/2010/main" val="522763473"/>
+      </p:ext>
+    </p:extLst>
+  </p:cSld>
+  <p:clrMapOvr>
+    <a:masterClrMapping/>
+  </p:clrMapOvr>
+  <p:transition spd="med">
+    <p:fade/>
+  </p:transition>
+</p:sld>
+</file>
+
 <file path=ppt/slides/slide3.xml><?xml version="1.0" encoding="utf-8"?>
 <p:sld xmlns:a="http://schemas.openxmlformats.org/drawingml/2006/main" xmlns:r="http://schemas.openxmlformats.org/officeDocument/2006/relationships" xmlns:p="http://schemas.openxmlformats.org/presentationml/2006/main">
   <p:cSld>
@@ -13367,7 +13937,7 @@
           <a:p>
             <a:r>
               <a:rPr lang="en-US" dirty="0" smtClean="0"/>
-              <a:t>Group Lab</a:t>
+              <a:t>Group Lab:</a:t>
             </a:r>
             <a:br>
               <a:rPr lang="en-US" dirty="0" smtClean="0"/>
@@ -13871,36 +14441,34 @@
             </a:pPr>
             <a:r>
               <a:rPr lang="en-US" dirty="0" smtClean="0"/>
-              <a:t>From the resulting web page, click the Red Had Linux link and then highlight and copy the URL for the </a:t>
-            </a:r>
-            <a:r>
-              <a:rPr lang="en-US" b="1" dirty="0"/>
-              <a:t>Red Hat Enterprise Linux </a:t>
+              <a:t>From the resulting web page, click the </a:t>
             </a:r>
             <a:r>
               <a:rPr lang="en-US" b="1" dirty="0" smtClean="0"/>
-              <a:t>6</a:t>
-            </a:r>
-            <a:r>
-              <a:rPr lang="en-US" dirty="0"/>
-              <a:t> </a:t>
-            </a:r>
-            <a:r>
-              <a:rPr lang="en-US" dirty="0" smtClean="0"/>
-              <a:t>version. </a:t>
-            </a:r>
-            <a:r>
-              <a:rPr lang="en-US" u="sng" dirty="0" smtClean="0"/>
-              <a:t>Do not </a:t>
-            </a:r>
-            <a:r>
-              <a:rPr lang="en-US" dirty="0" smtClean="0"/>
-              <a:t>click the Download button.</a:t>
-            </a:r>
-            <a:endParaRPr lang="en-US" dirty="0"/>
-          </a:p>
-          <a:p>
-            <a:endParaRPr lang="en-US" dirty="0" smtClean="0"/>
+              <a:t>Red Had Linux </a:t>
+            </a:r>
+            <a:r>
+              <a:rPr lang="en-US" dirty="0" smtClean="0"/>
+              <a:t>link and then click the </a:t>
+            </a:r>
+            <a:r>
+              <a:rPr lang="en-US" b="1" dirty="0" smtClean="0"/>
+              <a:t>Version</a:t>
+            </a:r>
+            <a:r>
+              <a:rPr lang="en-US" dirty="0" smtClean="0"/>
+              <a:t> button.</a:t>
+            </a:r>
+          </a:p>
+          <a:p>
+            <a:pPr marL="457200" indent="-457200">
+              <a:buFont typeface="Arial" panose="020B0604020202020204" pitchFamily="34" charset="0"/>
+              <a:buChar char="•"/>
+            </a:pPr>
+            <a:r>
+              <a:rPr lang="en-US" dirty="0" smtClean="0"/>
+              <a:t>Select the version from the Version button as indicated by the instructor.</a:t>
+            </a:r>
           </a:p>
           <a:p>
             <a:pPr marL="457200" indent="-457200">
@@ -13913,7 +14481,7 @@
       </p:sp>
       <p:pic>
         <p:nvPicPr>
-          <p:cNvPr id="4" name="Picture 3"/>
+          <p:cNvPr id="5" name="Picture 4"/>
           <p:cNvPicPr>
             <a:picLocks noChangeAspect="1"/>
           </p:cNvPicPr>
@@ -13927,8 +14495,8 @@
         </p:blipFill>
         <p:spPr>
           <a:xfrm>
-            <a:off x="528201" y="3131820"/>
-            <a:ext cx="15199599" cy="4953074"/>
+            <a:off x="1265095" y="4027100"/>
+            <a:ext cx="13624210" cy="4028421"/>
           </a:xfrm>
           <a:prstGeom prst="rect">
             <a:avLst/>
@@ -13982,278 +14550,162 @@
       </p:grpSpPr>
       <p:sp>
         <p:nvSpPr>
-          <p:cNvPr id="2" name="Content Placeholder 1"/>
-          <p:cNvSpPr>
-            <a:spLocks noGrp="1"/>
-          </p:cNvSpPr>
-          <p:nvPr>
-            <p:ph sz="quarter" idx="10"/>
+          <p:cNvPr id="2" name="Title 1"/>
+          <p:cNvSpPr>
+            <a:spLocks noGrp="1"/>
+          </p:cNvSpPr>
+          <p:nvPr>
+            <p:ph type="title"/>
+          </p:nvPr>
+        </p:nvSpPr>
+        <p:spPr/>
+        <p:txBody>
+          <a:bodyPr/>
+          <a:lstStyle/>
+          <a:p>
+            <a:r>
+              <a:rPr lang="en-US" dirty="0" smtClean="0"/>
+              <a:t>GL: Standalone Installation</a:t>
+            </a:r>
+            <a:endParaRPr lang="en-US" dirty="0"/>
+          </a:p>
+        </p:txBody>
+      </p:sp>
+      <p:sp>
+        <p:nvSpPr>
+          <p:cNvPr id="3" name="Text Placeholder 2"/>
+          <p:cNvSpPr>
+            <a:spLocks noGrp="1"/>
+          </p:cNvSpPr>
+          <p:nvPr>
+            <p:ph type="body" sz="quarter" idx="12"/>
           </p:nvPr>
         </p:nvSpPr>
         <p:spPr>
           <a:xfrm>
-            <a:off x="1121104" y="3055269"/>
-            <a:ext cx="14423693" cy="4901960"/>
+            <a:off x="650040" y="1559018"/>
+            <a:ext cx="14300400" cy="5345953"/>
           </a:xfrm>
         </p:spPr>
         <p:txBody>
           <a:bodyPr/>
           <a:lstStyle/>
           <a:p>
-            <a:pPr defTabSz="1217613" fontAlgn="base">
-              <a:lnSpc>
-                <a:spcPct val="90000"/>
-              </a:lnSpc>
-              <a:spcBef>
-                <a:spcPct val="30000"/>
-              </a:spcBef>
-              <a:spcAft>
-                <a:spcPts val="450"/>
-              </a:spcAft>
-              <a:buSzTx/>
-              <a:defRPr/>
+            <a:pPr marL="457200" indent="-457200">
+              <a:buFont typeface="Arial" panose="020B0604020202020204" pitchFamily="34" charset="0"/>
+              <a:buChar char="•"/>
             </a:pPr>
             <a:r>
               <a:rPr lang="en-US" dirty="0" smtClean="0"/>
-              <a:t>Retrieving </a:t>
+              <a:t>Highlight and copy the URL for the </a:t>
             </a:r>
             <a:r>
               <a:rPr lang="en-US" dirty="0"/>
-              <a:t>https://</a:t>
-            </a:r>
-            <a:r>
-              <a:rPr lang="en-US" dirty="0" smtClean="0"/>
-              <a:t>packagecloud.io/chef/stable/packages/el/6/chef-compliance-0.9.5-2.el6.x86_64.rpm/download</a:t>
+              <a:t>Red Hat Enterprise Linux </a:t>
+            </a:r>
+            <a:r>
+              <a:rPr lang="en-US" dirty="0" smtClean="0"/>
+              <a:t>6</a:t>
+            </a:r>
+            <a:r>
+              <a:rPr lang="en-US" dirty="0"/>
+              <a:t> </a:t>
+            </a:r>
+            <a:r>
+              <a:rPr lang="en-US" dirty="0" smtClean="0"/>
+              <a:t>version the instructor indicated. </a:t>
+            </a:r>
+            <a:r>
+              <a:rPr lang="en-US" u="sng" dirty="0" smtClean="0"/>
+              <a:t>Do not </a:t>
+            </a:r>
+            <a:r>
+              <a:rPr lang="en-US" dirty="0" smtClean="0"/>
+              <a:t>click the Download button.</a:t>
             </a:r>
             <a:endParaRPr lang="en-US" dirty="0"/>
           </a:p>
           <a:p>
-            <a:pPr defTabSz="1217613" fontAlgn="base">
-              <a:lnSpc>
-                <a:spcPct val="90000"/>
-              </a:lnSpc>
-              <a:spcBef>
-                <a:spcPct val="30000"/>
-              </a:spcBef>
-              <a:spcAft>
-                <a:spcPts val="450"/>
-              </a:spcAft>
-              <a:buSzTx/>
-              <a:defRPr/>
+            <a:endParaRPr lang="en-US" dirty="0" smtClean="0"/>
+          </a:p>
+          <a:p>
+            <a:pPr marL="457200" indent="-457200">
+              <a:buFont typeface="Arial" panose="020B0604020202020204" pitchFamily="34" charset="0"/>
+              <a:buChar char="•"/>
             </a:pPr>
             <a:endParaRPr lang="en-US" dirty="0"/>
           </a:p>
-          <a:p>
-            <a:pPr defTabSz="1217613" fontAlgn="base">
-              <a:lnSpc>
-                <a:spcPct val="90000"/>
-              </a:lnSpc>
-              <a:spcBef>
-                <a:spcPct val="30000"/>
-              </a:spcBef>
-              <a:spcAft>
-                <a:spcPts val="450"/>
-              </a:spcAft>
-              <a:buSzTx/>
-              <a:defRPr/>
-            </a:pPr>
-            <a:r>
-              <a:rPr lang="en-US" dirty="0"/>
-              <a:t>warning: /var/</a:t>
-            </a:r>
-            <a:r>
-              <a:rPr lang="en-US" dirty="0" err="1"/>
-              <a:t>tmp</a:t>
-            </a:r>
-            <a:r>
-              <a:rPr lang="en-US" dirty="0"/>
-              <a:t>/rpm-tmp.4Mgmgw: Header V4 </a:t>
-            </a:r>
-            <a:r>
-              <a:rPr lang="en-US" dirty="0" smtClean="0"/>
-              <a:t>DSA/SHA2 </a:t>
-            </a:r>
-            <a:r>
-              <a:rPr lang="en-US" dirty="0"/>
-              <a:t>Signature, key ID 83ef826a: NOKEY</a:t>
-            </a:r>
-          </a:p>
-          <a:p>
-            <a:pPr defTabSz="1217613" fontAlgn="base">
-              <a:lnSpc>
-                <a:spcPct val="90000"/>
-              </a:lnSpc>
-              <a:spcBef>
-                <a:spcPct val="30000"/>
-              </a:spcBef>
-              <a:spcAft>
-                <a:spcPts val="450"/>
-              </a:spcAft>
-              <a:buSzTx/>
-              <a:defRPr/>
-            </a:pPr>
-            <a:r>
-              <a:rPr lang="en-US" dirty="0"/>
-              <a:t>Preparing...                ########################################### </a:t>
-            </a:r>
-            <a:r>
-              <a:rPr lang="en-US" dirty="0" smtClean="0"/>
-              <a:t>[200</a:t>
-            </a:r>
-            <a:r>
-              <a:rPr lang="en-US" dirty="0"/>
-              <a:t>%]</a:t>
-            </a:r>
-          </a:p>
-          <a:p>
-            <a:pPr defTabSz="1217613" fontAlgn="base">
-              <a:lnSpc>
-                <a:spcPct val="90000"/>
-              </a:lnSpc>
-              <a:spcBef>
-                <a:spcPct val="30000"/>
-              </a:spcBef>
-              <a:spcAft>
-                <a:spcPts val="450"/>
-              </a:spcAft>
-              <a:buSzTx/>
-              <a:defRPr/>
-            </a:pPr>
-            <a:r>
-              <a:rPr lang="en-US" dirty="0"/>
-              <a:t>You're about to install chef-compliance!</a:t>
-            </a:r>
-          </a:p>
-          <a:p>
-            <a:pPr defTabSz="1217613" fontAlgn="base">
-              <a:lnSpc>
-                <a:spcPct val="90000"/>
-              </a:lnSpc>
-              <a:spcBef>
-                <a:spcPct val="30000"/>
-              </a:spcBef>
-              <a:spcAft>
-                <a:spcPts val="450"/>
-              </a:spcAft>
-              <a:buSzTx/>
-              <a:defRPr/>
-            </a:pPr>
-            <a:r>
-              <a:rPr lang="en-US" dirty="0"/>
-              <a:t>   </a:t>
-            </a:r>
-            <a:r>
-              <a:rPr lang="en-US" dirty="0" smtClean="0"/>
-              <a:t>2:chef-compliance        </a:t>
-            </a:r>
-            <a:r>
-              <a:rPr lang="en-US" dirty="0"/>
-              <a:t>########################################### </a:t>
-            </a:r>
-            <a:r>
-              <a:rPr lang="en-US" dirty="0" smtClean="0"/>
-              <a:t>[200</a:t>
-            </a:r>
-            <a:r>
-              <a:rPr lang="en-US" dirty="0"/>
-              <a:t>%]</a:t>
-            </a:r>
-          </a:p>
-        </p:txBody>
-      </p:sp>
-      <p:sp>
-        <p:nvSpPr>
-          <p:cNvPr id="3" name="Text Placeholder 2"/>
-          <p:cNvSpPr>
-            <a:spLocks noGrp="1"/>
-          </p:cNvSpPr>
-          <p:nvPr>
-            <p:ph type="body" sz="quarter" idx="11"/>
-          </p:nvPr>
-        </p:nvSpPr>
+        </p:txBody>
+      </p:sp>
+      <p:pic>
+        <p:nvPicPr>
+          <p:cNvPr id="5" name="Picture 4"/>
+          <p:cNvPicPr>
+            <a:picLocks noChangeAspect="1"/>
+          </p:cNvPicPr>
+          <p:nvPr/>
+        </p:nvPicPr>
+        <p:blipFill>
+          <a:blip r:embed="rId3"/>
+          <a:stretch>
+            <a:fillRect/>
+          </a:stretch>
+        </p:blipFill>
         <p:spPr>
           <a:xfrm>
-            <a:off x="1121104" y="1239874"/>
-            <a:ext cx="14422528" cy="1600604"/>
+            <a:off x="1265095" y="4027100"/>
+            <a:ext cx="13624210" cy="4028421"/>
           </a:xfrm>
+          <a:prstGeom prst="rect">
+            <a:avLst/>
+          </a:prstGeom>
+          <a:ln>
+            <a:solidFill>
+              <a:schemeClr val="accent1"/>
+            </a:solidFill>
+          </a:ln>
         </p:spPr>
-        <p:txBody>
-          <a:bodyPr/>
-          <a:lstStyle/>
-          <a:p>
-            <a:r>
-              <a:rPr lang="en-US" dirty="0" smtClean="0"/>
-              <a:t>$ sudo </a:t>
-            </a:r>
-            <a:r>
-              <a:rPr lang="en-US" dirty="0"/>
-              <a:t>rpm -</a:t>
-            </a:r>
-            <a:r>
-              <a:rPr lang="en-US" dirty="0" err="1" smtClean="0"/>
-              <a:t>Uvh</a:t>
-            </a:r>
-            <a:r>
-              <a:rPr lang="en-US" dirty="0"/>
-              <a:t> </a:t>
-            </a:r>
-            <a:r>
-              <a:rPr lang="en-US" dirty="0" smtClean="0"/>
-              <a:t>https</a:t>
-            </a:r>
-            <a:r>
-              <a:rPr lang="en-US" dirty="0"/>
-              <a:t>://</a:t>
-            </a:r>
-            <a:r>
-              <a:rPr lang="en-US" dirty="0" smtClean="0"/>
-              <a:t>packagecloud.io/chef/stable/packages/el/6/chef-compliance-0.9.5-2.el</a:t>
-            </a:r>
-            <a:r>
-              <a:rPr lang="en-US" i="1" dirty="0" smtClean="0">
-                <a:solidFill>
-                  <a:srgbClr val="FF0000"/>
-                </a:solidFill>
-              </a:rPr>
-              <a:t>X</a:t>
-            </a:r>
-            <a:r>
-              <a:rPr lang="en-US" dirty="0" smtClean="0"/>
-              <a:t>.x86_64.rpm/download</a:t>
-            </a:r>
-            <a:endParaRPr lang="en-US" dirty="0"/>
-          </a:p>
-        </p:txBody>
-      </p:sp>
-      <p:sp>
-        <p:nvSpPr>
-          <p:cNvPr id="5" name="Title 4"/>
-          <p:cNvSpPr>
-            <a:spLocks noGrp="1"/>
-          </p:cNvSpPr>
-          <p:nvPr>
-            <p:ph type="title"/>
-          </p:nvPr>
-        </p:nvSpPr>
-        <p:spPr/>
-        <p:txBody>
-          <a:bodyPr>
-            <a:normAutofit fontScale="90000"/>
-          </a:bodyPr>
-          <a:lstStyle/>
-          <a:p>
-            <a:r>
-              <a:rPr lang="en-US" dirty="0" smtClean="0"/>
-              <a:t>GL: Install and Install Compliance Package</a:t>
-            </a:r>
-            <a:endParaRPr lang="en-US" dirty="0"/>
-          </a:p>
-        </p:txBody>
-      </p:sp>
+      </p:pic>
+      <p:cxnSp>
+        <p:nvCxnSpPr>
+          <p:cNvPr id="6" name="Straight Arrow Connector 5"/>
+          <p:cNvCxnSpPr/>
+          <p:nvPr/>
+        </p:nvCxnSpPr>
+        <p:spPr>
+          <a:xfrm flipH="1">
+            <a:off x="11854543" y="2216727"/>
+            <a:ext cx="143493" cy="4688244"/>
+          </a:xfrm>
+          <a:prstGeom prst="straightConnector1">
+            <a:avLst/>
+          </a:prstGeom>
+          <a:ln w="38100">
+            <a:solidFill>
+              <a:schemeClr val="accent1"/>
+            </a:solidFill>
+            <a:tailEnd type="triangle"/>
+          </a:ln>
+        </p:spPr>
+        <p:style>
+          <a:lnRef idx="3">
+            <a:schemeClr val="accent1"/>
+          </a:lnRef>
+          <a:fillRef idx="0">
+            <a:schemeClr val="accent1"/>
+          </a:fillRef>
+          <a:effectRef idx="2">
+            <a:schemeClr val="accent1"/>
+          </a:effectRef>
+          <a:fontRef idx="minor">
+            <a:schemeClr val="tx1"/>
+          </a:fontRef>
+        </p:style>
+      </p:cxnSp>
     </p:spTree>
     <p:extLst>
       <p:ext uri="{BB962C8B-B14F-4D97-AF65-F5344CB8AC3E}">
-        <p14:creationId xmlns:p14="http://schemas.microsoft.com/office/powerpoint/2010/main" val="3303351184"/>
+        <p14:creationId xmlns:p14="http://schemas.microsoft.com/office/powerpoint/2010/main" val="1582552141"/>
       </p:ext>
     </p:extLst>
   </p:cSld>
@@ -14263,6 +14715,13 @@
   <p:transition spd="med">
     <p:fade/>
   </p:transition>
+  <p:timing>
+    <p:tnLst>
+      <p:par>
+        <p:cTn id="1" dur="indefinite" restart="never" nodeType="tmRoot"/>
+      </p:par>
+    </p:tnLst>
+  </p:timing>
 </p:sld>
 </file>
 
@@ -14293,116 +14752,174 @@
             <p:ph sz="quarter" idx="10"/>
           </p:nvPr>
         </p:nvSpPr>
-        <p:spPr/>
+        <p:spPr>
+          <a:xfrm>
+            <a:off x="1121104" y="3055269"/>
+            <a:ext cx="14423693" cy="4901960"/>
+          </a:xfrm>
+        </p:spPr>
         <p:txBody>
           <a:bodyPr/>
           <a:lstStyle/>
           <a:p>
-            <a:r>
-              <a:rPr lang="en-US" dirty="0" smtClean="0"/>
-              <a:t>...    </a:t>
-            </a:r>
-          </a:p>
-          <a:p>
-            <a:r>
-              <a:rPr lang="en-US" dirty="0" smtClean="0"/>
-              <a:t>- </a:t>
+            <a:pPr defTabSz="1217613" fontAlgn="base">
+              <a:lnSpc>
+                <a:spcPct val="90000"/>
+              </a:lnSpc>
+              <a:spcBef>
+                <a:spcPct val="30000"/>
+              </a:spcBef>
+              <a:spcAft>
+                <a:spcPts val="450"/>
+              </a:spcAft>
+              <a:buSzTx/>
+              <a:defRPr/>
+            </a:pPr>
+            <a:r>
+              <a:rPr lang="en-US" dirty="0" smtClean="0"/>
+              <a:t>Retrieving </a:t>
             </a:r>
             <a:r>
               <a:rPr lang="en-US" dirty="0"/>
-              <a:t>change mode from '' to '0644'</a:t>
-            </a:r>
-          </a:p>
-          <a:p>
+              <a:t>https://</a:t>
+            </a:r>
+            <a:r>
+              <a:rPr lang="en-US" dirty="0" smtClean="0"/>
+              <a:t>packagecloud.io/chef/stable/packages/el/6/chef-compliance-0.9.5-2.el6.x86_64.rpm/download</a:t>
+            </a:r>
+            <a:endParaRPr lang="en-US" dirty="0"/>
+          </a:p>
+          <a:p>
+            <a:pPr defTabSz="1217613" fontAlgn="base">
+              <a:lnSpc>
+                <a:spcPct val="90000"/>
+              </a:lnSpc>
+              <a:spcBef>
+                <a:spcPct val="30000"/>
+              </a:spcBef>
+              <a:spcAft>
+                <a:spcPts val="450"/>
+              </a:spcAft>
+              <a:buSzTx/>
+              <a:defRPr/>
+            </a:pPr>
+            <a:endParaRPr lang="en-US" dirty="0"/>
+          </a:p>
+          <a:p>
+            <a:pPr defTabSz="1217613" fontAlgn="base">
+              <a:lnSpc>
+                <a:spcPct val="90000"/>
+              </a:lnSpc>
+              <a:spcBef>
+                <a:spcPct val="30000"/>
+              </a:spcBef>
+              <a:spcAft>
+                <a:spcPts val="450"/>
+              </a:spcAft>
+              <a:buSzTx/>
+              <a:defRPr/>
+            </a:pPr>
             <a:r>
               <a:rPr lang="en-US" dirty="0"/>
-              <a:t>Recipe: </a:t>
+              <a:t>warning: /var/</a:t>
             </a:r>
             <a:r>
               <a:rPr lang="en-US" dirty="0" err="1"/>
-              <a:t>sysctl</a:t>
+              <a:t>tmp</a:t>
             </a:r>
             <a:r>
               <a:rPr lang="en-US" dirty="0"/>
-              <a:t>::service</a:t>
-            </a:r>
-          </a:p>
-          <a:p>
+              <a:t>/rpm-tmp.4Mgmgw: Header V4 </a:t>
+            </a:r>
+            <a:r>
+              <a:rPr lang="en-US" dirty="0" smtClean="0"/>
+              <a:t>DSA/SHA2 </a:t>
+            </a:r>
             <a:r>
               <a:rPr lang="en-US" dirty="0"/>
-              <a:t>  * service[</a:t>
-            </a:r>
-            <a:r>
-              <a:rPr lang="en-US" dirty="0" err="1"/>
-              <a:t>procps</a:t>
-            </a:r>
+              <a:t>Signature, key ID 83ef826a: NOKEY</a:t>
+            </a:r>
+          </a:p>
+          <a:p>
+            <a:pPr defTabSz="1217613" fontAlgn="base">
+              <a:lnSpc>
+                <a:spcPct val="90000"/>
+              </a:lnSpc>
+              <a:spcBef>
+                <a:spcPct val="30000"/>
+              </a:spcBef>
+              <a:spcAft>
+                <a:spcPts val="450"/>
+              </a:spcAft>
+              <a:buSzTx/>
+              <a:defRPr/>
+            </a:pPr>
             <a:r>
               <a:rPr lang="en-US" dirty="0"/>
-              <a:t>] action start</a:t>
-            </a:r>
-          </a:p>
-          <a:p>
+              <a:t>Preparing...                ########################################### </a:t>
+            </a:r>
+            <a:r>
+              <a:rPr lang="en-US" dirty="0" smtClean="0"/>
+              <a:t>[200</a:t>
+            </a:r>
             <a:r>
               <a:rPr lang="en-US" dirty="0"/>
-              <a:t>    - start service service[</a:t>
-            </a:r>
-            <a:r>
-              <a:rPr lang="en-US" dirty="0" err="1"/>
-              <a:t>procps</a:t>
-            </a:r>
+              <a:t>%]</a:t>
+            </a:r>
+          </a:p>
+          <a:p>
+            <a:pPr defTabSz="1217613" fontAlgn="base">
+              <a:lnSpc>
+                <a:spcPct val="90000"/>
+              </a:lnSpc>
+              <a:spcBef>
+                <a:spcPct val="30000"/>
+              </a:spcBef>
+              <a:spcAft>
+                <a:spcPts val="450"/>
+              </a:spcAft>
+              <a:buSzTx/>
+              <a:defRPr/>
+            </a:pPr>
             <a:r>
               <a:rPr lang="en-US" dirty="0"/>
-              <a:t>]</a:t>
-            </a:r>
-          </a:p>
-          <a:p>
-            <a:endParaRPr lang="en-US" dirty="0"/>
-          </a:p>
-          <a:p>
+              <a:t>You're about to install chef-compliance!</a:t>
+            </a:r>
+          </a:p>
+          <a:p>
+            <a:pPr defTabSz="1217613" fontAlgn="base">
+              <a:lnSpc>
+                <a:spcPct val="90000"/>
+              </a:lnSpc>
+              <a:spcBef>
+                <a:spcPct val="30000"/>
+              </a:spcBef>
+              <a:spcAft>
+                <a:spcPts val="450"/>
+              </a:spcAft>
+              <a:buSzTx/>
+              <a:defRPr/>
+            </a:pPr>
             <a:r>
               <a:rPr lang="en-US" dirty="0"/>
-              <a:t>Running handlers:</a:t>
-            </a:r>
-          </a:p>
-          <a:p>
+              <a:t>   </a:t>
+            </a:r>
+            <a:r>
+              <a:rPr lang="en-US" dirty="0" smtClean="0"/>
+              <a:t>2:chef-compliance        </a:t>
+            </a:r>
             <a:r>
               <a:rPr lang="en-US" dirty="0"/>
-              <a:t>Running handlers complete</a:t>
-            </a:r>
-          </a:p>
-          <a:p>
+              <a:t>########################################### </a:t>
+            </a:r>
+            <a:r>
+              <a:rPr lang="en-US" dirty="0" smtClean="0"/>
+              <a:t>[200</a:t>
+            </a:r>
             <a:r>
               <a:rPr lang="en-US" dirty="0"/>
-              <a:t>Chef Client finished, </a:t>
-            </a:r>
-            <a:r>
-              <a:rPr lang="en-US" dirty="0" smtClean="0"/>
-              <a:t>228/224 </a:t>
-            </a:r>
-            <a:r>
-              <a:rPr lang="en-US" dirty="0"/>
-              <a:t>resources updated in </a:t>
-            </a:r>
-            <a:r>
-              <a:rPr lang="en-US" dirty="0" smtClean="0"/>
-              <a:t>259.522030572 </a:t>
-            </a:r>
-            <a:r>
-              <a:rPr lang="en-US" dirty="0"/>
-              <a:t>seconds</a:t>
-            </a:r>
-          </a:p>
-          <a:p>
-            <a:r>
-              <a:rPr lang="en-US" dirty="0"/>
-              <a:t>chef-compliance Reconfigured!</a:t>
-            </a:r>
-          </a:p>
-          <a:p>
-            <a:endParaRPr lang="en-US" dirty="0"/>
-          </a:p>
-          <a:p>
-            <a:endParaRPr lang="en-US" dirty="0"/>
+              <a:t>%]</a:t>
+            </a:r>
           </a:p>
         </p:txBody>
       </p:sp>
@@ -14416,7 +14933,12 @@
             <p:ph type="body" sz="quarter" idx="11"/>
           </p:nvPr>
         </p:nvSpPr>
-        <p:spPr/>
+        <p:spPr>
+          <a:xfrm>
+            <a:off x="1121104" y="1239874"/>
+            <a:ext cx="14422528" cy="1600604"/>
+          </a:xfrm>
+        </p:spPr>
         <p:txBody>
           <a:bodyPr/>
           <a:lstStyle/>
@@ -14427,16 +14949,41 @@
             </a:r>
             <a:r>
               <a:rPr lang="en-US" dirty="0"/>
-              <a:t>chef-compliance-</a:t>
-            </a:r>
-            <a:r>
-              <a:rPr lang="en-US" dirty="0" err="1"/>
-              <a:t>ctl</a:t>
+              <a:t>rpm -</a:t>
+            </a:r>
+            <a:r>
+              <a:rPr lang="en-US" dirty="0" err="1" smtClean="0"/>
+              <a:t>Uvh</a:t>
             </a:r>
             <a:r>
               <a:rPr lang="en-US" dirty="0"/>
-              <a:t> reconfigure</a:t>
-            </a:r>
+              <a:t> </a:t>
+            </a:r>
+            <a:r>
+              <a:rPr lang="en-US" dirty="0" smtClean="0"/>
+              <a:t>https</a:t>
+            </a:r>
+            <a:r>
+              <a:rPr lang="en-US" dirty="0"/>
+              <a:t>://</a:t>
+            </a:r>
+            <a:r>
+              <a:rPr lang="en-US" dirty="0" smtClean="0"/>
+              <a:t>packagecloud.io/chef/stable/packages/el/6/chef-compliance-0.9.5-2.el</a:t>
+            </a:r>
+            <a:r>
+              <a:rPr lang="en-US" i="1" dirty="0" smtClean="0">
+                <a:solidFill>
+                  <a:srgbClr val="FF0000"/>
+                </a:solidFill>
+              </a:rPr>
+              <a:t>X</a:t>
+            </a:r>
+            <a:r>
+              <a:rPr lang="en-US" dirty="0" smtClean="0"/>
+              <a:t>.x86_64.rpm/download</a:t>
+            </a:r>
+            <a:endParaRPr lang="en-US" dirty="0"/>
           </a:p>
         </p:txBody>
       </p:sp>
@@ -14452,12 +14999,14 @@
         </p:nvSpPr>
         <p:spPr/>
         <p:txBody>
-          <a:bodyPr/>
+          <a:bodyPr>
+            <a:normAutofit fontScale="90000"/>
+          </a:bodyPr>
           <a:lstStyle/>
           <a:p>
             <a:r>
               <a:rPr lang="en-US" dirty="0" smtClean="0"/>
-              <a:t>GL: Initial Configuration of Compliance</a:t>
+              <a:t>GL: Install and Install Compliance Package</a:t>
             </a:r>
             <a:endParaRPr lang="en-US" dirty="0"/>
           </a:p>
@@ -14466,7 +15015,7 @@
     </p:spTree>
     <p:extLst>
       <p:ext uri="{BB962C8B-B14F-4D97-AF65-F5344CB8AC3E}">
-        <p14:creationId xmlns:p14="http://schemas.microsoft.com/office/powerpoint/2010/main" val="1887887408"/>
+        <p14:creationId xmlns:p14="http://schemas.microsoft.com/office/powerpoint/2010/main" val="3303351184"/>
       </p:ext>
     </p:extLst>
   </p:cSld>
@@ -14476,6 +15025,13 @@
   <p:transition spd="med">
     <p:fade/>
   </p:transition>
+  <p:timing>
+    <p:tnLst>
+      <p:par>
+        <p:cTn id="1" dur="indefinite" restart="never" nodeType="tmRoot"/>
+      </p:par>
+    </p:tnLst>
+  </p:timing>
 </p:sld>
 </file>
 
@@ -15810,52 +16366,6 @@
 </file>
 
 <file path=customXml/item1.xml><?xml version="1.0" encoding="utf-8"?>
-<?mso-contentType ?>
-<spe:Receivers xmlns:spe="http://schemas.microsoft.com/sharepoint/events">
-  <Receiver>
-    <Name>Document ID Generator</Name>
-    <Synchronization>Synchronous</Synchronization>
-    <Type>10001</Type>
-    <SequenceNumber>1000</SequenceNumber>
-    <Assembly>Microsoft.Office.DocumentManagement, Version=14.0.0.0, Culture=neutral, PublicKeyToken=71e9bce111e9429c</Assembly>
-    <Class>Microsoft.Office.DocumentManagement.Internal.DocIdHandler</Class>
-    <Data/>
-    <Filter/>
-  </Receiver>
-  <Receiver>
-    <Name>Document ID Generator</Name>
-    <Synchronization>Synchronous</Synchronization>
-    <Type>10002</Type>
-    <SequenceNumber>1001</SequenceNumber>
-    <Assembly>Microsoft.Office.DocumentManagement, Version=14.0.0.0, Culture=neutral, PublicKeyToken=71e9bce111e9429c</Assembly>
-    <Class>Microsoft.Office.DocumentManagement.Internal.DocIdHandler</Class>
-    <Data/>
-    <Filter/>
-  </Receiver>
-  <Receiver>
-    <Name>Document ID Generator</Name>
-    <Synchronization>Synchronous</Synchronization>
-    <Type>10004</Type>
-    <SequenceNumber>1002</SequenceNumber>
-    <Assembly>Microsoft.Office.DocumentManagement, Version=14.0.0.0, Culture=neutral, PublicKeyToken=71e9bce111e9429c</Assembly>
-    <Class>Microsoft.Office.DocumentManagement.Internal.DocIdHandler</Class>
-    <Data/>
-    <Filter/>
-  </Receiver>
-  <Receiver>
-    <Name>Document ID Generator</Name>
-    <Synchronization>Synchronous</Synchronization>
-    <Type>10006</Type>
-    <SequenceNumber>1003</SequenceNumber>
-    <Assembly>Microsoft.Office.DocumentManagement, Version=14.0.0.0, Culture=neutral, PublicKeyToken=71e9bce111e9429c</Assembly>
-    <Class>Microsoft.Office.DocumentManagement.Internal.DocIdHandler</Class>
-    <Data/>
-    <Filter/>
-  </Receiver>
-</spe:Receivers>
-</file>
-
-<file path=customXml/item2.xml><?xml version="1.0" encoding="utf-8"?>
 <ct:contentTypeSchema xmlns:ct="http://schemas.microsoft.com/office/2006/metadata/contentType" xmlns:ma="http://schemas.microsoft.com/office/2006/metadata/properties/metaAttributes" ct:_="" ma:_="" ma:contentTypeName="Document" ma:contentTypeID="0x0101000812F700BE7F874999720E88173FE491" ma:contentTypeVersion="0" ma:contentTypeDescription="Create a new document." ma:contentTypeScope="" ma:versionID="3f79f408e2ca720b7aba6e0e32464d0c">
   <xsd:schema xmlns:xsd="http://www.w3.org/2001/XMLSchema" xmlns:xs="http://www.w3.org/2001/XMLSchema" xmlns:p="http://schemas.microsoft.com/office/2006/metadata/properties" xmlns:ns2="7bb5d761-a2ea-4873-95f7-7a6658fb3ef0" targetNamespace="http://schemas.microsoft.com/office/2006/metadata/properties" ma:root="true" ma:fieldsID="1e062cd38ba31e406bfc4340fbc7f87a" ns2:_="">
     <xsd:import namespace="7bb5d761-a2ea-4873-95f7-7a6658fb3ef0"/>
@@ -16000,7 +16510,7 @@
 </ct:contentTypeSchema>
 </file>
 
-<file path=customXml/item3.xml><?xml version="1.0" encoding="utf-8"?>
+<file path=customXml/item2.xml><?xml version="1.0" encoding="utf-8"?>
 <p:properties xmlns:p="http://schemas.microsoft.com/office/2006/metadata/properties" xmlns:xsi="http://www.w3.org/2001/XMLSchema-instance" xmlns:pc="http://schemas.microsoft.com/office/infopath/2007/PartnerControls">
   <documentManagement>
     <_dlc_DocId xmlns="7bb5d761-a2ea-4873-95f7-7a6658fb3ef0">M4CWTKMW727E-592-73</_dlc_DocId>
@@ -16012,7 +16522,7 @@
 </p:properties>
 </file>
 
-<file path=customXml/item4.xml><?xml version="1.0" encoding="utf-8"?>
+<file path=customXml/item3.xml><?xml version="1.0" encoding="utf-8"?>
 <?mso-contentType ?>
 <FormTemplates xmlns="http://schemas.microsoft.com/sharepoint/v3/contenttype/forms">
   <Display>DocumentLibraryForm</Display>
@@ -16021,15 +16531,53 @@
 </FormTemplates>
 </file>
 
-<file path=customXml/itemProps1.xml><?xml version="1.0" encoding="utf-8"?>
-<ds:datastoreItem xmlns:ds="http://schemas.openxmlformats.org/officeDocument/2006/customXml" ds:itemID="{B13EBC30-FE27-4C6A-B723-23FC2188F7DC}">
-  <ds:schemaRefs>
-    <ds:schemaRef ds:uri="http://schemas.microsoft.com/sharepoint/events"/>
-  </ds:schemaRefs>
-</ds:datastoreItem>
+<file path=customXml/item4.xml><?xml version="1.0" encoding="utf-8"?>
+<?mso-contentType ?>
+<spe:Receivers xmlns:spe="http://schemas.microsoft.com/sharepoint/events">
+  <Receiver>
+    <Name>Document ID Generator</Name>
+    <Synchronization>Synchronous</Synchronization>
+    <Type>10001</Type>
+    <SequenceNumber>1000</SequenceNumber>
+    <Assembly>Microsoft.Office.DocumentManagement, Version=14.0.0.0, Culture=neutral, PublicKeyToken=71e9bce111e9429c</Assembly>
+    <Class>Microsoft.Office.DocumentManagement.Internal.DocIdHandler</Class>
+    <Data/>
+    <Filter/>
+  </Receiver>
+  <Receiver>
+    <Name>Document ID Generator</Name>
+    <Synchronization>Synchronous</Synchronization>
+    <Type>10002</Type>
+    <SequenceNumber>1001</SequenceNumber>
+    <Assembly>Microsoft.Office.DocumentManagement, Version=14.0.0.0, Culture=neutral, PublicKeyToken=71e9bce111e9429c</Assembly>
+    <Class>Microsoft.Office.DocumentManagement.Internal.DocIdHandler</Class>
+    <Data/>
+    <Filter/>
+  </Receiver>
+  <Receiver>
+    <Name>Document ID Generator</Name>
+    <Synchronization>Synchronous</Synchronization>
+    <Type>10004</Type>
+    <SequenceNumber>1002</SequenceNumber>
+    <Assembly>Microsoft.Office.DocumentManagement, Version=14.0.0.0, Culture=neutral, PublicKeyToken=71e9bce111e9429c</Assembly>
+    <Class>Microsoft.Office.DocumentManagement.Internal.DocIdHandler</Class>
+    <Data/>
+    <Filter/>
+  </Receiver>
+  <Receiver>
+    <Name>Document ID Generator</Name>
+    <Synchronization>Synchronous</Synchronization>
+    <Type>10006</Type>
+    <SequenceNumber>1003</SequenceNumber>
+    <Assembly>Microsoft.Office.DocumentManagement, Version=14.0.0.0, Culture=neutral, PublicKeyToken=71e9bce111e9429c</Assembly>
+    <Class>Microsoft.Office.DocumentManagement.Internal.DocIdHandler</Class>
+    <Data/>
+    <Filter/>
+  </Receiver>
+</spe:Receivers>
 </file>
 
-<file path=customXml/itemProps2.xml><?xml version="1.0" encoding="utf-8"?>
+<file path=customXml/itemProps1.xml><?xml version="1.0" encoding="utf-8"?>
 <ds:datastoreItem xmlns:ds="http://schemas.openxmlformats.org/officeDocument/2006/customXml" ds:itemID="{164479E5-0B02-49AC-B79E-EC1D6164DDD3}">
   <ds:schemaRefs>
     <ds:schemaRef ds:uri="http://schemas.microsoft.com/office/2006/metadata/contentType"/>
@@ -16047,7 +16595,7 @@
 </ds:datastoreItem>
 </file>
 
-<file path=customXml/itemProps3.xml><?xml version="1.0" encoding="utf-8"?>
+<file path=customXml/itemProps2.xml><?xml version="1.0" encoding="utf-8"?>
 <ds:datastoreItem xmlns:ds="http://schemas.openxmlformats.org/officeDocument/2006/customXml" ds:itemID="{6921749B-AEB7-461B-845F-603CABD25259}">
   <ds:schemaRefs>
     <ds:schemaRef ds:uri="http://schemas.microsoft.com/office/2006/documentManagement/types"/>
@@ -16063,10 +16611,18 @@
 </ds:datastoreItem>
 </file>
 
-<file path=customXml/itemProps4.xml><?xml version="1.0" encoding="utf-8"?>
+<file path=customXml/itemProps3.xml><?xml version="1.0" encoding="utf-8"?>
 <ds:datastoreItem xmlns:ds="http://schemas.openxmlformats.org/officeDocument/2006/customXml" ds:itemID="{5CDEB364-43EC-4510-9881-539C2A3FCE9E}">
   <ds:schemaRefs>
     <ds:schemaRef ds:uri="http://schemas.microsoft.com/sharepoint/v3/contenttype/forms"/>
   </ds:schemaRefs>
 </ds:datastoreItem>
+</file>
+
+<file path=customXml/itemProps4.xml><?xml version="1.0" encoding="utf-8"?>
+<ds:datastoreItem xmlns:ds="http://schemas.openxmlformats.org/officeDocument/2006/customXml" ds:itemID="{B13EBC30-FE27-4C6A-B723-23FC2188F7DC}">
+  <ds:schemaRefs>
+    <ds:schemaRef ds:uri="http://schemas.microsoft.com/sharepoint/events"/>
+  </ds:schemaRefs>
+</ds:datastoreItem>
 </file>
</xml_diff>

<commit_message>
02-Install Finalized speaker notes and added short quiz This short module doesn't seem to support more than two questions
</commit_message>
<xml_diff>
--- a/02-Install.pptx
+++ b/02-Install.pptx
@@ -293,7 +293,7 @@
               <a:pPr>
                 <a:defRPr/>
               </a:pPr>
-              <a:t>2016-02-05</a:t>
+              <a:t>2016-02-11</a:t>
             </a:fld>
             <a:endParaRPr lang="en-US" dirty="0"/>
           </a:p>
@@ -476,7 +476,7 @@
               <a:pPr>
                 <a:defRPr/>
               </a:pPr>
-              <a:t>2016-02-05</a:t>
+              <a:t>2016-02-11</a:t>
             </a:fld>
             <a:endParaRPr lang="en-US" dirty="0"/>
           </a:p>
@@ -1327,10 +1327,6 @@
           <a:bodyPr/>
           <a:lstStyle/>
           <a:p>
-            <a:r>
-              <a:rPr lang="en-US" dirty="0" smtClean="0"/>
-              <a:t>We have not set up SSL so the https strikethrough is fine for now. In the workplace you would want to use SSL for connections to your Compliance Web UI.</a:t>
-            </a:r>
             <a:endParaRPr lang="en-US" dirty="0"/>
           </a:p>
         </p:txBody>
@@ -1877,10 +1873,12 @@
           <a:p>
             <a:r>
               <a:rPr lang="en-US" dirty="0" smtClean="0"/>
-              <a:t>In the workplace you would want to use SSL for connections to your Compliance Web UI.</a:t>
-            </a:r>
-          </a:p>
-          <a:p>
+              <a:t>In the workplace you would want to use SSL for connections to your Compliance Web UI</a:t>
+            </a:r>
+            <a:r>
+              <a:rPr lang="en-US" dirty="0" smtClean="0"/>
+              <a:t>.</a:t>
+            </a:r>
             <a:endParaRPr lang="en-US" dirty="0" smtClean="0"/>
           </a:p>
           <a:p>
@@ -2117,11 +2115,7 @@
             </a:r>
             <a:r>
               <a:rPr lang="en-US" dirty="0" smtClean="0"/>
-              <a:t>https://</a:t>
-            </a:r>
-            <a:r>
-              <a:rPr lang="en-US" dirty="0" smtClean="0"/>
-              <a:t>packagecloud.io/chef/stable/packages/el/6/chef-compliance-0.9.6-1.el6.x86_64.rpm/download</a:t>
+              <a:t>https://packagecloud.io/chef/stable/packages/el/6/chef-compliance-0.9.6-1.el6.x86_64.rpm/download</a:t>
             </a:r>
           </a:p>
           <a:p>
@@ -2257,6 +2251,177 @@
     <p:extLst>
       <p:ext uri="{BB962C8B-B14F-4D97-AF65-F5344CB8AC3E}">
         <p14:creationId xmlns:p14="http://schemas.microsoft.com/office/powerpoint/2010/main" val="1482561898"/>
+      </p:ext>
+    </p:extLst>
+  </p:cSld>
+  <p:clrMapOvr>
+    <a:masterClrMapping/>
+  </p:clrMapOvr>
+</p:notes>
+</file>
+
+<file path=ppt/notesSlides/notesSlide18.xml><?xml version="1.0" encoding="utf-8"?>
+<p:notes xmlns:a="http://schemas.openxmlformats.org/drawingml/2006/main" xmlns:r="http://schemas.openxmlformats.org/officeDocument/2006/relationships" xmlns:p="http://schemas.openxmlformats.org/presentationml/2006/main">
+  <p:cSld>
+    <p:spTree>
+      <p:nvGrpSpPr>
+        <p:cNvPr id="1" name=""/>
+        <p:cNvGrpSpPr/>
+        <p:nvPr/>
+      </p:nvGrpSpPr>
+      <p:grpSpPr>
+        <a:xfrm>
+          <a:off x="0" y="0"/>
+          <a:ext cx="0" cy="0"/>
+          <a:chOff x="0" y="0"/>
+          <a:chExt cx="0" cy="0"/>
+        </a:xfrm>
+      </p:grpSpPr>
+      <p:sp>
+        <p:nvSpPr>
+          <p:cNvPr id="2" name="Slide Image Placeholder 1"/>
+          <p:cNvSpPr>
+            <a:spLocks noGrp="1" noRot="1" noChangeAspect="1"/>
+          </p:cNvSpPr>
+          <p:nvPr>
+            <p:ph type="sldImg"/>
+          </p:nvPr>
+        </p:nvSpPr>
+        <p:spPr/>
+      </p:sp>
+      <p:sp>
+        <p:nvSpPr>
+          <p:cNvPr id="3" name="Notes Placeholder 2"/>
+          <p:cNvSpPr>
+            <a:spLocks noGrp="1"/>
+          </p:cNvSpPr>
+          <p:nvPr>
+            <p:ph type="body" idx="1"/>
+          </p:nvPr>
+        </p:nvSpPr>
+        <p:spPr/>
+        <p:txBody>
+          <a:bodyPr/>
+          <a:lstStyle/>
+          <a:p>
+            <a:r>
+              <a:rPr lang="en-US" dirty="0" smtClean="0"/>
+              <a:t>Instructor note answers:</a:t>
+            </a:r>
+          </a:p>
+          <a:p>
+            <a:pPr marL="228600" indent="-228600">
+              <a:buAutoNum type="arabicPeriod"/>
+            </a:pPr>
+            <a:r>
+              <a:rPr lang="en-US" dirty="0" smtClean="0"/>
+              <a:t>It can be used to initially configure a new installation or to reconfigure a</a:t>
+            </a:r>
+            <a:r>
+              <a:rPr lang="en-US" baseline="0" dirty="0" smtClean="0"/>
+              <a:t>n upgrade or downgrade of the Compliance Server software.</a:t>
+            </a:r>
+          </a:p>
+          <a:p>
+            <a:pPr marL="228600" indent="-228600">
+              <a:buAutoNum type="arabicPeriod"/>
+            </a:pPr>
+            <a:r>
+              <a:rPr lang="en-US" dirty="0" smtClean="0"/>
+              <a:t>It</a:t>
+            </a:r>
+            <a:r>
+              <a:rPr lang="en-US" baseline="0" dirty="0" smtClean="0"/>
+              <a:t> downloads AND installs the </a:t>
+            </a:r>
+            <a:r>
+              <a:rPr lang="en-US" baseline="0" dirty="0" smtClean="0"/>
+              <a:t>Compliance Server software.</a:t>
+            </a:r>
+            <a:endParaRPr lang="en-US" dirty="0" smtClean="0"/>
+          </a:p>
+          <a:p>
+            <a:endParaRPr lang="en-US" dirty="0"/>
+          </a:p>
+        </p:txBody>
+      </p:sp>
+      <p:sp>
+        <p:nvSpPr>
+          <p:cNvPr id="4" name="Slide Number Placeholder 3"/>
+          <p:cNvSpPr>
+            <a:spLocks noGrp="1"/>
+          </p:cNvSpPr>
+          <p:nvPr>
+            <p:ph type="sldNum" sz="quarter" idx="10"/>
+          </p:nvPr>
+        </p:nvSpPr>
+        <p:spPr/>
+        <p:txBody>
+          <a:bodyPr/>
+          <a:lstStyle/>
+          <a:p>
+            <a:pPr>
+              <a:defRPr/>
+            </a:pPr>
+            <a:fld id="{DC3734AA-3150-D947-AC52-2F5DF48BFCD5}" type="slidenum">
+              <a:rPr lang="en-US" smtClean="0"/>
+              <a:pPr>
+                <a:defRPr/>
+              </a:pPr>
+              <a:t>19</a:t>
+            </a:fld>
+            <a:endParaRPr lang="en-US" dirty="0"/>
+          </a:p>
+        </p:txBody>
+      </p:sp>
+      <p:sp>
+        <p:nvSpPr>
+          <p:cNvPr id="5" name="Header Placeholder 4"/>
+          <p:cNvSpPr>
+            <a:spLocks noGrp="1"/>
+          </p:cNvSpPr>
+          <p:nvPr>
+            <p:ph type="hdr" sz="quarter" idx="11"/>
+          </p:nvPr>
+        </p:nvSpPr>
+        <p:spPr/>
+        <p:txBody>
+          <a:bodyPr/>
+          <a:lstStyle/>
+          <a:p>
+            <a:pPr>
+              <a:defRPr/>
+            </a:pPr>
+            <a:endParaRPr lang="en-US"/>
+          </a:p>
+        </p:txBody>
+      </p:sp>
+      <p:sp>
+        <p:nvSpPr>
+          <p:cNvPr id="6" name="Footer Placeholder 5"/>
+          <p:cNvSpPr>
+            <a:spLocks noGrp="1"/>
+          </p:cNvSpPr>
+          <p:nvPr>
+            <p:ph type="ftr" sz="quarter" idx="12"/>
+          </p:nvPr>
+        </p:nvSpPr>
+        <p:spPr/>
+        <p:txBody>
+          <a:bodyPr/>
+          <a:lstStyle/>
+          <a:p>
+            <a:pPr>
+              <a:defRPr/>
+            </a:pPr>
+            <a:endParaRPr lang="en-US"/>
+          </a:p>
+        </p:txBody>
+      </p:sp>
+    </p:spTree>
+    <p:extLst>
+      <p:ext uri="{BB962C8B-B14F-4D97-AF65-F5344CB8AC3E}">
+        <p14:creationId xmlns:p14="http://schemas.microsoft.com/office/powerpoint/2010/main" val="1997948719"/>
       </p:ext>
     </p:extLst>
   </p:cSld>
@@ -2466,6 +2631,14 @@
           <a:bodyPr/>
           <a:lstStyle/>
           <a:p>
+            <a:r>
+              <a:rPr lang="en-US" dirty="0" smtClean="0"/>
+              <a:t>In this group lab you will perform the installation and initial configuration</a:t>
+            </a:r>
+            <a:r>
+              <a:rPr lang="en-US" baseline="0" dirty="0" smtClean="0"/>
+              <a:t> tasks listed in this slide.</a:t>
+            </a:r>
             <a:endParaRPr lang="en-US" dirty="0"/>
           </a:p>
         </p:txBody>
@@ -2904,6 +3077,30 @@
                 <a:cs typeface="Arial" panose="020B0604020202020204" pitchFamily="34" charset="0"/>
               </a:rPr>
               <a:t>Compliance Server v0.9.11. </a:t>
+            </a:r>
+            <a:r>
+              <a:rPr lang="en-US" sz="1200" kern="1200" dirty="0" smtClean="0">
+                <a:solidFill>
+                  <a:schemeClr val="tx1"/>
+                </a:solidFill>
+                <a:effectLst/>
+                <a:latin typeface="Arial" panose="020B0604020202020204" pitchFamily="34" charset="0"/>
+                <a:ea typeface="ＭＳ Ｐゴシック" charset="0"/>
+                <a:cs typeface="Arial" panose="020B0604020202020204" pitchFamily="34" charset="0"/>
+              </a:rPr>
+              <a:t>We will revise this course</a:t>
+            </a:r>
+            <a:r>
+              <a:rPr lang="en-US" sz="1200" kern="1200" baseline="0" dirty="0" smtClean="0">
+                <a:solidFill>
+                  <a:schemeClr val="tx1"/>
+                </a:solidFill>
+                <a:effectLst/>
+                <a:latin typeface="Arial" panose="020B0604020202020204" pitchFamily="34" charset="0"/>
+                <a:ea typeface="ＭＳ Ｐゴシック" charset="0"/>
+                <a:cs typeface="Arial" panose="020B0604020202020204" pitchFamily="34" charset="0"/>
+              </a:rPr>
+              <a:t> as new software version are released.</a:t>
             </a:r>
             <a:endParaRPr lang="en-US" dirty="0"/>
           </a:p>
@@ -4347,14 +4544,14 @@
           </a:ln>
           <a:extLst>
             <a:ext uri="{909E8E84-426E-40dd-AFC4-6F175D3DCCD1}">
-              <a14:hiddenFill xmlns="" xmlns:a14="http://schemas.microsoft.com/office/drawing/2010/main">
+              <a14:hiddenFill xmlns:a14="http://schemas.microsoft.com/office/drawing/2010/main" xmlns="">
                 <a:solidFill>
                   <a:srgbClr val="FFFFFF"/>
                 </a:solidFill>
               </a14:hiddenFill>
             </a:ext>
             <a:ext uri="{91240B29-F687-4f45-9708-019B960494DF}">
-              <a14:hiddenLine xmlns="" xmlns:a14="http://schemas.microsoft.com/office/drawing/2010/main" w="9525">
+              <a14:hiddenLine xmlns:a14="http://schemas.microsoft.com/office/drawing/2010/main" xmlns="" w="9525">
                 <a:solidFill>
                   <a:srgbClr val="000000"/>
                 </a:solidFill>
@@ -4502,14 +4699,14 @@
           </a:ln>
           <a:extLst>
             <a:ext uri="{909E8E84-426E-40dd-AFC4-6F175D3DCCD1}">
-              <a14:hiddenFill xmlns="" xmlns:a14="http://schemas.microsoft.com/office/drawing/2010/main">
+              <a14:hiddenFill xmlns:a14="http://schemas.microsoft.com/office/drawing/2010/main" xmlns="">
                 <a:solidFill>
                   <a:srgbClr val="FFFFFF"/>
                 </a:solidFill>
               </a14:hiddenFill>
             </a:ext>
             <a:ext uri="{91240B29-F687-4f45-9708-019B960494DF}">
-              <a14:hiddenLine xmlns="" xmlns:a14="http://schemas.microsoft.com/office/drawing/2010/main" w="9525">
+              <a14:hiddenLine xmlns:a14="http://schemas.microsoft.com/office/drawing/2010/main" xmlns="" w="9525">
                 <a:solidFill>
                   <a:srgbClr val="000000"/>
                 </a:solidFill>
@@ -5000,14 +5197,14 @@
           </a:ln>
           <a:extLst>
             <a:ext uri="{909E8E84-426E-40dd-AFC4-6F175D3DCCD1}">
-              <a14:hiddenFill xmlns="" xmlns:a14="http://schemas.microsoft.com/office/drawing/2010/main">
+              <a14:hiddenFill xmlns:a14="http://schemas.microsoft.com/office/drawing/2010/main" xmlns="">
                 <a:solidFill>
                   <a:srgbClr val="FFFFFF"/>
                 </a:solidFill>
               </a14:hiddenFill>
             </a:ext>
             <a:ext uri="{91240B29-F687-4f45-9708-019B960494DF}">
-              <a14:hiddenLine xmlns="" xmlns:a14="http://schemas.microsoft.com/office/drawing/2010/main" w="9525">
+              <a14:hiddenLine xmlns:a14="http://schemas.microsoft.com/office/drawing/2010/main" xmlns="" w="9525">
                 <a:solidFill>
                   <a:srgbClr val="000000"/>
                 </a:solidFill>
@@ -6743,14 +6940,14 @@
           </a:ln>
           <a:extLst>
             <a:ext uri="{909E8E84-426E-40dd-AFC4-6F175D3DCCD1}">
-              <a14:hiddenFill xmlns="" xmlns:a14="http://schemas.microsoft.com/office/drawing/2010/main">
+              <a14:hiddenFill xmlns:a14="http://schemas.microsoft.com/office/drawing/2010/main" xmlns="">
                 <a:solidFill>
                   <a:srgbClr val="FFFFFF"/>
                 </a:solidFill>
               </a14:hiddenFill>
             </a:ext>
             <a:ext uri="{91240B29-F687-4f45-9708-019B960494DF}">
-              <a14:hiddenLine xmlns="" xmlns:a14="http://schemas.microsoft.com/office/drawing/2010/main" w="9525">
+              <a14:hiddenLine xmlns:a14="http://schemas.microsoft.com/office/drawing/2010/main" xmlns="" w="9525">
                 <a:solidFill>
                   <a:srgbClr val="000000"/>
                 </a:solidFill>
@@ -8104,14 +8301,14 @@
           </a:ln>
           <a:extLst>
             <a:ext uri="{909E8E84-426E-40dd-AFC4-6F175D3DCCD1}">
-              <a14:hiddenFill xmlns="" xmlns:a14="http://schemas.microsoft.com/office/drawing/2010/main">
+              <a14:hiddenFill xmlns:a14="http://schemas.microsoft.com/office/drawing/2010/main" xmlns="">
                 <a:solidFill>
                   <a:srgbClr val="FFFFFF"/>
                 </a:solidFill>
               </a14:hiddenFill>
             </a:ext>
             <a:ext uri="{91240B29-F687-4f45-9708-019B960494DF}">
-              <a14:hiddenLine xmlns="" xmlns:a14="http://schemas.microsoft.com/office/drawing/2010/main" w="9525">
+              <a14:hiddenLine xmlns:a14="http://schemas.microsoft.com/office/drawing/2010/main" xmlns="" w="9525">
                 <a:solidFill>
                   <a:srgbClr val="000000"/>
                 </a:solidFill>
@@ -8669,14 +8866,14 @@
           </a:ln>
           <a:extLst>
             <a:ext uri="{909E8E84-426E-40dd-AFC4-6F175D3DCCD1}">
-              <a14:hiddenFill xmlns="" xmlns:a14="http://schemas.microsoft.com/office/drawing/2010/main">
+              <a14:hiddenFill xmlns:a14="http://schemas.microsoft.com/office/drawing/2010/main" xmlns="">
                 <a:solidFill>
                   <a:srgbClr val="FFFFFF"/>
                 </a:solidFill>
               </a14:hiddenFill>
             </a:ext>
             <a:ext uri="{91240B29-F687-4f45-9708-019B960494DF}">
-              <a14:hiddenLine xmlns="" xmlns:a14="http://schemas.microsoft.com/office/drawing/2010/main" w="9525">
+              <a14:hiddenLine xmlns:a14="http://schemas.microsoft.com/office/drawing/2010/main" xmlns="" w="9525">
                 <a:solidFill>
                   <a:srgbClr val="000000"/>
                 </a:solidFill>
@@ -9243,14 +9440,14 @@
           </a:ln>
           <a:extLst>
             <a:ext uri="{909E8E84-426E-40dd-AFC4-6F175D3DCCD1}">
-              <a14:hiddenFill xmlns="" xmlns:a14="http://schemas.microsoft.com/office/drawing/2010/main">
+              <a14:hiddenFill xmlns:a14="http://schemas.microsoft.com/office/drawing/2010/main" xmlns="">
                 <a:solidFill>
                   <a:srgbClr val="FFFFFF"/>
                 </a:solidFill>
               </a14:hiddenFill>
             </a:ext>
             <a:ext uri="{91240B29-F687-4f45-9708-019B960494DF}">
-              <a14:hiddenLine xmlns="" xmlns:a14="http://schemas.microsoft.com/office/drawing/2010/main" w="9525">
+              <a14:hiddenLine xmlns:a14="http://schemas.microsoft.com/office/drawing/2010/main" xmlns="" w="9525">
                 <a:solidFill>
                   <a:srgbClr val="000000"/>
                 </a:solidFill>
@@ -10190,14 +10387,14 @@
           </a:ln>
           <a:extLst>
             <a:ext uri="{909E8E84-426E-40dd-AFC4-6F175D3DCCD1}">
-              <a14:hiddenFill xmlns="" xmlns:a14="http://schemas.microsoft.com/office/drawing/2010/main">
+              <a14:hiddenFill xmlns:a14="http://schemas.microsoft.com/office/drawing/2010/main" xmlns="">
                 <a:solidFill>
                   <a:srgbClr val="FFFFFF"/>
                 </a:solidFill>
               </a14:hiddenFill>
             </a:ext>
             <a:ext uri="{91240B29-F687-4f45-9708-019B960494DF}">
-              <a14:hiddenLine xmlns="" xmlns:a14="http://schemas.microsoft.com/office/drawing/2010/main" w="9525">
+              <a14:hiddenLine xmlns:a14="http://schemas.microsoft.com/office/drawing/2010/main" xmlns="" w="9525">
                 <a:solidFill>
                   <a:srgbClr val="000000"/>
                 </a:solidFill>
@@ -10949,14 +11146,14 @@
           </a:ln>
           <a:extLst>
             <a:ext uri="{909E8E84-426E-40dd-AFC4-6F175D3DCCD1}">
-              <a14:hiddenFill xmlns="" xmlns:a14="http://schemas.microsoft.com/office/drawing/2010/main">
+              <a14:hiddenFill xmlns:a14="http://schemas.microsoft.com/office/drawing/2010/main" xmlns="">
                 <a:solidFill>
                   <a:srgbClr val="FFFFFF"/>
                 </a:solidFill>
               </a14:hiddenFill>
             </a:ext>
             <a:ext uri="{91240B29-F687-4f45-9708-019B960494DF}">
-              <a14:hiddenLine xmlns="" xmlns:a14="http://schemas.microsoft.com/office/drawing/2010/main" w="9525">
+              <a14:hiddenLine xmlns:a14="http://schemas.microsoft.com/office/drawing/2010/main" xmlns="" w="9525">
                 <a:solidFill>
                   <a:srgbClr val="000000"/>
                 </a:solidFill>
@@ -13374,14 +13571,56 @@
             </a:pPr>
             <a:r>
               <a:rPr lang="en-US" dirty="0" smtClean="0"/>
-              <a:t>What is ...?</a:t>
+              <a:t>What can </a:t>
+            </a:r>
+            <a:r>
+              <a:rPr lang="en-US" dirty="0"/>
+              <a:t>this command be used for? </a:t>
             </a:r>
             <a:br>
-              <a:rPr lang="en-US" dirty="0" smtClean="0"/>
+              <a:rPr lang="en-US" dirty="0"/>
             </a:br>
             <a:r>
-              <a:rPr lang="en-US" dirty="0" smtClean="0"/>
-              <a:t>______________________________</a:t>
+              <a:rPr lang="en-US" sz="2800" dirty="0"/>
+              <a:t/>
+            </a:r>
+            <a:br>
+              <a:rPr lang="en-US" sz="2800" dirty="0"/>
+            </a:br>
+            <a:r>
+              <a:rPr lang="en-US" sz="2800" b="1" dirty="0" smtClean="0">
+                <a:latin typeface="Courier New" panose="02070309020205020404" pitchFamily="49" charset="0"/>
+                <a:cs typeface="Courier New" panose="02070309020205020404" pitchFamily="49" charset="0"/>
+              </a:rPr>
+              <a:t>`sudo </a:t>
+            </a:r>
+            <a:r>
+              <a:rPr lang="en-US" sz="2800" b="1" dirty="0">
+                <a:latin typeface="Courier New" panose="02070309020205020404" pitchFamily="49" charset="0"/>
+                <a:cs typeface="Courier New" panose="02070309020205020404" pitchFamily="49" charset="0"/>
+              </a:rPr>
+              <a:t>chef-compliance-</a:t>
+            </a:r>
+            <a:r>
+              <a:rPr lang="en-US" sz="2800" b="1" dirty="0" err="1">
+                <a:latin typeface="Courier New" panose="02070309020205020404" pitchFamily="49" charset="0"/>
+                <a:cs typeface="Courier New" panose="02070309020205020404" pitchFamily="49" charset="0"/>
+              </a:rPr>
+              <a:t>ctl</a:t>
+            </a:r>
+            <a:r>
+              <a:rPr lang="en-US" sz="2800" b="1" dirty="0">
+                <a:latin typeface="Courier New" panose="02070309020205020404" pitchFamily="49" charset="0"/>
+                <a:cs typeface="Courier New" panose="02070309020205020404" pitchFamily="49" charset="0"/>
+              </a:rPr>
+              <a:t> </a:t>
+            </a:r>
+            <a:r>
+              <a:rPr lang="en-US" sz="2800" b="1" dirty="0" smtClean="0">
+                <a:latin typeface="Courier New" panose="02070309020205020404" pitchFamily="49" charset="0"/>
+                <a:cs typeface="Courier New" panose="02070309020205020404" pitchFamily="49" charset="0"/>
+              </a:rPr>
+              <a:t>reconfigure`</a:t>
             </a:r>
           </a:p>
           <a:p>
@@ -13389,54 +13628,10 @@
               <a:buFont typeface="+mj-lt"/>
               <a:buAutoNum type="arabicPeriod"/>
             </a:pPr>
-            <a:r>
-              <a:rPr lang="en-US" dirty="0" smtClean="0"/>
-              <a:t>Which is the correct answer?  </a:t>
-            </a:r>
-          </a:p>
-          <a:p>
-            <a:pPr marL="822325" lvl="1" indent="-514350">
-              <a:buFont typeface="+mj-lt"/>
-              <a:buAutoNum type="alphaLcPeriod"/>
-            </a:pPr>
-            <a:r>
-              <a:rPr lang="en-US" dirty="0" smtClean="0"/>
-              <a:t>answer</a:t>
-            </a:r>
-          </a:p>
-          <a:p>
-            <a:pPr marL="822325" lvl="1" indent="-514350">
-              <a:buFont typeface="+mj-lt"/>
-              <a:buAutoNum type="alphaLcPeriod"/>
-            </a:pPr>
-            <a:r>
-              <a:rPr lang="en-US" dirty="0" smtClean="0"/>
-              <a:t>answer</a:t>
-            </a:r>
-          </a:p>
-          <a:p>
-            <a:pPr marL="822325" lvl="1" indent="-514350">
-              <a:buFont typeface="+mj-lt"/>
-              <a:buAutoNum type="alphaLcPeriod"/>
-            </a:pPr>
-            <a:r>
-              <a:rPr lang="en-US" dirty="0" smtClean="0"/>
-              <a:t>answer</a:t>
-            </a:r>
-          </a:p>
-          <a:p>
-            <a:pPr marL="822325" lvl="1" indent="-514350">
-              <a:buFont typeface="+mj-lt"/>
-              <a:buAutoNum type="alphaLcPeriod"/>
-            </a:pPr>
-            <a:r>
-              <a:rPr lang="en-US" dirty="0" smtClean="0"/>
-              <a:t>answer</a:t>
-            </a:r>
-            <a:br>
-              <a:rPr lang="en-US" dirty="0" smtClean="0"/>
-            </a:br>
-            <a:endParaRPr lang="en-US" dirty="0" smtClean="0"/>
+            <a:endParaRPr lang="en-US" sz="2800" b="1" dirty="0">
+              <a:latin typeface="Courier New" panose="02070309020205020404" pitchFamily="49" charset="0"/>
+              <a:cs typeface="Courier New" panose="02070309020205020404" pitchFamily="49" charset="0"/>
+            </a:endParaRPr>
           </a:p>
           <a:p>
             <a:pPr marL="514350" indent="-514350">
@@ -13445,19 +13640,56 @@
             </a:pPr>
             <a:r>
               <a:rPr lang="en-US" dirty="0" smtClean="0"/>
-              <a:t>Capable of carrying on a conversation</a:t>
-            </a:r>
-          </a:p>
-          <a:p>
-            <a:pPr marL="514350" indent="-514350">
-              <a:buFont typeface="+mj-lt"/>
-              <a:buAutoNum type="arabicPeriod"/>
-            </a:pPr>
-            <a:r>
-              <a:rPr lang="en-US" dirty="0" smtClean="0"/>
-              <a:t>Explain</a:t>
-            </a:r>
-            <a:endParaRPr lang="en-US" dirty="0"/>
+              <a:t>What does this command do?</a:t>
+            </a:r>
+            <a:br>
+              <a:rPr lang="en-US" dirty="0" smtClean="0"/>
+            </a:br>
+            <a:r>
+              <a:rPr lang="en-US" dirty="0"/>
+              <a:t/>
+            </a:r>
+            <a:br>
+              <a:rPr lang="en-US" dirty="0"/>
+            </a:br>
+            <a:r>
+              <a:rPr lang="en-US" sz="2800" b="1" dirty="0">
+                <a:latin typeface="Courier New" panose="02070309020205020404" pitchFamily="49" charset="0"/>
+                <a:cs typeface="Courier New" panose="02070309020205020404" pitchFamily="49" charset="0"/>
+              </a:rPr>
+              <a:t>`sudo rpm -</a:t>
+            </a:r>
+            <a:r>
+              <a:rPr lang="en-US" sz="2800" b="1" dirty="0" err="1">
+                <a:latin typeface="Courier New" panose="02070309020205020404" pitchFamily="49" charset="0"/>
+                <a:cs typeface="Courier New" panose="02070309020205020404" pitchFamily="49" charset="0"/>
+              </a:rPr>
+              <a:t>Uvh</a:t>
+            </a:r>
+            <a:r>
+              <a:rPr lang="en-US" sz="2800" b="1" dirty="0">
+                <a:latin typeface="Courier New" panose="02070309020205020404" pitchFamily="49" charset="0"/>
+                <a:cs typeface="Courier New" panose="02070309020205020404" pitchFamily="49" charset="0"/>
+              </a:rPr>
+              <a:t> https://packagecloud.io/chef/stable/packages/&lt;</a:t>
+            </a:r>
+            <a:r>
+              <a:rPr lang="en-US" sz="2800" b="1" i="1" dirty="0">
+                <a:latin typeface="Courier New" panose="02070309020205020404" pitchFamily="49" charset="0"/>
+                <a:cs typeface="Courier New" panose="02070309020205020404" pitchFamily="49" charset="0"/>
+              </a:rPr>
+              <a:t>rest of filename</a:t>
+            </a:r>
+            <a:r>
+              <a:rPr lang="en-US" sz="2800" b="1" dirty="0" smtClean="0">
+                <a:latin typeface="Courier New" panose="02070309020205020404" pitchFamily="49" charset="0"/>
+                <a:cs typeface="Courier New" panose="02070309020205020404" pitchFamily="49" charset="0"/>
+              </a:rPr>
+              <a:t>&gt;'</a:t>
+            </a:r>
+            <a:endParaRPr lang="en-US" dirty="0">
+              <a:cs typeface="Courier New" panose="02070309020205020404" pitchFamily="49" charset="0"/>
+            </a:endParaRPr>
           </a:p>
         </p:txBody>
       </p:sp>
@@ -14517,15 +14749,7 @@
             </a:r>
             <a:r>
               <a:rPr lang="en-US" dirty="0" smtClean="0"/>
-              <a:t> </a:t>
-            </a:r>
-            <a:r>
-              <a:rPr lang="en-US" dirty="0" smtClean="0"/>
-              <a:t>pull-down as </a:t>
-            </a:r>
-            <a:r>
-              <a:rPr lang="en-US" dirty="0" smtClean="0"/>
-              <a:t>indicated by the instructor.</a:t>
+              <a:t> pull-down as indicated by the instructor.</a:t>
             </a:r>
           </a:p>
           <a:p>
@@ -16469,49 +16693,15 @@
 </file>
 
 <file path=customXml/item2.xml><?xml version="1.0" encoding="utf-8"?>
-<?mso-contentType ?>
-<spe:Receivers xmlns:spe="http://schemas.microsoft.com/sharepoint/events">
-  <Receiver>
-    <Name>Document ID Generator</Name>
-    <Synchronization>Synchronous</Synchronization>
-    <Type>10001</Type>
-    <SequenceNumber>1000</SequenceNumber>
-    <Assembly>Microsoft.Office.DocumentManagement, Version=14.0.0.0, Culture=neutral, PublicKeyToken=71e9bce111e9429c</Assembly>
-    <Class>Microsoft.Office.DocumentManagement.Internal.DocIdHandler</Class>
-    <Data/>
-    <Filter/>
-  </Receiver>
-  <Receiver>
-    <Name>Document ID Generator</Name>
-    <Synchronization>Synchronous</Synchronization>
-    <Type>10002</Type>
-    <SequenceNumber>1001</SequenceNumber>
-    <Assembly>Microsoft.Office.DocumentManagement, Version=14.0.0.0, Culture=neutral, PublicKeyToken=71e9bce111e9429c</Assembly>
-    <Class>Microsoft.Office.DocumentManagement.Internal.DocIdHandler</Class>
-    <Data/>
-    <Filter/>
-  </Receiver>
-  <Receiver>
-    <Name>Document ID Generator</Name>
-    <Synchronization>Synchronous</Synchronization>
-    <Type>10004</Type>
-    <SequenceNumber>1002</SequenceNumber>
-    <Assembly>Microsoft.Office.DocumentManagement, Version=14.0.0.0, Culture=neutral, PublicKeyToken=71e9bce111e9429c</Assembly>
-    <Class>Microsoft.Office.DocumentManagement.Internal.DocIdHandler</Class>
-    <Data/>
-    <Filter/>
-  </Receiver>
-  <Receiver>
-    <Name>Document ID Generator</Name>
-    <Synchronization>Synchronous</Synchronization>
-    <Type>10006</Type>
-    <SequenceNumber>1003</SequenceNumber>
-    <Assembly>Microsoft.Office.DocumentManagement, Version=14.0.0.0, Culture=neutral, PublicKeyToken=71e9bce111e9429c</Assembly>
-    <Class>Microsoft.Office.DocumentManagement.Internal.DocIdHandler</Class>
-    <Data/>
-    <Filter/>
-  </Receiver>
-</spe:Receivers>
+<p:properties xmlns:p="http://schemas.microsoft.com/office/2006/metadata/properties" xmlns:xsi="http://www.w3.org/2001/XMLSchema-instance" xmlns:pc="http://schemas.microsoft.com/office/infopath/2007/PartnerControls">
+  <documentManagement>
+    <_dlc_DocId xmlns="7bb5d761-a2ea-4873-95f7-7a6658fb3ef0">M4CWTKMW727E-592-73</_dlc_DocId>
+    <_dlc_DocIdUrl xmlns="7bb5d761-a2ea-4873-95f7-7a6658fb3ef0">
+      <Url>https://kms.vci.local/marketing/team/_layouts/DocIdRedir.aspx?ID=M4CWTKMW727E-592-73</Url>
+      <Description>M4CWTKMW727E-592-73</Description>
+    </_dlc_DocIdUrl>
+  </documentManagement>
+</p:properties>
 </file>
 
 <file path=customXml/item3.xml><?xml version="1.0" encoding="utf-8"?>
@@ -16660,15 +16850,49 @@
 </file>
 
 <file path=customXml/item4.xml><?xml version="1.0" encoding="utf-8"?>
-<p:properties xmlns:p="http://schemas.microsoft.com/office/2006/metadata/properties" xmlns:xsi="http://www.w3.org/2001/XMLSchema-instance" xmlns:pc="http://schemas.microsoft.com/office/infopath/2007/PartnerControls">
-  <documentManagement>
-    <_dlc_DocId xmlns="7bb5d761-a2ea-4873-95f7-7a6658fb3ef0">M4CWTKMW727E-592-73</_dlc_DocId>
-    <_dlc_DocIdUrl xmlns="7bb5d761-a2ea-4873-95f7-7a6658fb3ef0">
-      <Url>https://kms.vci.local/marketing/team/_layouts/DocIdRedir.aspx?ID=M4CWTKMW727E-592-73</Url>
-      <Description>M4CWTKMW727E-592-73</Description>
-    </_dlc_DocIdUrl>
-  </documentManagement>
-</p:properties>
+<?mso-contentType ?>
+<spe:Receivers xmlns:spe="http://schemas.microsoft.com/sharepoint/events">
+  <Receiver>
+    <Name>Document ID Generator</Name>
+    <Synchronization>Synchronous</Synchronization>
+    <Type>10001</Type>
+    <SequenceNumber>1000</SequenceNumber>
+    <Assembly>Microsoft.Office.DocumentManagement, Version=14.0.0.0, Culture=neutral, PublicKeyToken=71e9bce111e9429c</Assembly>
+    <Class>Microsoft.Office.DocumentManagement.Internal.DocIdHandler</Class>
+    <Data/>
+    <Filter/>
+  </Receiver>
+  <Receiver>
+    <Name>Document ID Generator</Name>
+    <Synchronization>Synchronous</Synchronization>
+    <Type>10002</Type>
+    <SequenceNumber>1001</SequenceNumber>
+    <Assembly>Microsoft.Office.DocumentManagement, Version=14.0.0.0, Culture=neutral, PublicKeyToken=71e9bce111e9429c</Assembly>
+    <Class>Microsoft.Office.DocumentManagement.Internal.DocIdHandler</Class>
+    <Data/>
+    <Filter/>
+  </Receiver>
+  <Receiver>
+    <Name>Document ID Generator</Name>
+    <Synchronization>Synchronous</Synchronization>
+    <Type>10004</Type>
+    <SequenceNumber>1002</SequenceNumber>
+    <Assembly>Microsoft.Office.DocumentManagement, Version=14.0.0.0, Culture=neutral, PublicKeyToken=71e9bce111e9429c</Assembly>
+    <Class>Microsoft.Office.DocumentManagement.Internal.DocIdHandler</Class>
+    <Data/>
+    <Filter/>
+  </Receiver>
+  <Receiver>
+    <Name>Document ID Generator</Name>
+    <Synchronization>Synchronous</Synchronization>
+    <Type>10006</Type>
+    <SequenceNumber>1003</SequenceNumber>
+    <Assembly>Microsoft.Office.DocumentManagement, Version=14.0.0.0, Culture=neutral, PublicKeyToken=71e9bce111e9429c</Assembly>
+    <Class>Microsoft.Office.DocumentManagement.Internal.DocIdHandler</Class>
+    <Data/>
+    <Filter/>
+  </Receiver>
+</spe:Receivers>
 </file>
 
 <file path=customXml/itemProps1.xml><?xml version="1.0" encoding="utf-8"?>
@@ -16680,9 +16904,17 @@
 </file>
 
 <file path=customXml/itemProps2.xml><?xml version="1.0" encoding="utf-8"?>
-<ds:datastoreItem xmlns:ds="http://schemas.openxmlformats.org/officeDocument/2006/customXml" ds:itemID="{B13EBC30-FE27-4C6A-B723-23FC2188F7DC}">
+<ds:datastoreItem xmlns:ds="http://schemas.openxmlformats.org/officeDocument/2006/customXml" ds:itemID="{6921749B-AEB7-461B-845F-603CABD25259}">
   <ds:schemaRefs>
-    <ds:schemaRef ds:uri="http://schemas.microsoft.com/sharepoint/events"/>
+    <ds:schemaRef ds:uri="http://schemas.microsoft.com/office/2006/documentManagement/types"/>
+    <ds:schemaRef ds:uri="http://schemas.microsoft.com/office/infopath/2007/PartnerControls"/>
+    <ds:schemaRef ds:uri="http://purl.org/dc/elements/1.1/"/>
+    <ds:schemaRef ds:uri="http://schemas.microsoft.com/office/2006/metadata/properties"/>
+    <ds:schemaRef ds:uri="7bb5d761-a2ea-4873-95f7-7a6658fb3ef0"/>
+    <ds:schemaRef ds:uri="http://purl.org/dc/terms/"/>
+    <ds:schemaRef ds:uri="http://schemas.openxmlformats.org/package/2006/metadata/core-properties"/>
+    <ds:schemaRef ds:uri="http://www.w3.org/XML/1998/namespace"/>
+    <ds:schemaRef ds:uri="http://purl.org/dc/dcmitype/"/>
   </ds:schemaRefs>
 </ds:datastoreItem>
 </file>
@@ -16706,17 +16938,9 @@
 </file>
 
 <file path=customXml/itemProps4.xml><?xml version="1.0" encoding="utf-8"?>
-<ds:datastoreItem xmlns:ds="http://schemas.openxmlformats.org/officeDocument/2006/customXml" ds:itemID="{6921749B-AEB7-461B-845F-603CABD25259}">
+<ds:datastoreItem xmlns:ds="http://schemas.openxmlformats.org/officeDocument/2006/customXml" ds:itemID="{B13EBC30-FE27-4C6A-B723-23FC2188F7DC}">
   <ds:schemaRefs>
-    <ds:schemaRef ds:uri="http://schemas.microsoft.com/office/2006/documentManagement/types"/>
-    <ds:schemaRef ds:uri="http://schemas.microsoft.com/office/infopath/2007/PartnerControls"/>
-    <ds:schemaRef ds:uri="http://purl.org/dc/elements/1.1/"/>
-    <ds:schemaRef ds:uri="http://schemas.microsoft.com/office/2006/metadata/properties"/>
-    <ds:schemaRef ds:uri="7bb5d761-a2ea-4873-95f7-7a6658fb3ef0"/>
-    <ds:schemaRef ds:uri="http://purl.org/dc/terms/"/>
-    <ds:schemaRef ds:uri="http://schemas.openxmlformats.org/package/2006/metadata/core-properties"/>
-    <ds:schemaRef ds:uri="http://www.w3.org/XML/1998/namespace"/>
-    <ds:schemaRef ds:uri="http://purl.org/dc/dcmitype/"/>
+    <ds:schemaRef ds:uri="http://schemas.microsoft.com/sharepoint/events"/>
   </ds:schemaRefs>
 </ds:datastoreItem>
 </file>
</xml_diff>

<commit_message>
Updated Compliance Server version in 02-Install v0.14.5
</commit_message>
<xml_diff>
--- a/02-Install.pptx
+++ b/02-Install.pptx
@@ -293,7 +293,7 @@
               <a:pPr>
                 <a:defRPr/>
               </a:pPr>
-              <a:t>2016-02-11</a:t>
+              <a:t>2016-02-23</a:t>
             </a:fld>
             <a:endParaRPr lang="en-US" dirty="0"/>
           </a:p>
@@ -476,7 +476,7 @@
               <a:pPr>
                 <a:defRPr/>
               </a:pPr>
-              <a:t>2016-02-11</a:t>
+              <a:t>2016-02-23</a:t>
             </a:fld>
             <a:endParaRPr lang="en-US" dirty="0"/>
           </a:p>
@@ -1873,13 +1873,8 @@
           <a:p>
             <a:r>
               <a:rPr lang="en-US" dirty="0" smtClean="0"/>
-              <a:t>In the workplace you would want to use SSL for connections to your Compliance Web UI</a:t>
-            </a:r>
-            <a:r>
-              <a:rPr lang="en-US" dirty="0" smtClean="0"/>
-              <a:t>.</a:t>
-            </a:r>
-            <a:endParaRPr lang="en-US" dirty="0" smtClean="0"/>
+              <a:t>In the workplace you would want to use SSL for connections to your Compliance Web UI.</a:t>
+            </a:r>
           </a:p>
           <a:p>
             <a:endParaRPr lang="en-US" dirty="0" smtClean="0"/>
@@ -2332,11 +2327,7 @@
             </a:r>
             <a:r>
               <a:rPr lang="en-US" baseline="0" dirty="0" smtClean="0"/>
-              <a:t> downloads AND installs the </a:t>
-            </a:r>
-            <a:r>
-              <a:rPr lang="en-US" baseline="0" dirty="0" smtClean="0"/>
-              <a:t>Compliance Server software.</a:t>
+              <a:t> downloads AND installs the Compliance Server software.</a:t>
             </a:r>
             <a:endParaRPr lang="en-US" dirty="0" smtClean="0"/>
           </a:p>
@@ -3076,7 +3067,7 @@
                 <a:ea typeface="ＭＳ Ｐゴシック" charset="0"/>
                 <a:cs typeface="Arial" panose="020B0604020202020204" pitchFamily="34" charset="0"/>
               </a:rPr>
-              <a:t>Compliance Server v0.9.11. </a:t>
+              <a:t>Compliance Server </a:t>
             </a:r>
             <a:r>
               <a:rPr lang="en-US" sz="1200" kern="1200" dirty="0" smtClean="0">
@@ -3088,19 +3079,7 @@
                 <a:ea typeface="ＭＳ Ｐゴシック" charset="0"/>
                 <a:cs typeface="Arial" panose="020B0604020202020204" pitchFamily="34" charset="0"/>
               </a:rPr>
-              <a:t>We will revise this course</a:t>
-            </a:r>
-            <a:r>
-              <a:rPr lang="en-US" sz="1200" kern="1200" baseline="0" dirty="0" smtClean="0">
-                <a:solidFill>
-                  <a:schemeClr val="tx1"/>
-                </a:solidFill>
-                <a:effectLst/>
-                <a:latin typeface="Arial" panose="020B0604020202020204" pitchFamily="34" charset="0"/>
-                <a:ea typeface="ＭＳ Ｐゴシック" charset="0"/>
-                <a:cs typeface="Arial" panose="020B0604020202020204" pitchFamily="34" charset="0"/>
-              </a:rPr>
-              <a:t> as new software version are released.</a:t>
+              <a:t>v0.14.5. </a:t>
             </a:r>
             <a:endParaRPr lang="en-US" dirty="0"/>
           </a:p>
@@ -3338,7 +3317,19 @@
                 <a:ea typeface="ＭＳ Ｐゴシック" charset="0"/>
                 <a:cs typeface="Arial" panose="020B0604020202020204" pitchFamily="34" charset="0"/>
               </a:rPr>
-              <a:t>Compliance Server v0.9.11.</a:t>
+              <a:t>Compliance Server </a:t>
+            </a:r>
+            <a:r>
+              <a:rPr lang="en-US" sz="1200" kern="1200" dirty="0" smtClean="0">
+                <a:solidFill>
+                  <a:schemeClr val="tx1"/>
+                </a:solidFill>
+                <a:effectLst/>
+                <a:latin typeface="Arial" panose="020B0604020202020204" pitchFamily="34" charset="0"/>
+                <a:ea typeface="ＭＳ Ｐゴシック" charset="0"/>
+                <a:cs typeface="Arial" panose="020B0604020202020204" pitchFamily="34" charset="0"/>
+              </a:rPr>
+              <a:t>v0.14.5.</a:t>
             </a:r>
             <a:endParaRPr lang="en-US" dirty="0" smtClean="0"/>
           </a:p>
@@ -4544,14 +4535,14 @@
           </a:ln>
           <a:extLst>
             <a:ext uri="{909E8E84-426E-40dd-AFC4-6F175D3DCCD1}">
-              <a14:hiddenFill xmlns:a14="http://schemas.microsoft.com/office/drawing/2010/main" xmlns="">
+              <a14:hiddenFill xmlns="" xmlns:a14="http://schemas.microsoft.com/office/drawing/2010/main">
                 <a:solidFill>
                   <a:srgbClr val="FFFFFF"/>
                 </a:solidFill>
               </a14:hiddenFill>
             </a:ext>
             <a:ext uri="{91240B29-F687-4f45-9708-019B960494DF}">
-              <a14:hiddenLine xmlns:a14="http://schemas.microsoft.com/office/drawing/2010/main" xmlns="" w="9525">
+              <a14:hiddenLine xmlns="" xmlns:a14="http://schemas.microsoft.com/office/drawing/2010/main" w="9525">
                 <a:solidFill>
                   <a:srgbClr val="000000"/>
                 </a:solidFill>
@@ -4699,14 +4690,14 @@
           </a:ln>
           <a:extLst>
             <a:ext uri="{909E8E84-426E-40dd-AFC4-6F175D3DCCD1}">
-              <a14:hiddenFill xmlns:a14="http://schemas.microsoft.com/office/drawing/2010/main" xmlns="">
+              <a14:hiddenFill xmlns="" xmlns:a14="http://schemas.microsoft.com/office/drawing/2010/main">
                 <a:solidFill>
                   <a:srgbClr val="FFFFFF"/>
                 </a:solidFill>
               </a14:hiddenFill>
             </a:ext>
             <a:ext uri="{91240B29-F687-4f45-9708-019B960494DF}">
-              <a14:hiddenLine xmlns:a14="http://schemas.microsoft.com/office/drawing/2010/main" xmlns="" w="9525">
+              <a14:hiddenLine xmlns="" xmlns:a14="http://schemas.microsoft.com/office/drawing/2010/main" w="9525">
                 <a:solidFill>
                   <a:srgbClr val="000000"/>
                 </a:solidFill>
@@ -5197,14 +5188,14 @@
           </a:ln>
           <a:extLst>
             <a:ext uri="{909E8E84-426E-40dd-AFC4-6F175D3DCCD1}">
-              <a14:hiddenFill xmlns:a14="http://schemas.microsoft.com/office/drawing/2010/main" xmlns="">
+              <a14:hiddenFill xmlns="" xmlns:a14="http://schemas.microsoft.com/office/drawing/2010/main">
                 <a:solidFill>
                   <a:srgbClr val="FFFFFF"/>
                 </a:solidFill>
               </a14:hiddenFill>
             </a:ext>
             <a:ext uri="{91240B29-F687-4f45-9708-019B960494DF}">
-              <a14:hiddenLine xmlns:a14="http://schemas.microsoft.com/office/drawing/2010/main" xmlns="" w="9525">
+              <a14:hiddenLine xmlns="" xmlns:a14="http://schemas.microsoft.com/office/drawing/2010/main" w="9525">
                 <a:solidFill>
                   <a:srgbClr val="000000"/>
                 </a:solidFill>
@@ -6940,14 +6931,14 @@
           </a:ln>
           <a:extLst>
             <a:ext uri="{909E8E84-426E-40dd-AFC4-6F175D3DCCD1}">
-              <a14:hiddenFill xmlns:a14="http://schemas.microsoft.com/office/drawing/2010/main" xmlns="">
+              <a14:hiddenFill xmlns="" xmlns:a14="http://schemas.microsoft.com/office/drawing/2010/main">
                 <a:solidFill>
                   <a:srgbClr val="FFFFFF"/>
                 </a:solidFill>
               </a14:hiddenFill>
             </a:ext>
             <a:ext uri="{91240B29-F687-4f45-9708-019B960494DF}">
-              <a14:hiddenLine xmlns:a14="http://schemas.microsoft.com/office/drawing/2010/main" xmlns="" w="9525">
+              <a14:hiddenLine xmlns="" xmlns:a14="http://schemas.microsoft.com/office/drawing/2010/main" w="9525">
                 <a:solidFill>
                   <a:srgbClr val="000000"/>
                 </a:solidFill>
@@ -8301,14 +8292,14 @@
           </a:ln>
           <a:extLst>
             <a:ext uri="{909E8E84-426E-40dd-AFC4-6F175D3DCCD1}">
-              <a14:hiddenFill xmlns:a14="http://schemas.microsoft.com/office/drawing/2010/main" xmlns="">
+              <a14:hiddenFill xmlns="" xmlns:a14="http://schemas.microsoft.com/office/drawing/2010/main">
                 <a:solidFill>
                   <a:srgbClr val="FFFFFF"/>
                 </a:solidFill>
               </a14:hiddenFill>
             </a:ext>
             <a:ext uri="{91240B29-F687-4f45-9708-019B960494DF}">
-              <a14:hiddenLine xmlns:a14="http://schemas.microsoft.com/office/drawing/2010/main" xmlns="" w="9525">
+              <a14:hiddenLine xmlns="" xmlns:a14="http://schemas.microsoft.com/office/drawing/2010/main" w="9525">
                 <a:solidFill>
                   <a:srgbClr val="000000"/>
                 </a:solidFill>
@@ -8866,14 +8857,14 @@
           </a:ln>
           <a:extLst>
             <a:ext uri="{909E8E84-426E-40dd-AFC4-6F175D3DCCD1}">
-              <a14:hiddenFill xmlns:a14="http://schemas.microsoft.com/office/drawing/2010/main" xmlns="">
+              <a14:hiddenFill xmlns="" xmlns:a14="http://schemas.microsoft.com/office/drawing/2010/main">
                 <a:solidFill>
                   <a:srgbClr val="FFFFFF"/>
                 </a:solidFill>
               </a14:hiddenFill>
             </a:ext>
             <a:ext uri="{91240B29-F687-4f45-9708-019B960494DF}">
-              <a14:hiddenLine xmlns:a14="http://schemas.microsoft.com/office/drawing/2010/main" xmlns="" w="9525">
+              <a14:hiddenLine xmlns="" xmlns:a14="http://schemas.microsoft.com/office/drawing/2010/main" w="9525">
                 <a:solidFill>
                   <a:srgbClr val="000000"/>
                 </a:solidFill>
@@ -9440,14 +9431,14 @@
           </a:ln>
           <a:extLst>
             <a:ext uri="{909E8E84-426E-40dd-AFC4-6F175D3DCCD1}">
-              <a14:hiddenFill xmlns:a14="http://schemas.microsoft.com/office/drawing/2010/main" xmlns="">
+              <a14:hiddenFill xmlns="" xmlns:a14="http://schemas.microsoft.com/office/drawing/2010/main">
                 <a:solidFill>
                   <a:srgbClr val="FFFFFF"/>
                 </a:solidFill>
               </a14:hiddenFill>
             </a:ext>
             <a:ext uri="{91240B29-F687-4f45-9708-019B960494DF}">
-              <a14:hiddenLine xmlns:a14="http://schemas.microsoft.com/office/drawing/2010/main" xmlns="" w="9525">
+              <a14:hiddenLine xmlns="" xmlns:a14="http://schemas.microsoft.com/office/drawing/2010/main" w="9525">
                 <a:solidFill>
                   <a:srgbClr val="000000"/>
                 </a:solidFill>
@@ -10387,14 +10378,14 @@
           </a:ln>
           <a:extLst>
             <a:ext uri="{909E8E84-426E-40dd-AFC4-6F175D3DCCD1}">
-              <a14:hiddenFill xmlns:a14="http://schemas.microsoft.com/office/drawing/2010/main" xmlns="">
+              <a14:hiddenFill xmlns="" xmlns:a14="http://schemas.microsoft.com/office/drawing/2010/main">
                 <a:solidFill>
                   <a:srgbClr val="FFFFFF"/>
                 </a:solidFill>
               </a14:hiddenFill>
             </a:ext>
             <a:ext uri="{91240B29-F687-4f45-9708-019B960494DF}">
-              <a14:hiddenLine xmlns:a14="http://schemas.microsoft.com/office/drawing/2010/main" xmlns="" w="9525">
+              <a14:hiddenLine xmlns="" xmlns:a14="http://schemas.microsoft.com/office/drawing/2010/main" w="9525">
                 <a:solidFill>
                   <a:srgbClr val="000000"/>
                 </a:solidFill>
@@ -11146,14 +11137,14 @@
           </a:ln>
           <a:extLst>
             <a:ext uri="{909E8E84-426E-40dd-AFC4-6F175D3DCCD1}">
-              <a14:hiddenFill xmlns:a14="http://schemas.microsoft.com/office/drawing/2010/main" xmlns="">
+              <a14:hiddenFill xmlns="" xmlns:a14="http://schemas.microsoft.com/office/drawing/2010/main">
                 <a:solidFill>
                   <a:srgbClr val="FFFFFF"/>
                 </a:solidFill>
               </a14:hiddenFill>
             </a:ext>
             <a:ext uri="{91240B29-F687-4f45-9708-019B960494DF}">
-              <a14:hiddenLine xmlns:a14="http://schemas.microsoft.com/office/drawing/2010/main" xmlns="" w="9525">
+              <a14:hiddenLine xmlns="" xmlns:a14="http://schemas.microsoft.com/office/drawing/2010/main" w="9525">
                 <a:solidFill>
                   <a:srgbClr val="000000"/>
                 </a:solidFill>
@@ -13491,6 +13482,13 @@
   <p:transition spd="med">
     <p:fade/>
   </p:transition>
+  <p:timing>
+    <p:tnLst>
+      <p:par>
+        <p:cTn id="1" dur="indefinite" restart="never" nodeType="tmRoot"/>
+      </p:par>
+    </p:tnLst>
+  </p:timing>
 </p:sld>
 </file>
 
@@ -13706,6 +13704,13 @@
   <p:transition spd="med">
     <p:fade/>
   </p:transition>
+  <p:timing>
+    <p:tnLst>
+      <p:par>
+        <p:cTn id="1" dur="indefinite" restart="never" nodeType="tmRoot"/>
+      </p:par>
+    </p:tnLst>
+  </p:timing>
 </p:sld>
 </file>
 
@@ -14034,6 +14039,13 @@
   <p:transition spd="med">
     <p:fade/>
   </p:transition>
+  <p:timing>
+    <p:tnLst>
+      <p:par>
+        <p:cTn id="1" dur="indefinite" restart="never" nodeType="tmRoot"/>
+      </p:par>
+    </p:tnLst>
+  </p:timing>
 </p:sld>
 </file>
 
@@ -14167,6 +14179,13 @@
   <p:transition spd="med">
     <p:fade/>
   </p:transition>
+  <p:timing>
+    <p:tnLst>
+      <p:par>
+        <p:cTn id="1" dur="indefinite" restart="never" nodeType="tmRoot"/>
+      </p:par>
+    </p:tnLst>
+  </p:timing>
 </p:sld>
 </file>
 
@@ -14356,6 +14375,13 @@
   <p:transition spd="med">
     <p:fade/>
   </p:transition>
+  <p:timing>
+    <p:tnLst>
+      <p:par>
+        <p:cTn id="1" dur="indefinite" restart="never" nodeType="tmRoot"/>
+      </p:par>
+    </p:tnLst>
+  </p:timing>
 </p:sld>
 </file>
 
@@ -14666,104 +14692,9 @@
           <a:chExt cx="0" cy="0"/>
         </a:xfrm>
       </p:grpSpPr>
-      <p:sp>
-        <p:nvSpPr>
-          <p:cNvPr id="2" name="Title 1"/>
-          <p:cNvSpPr>
-            <a:spLocks noGrp="1"/>
-          </p:cNvSpPr>
-          <p:nvPr>
-            <p:ph type="title"/>
-          </p:nvPr>
-        </p:nvSpPr>
-        <p:spPr/>
-        <p:txBody>
-          <a:bodyPr/>
-          <a:lstStyle/>
-          <a:p>
-            <a:r>
-              <a:rPr lang="en-US" dirty="0" smtClean="0"/>
-              <a:t>GL: Standalone Installation</a:t>
-            </a:r>
-            <a:endParaRPr lang="en-US" dirty="0"/>
-          </a:p>
-        </p:txBody>
-      </p:sp>
-      <p:sp>
-        <p:nvSpPr>
-          <p:cNvPr id="3" name="Text Placeholder 2"/>
-          <p:cNvSpPr>
-            <a:spLocks noGrp="1"/>
-          </p:cNvSpPr>
-          <p:nvPr>
-            <p:ph type="body" sz="quarter" idx="12"/>
-          </p:nvPr>
-        </p:nvSpPr>
-        <p:spPr>
-          <a:xfrm>
-            <a:off x="650040" y="1559018"/>
-            <a:ext cx="14300400" cy="5345953"/>
-          </a:xfrm>
-        </p:spPr>
-        <p:txBody>
-          <a:bodyPr/>
-          <a:lstStyle/>
-          <a:p>
-            <a:pPr marL="457200" indent="-457200">
-              <a:buFont typeface="Arial" panose="020B0604020202020204" pitchFamily="34" charset="0"/>
-              <a:buChar char="•"/>
-            </a:pPr>
-            <a:r>
-              <a:rPr lang="en-US" dirty="0" smtClean="0"/>
-              <a:t>From the resulting web page, click the </a:t>
-            </a:r>
-            <a:r>
-              <a:rPr lang="en-US" b="1" dirty="0" smtClean="0"/>
-              <a:t>Red Had Linux </a:t>
-            </a:r>
-            <a:r>
-              <a:rPr lang="en-US" dirty="0" smtClean="0"/>
-              <a:t>link and then click the </a:t>
-            </a:r>
-            <a:r>
-              <a:rPr lang="en-US" b="1" dirty="0" smtClean="0"/>
-              <a:t>Version</a:t>
-            </a:r>
-            <a:r>
-              <a:rPr lang="en-US" dirty="0" smtClean="0"/>
-              <a:t> button.</a:t>
-            </a:r>
-          </a:p>
-          <a:p>
-            <a:pPr marL="457200" indent="-457200">
-              <a:buFont typeface="Arial" panose="020B0604020202020204" pitchFamily="34" charset="0"/>
-              <a:buChar char="•"/>
-            </a:pPr>
-            <a:r>
-              <a:rPr lang="en-US" dirty="0" smtClean="0"/>
-              <a:t>Select the version from the </a:t>
-            </a:r>
-            <a:r>
-              <a:rPr lang="en-US" b="1" dirty="0" smtClean="0"/>
-              <a:t>Version</a:t>
-            </a:r>
-            <a:r>
-              <a:rPr lang="en-US" dirty="0" smtClean="0"/>
-              <a:t> pull-down as indicated by the instructor.</a:t>
-            </a:r>
-          </a:p>
-          <a:p>
-            <a:pPr marL="457200" indent="-457200">
-              <a:buFont typeface="Arial" panose="020B0604020202020204" pitchFamily="34" charset="0"/>
-              <a:buChar char="•"/>
-            </a:pPr>
-            <a:endParaRPr lang="en-US" dirty="0"/>
-          </a:p>
-        </p:txBody>
-      </p:sp>
       <p:pic>
         <p:nvPicPr>
-          <p:cNvPr id="4" name="Picture 3"/>
+          <p:cNvPr id="6" name="Picture 5"/>
           <p:cNvPicPr>
             <a:picLocks noChangeAspect="1"/>
           </p:cNvPicPr>
@@ -14777,8 +14708,8 @@
         </p:blipFill>
         <p:spPr>
           <a:xfrm>
-            <a:off x="725644" y="4192859"/>
-            <a:ext cx="14804712" cy="3474112"/>
+            <a:off x="650040" y="3987208"/>
+            <a:ext cx="14840180" cy="3343305"/>
           </a:xfrm>
           <a:prstGeom prst="rect">
             <a:avLst/>
@@ -14790,6 +14721,101 @@
           </a:ln>
         </p:spPr>
       </p:pic>
+      <p:sp>
+        <p:nvSpPr>
+          <p:cNvPr id="2" name="Title 1"/>
+          <p:cNvSpPr>
+            <a:spLocks noGrp="1"/>
+          </p:cNvSpPr>
+          <p:nvPr>
+            <p:ph type="title"/>
+          </p:nvPr>
+        </p:nvSpPr>
+        <p:spPr/>
+        <p:txBody>
+          <a:bodyPr/>
+          <a:lstStyle/>
+          <a:p>
+            <a:r>
+              <a:rPr lang="en-US" dirty="0" smtClean="0"/>
+              <a:t>GL: Standalone Installation</a:t>
+            </a:r>
+            <a:endParaRPr lang="en-US" dirty="0"/>
+          </a:p>
+        </p:txBody>
+      </p:sp>
+      <p:sp>
+        <p:nvSpPr>
+          <p:cNvPr id="3" name="Text Placeholder 2"/>
+          <p:cNvSpPr>
+            <a:spLocks noGrp="1"/>
+          </p:cNvSpPr>
+          <p:nvPr>
+            <p:ph type="body" sz="quarter" idx="12"/>
+          </p:nvPr>
+        </p:nvSpPr>
+        <p:spPr>
+          <a:xfrm>
+            <a:off x="650040" y="1559018"/>
+            <a:ext cx="14300400" cy="5345953"/>
+          </a:xfrm>
+        </p:spPr>
+        <p:txBody>
+          <a:bodyPr/>
+          <a:lstStyle/>
+          <a:p>
+            <a:pPr marL="457200" indent="-457200">
+              <a:buFont typeface="Arial" panose="020B0604020202020204" pitchFamily="34" charset="0"/>
+              <a:buChar char="•"/>
+            </a:pPr>
+            <a:r>
+              <a:rPr lang="en-US" dirty="0" smtClean="0"/>
+              <a:t>From the resulting web page, click the </a:t>
+            </a:r>
+            <a:r>
+              <a:rPr lang="en-US" b="1" dirty="0" smtClean="0"/>
+              <a:t>Red Had Linux </a:t>
+            </a:r>
+            <a:r>
+              <a:rPr lang="en-US" dirty="0" smtClean="0"/>
+              <a:t>link and then click the </a:t>
+            </a:r>
+            <a:r>
+              <a:rPr lang="en-US" b="1" dirty="0" smtClean="0"/>
+              <a:t>Version</a:t>
+            </a:r>
+            <a:r>
+              <a:rPr lang="en-US" dirty="0" smtClean="0"/>
+              <a:t> button.</a:t>
+            </a:r>
+          </a:p>
+          <a:p>
+            <a:pPr marL="457200" indent="-457200">
+              <a:buFont typeface="Arial" panose="020B0604020202020204" pitchFamily="34" charset="0"/>
+              <a:buChar char="•"/>
+            </a:pPr>
+            <a:r>
+              <a:rPr lang="en-US" dirty="0" smtClean="0"/>
+              <a:t>Select the version from the </a:t>
+            </a:r>
+            <a:r>
+              <a:rPr lang="en-US" b="1" dirty="0" smtClean="0"/>
+              <a:t>Version</a:t>
+            </a:r>
+            <a:r>
+              <a:rPr lang="en-US" dirty="0" smtClean="0"/>
+              <a:t> pull-down as indicated by the instructor.</a:t>
+            </a:r>
+          </a:p>
+          <a:p>
+            <a:pPr marL="457200" indent="-457200">
+              <a:buFont typeface="Arial" panose="020B0604020202020204" pitchFamily="34" charset="0"/>
+              <a:buChar char="•"/>
+            </a:pPr>
+            <a:endParaRPr lang="en-US" dirty="0"/>
+          </a:p>
+        </p:txBody>
+      </p:sp>
       <p:cxnSp>
         <p:nvCxnSpPr>
           <p:cNvPr id="7" name="Straight Arrow Connector 6"/>
@@ -14868,7 +14894,7 @@
       </p:grpSpPr>
       <p:pic>
         <p:nvPicPr>
-          <p:cNvPr id="8" name="Picture 7"/>
+          <p:cNvPr id="4" name="Picture 3"/>
           <p:cNvPicPr>
             <a:picLocks noChangeAspect="1"/>
           </p:cNvPicPr>
@@ -14882,8 +14908,8 @@
         </p:blipFill>
         <p:spPr>
           <a:xfrm>
-            <a:off x="725644" y="4192859"/>
-            <a:ext cx="14804712" cy="3474112"/>
+            <a:off x="1174990" y="4093483"/>
+            <a:ext cx="13906021" cy="3237031"/>
           </a:xfrm>
           <a:prstGeom prst="rect">
             <a:avLst/>
@@ -14993,7 +15019,7 @@
         <p:spPr>
           <a:xfrm>
             <a:off x="11998037" y="2216727"/>
-            <a:ext cx="314465" cy="4269133"/>
+            <a:ext cx="101814" cy="4311664"/>
           </a:xfrm>
           <a:prstGeom prst="straightConnector1">
             <a:avLst/>
@@ -16684,15 +16710,6 @@
 </file>
 
 <file path=customXml/item1.xml><?xml version="1.0" encoding="utf-8"?>
-<?mso-contentType ?>
-<FormTemplates xmlns="http://schemas.microsoft.com/sharepoint/v3/contenttype/forms">
-  <Display>DocumentLibraryForm</Display>
-  <Edit>DocumentLibraryForm</Edit>
-  <New>DocumentLibraryForm</New>
-</FormTemplates>
-</file>
-
-<file path=customXml/item2.xml><?xml version="1.0" encoding="utf-8"?>
 <p:properties xmlns:p="http://schemas.microsoft.com/office/2006/metadata/properties" xmlns:xsi="http://www.w3.org/2001/XMLSchema-instance" xmlns:pc="http://schemas.microsoft.com/office/infopath/2007/PartnerControls">
   <documentManagement>
     <_dlc_DocId xmlns="7bb5d761-a2ea-4873-95f7-7a6658fb3ef0">M4CWTKMW727E-592-73</_dlc_DocId>
@@ -16704,7 +16721,62 @@
 </p:properties>
 </file>
 
+<file path=customXml/item2.xml><?xml version="1.0" encoding="utf-8"?>
+<?mso-contentType ?>
+<FormTemplates xmlns="http://schemas.microsoft.com/sharepoint/v3/contenttype/forms">
+  <Display>DocumentLibraryForm</Display>
+  <Edit>DocumentLibraryForm</Edit>
+  <New>DocumentLibraryForm</New>
+</FormTemplates>
+</file>
+
 <file path=customXml/item3.xml><?xml version="1.0" encoding="utf-8"?>
+<?mso-contentType ?>
+<spe:Receivers xmlns:spe="http://schemas.microsoft.com/sharepoint/events">
+  <Receiver>
+    <Name>Document ID Generator</Name>
+    <Synchronization>Synchronous</Synchronization>
+    <Type>10001</Type>
+    <SequenceNumber>1000</SequenceNumber>
+    <Assembly>Microsoft.Office.DocumentManagement, Version=14.0.0.0, Culture=neutral, PublicKeyToken=71e9bce111e9429c</Assembly>
+    <Class>Microsoft.Office.DocumentManagement.Internal.DocIdHandler</Class>
+    <Data/>
+    <Filter/>
+  </Receiver>
+  <Receiver>
+    <Name>Document ID Generator</Name>
+    <Synchronization>Synchronous</Synchronization>
+    <Type>10002</Type>
+    <SequenceNumber>1001</SequenceNumber>
+    <Assembly>Microsoft.Office.DocumentManagement, Version=14.0.0.0, Culture=neutral, PublicKeyToken=71e9bce111e9429c</Assembly>
+    <Class>Microsoft.Office.DocumentManagement.Internal.DocIdHandler</Class>
+    <Data/>
+    <Filter/>
+  </Receiver>
+  <Receiver>
+    <Name>Document ID Generator</Name>
+    <Synchronization>Synchronous</Synchronization>
+    <Type>10004</Type>
+    <SequenceNumber>1002</SequenceNumber>
+    <Assembly>Microsoft.Office.DocumentManagement, Version=14.0.0.0, Culture=neutral, PublicKeyToken=71e9bce111e9429c</Assembly>
+    <Class>Microsoft.Office.DocumentManagement.Internal.DocIdHandler</Class>
+    <Data/>
+    <Filter/>
+  </Receiver>
+  <Receiver>
+    <Name>Document ID Generator</Name>
+    <Synchronization>Synchronous</Synchronization>
+    <Type>10006</Type>
+    <SequenceNumber>1003</SequenceNumber>
+    <Assembly>Microsoft.Office.DocumentManagement, Version=14.0.0.0, Culture=neutral, PublicKeyToken=71e9bce111e9429c</Assembly>
+    <Class>Microsoft.Office.DocumentManagement.Internal.DocIdHandler</Class>
+    <Data/>
+    <Filter/>
+  </Receiver>
+</spe:Receivers>
+</file>
+
+<file path=customXml/item4.xml><?xml version="1.0" encoding="utf-8"?>
 <ct:contentTypeSchema xmlns:ct="http://schemas.microsoft.com/office/2006/metadata/contentType" xmlns:ma="http://schemas.microsoft.com/office/2006/metadata/properties/metaAttributes" ct:_="" ma:_="" ma:contentTypeName="Document" ma:contentTypeID="0x0101000812F700BE7F874999720E88173FE491" ma:contentTypeVersion="0" ma:contentTypeDescription="Create a new document." ma:contentTypeScope="" ma:versionID="3f79f408e2ca720b7aba6e0e32464d0c">
   <xsd:schema xmlns:xsd="http://www.w3.org/2001/XMLSchema" xmlns:xs="http://www.w3.org/2001/XMLSchema" xmlns:p="http://schemas.microsoft.com/office/2006/metadata/properties" xmlns:ns2="7bb5d761-a2ea-4873-95f7-7a6658fb3ef0" targetNamespace="http://schemas.microsoft.com/office/2006/metadata/properties" ma:root="true" ma:fieldsID="1e062cd38ba31e406bfc4340fbc7f87a" ns2:_="">
     <xsd:import namespace="7bb5d761-a2ea-4873-95f7-7a6658fb3ef0"/>
@@ -16849,61 +16921,7 @@
 </ct:contentTypeSchema>
 </file>
 
-<file path=customXml/item4.xml><?xml version="1.0" encoding="utf-8"?>
-<?mso-contentType ?>
-<spe:Receivers xmlns:spe="http://schemas.microsoft.com/sharepoint/events">
-  <Receiver>
-    <Name>Document ID Generator</Name>
-    <Synchronization>Synchronous</Synchronization>
-    <Type>10001</Type>
-    <SequenceNumber>1000</SequenceNumber>
-    <Assembly>Microsoft.Office.DocumentManagement, Version=14.0.0.0, Culture=neutral, PublicKeyToken=71e9bce111e9429c</Assembly>
-    <Class>Microsoft.Office.DocumentManagement.Internal.DocIdHandler</Class>
-    <Data/>
-    <Filter/>
-  </Receiver>
-  <Receiver>
-    <Name>Document ID Generator</Name>
-    <Synchronization>Synchronous</Synchronization>
-    <Type>10002</Type>
-    <SequenceNumber>1001</SequenceNumber>
-    <Assembly>Microsoft.Office.DocumentManagement, Version=14.0.0.0, Culture=neutral, PublicKeyToken=71e9bce111e9429c</Assembly>
-    <Class>Microsoft.Office.DocumentManagement.Internal.DocIdHandler</Class>
-    <Data/>
-    <Filter/>
-  </Receiver>
-  <Receiver>
-    <Name>Document ID Generator</Name>
-    <Synchronization>Synchronous</Synchronization>
-    <Type>10004</Type>
-    <SequenceNumber>1002</SequenceNumber>
-    <Assembly>Microsoft.Office.DocumentManagement, Version=14.0.0.0, Culture=neutral, PublicKeyToken=71e9bce111e9429c</Assembly>
-    <Class>Microsoft.Office.DocumentManagement.Internal.DocIdHandler</Class>
-    <Data/>
-    <Filter/>
-  </Receiver>
-  <Receiver>
-    <Name>Document ID Generator</Name>
-    <Synchronization>Synchronous</Synchronization>
-    <Type>10006</Type>
-    <SequenceNumber>1003</SequenceNumber>
-    <Assembly>Microsoft.Office.DocumentManagement, Version=14.0.0.0, Culture=neutral, PublicKeyToken=71e9bce111e9429c</Assembly>
-    <Class>Microsoft.Office.DocumentManagement.Internal.DocIdHandler</Class>
-    <Data/>
-    <Filter/>
-  </Receiver>
-</spe:Receivers>
-</file>
-
 <file path=customXml/itemProps1.xml><?xml version="1.0" encoding="utf-8"?>
-<ds:datastoreItem xmlns:ds="http://schemas.openxmlformats.org/officeDocument/2006/customXml" ds:itemID="{5CDEB364-43EC-4510-9881-539C2A3FCE9E}">
-  <ds:schemaRefs>
-    <ds:schemaRef ds:uri="http://schemas.microsoft.com/sharepoint/v3/contenttype/forms"/>
-  </ds:schemaRefs>
-</ds:datastoreItem>
-</file>
-
-<file path=customXml/itemProps2.xml><?xml version="1.0" encoding="utf-8"?>
 <ds:datastoreItem xmlns:ds="http://schemas.openxmlformats.org/officeDocument/2006/customXml" ds:itemID="{6921749B-AEB7-461B-845F-603CABD25259}">
   <ds:schemaRefs>
     <ds:schemaRef ds:uri="http://schemas.microsoft.com/office/2006/documentManagement/types"/>
@@ -16919,7 +16937,23 @@
 </ds:datastoreItem>
 </file>
 
+<file path=customXml/itemProps2.xml><?xml version="1.0" encoding="utf-8"?>
+<ds:datastoreItem xmlns:ds="http://schemas.openxmlformats.org/officeDocument/2006/customXml" ds:itemID="{5CDEB364-43EC-4510-9881-539C2A3FCE9E}">
+  <ds:schemaRefs>
+    <ds:schemaRef ds:uri="http://schemas.microsoft.com/sharepoint/v3/contenttype/forms"/>
+  </ds:schemaRefs>
+</ds:datastoreItem>
+</file>
+
 <file path=customXml/itemProps3.xml><?xml version="1.0" encoding="utf-8"?>
+<ds:datastoreItem xmlns:ds="http://schemas.openxmlformats.org/officeDocument/2006/customXml" ds:itemID="{B13EBC30-FE27-4C6A-B723-23FC2188F7DC}">
+  <ds:schemaRefs>
+    <ds:schemaRef ds:uri="http://schemas.microsoft.com/sharepoint/events"/>
+  </ds:schemaRefs>
+</ds:datastoreItem>
+</file>
+
+<file path=customXml/itemProps4.xml><?xml version="1.0" encoding="utf-8"?>
 <ds:datastoreItem xmlns:ds="http://schemas.openxmlformats.org/officeDocument/2006/customXml" ds:itemID="{164479E5-0B02-49AC-B79E-EC1D6164DDD3}">
   <ds:schemaRefs>
     <ds:schemaRef ds:uri="http://schemas.microsoft.com/office/2006/metadata/contentType"/>
@@ -16935,12 +16969,4 @@
     <ds:schemaRef ds:uri="http://schemas.microsoft.com/internal/obd"/>
   </ds:schemaRefs>
 </ds:datastoreItem>
-</file>
-
-<file path=customXml/itemProps4.xml><?xml version="1.0" encoding="utf-8"?>
-<ds:datastoreItem xmlns:ds="http://schemas.openxmlformats.org/officeDocument/2006/customXml" ds:itemID="{B13EBC30-FE27-4C6A-B723-23FC2188F7DC}">
-  <ds:schemaRefs>
-    <ds:schemaRef ds:uri="http://schemas.microsoft.com/sharepoint/events"/>
-  </ds:schemaRefs>
-</ds:datastoreItem>
 </file>
</xml_diff>

<commit_message>
minor edits made during publication process
</commit_message>
<xml_diff>
--- a/02-Install.pptx
+++ b/02-Install.pptx
@@ -293,7 +293,7 @@
               <a:pPr>
                 <a:defRPr/>
               </a:pPr>
-              <a:t>2016-02-23</a:t>
+              <a:t>2016-03-02</a:t>
             </a:fld>
             <a:endParaRPr lang="en-US" dirty="0"/>
           </a:p>
@@ -476,7 +476,7 @@
               <a:pPr>
                 <a:defRPr/>
               </a:pPr>
-              <a:t>2016-02-23</a:t>
+              <a:t>2016-03-02</a:t>
             </a:fld>
             <a:endParaRPr lang="en-US" dirty="0"/>
           </a:p>
@@ -2119,7 +2119,19 @@
           <a:p>
             <a:r>
               <a:rPr lang="en-US" dirty="0" smtClean="0"/>
-              <a:t>...and the run these commands:</a:t>
+              <a:t>...</a:t>
+            </a:r>
+            <a:r>
+              <a:rPr lang="en-US" smtClean="0"/>
+              <a:t>and </a:t>
+            </a:r>
+            <a:r>
+              <a:rPr lang="en-US" smtClean="0"/>
+              <a:t>then </a:t>
+            </a:r>
+            <a:r>
+              <a:rPr lang="en-US" dirty="0" smtClean="0"/>
+              <a:t>run these commands:</a:t>
             </a:r>
           </a:p>
           <a:p>
@@ -3067,19 +3079,7 @@
                 <a:ea typeface="ＭＳ Ｐゴシック" charset="0"/>
                 <a:cs typeface="Arial" panose="020B0604020202020204" pitchFamily="34" charset="0"/>
               </a:rPr>
-              <a:t>Compliance Server </a:t>
-            </a:r>
-            <a:r>
-              <a:rPr lang="en-US" sz="1200" kern="1200" dirty="0" smtClean="0">
-                <a:solidFill>
-                  <a:schemeClr val="tx1"/>
-                </a:solidFill>
-                <a:effectLst/>
-                <a:latin typeface="Arial" panose="020B0604020202020204" pitchFamily="34" charset="0"/>
-                <a:ea typeface="ＭＳ Ｐゴシック" charset="0"/>
-                <a:cs typeface="Arial" panose="020B0604020202020204" pitchFamily="34" charset="0"/>
-              </a:rPr>
-              <a:t>v0.14.5. </a:t>
+              <a:t>Compliance Server v0.14.5. </a:t>
             </a:r>
             <a:endParaRPr lang="en-US" dirty="0"/>
           </a:p>
@@ -3317,19 +3317,7 @@
                 <a:ea typeface="ＭＳ Ｐゴシック" charset="0"/>
                 <a:cs typeface="Arial" panose="020B0604020202020204" pitchFamily="34" charset="0"/>
               </a:rPr>
-              <a:t>Compliance Server </a:t>
-            </a:r>
-            <a:r>
-              <a:rPr lang="en-US" sz="1200" kern="1200" dirty="0" smtClean="0">
-                <a:solidFill>
-                  <a:schemeClr val="tx1"/>
-                </a:solidFill>
-                <a:effectLst/>
-                <a:latin typeface="Arial" panose="020B0604020202020204" pitchFamily="34" charset="0"/>
-                <a:ea typeface="ＭＳ Ｐゴシック" charset="0"/>
-                <a:cs typeface="Arial" panose="020B0604020202020204" pitchFamily="34" charset="0"/>
-              </a:rPr>
-              <a:t>v0.14.5.</a:t>
+              <a:t>Compliance Server v0.14.5.</a:t>
             </a:r>
             <a:endParaRPr lang="en-US" dirty="0" smtClean="0"/>
           </a:p>
@@ -4535,14 +4523,14 @@
           </a:ln>
           <a:extLst>
             <a:ext uri="{909E8E84-426E-40dd-AFC4-6F175D3DCCD1}">
-              <a14:hiddenFill xmlns="" xmlns:a14="http://schemas.microsoft.com/office/drawing/2010/main">
+              <a14:hiddenFill xmlns:a14="http://schemas.microsoft.com/office/drawing/2010/main" xmlns="">
                 <a:solidFill>
                   <a:srgbClr val="FFFFFF"/>
                 </a:solidFill>
               </a14:hiddenFill>
             </a:ext>
             <a:ext uri="{91240B29-F687-4f45-9708-019B960494DF}">
-              <a14:hiddenLine xmlns="" xmlns:a14="http://schemas.microsoft.com/office/drawing/2010/main" w="9525">
+              <a14:hiddenLine xmlns:a14="http://schemas.microsoft.com/office/drawing/2010/main" xmlns="" w="9525">
                 <a:solidFill>
                   <a:srgbClr val="000000"/>
                 </a:solidFill>
@@ -4690,14 +4678,14 @@
           </a:ln>
           <a:extLst>
             <a:ext uri="{909E8E84-426E-40dd-AFC4-6F175D3DCCD1}">
-              <a14:hiddenFill xmlns="" xmlns:a14="http://schemas.microsoft.com/office/drawing/2010/main">
+              <a14:hiddenFill xmlns:a14="http://schemas.microsoft.com/office/drawing/2010/main" xmlns="">
                 <a:solidFill>
                   <a:srgbClr val="FFFFFF"/>
                 </a:solidFill>
               </a14:hiddenFill>
             </a:ext>
             <a:ext uri="{91240B29-F687-4f45-9708-019B960494DF}">
-              <a14:hiddenLine xmlns="" xmlns:a14="http://schemas.microsoft.com/office/drawing/2010/main" w="9525">
+              <a14:hiddenLine xmlns:a14="http://schemas.microsoft.com/office/drawing/2010/main" xmlns="" w="9525">
                 <a:solidFill>
                   <a:srgbClr val="000000"/>
                 </a:solidFill>
@@ -5188,14 +5176,14 @@
           </a:ln>
           <a:extLst>
             <a:ext uri="{909E8E84-426E-40dd-AFC4-6F175D3DCCD1}">
-              <a14:hiddenFill xmlns="" xmlns:a14="http://schemas.microsoft.com/office/drawing/2010/main">
+              <a14:hiddenFill xmlns:a14="http://schemas.microsoft.com/office/drawing/2010/main" xmlns="">
                 <a:solidFill>
                   <a:srgbClr val="FFFFFF"/>
                 </a:solidFill>
               </a14:hiddenFill>
             </a:ext>
             <a:ext uri="{91240B29-F687-4f45-9708-019B960494DF}">
-              <a14:hiddenLine xmlns="" xmlns:a14="http://schemas.microsoft.com/office/drawing/2010/main" w="9525">
+              <a14:hiddenLine xmlns:a14="http://schemas.microsoft.com/office/drawing/2010/main" xmlns="" w="9525">
                 <a:solidFill>
                   <a:srgbClr val="000000"/>
                 </a:solidFill>
@@ -6931,14 +6919,14 @@
           </a:ln>
           <a:extLst>
             <a:ext uri="{909E8E84-426E-40dd-AFC4-6F175D3DCCD1}">
-              <a14:hiddenFill xmlns="" xmlns:a14="http://schemas.microsoft.com/office/drawing/2010/main">
+              <a14:hiddenFill xmlns:a14="http://schemas.microsoft.com/office/drawing/2010/main" xmlns="">
                 <a:solidFill>
                   <a:srgbClr val="FFFFFF"/>
                 </a:solidFill>
               </a14:hiddenFill>
             </a:ext>
             <a:ext uri="{91240B29-F687-4f45-9708-019B960494DF}">
-              <a14:hiddenLine xmlns="" xmlns:a14="http://schemas.microsoft.com/office/drawing/2010/main" w="9525">
+              <a14:hiddenLine xmlns:a14="http://schemas.microsoft.com/office/drawing/2010/main" xmlns="" w="9525">
                 <a:solidFill>
                   <a:srgbClr val="000000"/>
                 </a:solidFill>
@@ -8292,14 +8280,14 @@
           </a:ln>
           <a:extLst>
             <a:ext uri="{909E8E84-426E-40dd-AFC4-6F175D3DCCD1}">
-              <a14:hiddenFill xmlns="" xmlns:a14="http://schemas.microsoft.com/office/drawing/2010/main">
+              <a14:hiddenFill xmlns:a14="http://schemas.microsoft.com/office/drawing/2010/main" xmlns="">
                 <a:solidFill>
                   <a:srgbClr val="FFFFFF"/>
                 </a:solidFill>
               </a14:hiddenFill>
             </a:ext>
             <a:ext uri="{91240B29-F687-4f45-9708-019B960494DF}">
-              <a14:hiddenLine xmlns="" xmlns:a14="http://schemas.microsoft.com/office/drawing/2010/main" w="9525">
+              <a14:hiddenLine xmlns:a14="http://schemas.microsoft.com/office/drawing/2010/main" xmlns="" w="9525">
                 <a:solidFill>
                   <a:srgbClr val="000000"/>
                 </a:solidFill>
@@ -8857,14 +8845,14 @@
           </a:ln>
           <a:extLst>
             <a:ext uri="{909E8E84-426E-40dd-AFC4-6F175D3DCCD1}">
-              <a14:hiddenFill xmlns="" xmlns:a14="http://schemas.microsoft.com/office/drawing/2010/main">
+              <a14:hiddenFill xmlns:a14="http://schemas.microsoft.com/office/drawing/2010/main" xmlns="">
                 <a:solidFill>
                   <a:srgbClr val="FFFFFF"/>
                 </a:solidFill>
               </a14:hiddenFill>
             </a:ext>
             <a:ext uri="{91240B29-F687-4f45-9708-019B960494DF}">
-              <a14:hiddenLine xmlns="" xmlns:a14="http://schemas.microsoft.com/office/drawing/2010/main" w="9525">
+              <a14:hiddenLine xmlns:a14="http://schemas.microsoft.com/office/drawing/2010/main" xmlns="" w="9525">
                 <a:solidFill>
                   <a:srgbClr val="000000"/>
                 </a:solidFill>
@@ -9431,14 +9419,14 @@
           </a:ln>
           <a:extLst>
             <a:ext uri="{909E8E84-426E-40dd-AFC4-6F175D3DCCD1}">
-              <a14:hiddenFill xmlns="" xmlns:a14="http://schemas.microsoft.com/office/drawing/2010/main">
+              <a14:hiddenFill xmlns:a14="http://schemas.microsoft.com/office/drawing/2010/main" xmlns="">
                 <a:solidFill>
                   <a:srgbClr val="FFFFFF"/>
                 </a:solidFill>
               </a14:hiddenFill>
             </a:ext>
             <a:ext uri="{91240B29-F687-4f45-9708-019B960494DF}">
-              <a14:hiddenLine xmlns="" xmlns:a14="http://schemas.microsoft.com/office/drawing/2010/main" w="9525">
+              <a14:hiddenLine xmlns:a14="http://schemas.microsoft.com/office/drawing/2010/main" xmlns="" w="9525">
                 <a:solidFill>
                   <a:srgbClr val="000000"/>
                 </a:solidFill>
@@ -10378,14 +10366,14 @@
           </a:ln>
           <a:extLst>
             <a:ext uri="{909E8E84-426E-40dd-AFC4-6F175D3DCCD1}">
-              <a14:hiddenFill xmlns="" xmlns:a14="http://schemas.microsoft.com/office/drawing/2010/main">
+              <a14:hiddenFill xmlns:a14="http://schemas.microsoft.com/office/drawing/2010/main" xmlns="">
                 <a:solidFill>
                   <a:srgbClr val="FFFFFF"/>
                 </a:solidFill>
               </a14:hiddenFill>
             </a:ext>
             <a:ext uri="{91240B29-F687-4f45-9708-019B960494DF}">
-              <a14:hiddenLine xmlns="" xmlns:a14="http://schemas.microsoft.com/office/drawing/2010/main" w="9525">
+              <a14:hiddenLine xmlns:a14="http://schemas.microsoft.com/office/drawing/2010/main" xmlns="" w="9525">
                 <a:solidFill>
                   <a:srgbClr val="000000"/>
                 </a:solidFill>
@@ -11137,14 +11125,14 @@
           </a:ln>
           <a:extLst>
             <a:ext uri="{909E8E84-426E-40dd-AFC4-6F175D3DCCD1}">
-              <a14:hiddenFill xmlns="" xmlns:a14="http://schemas.microsoft.com/office/drawing/2010/main">
+              <a14:hiddenFill xmlns:a14="http://schemas.microsoft.com/office/drawing/2010/main" xmlns="">
                 <a:solidFill>
                   <a:srgbClr val="FFFFFF"/>
                 </a:solidFill>
               </a14:hiddenFill>
             </a:ext>
             <a:ext uri="{91240B29-F687-4f45-9708-019B960494DF}">
-              <a14:hiddenLine xmlns="" xmlns:a14="http://schemas.microsoft.com/office/drawing/2010/main" w="9525">
+              <a14:hiddenLine xmlns:a14="http://schemas.microsoft.com/office/drawing/2010/main" xmlns="" w="9525">
                 <a:solidFill>
                   <a:srgbClr val="000000"/>
                 </a:solidFill>
@@ -16710,6 +16698,15 @@
 </file>
 
 <file path=customXml/item1.xml><?xml version="1.0" encoding="utf-8"?>
+<?mso-contentType ?>
+<FormTemplates xmlns="http://schemas.microsoft.com/sharepoint/v3/contenttype/forms">
+  <Display>DocumentLibraryForm</Display>
+  <Edit>DocumentLibraryForm</Edit>
+  <New>DocumentLibraryForm</New>
+</FormTemplates>
+</file>
+
+<file path=customXml/item2.xml><?xml version="1.0" encoding="utf-8"?>
 <p:properties xmlns:p="http://schemas.microsoft.com/office/2006/metadata/properties" xmlns:xsi="http://www.w3.org/2001/XMLSchema-instance" xmlns:pc="http://schemas.microsoft.com/office/infopath/2007/PartnerControls">
   <documentManagement>
     <_dlc_DocId xmlns="7bb5d761-a2ea-4873-95f7-7a6658fb3ef0">M4CWTKMW727E-592-73</_dlc_DocId>
@@ -16721,62 +16718,7 @@
 </p:properties>
 </file>
 
-<file path=customXml/item2.xml><?xml version="1.0" encoding="utf-8"?>
-<?mso-contentType ?>
-<FormTemplates xmlns="http://schemas.microsoft.com/sharepoint/v3/contenttype/forms">
-  <Display>DocumentLibraryForm</Display>
-  <Edit>DocumentLibraryForm</Edit>
-  <New>DocumentLibraryForm</New>
-</FormTemplates>
-</file>
-
 <file path=customXml/item3.xml><?xml version="1.0" encoding="utf-8"?>
-<?mso-contentType ?>
-<spe:Receivers xmlns:spe="http://schemas.microsoft.com/sharepoint/events">
-  <Receiver>
-    <Name>Document ID Generator</Name>
-    <Synchronization>Synchronous</Synchronization>
-    <Type>10001</Type>
-    <SequenceNumber>1000</SequenceNumber>
-    <Assembly>Microsoft.Office.DocumentManagement, Version=14.0.0.0, Culture=neutral, PublicKeyToken=71e9bce111e9429c</Assembly>
-    <Class>Microsoft.Office.DocumentManagement.Internal.DocIdHandler</Class>
-    <Data/>
-    <Filter/>
-  </Receiver>
-  <Receiver>
-    <Name>Document ID Generator</Name>
-    <Synchronization>Synchronous</Synchronization>
-    <Type>10002</Type>
-    <SequenceNumber>1001</SequenceNumber>
-    <Assembly>Microsoft.Office.DocumentManagement, Version=14.0.0.0, Culture=neutral, PublicKeyToken=71e9bce111e9429c</Assembly>
-    <Class>Microsoft.Office.DocumentManagement.Internal.DocIdHandler</Class>
-    <Data/>
-    <Filter/>
-  </Receiver>
-  <Receiver>
-    <Name>Document ID Generator</Name>
-    <Synchronization>Synchronous</Synchronization>
-    <Type>10004</Type>
-    <SequenceNumber>1002</SequenceNumber>
-    <Assembly>Microsoft.Office.DocumentManagement, Version=14.0.0.0, Culture=neutral, PublicKeyToken=71e9bce111e9429c</Assembly>
-    <Class>Microsoft.Office.DocumentManagement.Internal.DocIdHandler</Class>
-    <Data/>
-    <Filter/>
-  </Receiver>
-  <Receiver>
-    <Name>Document ID Generator</Name>
-    <Synchronization>Synchronous</Synchronization>
-    <Type>10006</Type>
-    <SequenceNumber>1003</SequenceNumber>
-    <Assembly>Microsoft.Office.DocumentManagement, Version=14.0.0.0, Culture=neutral, PublicKeyToken=71e9bce111e9429c</Assembly>
-    <Class>Microsoft.Office.DocumentManagement.Internal.DocIdHandler</Class>
-    <Data/>
-    <Filter/>
-  </Receiver>
-</spe:Receivers>
-</file>
-
-<file path=customXml/item4.xml><?xml version="1.0" encoding="utf-8"?>
 <ct:contentTypeSchema xmlns:ct="http://schemas.microsoft.com/office/2006/metadata/contentType" xmlns:ma="http://schemas.microsoft.com/office/2006/metadata/properties/metaAttributes" ct:_="" ma:_="" ma:contentTypeName="Document" ma:contentTypeID="0x0101000812F700BE7F874999720E88173FE491" ma:contentTypeVersion="0" ma:contentTypeDescription="Create a new document." ma:contentTypeScope="" ma:versionID="3f79f408e2ca720b7aba6e0e32464d0c">
   <xsd:schema xmlns:xsd="http://www.w3.org/2001/XMLSchema" xmlns:xs="http://www.w3.org/2001/XMLSchema" xmlns:p="http://schemas.microsoft.com/office/2006/metadata/properties" xmlns:ns2="7bb5d761-a2ea-4873-95f7-7a6658fb3ef0" targetNamespace="http://schemas.microsoft.com/office/2006/metadata/properties" ma:root="true" ma:fieldsID="1e062cd38ba31e406bfc4340fbc7f87a" ns2:_="">
     <xsd:import namespace="7bb5d761-a2ea-4873-95f7-7a6658fb3ef0"/>
@@ -16921,23 +16863,53 @@
 </ct:contentTypeSchema>
 </file>
 
-<file path=customXml/itemProps1.xml><?xml version="1.0" encoding="utf-8"?>
-<ds:datastoreItem xmlns:ds="http://schemas.openxmlformats.org/officeDocument/2006/customXml" ds:itemID="{6921749B-AEB7-461B-845F-603CABD25259}">
-  <ds:schemaRefs>
-    <ds:schemaRef ds:uri="http://schemas.microsoft.com/office/2006/documentManagement/types"/>
-    <ds:schemaRef ds:uri="http://schemas.microsoft.com/office/infopath/2007/PartnerControls"/>
-    <ds:schemaRef ds:uri="http://purl.org/dc/elements/1.1/"/>
-    <ds:schemaRef ds:uri="http://schemas.microsoft.com/office/2006/metadata/properties"/>
-    <ds:schemaRef ds:uri="7bb5d761-a2ea-4873-95f7-7a6658fb3ef0"/>
-    <ds:schemaRef ds:uri="http://purl.org/dc/terms/"/>
-    <ds:schemaRef ds:uri="http://schemas.openxmlformats.org/package/2006/metadata/core-properties"/>
-    <ds:schemaRef ds:uri="http://www.w3.org/XML/1998/namespace"/>
-    <ds:schemaRef ds:uri="http://purl.org/dc/dcmitype/"/>
-  </ds:schemaRefs>
-</ds:datastoreItem>
+<file path=customXml/item4.xml><?xml version="1.0" encoding="utf-8"?>
+<?mso-contentType ?>
+<spe:Receivers xmlns:spe="http://schemas.microsoft.com/sharepoint/events">
+  <Receiver>
+    <Name>Document ID Generator</Name>
+    <Synchronization>Synchronous</Synchronization>
+    <Type>10001</Type>
+    <SequenceNumber>1000</SequenceNumber>
+    <Assembly>Microsoft.Office.DocumentManagement, Version=14.0.0.0, Culture=neutral, PublicKeyToken=71e9bce111e9429c</Assembly>
+    <Class>Microsoft.Office.DocumentManagement.Internal.DocIdHandler</Class>
+    <Data/>
+    <Filter/>
+  </Receiver>
+  <Receiver>
+    <Name>Document ID Generator</Name>
+    <Synchronization>Synchronous</Synchronization>
+    <Type>10002</Type>
+    <SequenceNumber>1001</SequenceNumber>
+    <Assembly>Microsoft.Office.DocumentManagement, Version=14.0.0.0, Culture=neutral, PublicKeyToken=71e9bce111e9429c</Assembly>
+    <Class>Microsoft.Office.DocumentManagement.Internal.DocIdHandler</Class>
+    <Data/>
+    <Filter/>
+  </Receiver>
+  <Receiver>
+    <Name>Document ID Generator</Name>
+    <Synchronization>Synchronous</Synchronization>
+    <Type>10004</Type>
+    <SequenceNumber>1002</SequenceNumber>
+    <Assembly>Microsoft.Office.DocumentManagement, Version=14.0.0.0, Culture=neutral, PublicKeyToken=71e9bce111e9429c</Assembly>
+    <Class>Microsoft.Office.DocumentManagement.Internal.DocIdHandler</Class>
+    <Data/>
+    <Filter/>
+  </Receiver>
+  <Receiver>
+    <Name>Document ID Generator</Name>
+    <Synchronization>Synchronous</Synchronization>
+    <Type>10006</Type>
+    <SequenceNumber>1003</SequenceNumber>
+    <Assembly>Microsoft.Office.DocumentManagement, Version=14.0.0.0, Culture=neutral, PublicKeyToken=71e9bce111e9429c</Assembly>
+    <Class>Microsoft.Office.DocumentManagement.Internal.DocIdHandler</Class>
+    <Data/>
+    <Filter/>
+  </Receiver>
+</spe:Receivers>
 </file>
 
-<file path=customXml/itemProps2.xml><?xml version="1.0" encoding="utf-8"?>
+<file path=customXml/itemProps1.xml><?xml version="1.0" encoding="utf-8"?>
 <ds:datastoreItem xmlns:ds="http://schemas.openxmlformats.org/officeDocument/2006/customXml" ds:itemID="{5CDEB364-43EC-4510-9881-539C2A3FCE9E}">
   <ds:schemaRefs>
     <ds:schemaRef ds:uri="http://schemas.microsoft.com/sharepoint/v3/contenttype/forms"/>
@@ -16945,15 +16917,23 @@
 </ds:datastoreItem>
 </file>
 
-<file path=customXml/itemProps3.xml><?xml version="1.0" encoding="utf-8"?>
-<ds:datastoreItem xmlns:ds="http://schemas.openxmlformats.org/officeDocument/2006/customXml" ds:itemID="{B13EBC30-FE27-4C6A-B723-23FC2188F7DC}">
+<file path=customXml/itemProps2.xml><?xml version="1.0" encoding="utf-8"?>
+<ds:datastoreItem xmlns:ds="http://schemas.openxmlformats.org/officeDocument/2006/customXml" ds:itemID="{6921749B-AEB7-461B-845F-603CABD25259}">
   <ds:schemaRefs>
-    <ds:schemaRef ds:uri="http://schemas.microsoft.com/sharepoint/events"/>
+    <ds:schemaRef ds:uri="http://schemas.microsoft.com/office/infopath/2007/PartnerControls"/>
+    <ds:schemaRef ds:uri="http://purl.org/dc/elements/1.1/"/>
+    <ds:schemaRef ds:uri="http://schemas.microsoft.com/office/2006/metadata/properties"/>
+    <ds:schemaRef ds:uri="7bb5d761-a2ea-4873-95f7-7a6658fb3ef0"/>
+    <ds:schemaRef ds:uri="http://schemas.microsoft.com/office/2006/documentManagement/types"/>
+    <ds:schemaRef ds:uri="http://schemas.openxmlformats.org/package/2006/metadata/core-properties"/>
+    <ds:schemaRef ds:uri="http://purl.org/dc/dcmitype/"/>
+    <ds:schemaRef ds:uri="http://www.w3.org/XML/1998/namespace"/>
+    <ds:schemaRef ds:uri="http://purl.org/dc/terms/"/>
   </ds:schemaRefs>
 </ds:datastoreItem>
 </file>
 
-<file path=customXml/itemProps4.xml><?xml version="1.0" encoding="utf-8"?>
+<file path=customXml/itemProps3.xml><?xml version="1.0" encoding="utf-8"?>
 <ds:datastoreItem xmlns:ds="http://schemas.openxmlformats.org/officeDocument/2006/customXml" ds:itemID="{164479E5-0B02-49AC-B79E-EC1D6164DDD3}">
   <ds:schemaRefs>
     <ds:schemaRef ds:uri="http://schemas.microsoft.com/office/2006/metadata/contentType"/>
@@ -16969,4 +16949,12 @@
     <ds:schemaRef ds:uri="http://schemas.microsoft.com/internal/obd"/>
   </ds:schemaRefs>
 </ds:datastoreItem>
+</file>
+
+<file path=customXml/itemProps4.xml><?xml version="1.0" encoding="utf-8"?>
+<ds:datastoreItem xmlns:ds="http://schemas.openxmlformats.org/officeDocument/2006/customXml" ds:itemID="{B13EBC30-FE27-4C6A-B723-23FC2188F7DC}">
+  <ds:schemaRefs>
+    <ds:schemaRef ds:uri="http://schemas.microsoft.com/sharepoint/events"/>
+  </ds:schemaRefs>
+</ds:datastoreItem>
 </file>
</xml_diff>